<commit_message>
minor tweak to image in PowerPoint slide
</commit_message>
<xml_diff>
--- a/PowerPoint Slides/08 - Abstract Syntax Trees.pptx
+++ b/PowerPoint Slides/08 - Abstract Syntax Trees.pptx
@@ -24185,9 +24185,9 @@
         <p:grpSpPr>
           <a:xfrm>
             <a:off x="1909835" y="1853656"/>
-            <a:ext cx="5324330" cy="2184944"/>
+            <a:ext cx="5324330" cy="2003651"/>
             <a:chOff x="1951892" y="1765733"/>
-            <a:chExt cx="5324330" cy="2184944"/>
+            <a:chExt cx="5324330" cy="2003651"/>
           </a:xfrm>
         </p:grpSpPr>
         <p:sp>
@@ -24240,7 +24240,7 @@
           </p:nvSpPr>
           <p:spPr bwMode="auto">
             <a:xfrm>
-              <a:off x="1951892" y="3219157"/>
+              <a:off x="1951892" y="3037864"/>
               <a:ext cx="1645920" cy="731520"/>
             </a:xfrm>
             <a:prstGeom prst="rect">
@@ -24293,7 +24293,7 @@
           </p:nvSpPr>
           <p:spPr bwMode="auto">
             <a:xfrm>
-              <a:off x="5538862" y="3219157"/>
+              <a:off x="5538862" y="3037864"/>
               <a:ext cx="1737360" cy="731520"/>
             </a:xfrm>
             <a:prstGeom prst="rect">
@@ -24348,8 +24348,8 @@
           </p:nvCxnSpPr>
           <p:spPr bwMode="auto">
             <a:xfrm rot="5400000">
-              <a:off x="3316783" y="1963938"/>
-              <a:ext cx="713289" cy="1797149"/>
+              <a:off x="3407429" y="1873292"/>
+              <a:ext cx="531996" cy="1797149"/>
             </a:xfrm>
             <a:prstGeom prst="bentConnector3">
               <a:avLst>
@@ -24379,8 +24379,8 @@
           </p:nvCxnSpPr>
           <p:spPr bwMode="auto">
             <a:xfrm rot="16200000" flipH="1">
-              <a:off x="5133127" y="1944741"/>
-              <a:ext cx="713289" cy="1835541"/>
+              <a:off x="5223773" y="1854095"/>
+              <a:ext cx="531996" cy="1835541"/>
             </a:xfrm>
             <a:prstGeom prst="bentConnector3">
               <a:avLst>
@@ -24408,7 +24408,7 @@
           </p:nvSpPr>
           <p:spPr bwMode="auto">
             <a:xfrm>
-              <a:off x="3931920" y="3217570"/>
+              <a:off x="3931920" y="3036277"/>
               <a:ext cx="1280160" cy="731520"/>
             </a:xfrm>
             <a:prstGeom prst="rect">
@@ -24491,7 +24491,7 @@
           <p:spPr bwMode="auto">
             <a:xfrm flipH="1">
               <a:off x="4572000" y="2505868"/>
-              <a:ext cx="1" cy="711702"/>
+              <a:ext cx="1" cy="530409"/>
             </a:xfrm>
             <a:prstGeom prst="line">
               <a:avLst/>

</xml_diff>

<commit_message>
minor clarifications to one of the slides
</commit_message>
<xml_diff>
--- a/PowerPoint Slides/08 - Abstract Syntax Trees.pptx
+++ b/PowerPoint Slides/08 - Abstract Syntax Trees.pptx
@@ -12945,24 +12945,24 @@
               <a:t>Identifiers declared using </a:t>
             </a:r>
             <a:r>
-              <a:rPr lang="en-US" dirty="0">
+              <a:rPr lang="en-US" dirty="0" err="1">
                 <a:latin typeface="Consolas" panose="020B0609020204030204" pitchFamily="49" charset="0"/>
               </a:rPr>
               <a:t>VarDecl</a:t>
             </a:r>
             <a:r>
               <a:rPr lang="en-US" dirty="0"/>
-              <a:t> (</a:t>
-            </a:r>
-            <a:r>
-              <a:rPr lang="en-US" dirty="0">
+              <a:t> ( which we convert to a list of </a:t>
+            </a:r>
+            <a:r>
+              <a:rPr lang="en-US" dirty="0" err="1">
                 <a:latin typeface="Consolas" panose="020B0609020204030204" pitchFamily="49" charset="0"/>
               </a:rPr>
               <a:t>SingleVarDecl</a:t>
             </a:r>
             <a:r>
               <a:rPr lang="en-US" dirty="0"/>
-              <a:t>) or </a:t>
+              <a:t> as described later) or </a:t>
             </a:r>
             <a:r>
               <a:rPr lang="en-US" dirty="0">

</xml_diff>

<commit_message>
minor corrections to a couple of slides
</commit_message>
<xml_diff>
--- a/PowerPoint Slides/08 - Abstract Syntax Trees.pptx
+++ b/PowerPoint Slides/08 - Abstract Syntax Trees.pptx
@@ -13118,10 +13118,16 @@
               <a:t>Example (in method </a:t>
             </a:r>
             <a:r>
+              <a:rPr lang="en-US" dirty="0" err="1">
+                <a:latin typeface="Consolas" panose="020B0609020204030204" pitchFamily="49" charset="0"/>
+              </a:rPr>
+              <a:t>parseVariableExpr</a:t>
+            </a:r>
+            <a:r>
               <a:rPr lang="en-US" dirty="0">
                 <a:latin typeface="Consolas" panose="020B0609020204030204" pitchFamily="49" charset="0"/>
               </a:rPr>
-              <a:t>parseVariableExpr()</a:t>
+              <a:t>()</a:t>
             </a:r>
             <a:r>
               <a:rPr lang="en-US" dirty="0"/>
@@ -20057,7 +20063,7 @@
               <a:rPr lang="en-US" sz="1800" dirty="0">
                 <a:latin typeface="Consolas" pitchFamily="49" charset="0"/>
               </a:rPr>
-              <a:t> * Called when finished parsing a procedure declaration.</a:t>
+              <a:t> * Called when finished parsing a subprogram declaration.</a:t>
             </a:r>
           </a:p>
           <a:p>
@@ -20239,102 +20245,52 @@
           </a:p>
           <a:p>
             <a:pPr lvl="1">
-              <a:buNone/>
-            </a:pPr>
-            <a:r>
-              <a:rPr lang="en-US" sz="1800" dirty="0">
-                <a:latin typeface="Consolas" pitchFamily="49" charset="0"/>
-                <a:cs typeface="Consolas" pitchFamily="49" charset="0"/>
-              </a:rPr>
-              <a:t>ExitStmt stmt = null;</a:t>
-            </a:r>
-          </a:p>
-          <a:p>
-            <a:pPr lvl="1">
               <a:spcBef>
                 <a:spcPts val="200"/>
               </a:spcBef>
               <a:buNone/>
             </a:pPr>
-            <a:r>
-              <a:rPr lang="en-US" sz="1800" dirty="0">
-                <a:latin typeface="Consolas" pitchFamily="49" charset="0"/>
-                <a:cs typeface="Consolas" pitchFamily="49" charset="0"/>
-              </a:rPr>
-              <a:t>...</a:t>
-            </a:r>
-          </a:p>
-          <a:p>
-            <a:pPr lvl="1">
-              <a:spcBef>
-                <a:spcPts val="200"/>
-              </a:spcBef>
-              <a:buNone/>
-            </a:pPr>
-            <a:r>
-              <a:rPr lang="en-US" sz="1800" dirty="0">
-                <a:latin typeface="Consolas" pitchFamily="49" charset="0"/>
-                <a:cs typeface="Consolas" pitchFamily="49" charset="0"/>
-              </a:rPr>
-              <a:t>LoopStmt </a:t>
-            </a:r>
             <a:r>
               <a:rPr lang="en-US" sz="1800" dirty="0" err="1">
                 <a:latin typeface="Consolas" pitchFamily="49" charset="0"/>
                 <a:cs typeface="Consolas" pitchFamily="49" charset="0"/>
               </a:rPr>
-              <a:t>loopStmt</a:t>
+              <a:t>LoopStmt</a:t>
             </a:r>
             <a:r>
               <a:rPr lang="en-US" sz="1800" dirty="0">
                 <a:latin typeface="Consolas" pitchFamily="49" charset="0"/>
                 <a:cs typeface="Consolas" pitchFamily="49" charset="0"/>
               </a:rPr>
-              <a:t> = </a:t>
+              <a:t> </a:t>
             </a:r>
             <a:r>
               <a:rPr lang="en-US" sz="1800" dirty="0" err="1">
                 <a:latin typeface="Consolas" pitchFamily="49" charset="0"/>
                 <a:cs typeface="Consolas" pitchFamily="49" charset="0"/>
               </a:rPr>
-              <a:t>loopContext.getLoopStmt</a:t>
+              <a:t>loopStmt</a:t>
             </a:r>
             <a:r>
               <a:rPr lang="en-US" sz="1800" dirty="0">
                 <a:latin typeface="Consolas" pitchFamily="49" charset="0"/>
                 <a:cs typeface="Consolas" pitchFamily="49" charset="0"/>
               </a:rPr>
-              <a:t>();</a:t>
-            </a:r>
-          </a:p>
-          <a:p>
-            <a:pPr lvl="1">
-              <a:spcBef>
-                <a:spcPts val="200"/>
-              </a:spcBef>
-              <a:buNone/>
-            </a:pPr>
-            <a:r>
-              <a:rPr lang="en-US" sz="1800" dirty="0">
+              <a:t> = </a:t>
+            </a:r>
+            <a:r>
+              <a:rPr lang="en-US" sz="1800" dirty="0" err="1">
                 <a:latin typeface="Consolas" pitchFamily="49" charset="0"/>
                 <a:cs typeface="Consolas" pitchFamily="49" charset="0"/>
               </a:rPr>
-              <a:t>if (loopStmt == null)</a:t>
-            </a:r>
-          </a:p>
-          <a:p>
-            <a:pPr lvl="1">
-              <a:spcBef>
-                <a:spcPts val="200"/>
-              </a:spcBef>
-              <a:buNone/>
-            </a:pPr>
+              <a:t>loopContext.getLoopStmt</a:t>
+            </a:r>
             <a:r>
               <a:rPr lang="en-US" sz="1800" dirty="0">
                 <a:latin typeface="Consolas" pitchFamily="49" charset="0"/>
                 <a:cs typeface="Consolas" pitchFamily="49" charset="0"/>
               </a:rPr>
-              <a:t>    throw error(exitPosition,</a:t>
+              <a:t>();</a:t>
             </a:r>
           </a:p>
           <a:p>
@@ -20349,7 +20305,7 @@
                 <a:latin typeface="Consolas" pitchFamily="49" charset="0"/>
                 <a:cs typeface="Consolas" pitchFamily="49" charset="0"/>
               </a:rPr>
-              <a:t>        "Exit statement is not nested within a loop");</a:t>
+              <a:t>if (loopStmt == null)</a:t>
             </a:r>
           </a:p>
           <a:p>
@@ -20364,7 +20320,37 @@
                 <a:latin typeface="Consolas" pitchFamily="49" charset="0"/>
                 <a:cs typeface="Consolas" pitchFamily="49" charset="0"/>
               </a:rPr>
-              <a:t>stmt = new ExitStmt(expr, loopStmt);</a:t>
+              <a:t>    throw error(exitPosition,</a:t>
+            </a:r>
+          </a:p>
+          <a:p>
+            <a:pPr lvl="1">
+              <a:spcBef>
+                <a:spcPts val="200"/>
+              </a:spcBef>
+              <a:buNone/>
+            </a:pPr>
+            <a:r>
+              <a:rPr lang="en-US" sz="1800" dirty="0">
+                <a:latin typeface="Consolas" pitchFamily="49" charset="0"/>
+                <a:cs typeface="Consolas" pitchFamily="49" charset="0"/>
+              </a:rPr>
+              <a:t>        "Exit statement is not nested within a loop");</a:t>
+            </a:r>
+          </a:p>
+          <a:p>
+            <a:pPr lvl="1">
+              <a:spcBef>
+                <a:spcPts val="200"/>
+              </a:spcBef>
+              <a:buNone/>
+            </a:pPr>
+            <a:r>
+              <a:rPr lang="en-US" sz="1800" dirty="0">
+                <a:latin typeface="Consolas" pitchFamily="49" charset="0"/>
+                <a:cs typeface="Consolas" pitchFamily="49" charset="0"/>
+              </a:rPr>
+              <a:t>return new ExitStmt(expr, loopStmt);</a:t>
             </a:r>
             <a:endParaRPr lang="en-US" dirty="0"/>
           </a:p>

</xml_diff>

<commit_message>
Added several new slides
</commit_message>
<xml_diff>
--- a/PowerPoint Slides/08 - Abstract Syntax Trees.pptx
+++ b/PowerPoint Slides/08 - Abstract Syntax Trees.pptx
@@ -5,10 +5,10 @@
     <p:sldMasterId id="2147483651" r:id="rId1"/>
   </p:sldMasterIdLst>
   <p:notesMasterIdLst>
-    <p:notesMasterId r:id="rId49"/>
+    <p:notesMasterId r:id="rId56"/>
   </p:notesMasterIdLst>
   <p:handoutMasterIdLst>
-    <p:handoutMasterId r:id="rId50"/>
+    <p:handoutMasterId r:id="rId57"/>
   </p:handoutMasterIdLst>
   <p:sldIdLst>
     <p:sldId id="256" r:id="rId2"/>
@@ -53,11 +53,18 @@
     <p:sldId id="325" r:id="rId41"/>
     <p:sldId id="322" r:id="rId42"/>
     <p:sldId id="330" r:id="rId43"/>
-    <p:sldId id="289" r:id="rId44"/>
-    <p:sldId id="290" r:id="rId45"/>
-    <p:sldId id="305" r:id="rId46"/>
-    <p:sldId id="291" r:id="rId47"/>
-    <p:sldId id="295" r:id="rId48"/>
+    <p:sldId id="336" r:id="rId44"/>
+    <p:sldId id="337" r:id="rId45"/>
+    <p:sldId id="338" r:id="rId46"/>
+    <p:sldId id="340" r:id="rId47"/>
+    <p:sldId id="339" r:id="rId48"/>
+    <p:sldId id="341" r:id="rId49"/>
+    <p:sldId id="342" r:id="rId50"/>
+    <p:sldId id="289" r:id="rId51"/>
+    <p:sldId id="290" r:id="rId52"/>
+    <p:sldId id="305" r:id="rId53"/>
+    <p:sldId id="291" r:id="rId54"/>
+    <p:sldId id="295" r:id="rId55"/>
   </p:sldIdLst>
   <p:sldSz cx="9144000" cy="6858000" type="screen4x3"/>
   <p:notesSz cx="7315200" cy="9601200"/>
@@ -3262,7 +3269,7 @@
               <a:pPr>
                 <a:defRPr/>
               </a:pPr>
-              <a:t>43</a:t>
+              <a:t>50</a:t>
             </a:fld>
             <a:endParaRPr lang="en-US" dirty="0"/>
           </a:p>
@@ -3379,7 +3386,7 @@
               <a:pPr>
                 <a:defRPr/>
               </a:pPr>
-              <a:t>44</a:t>
+              <a:t>51</a:t>
             </a:fld>
             <a:endParaRPr lang="en-US" dirty="0"/>
           </a:p>
@@ -3613,7 +3620,7 @@
               <a:pPr>
                 <a:defRPr/>
               </a:pPr>
-              <a:t>45</a:t>
+              <a:t>52</a:t>
             </a:fld>
             <a:endParaRPr lang="en-US" dirty="0"/>
           </a:p>
@@ -3730,7 +3737,7 @@
               <a:pPr>
                 <a:defRPr/>
               </a:pPr>
-              <a:t>46</a:t>
+              <a:t>53</a:t>
             </a:fld>
             <a:endParaRPr lang="en-US" dirty="0"/>
           </a:p>
@@ -3847,7 +3854,7 @@
               <a:pPr>
                 <a:defRPr/>
               </a:pPr>
-              <a:t>47</a:t>
+              <a:t>54</a:t>
             </a:fld>
             <a:endParaRPr lang="en-US" dirty="0"/>
           </a:p>
@@ -19244,31 +19251,107 @@
       </p:grpSpPr>
       <p:sp>
         <p:nvSpPr>
-          <p:cNvPr id="22530" name="Footer Placeholder 3"/>
+          <p:cNvPr id="8" name="Title 7">
+            <a:extLst>
+              <a:ext uri="{FF2B5EF4-FFF2-40B4-BE49-F238E27FC236}">
+                <a16:creationId xmlns:a16="http://schemas.microsoft.com/office/drawing/2014/main" id="{563233BE-B20A-4E38-8D6C-3D8FB41B4336}"/>
+              </a:ext>
+            </a:extLst>
+          </p:cNvPr>
           <p:cNvSpPr>
             <a:spLocks noGrp="1"/>
           </p:cNvSpPr>
           <p:nvPr>
+            <p:ph type="title"/>
+          </p:nvPr>
+        </p:nvSpPr>
+        <p:spPr/>
+        <p:txBody>
+          <a:bodyPr/>
+          <a:lstStyle/>
+          <a:p>
+            <a:r>
+              <a:rPr lang="en-US" dirty="0"/>
+              <a:t>Determining Types of Expressions</a:t>
+            </a:r>
+          </a:p>
+        </p:txBody>
+      </p:sp>
+      <p:sp>
+        <p:nvSpPr>
+          <p:cNvPr id="9" name="Content Placeholder 8">
+            <a:extLst>
+              <a:ext uri="{FF2B5EF4-FFF2-40B4-BE49-F238E27FC236}">
+                <a16:creationId xmlns:a16="http://schemas.microsoft.com/office/drawing/2014/main" id="{76E1210A-295D-4718-9E1A-27C835EA23E3}"/>
+              </a:ext>
+            </a:extLst>
+          </p:cNvPr>
+          <p:cNvSpPr>
+            <a:spLocks noGrp="1"/>
+          </p:cNvSpPr>
+          <p:nvPr>
+            <p:ph idx="1"/>
+          </p:nvPr>
+        </p:nvSpPr>
+        <p:spPr/>
+        <p:txBody>
+          <a:bodyPr/>
+          <a:lstStyle/>
+          <a:p>
+            <a:r>
+              <a:rPr lang="en-US" dirty="0"/>
+              <a:t>Since CPRL is statically typed, it is possible to determine the type of every expression at compile time, and AST class Expression has a property for the expression type that is inherited by all expression subclasses.</a:t>
+            </a:r>
+          </a:p>
+          <a:p>
+            <a:r>
+              <a:rPr lang="en-US" dirty="0"/>
+              <a:t>Where within the compiler should type determination take place?  In general, we will determine the type of an expression in the constructor for the expression’s AST class.</a:t>
+            </a:r>
+          </a:p>
+        </p:txBody>
+      </p:sp>
+      <p:sp>
+        <p:nvSpPr>
+          <p:cNvPr id="3" name="Footer Placeholder 2">
+            <a:extLst>
+              <a:ext uri="{FF2B5EF4-FFF2-40B4-BE49-F238E27FC236}">
+                <a16:creationId xmlns:a16="http://schemas.microsoft.com/office/drawing/2014/main" id="{5A404E55-B647-4C7C-9D62-C9EA115DC92C}"/>
+              </a:ext>
+            </a:extLst>
+          </p:cNvPr>
+          <p:cNvSpPr>
+            <a:spLocks noGrp="1"/>
+          </p:cNvSpPr>
+          <p:nvPr>
             <p:ph type="ftr" sz="quarter" idx="10"/>
           </p:nvPr>
         </p:nvSpPr>
-        <p:spPr>
-          <a:noFill/>
-        </p:spPr>
-        <p:txBody>
-          <a:bodyPr/>
-          <a:lstStyle/>
-          <a:p>
-            <a:r>
-              <a:rPr lang="en-US" dirty="0"/>
+        <p:spPr/>
+        <p:txBody>
+          <a:bodyPr/>
+          <a:lstStyle/>
+          <a:p>
+            <a:pPr>
+              <a:defRPr/>
+            </a:pPr>
+            <a:r>
+              <a:rPr lang="en-US"/>
               <a:t>©SoftMoore Consulting</a:t>
             </a:r>
-          </a:p>
-        </p:txBody>
-      </p:sp>
-      <p:sp>
-        <p:nvSpPr>
-          <p:cNvPr id="22531" name="Slide Number Placeholder 4"/>
+            <a:endParaRPr lang="en-US" dirty="0"/>
+          </a:p>
+        </p:txBody>
+      </p:sp>
+      <p:sp>
+        <p:nvSpPr>
+          <p:cNvPr id="4" name="Slide Number Placeholder 3">
+            <a:extLst>
+              <a:ext uri="{FF2B5EF4-FFF2-40B4-BE49-F238E27FC236}">
+                <a16:creationId xmlns:a16="http://schemas.microsoft.com/office/drawing/2014/main" id="{964B72F4-5156-47A8-BE64-4FAAF4115382}"/>
+              </a:ext>
+            </a:extLst>
+          </p:cNvPr>
           <p:cNvSpPr>
             <a:spLocks noGrp="1"/>
           </p:cNvSpPr>
@@ -19276,129 +19359,35 @@
             <p:ph type="sldNum" sz="quarter" idx="11"/>
           </p:nvPr>
         </p:nvSpPr>
-        <p:spPr>
-          <a:noFill/>
-        </p:spPr>
-        <p:txBody>
-          <a:bodyPr/>
-          <a:lstStyle/>
-          <a:p>
-            <a:r>
-              <a:rPr lang="en-US" dirty="0"/>
+        <p:spPr/>
+        <p:txBody>
+          <a:bodyPr/>
+          <a:lstStyle/>
+          <a:p>
+            <a:pPr>
+              <a:defRPr/>
+            </a:pPr>
+            <a:r>
+              <a:rPr lang="en-US"/>
               <a:t>Slide </a:t>
             </a:r>
-            <a:fld id="{E181C637-EA7A-4AA2-BD9E-5103699E8BC5}" type="slidenum">
+            <a:fld id="{0493F5BC-5863-40DB-9BF6-90302664BBE6}" type="slidenum">
               <a:rPr lang="en-US" smtClean="0"/>
-              <a:pPr/>
+              <a:pPr>
+                <a:defRPr/>
+              </a:pPr>
               <a:t>43</a:t>
             </a:fld>
             <a:endParaRPr lang="en-US" dirty="0"/>
           </a:p>
         </p:txBody>
       </p:sp>
-      <p:sp>
-        <p:nvSpPr>
-          <p:cNvPr id="22532" name="Rectangle 2"/>
-          <p:cNvSpPr>
-            <a:spLocks noGrp="1" noChangeArrowheads="1"/>
-          </p:cNvSpPr>
-          <p:nvPr>
-            <p:ph type="title"/>
-          </p:nvPr>
-        </p:nvSpPr>
-        <p:spPr/>
-        <p:txBody>
-          <a:bodyPr/>
-          <a:lstStyle/>
-          <a:p>
-            <a:r>
-              <a:rPr lang="en-US" dirty="0"/>
-              <a:t>Maintaining Context During Parsing</a:t>
-            </a:r>
-          </a:p>
-        </p:txBody>
-      </p:sp>
-      <p:sp>
-        <p:nvSpPr>
-          <p:cNvPr id="22533" name="Rectangle 3"/>
-          <p:cNvSpPr>
-            <a:spLocks noGrp="1" noChangeArrowheads="1"/>
-          </p:cNvSpPr>
-          <p:nvPr>
-            <p:ph type="body" idx="1"/>
-          </p:nvPr>
-        </p:nvSpPr>
-        <p:spPr/>
-        <p:txBody>
-          <a:bodyPr/>
-          <a:lstStyle/>
-          <a:p>
-            <a:r>
-              <a:rPr lang="en-US" dirty="0"/>
-              <a:t>Certain CPRL statements need access to an enclosing context for constraint checking and code generation.</a:t>
-            </a:r>
-          </a:p>
-          <a:p>
-            <a:r>
-              <a:rPr lang="en-US" dirty="0"/>
-              <a:t>Example: </a:t>
-            </a:r>
-            <a:r>
-              <a:rPr lang="en-US" sz="2000" dirty="0">
-                <a:latin typeface="Consolas" pitchFamily="49" charset="0"/>
-              </a:rPr>
-              <a:t>exit when n &gt; 10;</a:t>
-            </a:r>
-            <a:endParaRPr lang="en-US" dirty="0"/>
-          </a:p>
-          <a:p>
-            <a:pPr>
-              <a:spcBef>
-                <a:spcPts val="400"/>
-              </a:spcBef>
-              <a:buNone/>
-            </a:pPr>
-            <a:r>
-              <a:rPr lang="en-US" dirty="0"/>
-              <a:t>	An exit statement has meaning only when nested inside a loop., and code generation for an exit statement requires knowledge of which loop encloses it.</a:t>
-            </a:r>
-          </a:p>
-          <a:p>
-            <a:r>
-              <a:rPr lang="en-US" dirty="0"/>
-              <a:t>Similarly, a return statement needs to know which subprogram it is returning from.</a:t>
-            </a:r>
-          </a:p>
-          <a:p>
-            <a:r>
-              <a:rPr lang="en-US" dirty="0"/>
-              <a:t>Classes </a:t>
-            </a:r>
-            <a:r>
-              <a:rPr lang="en-US" dirty="0">
-                <a:latin typeface="Consolas" panose="020B0609020204030204" pitchFamily="49" charset="0"/>
-              </a:rPr>
-              <a:t>LoopContext</a:t>
-            </a:r>
-            <a:r>
-              <a:rPr lang="en-US" dirty="0"/>
-              <a:t> and </a:t>
-            </a:r>
-            <a:r>
-              <a:rPr lang="en-US" dirty="0">
-                <a:latin typeface="Consolas" pitchFamily="49" charset="0"/>
-                <a:cs typeface="Consolas" pitchFamily="49" charset="0"/>
-              </a:rPr>
-              <a:t>SubprogramContext</a:t>
-            </a:r>
-            <a:r>
-              <a:rPr lang="en-US" dirty="0"/>
-              <a:t> will be used to maintain contextual information in these cases.</a:t>
-            </a:r>
-          </a:p>
-        </p:txBody>
-      </p:sp>
     </p:spTree>
+    <p:extLst>
+      <p:ext uri="{BB962C8B-B14F-4D97-AF65-F5344CB8AC3E}">
+        <p14:creationId xmlns:p14="http://schemas.microsoft.com/office/powerpoint/2010/main" val="2250100895"/>
+      </p:ext>
+    </p:extLst>
   </p:cSld>
   <p:clrMapOvr>
     <a:masterClrMapping/>
@@ -19425,31 +19414,330 @@
       </p:grpSpPr>
       <p:sp>
         <p:nvSpPr>
-          <p:cNvPr id="23554" name="Footer Placeholder 3"/>
+          <p:cNvPr id="8" name="Title 7">
+            <a:extLst>
+              <a:ext uri="{FF2B5EF4-FFF2-40B4-BE49-F238E27FC236}">
+                <a16:creationId xmlns:a16="http://schemas.microsoft.com/office/drawing/2014/main" id="{563233BE-B20A-4E38-8D6C-3D8FB41B4336}"/>
+              </a:ext>
+            </a:extLst>
+          </p:cNvPr>
           <p:cNvSpPr>
             <a:spLocks noGrp="1"/>
           </p:cNvSpPr>
           <p:nvPr>
+            <p:ph type="title"/>
+          </p:nvPr>
+        </p:nvSpPr>
+        <p:spPr/>
+        <p:txBody>
+          <a:bodyPr/>
+          <a:lstStyle/>
+          <a:p>
+            <a:r>
+              <a:rPr lang="en-US" dirty="0"/>
+              <a:t>Example: </a:t>
+            </a:r>
+            <a:r>
+              <a:rPr lang="en-US" dirty="0" err="1">
+                <a:latin typeface="Consolas" panose="020B0609020204030204" pitchFamily="49" charset="0"/>
+              </a:rPr>
+              <a:t>RelationalExpr</a:t>
+            </a:r>
+            <a:endParaRPr lang="en-US" dirty="0">
+              <a:latin typeface="Consolas" panose="020B0609020204030204" pitchFamily="49" charset="0"/>
+            </a:endParaRPr>
+          </a:p>
+        </p:txBody>
+      </p:sp>
+      <p:sp>
+        <p:nvSpPr>
+          <p:cNvPr id="9" name="Content Placeholder 8">
+            <a:extLst>
+              <a:ext uri="{FF2B5EF4-FFF2-40B4-BE49-F238E27FC236}">
+                <a16:creationId xmlns:a16="http://schemas.microsoft.com/office/drawing/2014/main" id="{76E1210A-295D-4718-9E1A-27C835EA23E3}"/>
+              </a:ext>
+            </a:extLst>
+          </p:cNvPr>
+          <p:cNvSpPr>
+            <a:spLocks noGrp="1"/>
+          </p:cNvSpPr>
+          <p:nvPr>
+            <p:ph idx="1"/>
+          </p:nvPr>
+        </p:nvSpPr>
+        <p:spPr/>
+        <p:txBody>
+          <a:bodyPr/>
+          <a:lstStyle/>
+          <a:p>
+            <a:r>
+              <a:rPr lang="en-US" dirty="0"/>
+              <a:t>A relational expression is a binary expression where the operator is a relational operator such as “</a:t>
+            </a:r>
+            <a:r>
+              <a:rPr lang="en-US" dirty="0">
+                <a:latin typeface="Consolas" panose="020B0609020204030204" pitchFamily="49" charset="0"/>
+              </a:rPr>
+              <a:t>&lt;=</a:t>
+            </a:r>
+            <a:r>
+              <a:rPr lang="en-US" dirty="0"/>
+              <a:t>” or “&gt;”.</a:t>
+            </a:r>
+          </a:p>
+          <a:p>
+            <a:r>
+              <a:rPr lang="en-US" dirty="0"/>
+              <a:t>Regardless of the types of the two operands, a relational expression always has type </a:t>
+            </a:r>
+            <a:r>
+              <a:rPr lang="en-US" dirty="0">
+                <a:latin typeface="Consolas" panose="020B0609020204030204" pitchFamily="49" charset="0"/>
+              </a:rPr>
+              <a:t>Boolean</a:t>
+            </a:r>
+            <a:r>
+              <a:rPr lang="en-US" dirty="0"/>
+              <a:t>.</a:t>
+            </a:r>
+          </a:p>
+          <a:p>
+            <a:r>
+              <a:rPr lang="en-US" dirty="0"/>
+              <a:t>Constructor for </a:t>
+            </a:r>
+            <a:r>
+              <a:rPr lang="en-US" dirty="0" err="1">
+                <a:latin typeface="Consolas" panose="020B0609020204030204" pitchFamily="49" charset="0"/>
+              </a:rPr>
+              <a:t>RelationalExpr</a:t>
+            </a:r>
+            <a:endParaRPr lang="en-US" dirty="0">
+              <a:latin typeface="Consolas" panose="020B0609020204030204" pitchFamily="49" charset="0"/>
+            </a:endParaRPr>
+          </a:p>
+          <a:p>
+            <a:pPr marL="365760" indent="0">
+              <a:buNone/>
+            </a:pPr>
+            <a:r>
+              <a:rPr lang="en-US" sz="1800" dirty="0">
+                <a:latin typeface="Consolas" panose="020B0609020204030204" pitchFamily="49" charset="0"/>
+              </a:rPr>
+              <a:t>public </a:t>
+            </a:r>
+            <a:r>
+              <a:rPr lang="en-US" sz="1800" dirty="0" err="1">
+                <a:latin typeface="Consolas" panose="020B0609020204030204" pitchFamily="49" charset="0"/>
+              </a:rPr>
+              <a:t>RelationalExpr</a:t>
+            </a:r>
+            <a:r>
+              <a:rPr lang="en-US" sz="1800" dirty="0">
+                <a:latin typeface="Consolas" panose="020B0609020204030204" pitchFamily="49" charset="0"/>
+              </a:rPr>
+              <a:t>(Expression </a:t>
+            </a:r>
+            <a:r>
+              <a:rPr lang="en-US" sz="1800" dirty="0" err="1">
+                <a:latin typeface="Consolas" panose="020B0609020204030204" pitchFamily="49" charset="0"/>
+              </a:rPr>
+              <a:t>leftOperand</a:t>
+            </a:r>
+            <a:r>
+              <a:rPr lang="en-US" sz="1800" dirty="0">
+                <a:latin typeface="Consolas" panose="020B0609020204030204" pitchFamily="49" charset="0"/>
+              </a:rPr>
+              <a:t>, Token operator,</a:t>
+            </a:r>
+          </a:p>
+          <a:p>
+            <a:pPr marL="365760" indent="0">
+              <a:spcBef>
+                <a:spcPts val="200"/>
+              </a:spcBef>
+              <a:buNone/>
+            </a:pPr>
+            <a:r>
+              <a:rPr lang="en-US" sz="1800" dirty="0">
+                <a:latin typeface="Consolas" panose="020B0609020204030204" pitchFamily="49" charset="0"/>
+              </a:rPr>
+              <a:t>                      Expression </a:t>
+            </a:r>
+            <a:r>
+              <a:rPr lang="en-US" sz="1800" dirty="0" err="1">
+                <a:latin typeface="Consolas" panose="020B0609020204030204" pitchFamily="49" charset="0"/>
+              </a:rPr>
+              <a:t>rightOperand</a:t>
+            </a:r>
+            <a:r>
+              <a:rPr lang="en-US" sz="1800" dirty="0">
+                <a:latin typeface="Consolas" panose="020B0609020204030204" pitchFamily="49" charset="0"/>
+              </a:rPr>
+              <a:t>)</a:t>
+            </a:r>
+          </a:p>
+          <a:p>
+            <a:pPr marL="365760" indent="0">
+              <a:spcBef>
+                <a:spcPts val="200"/>
+              </a:spcBef>
+              <a:buNone/>
+            </a:pPr>
+            <a:r>
+              <a:rPr lang="en-US" sz="1800" dirty="0">
+                <a:latin typeface="Consolas" panose="020B0609020204030204" pitchFamily="49" charset="0"/>
+              </a:rPr>
+              <a:t>  {</a:t>
+            </a:r>
+          </a:p>
+          <a:p>
+            <a:pPr marL="365760" indent="0">
+              <a:spcBef>
+                <a:spcPts val="200"/>
+              </a:spcBef>
+              <a:buNone/>
+            </a:pPr>
+            <a:r>
+              <a:rPr lang="en-US" sz="1800" dirty="0">
+                <a:latin typeface="Consolas" panose="020B0609020204030204" pitchFamily="49" charset="0"/>
+              </a:rPr>
+              <a:t>    super(</a:t>
+            </a:r>
+            <a:r>
+              <a:rPr lang="en-US" sz="1800" dirty="0" err="1">
+                <a:latin typeface="Consolas" panose="020B0609020204030204" pitchFamily="49" charset="0"/>
+              </a:rPr>
+              <a:t>leftOperand</a:t>
+            </a:r>
+            <a:r>
+              <a:rPr lang="en-US" sz="1800" dirty="0">
+                <a:latin typeface="Consolas" panose="020B0609020204030204" pitchFamily="49" charset="0"/>
+              </a:rPr>
+              <a:t>, operator, </a:t>
+            </a:r>
+            <a:r>
+              <a:rPr lang="en-US" sz="1800" dirty="0" err="1">
+                <a:latin typeface="Consolas" panose="020B0609020204030204" pitchFamily="49" charset="0"/>
+              </a:rPr>
+              <a:t>rightOperand</a:t>
+            </a:r>
+            <a:r>
+              <a:rPr lang="en-US" sz="1800" dirty="0">
+                <a:latin typeface="Consolas" panose="020B0609020204030204" pitchFamily="49" charset="0"/>
+              </a:rPr>
+              <a:t>);</a:t>
+            </a:r>
+          </a:p>
+          <a:p>
+            <a:pPr marL="365760" indent="0">
+              <a:spcBef>
+                <a:spcPts val="200"/>
+              </a:spcBef>
+              <a:buNone/>
+            </a:pPr>
+            <a:r>
+              <a:rPr lang="en-US" sz="1800" dirty="0">
+                <a:latin typeface="Consolas" panose="020B0609020204030204" pitchFamily="49" charset="0"/>
+              </a:rPr>
+              <a:t>    </a:t>
+            </a:r>
+            <a:r>
+              <a:rPr lang="en-US" sz="1800" b="1" dirty="0" err="1">
+                <a:latin typeface="Consolas" panose="020B0609020204030204" pitchFamily="49" charset="0"/>
+              </a:rPr>
+              <a:t>setType</a:t>
+            </a:r>
+            <a:r>
+              <a:rPr lang="en-US" sz="1800" b="1" dirty="0">
+                <a:latin typeface="Consolas" panose="020B0609020204030204" pitchFamily="49" charset="0"/>
+              </a:rPr>
+              <a:t>(</a:t>
+            </a:r>
+            <a:r>
+              <a:rPr lang="en-US" sz="1800" b="1" dirty="0" err="1">
+                <a:latin typeface="Consolas" panose="020B0609020204030204" pitchFamily="49" charset="0"/>
+              </a:rPr>
+              <a:t>Type.Boolean</a:t>
+            </a:r>
+            <a:r>
+              <a:rPr lang="en-US" sz="1800" b="1" dirty="0">
+                <a:latin typeface="Consolas" panose="020B0609020204030204" pitchFamily="49" charset="0"/>
+              </a:rPr>
+              <a:t>);</a:t>
+            </a:r>
+          </a:p>
+          <a:p>
+            <a:pPr marL="365760" indent="0">
+              <a:spcBef>
+                <a:spcPts val="200"/>
+              </a:spcBef>
+              <a:buNone/>
+            </a:pPr>
+            <a:r>
+              <a:rPr lang="en-US" sz="1800" dirty="0">
+                <a:latin typeface="Consolas" panose="020B0609020204030204" pitchFamily="49" charset="0"/>
+              </a:rPr>
+              <a:t>    ...</a:t>
+            </a:r>
+          </a:p>
+          <a:p>
+            <a:pPr marL="365760" indent="0">
+              <a:spcBef>
+                <a:spcPts val="200"/>
+              </a:spcBef>
+              <a:buNone/>
+            </a:pPr>
+            <a:r>
+              <a:rPr lang="en-US" sz="1800" dirty="0">
+                <a:latin typeface="Consolas" panose="020B0609020204030204" pitchFamily="49" charset="0"/>
+              </a:rPr>
+              <a:t>  }</a:t>
+            </a:r>
+          </a:p>
+        </p:txBody>
+      </p:sp>
+      <p:sp>
+        <p:nvSpPr>
+          <p:cNvPr id="3" name="Footer Placeholder 2">
+            <a:extLst>
+              <a:ext uri="{FF2B5EF4-FFF2-40B4-BE49-F238E27FC236}">
+                <a16:creationId xmlns:a16="http://schemas.microsoft.com/office/drawing/2014/main" id="{5A404E55-B647-4C7C-9D62-C9EA115DC92C}"/>
+              </a:ext>
+            </a:extLst>
+          </p:cNvPr>
+          <p:cNvSpPr>
+            <a:spLocks noGrp="1"/>
+          </p:cNvSpPr>
+          <p:nvPr>
             <p:ph type="ftr" sz="quarter" idx="10"/>
           </p:nvPr>
         </p:nvSpPr>
-        <p:spPr>
-          <a:noFill/>
-        </p:spPr>
-        <p:txBody>
-          <a:bodyPr/>
-          <a:lstStyle/>
-          <a:p>
-            <a:r>
-              <a:rPr lang="en-US" dirty="0"/>
+        <p:spPr/>
+        <p:txBody>
+          <a:bodyPr/>
+          <a:lstStyle/>
+          <a:p>
+            <a:pPr>
+              <a:defRPr/>
+            </a:pPr>
+            <a:r>
+              <a:rPr lang="en-US"/>
               <a:t>©SoftMoore Consulting</a:t>
             </a:r>
-          </a:p>
-        </p:txBody>
-      </p:sp>
-      <p:sp>
-        <p:nvSpPr>
-          <p:cNvPr id="23555" name="Slide Number Placeholder 4"/>
+            <a:endParaRPr lang="en-US" dirty="0"/>
+          </a:p>
+        </p:txBody>
+      </p:sp>
+      <p:sp>
+        <p:nvSpPr>
+          <p:cNvPr id="4" name="Slide Number Placeholder 3">
+            <a:extLst>
+              <a:ext uri="{FF2B5EF4-FFF2-40B4-BE49-F238E27FC236}">
+                <a16:creationId xmlns:a16="http://schemas.microsoft.com/office/drawing/2014/main" id="{964B72F4-5156-47A8-BE64-4FAAF4115382}"/>
+              </a:ext>
+            </a:extLst>
+          </p:cNvPr>
           <p:cNvSpPr>
             <a:spLocks noGrp="1"/>
           </p:cNvSpPr>
@@ -19457,297 +19745,35 @@
             <p:ph type="sldNum" sz="quarter" idx="11"/>
           </p:nvPr>
         </p:nvSpPr>
-        <p:spPr>
-          <a:noFill/>
-        </p:spPr>
-        <p:txBody>
-          <a:bodyPr/>
-          <a:lstStyle/>
-          <a:p>
-            <a:r>
-              <a:rPr lang="en-US" dirty="0"/>
+        <p:spPr/>
+        <p:txBody>
+          <a:bodyPr/>
+          <a:lstStyle/>
+          <a:p>
+            <a:pPr>
+              <a:defRPr/>
+            </a:pPr>
+            <a:r>
+              <a:rPr lang="en-US"/>
               <a:t>Slide </a:t>
             </a:r>
-            <a:fld id="{239EA5B9-23A7-4CC1-AF6B-C52A3FEA3809}" type="slidenum">
+            <a:fld id="{0493F5BC-5863-40DB-9BF6-90302664BBE6}" type="slidenum">
               <a:rPr lang="en-US" smtClean="0"/>
-              <a:pPr/>
+              <a:pPr>
+                <a:defRPr/>
+              </a:pPr>
               <a:t>44</a:t>
             </a:fld>
             <a:endParaRPr lang="en-US" dirty="0"/>
           </a:p>
         </p:txBody>
       </p:sp>
-      <p:sp>
-        <p:nvSpPr>
-          <p:cNvPr id="23556" name="Rectangle 2"/>
-          <p:cNvSpPr>
-            <a:spLocks noGrp="1" noChangeArrowheads="1"/>
-          </p:cNvSpPr>
-          <p:nvPr>
-            <p:ph type="title"/>
-          </p:nvPr>
-        </p:nvSpPr>
-        <p:spPr/>
-        <p:txBody>
-          <a:bodyPr/>
-          <a:lstStyle/>
-          <a:p>
-            <a:r>
-              <a:rPr lang="en-US" dirty="0"/>
-              <a:t>Class </a:t>
-            </a:r>
-            <a:r>
-              <a:rPr lang="en-US" dirty="0">
-                <a:latin typeface="Consolas" panose="020B0609020204030204" pitchFamily="49" charset="0"/>
-              </a:rPr>
-              <a:t>Loop</a:t>
-            </a:r>
-            <a:r>
-              <a:rPr lang="en-US" dirty="0">
-                <a:latin typeface="Consolas" panose="020B0609020204030204" pitchFamily="49" charset="0"/>
-                <a:cs typeface="Consolas" pitchFamily="49" charset="0"/>
-              </a:rPr>
-              <a:t>Context</a:t>
-            </a:r>
-          </a:p>
-        </p:txBody>
-      </p:sp>
-      <p:sp>
-        <p:nvSpPr>
-          <p:cNvPr id="23557" name="Rectangle 3"/>
-          <p:cNvSpPr>
-            <a:spLocks noGrp="1" noChangeArrowheads="1"/>
-          </p:cNvSpPr>
-          <p:nvPr>
-            <p:ph type="body" idx="1"/>
-          </p:nvPr>
-        </p:nvSpPr>
-        <p:spPr/>
-        <p:txBody>
-          <a:bodyPr lIns="182880" tIns="91440"/>
-          <a:lstStyle/>
-          <a:p>
-            <a:pPr marL="0" indent="0">
-              <a:spcBef>
-                <a:spcPts val="100"/>
-              </a:spcBef>
-              <a:buFontTx/>
-              <a:buNone/>
-            </a:pPr>
-            <a:r>
-              <a:rPr lang="en-US" sz="1800" dirty="0">
-                <a:latin typeface="Consolas" pitchFamily="49" charset="0"/>
-              </a:rPr>
-              <a:t>/**</a:t>
-            </a:r>
-          </a:p>
-          <a:p>
-            <a:pPr marL="0" indent="0">
-              <a:spcBef>
-                <a:spcPts val="100"/>
-              </a:spcBef>
-              <a:buFontTx/>
-              <a:buNone/>
-            </a:pPr>
-            <a:r>
-              <a:rPr lang="en-US" sz="1800" dirty="0">
-                <a:latin typeface="Consolas" pitchFamily="49" charset="0"/>
-              </a:rPr>
-              <a:t> * Returns the loop statement currently being parsed;</a:t>
-            </a:r>
-          </a:p>
-          <a:p>
-            <a:pPr marL="0" indent="0">
-              <a:spcBef>
-                <a:spcPts val="100"/>
-              </a:spcBef>
-              <a:buFontTx/>
-              <a:buNone/>
-            </a:pPr>
-            <a:r>
-              <a:rPr lang="en-US" sz="1800" dirty="0">
-                <a:latin typeface="Consolas" pitchFamily="49" charset="0"/>
-              </a:rPr>
-              <a:t> * returns null if no such loop statement exists.</a:t>
-            </a:r>
-          </a:p>
-          <a:p>
-            <a:pPr marL="0" indent="0">
-              <a:spcBef>
-                <a:spcPts val="100"/>
-              </a:spcBef>
-              <a:buFontTx/>
-              <a:buNone/>
-            </a:pPr>
-            <a:r>
-              <a:rPr lang="en-US" sz="1800" dirty="0">
-                <a:latin typeface="Consolas" pitchFamily="49" charset="0"/>
-              </a:rPr>
-              <a:t> */</a:t>
-            </a:r>
-          </a:p>
-          <a:p>
-            <a:pPr marL="0" indent="0">
-              <a:spcBef>
-                <a:spcPts val="100"/>
-              </a:spcBef>
-              <a:buFontTx/>
-              <a:buNone/>
-            </a:pPr>
-            <a:r>
-              <a:rPr lang="en-US" sz="1800" dirty="0">
-                <a:latin typeface="Consolas" pitchFamily="49" charset="0"/>
-              </a:rPr>
-              <a:t>public LoopStmt getLoopStmt()</a:t>
-            </a:r>
-          </a:p>
-          <a:p>
-            <a:pPr marL="0" indent="0">
-              <a:spcBef>
-                <a:spcPts val="100"/>
-              </a:spcBef>
-              <a:buFontTx/>
-              <a:buNone/>
-            </a:pPr>
-            <a:endParaRPr lang="en-US" sz="1800" dirty="0">
-              <a:latin typeface="Consolas" pitchFamily="49" charset="0"/>
-            </a:endParaRPr>
-          </a:p>
-          <a:p>
-            <a:pPr marL="0" indent="0">
-              <a:spcBef>
-                <a:spcPts val="100"/>
-              </a:spcBef>
-              <a:buFontTx/>
-              <a:buNone/>
-            </a:pPr>
-            <a:r>
-              <a:rPr lang="en-US" sz="1800" dirty="0">
-                <a:latin typeface="Consolas" pitchFamily="49" charset="0"/>
-              </a:rPr>
-              <a:t>/**</a:t>
-            </a:r>
-          </a:p>
-          <a:p>
-            <a:pPr marL="0" indent="0">
-              <a:spcBef>
-                <a:spcPts val="100"/>
-              </a:spcBef>
-              <a:buFontTx/>
-              <a:buNone/>
-            </a:pPr>
-            <a:r>
-              <a:rPr lang="en-US" sz="1800" dirty="0">
-                <a:latin typeface="Consolas" pitchFamily="49" charset="0"/>
-              </a:rPr>
-              <a:t> * Called when starting to parse a loop statement.</a:t>
-            </a:r>
-          </a:p>
-          <a:p>
-            <a:pPr marL="0" indent="0">
-              <a:spcBef>
-                <a:spcPts val="100"/>
-              </a:spcBef>
-              <a:buFontTx/>
-              <a:buNone/>
-            </a:pPr>
-            <a:r>
-              <a:rPr lang="en-US" sz="1800" dirty="0">
-                <a:latin typeface="Consolas" pitchFamily="49" charset="0"/>
-              </a:rPr>
-              <a:t> */</a:t>
-            </a:r>
-          </a:p>
-          <a:p>
-            <a:pPr marL="0" indent="0">
-              <a:spcBef>
-                <a:spcPts val="100"/>
-              </a:spcBef>
-              <a:buFontTx/>
-              <a:buNone/>
-            </a:pPr>
-            <a:r>
-              <a:rPr lang="en-US" sz="1800" dirty="0">
-                <a:latin typeface="Consolas" pitchFamily="49" charset="0"/>
-              </a:rPr>
-              <a:t>public void beginLoop(LoopStmt stmt)</a:t>
-            </a:r>
-          </a:p>
-          <a:p>
-            <a:pPr marL="0" indent="0">
-              <a:spcBef>
-                <a:spcPts val="100"/>
-              </a:spcBef>
-              <a:buFontTx/>
-              <a:buNone/>
-            </a:pPr>
-            <a:endParaRPr lang="en-US" sz="1800" dirty="0">
-              <a:latin typeface="Consolas" pitchFamily="49" charset="0"/>
-            </a:endParaRPr>
-          </a:p>
-          <a:p>
-            <a:pPr marL="0" indent="0">
-              <a:spcBef>
-                <a:spcPts val="100"/>
-              </a:spcBef>
-              <a:buFontTx/>
-              <a:buNone/>
-            </a:pPr>
-            <a:r>
-              <a:rPr lang="en-US" sz="1800" dirty="0">
-                <a:latin typeface="Consolas" pitchFamily="49" charset="0"/>
-              </a:rPr>
-              <a:t>/**</a:t>
-            </a:r>
-          </a:p>
-          <a:p>
-            <a:pPr marL="0" indent="0">
-              <a:spcBef>
-                <a:spcPts val="100"/>
-              </a:spcBef>
-              <a:buFontTx/>
-              <a:buNone/>
-            </a:pPr>
-            <a:r>
-              <a:rPr lang="en-US" sz="1800" dirty="0">
-                <a:latin typeface="Consolas" pitchFamily="49" charset="0"/>
-              </a:rPr>
-              <a:t> * Called when finished parsing a loop statement.</a:t>
-            </a:r>
-          </a:p>
-          <a:p>
-            <a:pPr marL="0" indent="0">
-              <a:spcBef>
-                <a:spcPts val="100"/>
-              </a:spcBef>
-              <a:buFontTx/>
-              <a:buNone/>
-            </a:pPr>
-            <a:r>
-              <a:rPr lang="en-US" sz="1800" dirty="0">
-                <a:latin typeface="Consolas" pitchFamily="49" charset="0"/>
-              </a:rPr>
-              <a:t> */</a:t>
-            </a:r>
-          </a:p>
-          <a:p>
-            <a:pPr marL="0" indent="0">
-              <a:spcBef>
-                <a:spcPts val="100"/>
-              </a:spcBef>
-              <a:buFontTx/>
-              <a:buNone/>
-            </a:pPr>
-            <a:r>
-              <a:rPr lang="en-US" sz="1800" dirty="0">
-                <a:latin typeface="Consolas" pitchFamily="49" charset="0"/>
-              </a:rPr>
-              <a:t>public void endLoop()</a:t>
-            </a:r>
-          </a:p>
-        </p:txBody>
-      </p:sp>
     </p:spTree>
+    <p:extLst>
+      <p:ext uri="{BB962C8B-B14F-4D97-AF65-F5344CB8AC3E}">
+        <p14:creationId xmlns:p14="http://schemas.microsoft.com/office/powerpoint/2010/main" val="2714799205"/>
+      </p:ext>
+    </p:extLst>
   </p:cSld>
   <p:clrMapOvr>
     <a:masterClrMapping/>
@@ -19774,31 +19800,123 @@
       </p:grpSpPr>
       <p:sp>
         <p:nvSpPr>
-          <p:cNvPr id="23554" name="Footer Placeholder 3"/>
+          <p:cNvPr id="8" name="Title 7">
+            <a:extLst>
+              <a:ext uri="{FF2B5EF4-FFF2-40B4-BE49-F238E27FC236}">
+                <a16:creationId xmlns:a16="http://schemas.microsoft.com/office/drawing/2014/main" id="{563233BE-B20A-4E38-8D6C-3D8FB41B4336}"/>
+              </a:ext>
+            </a:extLst>
+          </p:cNvPr>
           <p:cNvSpPr>
             <a:spLocks noGrp="1"/>
           </p:cNvSpPr>
           <p:nvPr>
+            <p:ph type="title"/>
+          </p:nvPr>
+        </p:nvSpPr>
+        <p:spPr/>
+        <p:txBody>
+          <a:bodyPr/>
+          <a:lstStyle/>
+          <a:p>
+            <a:r>
+              <a:rPr lang="en-US" dirty="0"/>
+              <a:t>Example: </a:t>
+            </a:r>
+            <a:r>
+              <a:rPr lang="en-US" dirty="0" err="1">
+                <a:latin typeface="Consolas" panose="020B0609020204030204" pitchFamily="49" charset="0"/>
+              </a:rPr>
+              <a:t>AddingExpr</a:t>
+            </a:r>
+            <a:endParaRPr lang="en-US" dirty="0">
+              <a:latin typeface="Consolas" panose="020B0609020204030204" pitchFamily="49" charset="0"/>
+            </a:endParaRPr>
+          </a:p>
+        </p:txBody>
+      </p:sp>
+      <p:sp>
+        <p:nvSpPr>
+          <p:cNvPr id="9" name="Content Placeholder 8">
+            <a:extLst>
+              <a:ext uri="{FF2B5EF4-FFF2-40B4-BE49-F238E27FC236}">
+                <a16:creationId xmlns:a16="http://schemas.microsoft.com/office/drawing/2014/main" id="{76E1210A-295D-4718-9E1A-27C835EA23E3}"/>
+              </a:ext>
+            </a:extLst>
+          </p:cNvPr>
+          <p:cNvSpPr>
+            <a:spLocks noGrp="1"/>
+          </p:cNvSpPr>
+          <p:nvPr>
+            <p:ph idx="1"/>
+          </p:nvPr>
+        </p:nvSpPr>
+        <p:spPr/>
+        <p:txBody>
+          <a:bodyPr/>
+          <a:lstStyle/>
+          <a:p>
+            <a:r>
+              <a:rPr lang="en-US" dirty="0"/>
+              <a:t>For most “real” programming languages, determining the type of an adding expression can be somewhat complicated.</a:t>
+            </a:r>
+          </a:p>
+          <a:p>
+            <a:pPr lvl="1"/>
+            <a:r>
+              <a:rPr lang="en-US" dirty="0"/>
+              <a:t>C and Java have multiple numeric types with rules about automatic conversions (coercions) when an operator has different operand types.</a:t>
+            </a:r>
+          </a:p>
+          <a:p>
+            <a:r>
+              <a:rPr lang="en-US" dirty="0"/>
+              <a:t>In CPRL, an adding expression always has type Integer.  (Similarly for a multiplying expression in CPRL.)</a:t>
+            </a:r>
+          </a:p>
+        </p:txBody>
+      </p:sp>
+      <p:sp>
+        <p:nvSpPr>
+          <p:cNvPr id="3" name="Footer Placeholder 2">
+            <a:extLst>
+              <a:ext uri="{FF2B5EF4-FFF2-40B4-BE49-F238E27FC236}">
+                <a16:creationId xmlns:a16="http://schemas.microsoft.com/office/drawing/2014/main" id="{5A404E55-B647-4C7C-9D62-C9EA115DC92C}"/>
+              </a:ext>
+            </a:extLst>
+          </p:cNvPr>
+          <p:cNvSpPr>
+            <a:spLocks noGrp="1"/>
+          </p:cNvSpPr>
+          <p:nvPr>
             <p:ph type="ftr" sz="quarter" idx="10"/>
           </p:nvPr>
         </p:nvSpPr>
-        <p:spPr>
-          <a:noFill/>
-        </p:spPr>
-        <p:txBody>
-          <a:bodyPr/>
-          <a:lstStyle/>
-          <a:p>
-            <a:r>
-              <a:rPr lang="en-US" dirty="0"/>
+        <p:spPr/>
+        <p:txBody>
+          <a:bodyPr/>
+          <a:lstStyle/>
+          <a:p>
+            <a:pPr>
+              <a:defRPr/>
+            </a:pPr>
+            <a:r>
+              <a:rPr lang="en-US"/>
               <a:t>©SoftMoore Consulting</a:t>
             </a:r>
-          </a:p>
-        </p:txBody>
-      </p:sp>
-      <p:sp>
-        <p:nvSpPr>
-          <p:cNvPr id="23555" name="Slide Number Placeholder 4"/>
+            <a:endParaRPr lang="en-US" dirty="0"/>
+          </a:p>
+        </p:txBody>
+      </p:sp>
+      <p:sp>
+        <p:nvSpPr>
+          <p:cNvPr id="4" name="Slide Number Placeholder 3">
+            <a:extLst>
+              <a:ext uri="{FF2B5EF4-FFF2-40B4-BE49-F238E27FC236}">
+                <a16:creationId xmlns:a16="http://schemas.microsoft.com/office/drawing/2014/main" id="{964B72F4-5156-47A8-BE64-4FAAF4115382}"/>
+              </a:ext>
+            </a:extLst>
+          </p:cNvPr>
           <p:cNvSpPr>
             <a:spLocks noGrp="1"/>
           </p:cNvSpPr>
@@ -19806,299 +19924,35 @@
             <p:ph type="sldNum" sz="quarter" idx="11"/>
           </p:nvPr>
         </p:nvSpPr>
-        <p:spPr>
-          <a:noFill/>
-        </p:spPr>
-        <p:txBody>
-          <a:bodyPr/>
-          <a:lstStyle/>
-          <a:p>
-            <a:r>
-              <a:rPr lang="en-US" dirty="0"/>
+        <p:spPr/>
+        <p:txBody>
+          <a:bodyPr/>
+          <a:lstStyle/>
+          <a:p>
+            <a:pPr>
+              <a:defRPr/>
+            </a:pPr>
+            <a:r>
+              <a:rPr lang="en-US"/>
               <a:t>Slide </a:t>
             </a:r>
-            <a:fld id="{239EA5B9-23A7-4CC1-AF6B-C52A3FEA3809}" type="slidenum">
+            <a:fld id="{0493F5BC-5863-40DB-9BF6-90302664BBE6}" type="slidenum">
               <a:rPr lang="en-US" smtClean="0"/>
-              <a:pPr/>
+              <a:pPr>
+                <a:defRPr/>
+              </a:pPr>
               <a:t>45</a:t>
             </a:fld>
             <a:endParaRPr lang="en-US" dirty="0"/>
           </a:p>
         </p:txBody>
       </p:sp>
-      <p:sp>
-        <p:nvSpPr>
-          <p:cNvPr id="23556" name="Rectangle 2"/>
-          <p:cNvSpPr>
-            <a:spLocks noGrp="1" noChangeArrowheads="1"/>
-          </p:cNvSpPr>
-          <p:nvPr>
-            <p:ph type="title"/>
-          </p:nvPr>
-        </p:nvSpPr>
-        <p:spPr/>
-        <p:txBody>
-          <a:bodyPr/>
-          <a:lstStyle/>
-          <a:p>
-            <a:r>
-              <a:rPr lang="en-US" dirty="0"/>
-              <a:t>Class </a:t>
-            </a:r>
-            <a:r>
-              <a:rPr lang="en-US" dirty="0">
-                <a:latin typeface="Consolas" pitchFamily="49" charset="0"/>
-                <a:cs typeface="Consolas" pitchFamily="49" charset="0"/>
-              </a:rPr>
-              <a:t>SubprogramContext</a:t>
-            </a:r>
-            <a:endParaRPr lang="en-US" sz="2800" dirty="0">
-              <a:cs typeface="Consolas" pitchFamily="49" charset="0"/>
-            </a:endParaRPr>
-          </a:p>
-        </p:txBody>
-      </p:sp>
-      <p:sp>
-        <p:nvSpPr>
-          <p:cNvPr id="23557" name="Rectangle 3"/>
-          <p:cNvSpPr>
-            <a:spLocks noGrp="1" noChangeArrowheads="1"/>
-          </p:cNvSpPr>
-          <p:nvPr>
-            <p:ph type="body" idx="1"/>
-          </p:nvPr>
-        </p:nvSpPr>
-        <p:spPr>
-          <a:xfrm>
-            <a:off x="458787" y="1363663"/>
-            <a:ext cx="8321040" cy="4935537"/>
-          </a:xfrm>
-        </p:spPr>
-        <p:txBody>
-          <a:bodyPr lIns="182880" tIns="91440"/>
-          <a:lstStyle/>
-          <a:p>
-            <a:pPr marL="0" indent="0">
-              <a:spcBef>
-                <a:spcPts val="100"/>
-              </a:spcBef>
-              <a:buFontTx/>
-              <a:buNone/>
-            </a:pPr>
-            <a:r>
-              <a:rPr lang="en-US" sz="1800" dirty="0">
-                <a:latin typeface="Consolas" pitchFamily="49" charset="0"/>
-              </a:rPr>
-              <a:t>/**</a:t>
-            </a:r>
-          </a:p>
-          <a:p>
-            <a:pPr marL="0" indent="0">
-              <a:spcBef>
-                <a:spcPts val="100"/>
-              </a:spcBef>
-              <a:buFontTx/>
-              <a:buNone/>
-            </a:pPr>
-            <a:r>
-              <a:rPr lang="en-US" sz="1800" dirty="0">
-                <a:latin typeface="Consolas" pitchFamily="49" charset="0"/>
-              </a:rPr>
-              <a:t> * Returns the subprogram declaration currently being</a:t>
-            </a:r>
-          </a:p>
-          <a:p>
-            <a:pPr marL="0" indent="0">
-              <a:spcBef>
-                <a:spcPts val="100"/>
-              </a:spcBef>
-              <a:buFontTx/>
-              <a:buNone/>
-            </a:pPr>
-            <a:r>
-              <a:rPr lang="en-US" sz="1800" dirty="0">
-                <a:latin typeface="Consolas" pitchFamily="49" charset="0"/>
-              </a:rPr>
-              <a:t> * parsed.  Returns null if no such procedure exists.</a:t>
-            </a:r>
-          </a:p>
-          <a:p>
-            <a:pPr marL="0" indent="0">
-              <a:spcBef>
-                <a:spcPts val="100"/>
-              </a:spcBef>
-              <a:buFontTx/>
-              <a:buNone/>
-            </a:pPr>
-            <a:r>
-              <a:rPr lang="en-US" sz="1800" dirty="0">
-                <a:latin typeface="Consolas" pitchFamily="49" charset="0"/>
-              </a:rPr>
-              <a:t> */</a:t>
-            </a:r>
-          </a:p>
-          <a:p>
-            <a:pPr marL="0" indent="0">
-              <a:spcBef>
-                <a:spcPts val="100"/>
-              </a:spcBef>
-              <a:buFontTx/>
-              <a:buNone/>
-            </a:pPr>
-            <a:r>
-              <a:rPr lang="en-US" sz="1800" dirty="0">
-                <a:latin typeface="Consolas" pitchFamily="49" charset="0"/>
-              </a:rPr>
-              <a:t>public SubprogramDecl getSubprogramDecl()</a:t>
-            </a:r>
-          </a:p>
-          <a:p>
-            <a:pPr marL="0" indent="0">
-              <a:spcBef>
-                <a:spcPts val="100"/>
-              </a:spcBef>
-              <a:buFontTx/>
-              <a:buNone/>
-            </a:pPr>
-            <a:endParaRPr lang="en-US" sz="1800" dirty="0">
-              <a:latin typeface="Consolas" pitchFamily="49" charset="0"/>
-            </a:endParaRPr>
-          </a:p>
-          <a:p>
-            <a:pPr marL="0" indent="0">
-              <a:spcBef>
-                <a:spcPts val="100"/>
-              </a:spcBef>
-              <a:buFontTx/>
-              <a:buNone/>
-            </a:pPr>
-            <a:r>
-              <a:rPr lang="en-US" sz="1800" dirty="0">
-                <a:latin typeface="Consolas" pitchFamily="49" charset="0"/>
-              </a:rPr>
-              <a:t>/**</a:t>
-            </a:r>
-          </a:p>
-          <a:p>
-            <a:pPr marL="0" indent="0">
-              <a:spcBef>
-                <a:spcPts val="100"/>
-              </a:spcBef>
-              <a:buFontTx/>
-              <a:buNone/>
-            </a:pPr>
-            <a:r>
-              <a:rPr lang="en-US" sz="1800" dirty="0">
-                <a:latin typeface="Consolas" pitchFamily="49" charset="0"/>
-              </a:rPr>
-              <a:t> * Called when starting to parse a subprogram declaration.</a:t>
-            </a:r>
-          </a:p>
-          <a:p>
-            <a:pPr marL="0" indent="0">
-              <a:spcBef>
-                <a:spcPts val="100"/>
-              </a:spcBef>
-              <a:buFontTx/>
-              <a:buNone/>
-            </a:pPr>
-            <a:r>
-              <a:rPr lang="en-US" sz="1800" dirty="0">
-                <a:latin typeface="Consolas" pitchFamily="49" charset="0"/>
-              </a:rPr>
-              <a:t> */</a:t>
-            </a:r>
-          </a:p>
-          <a:p>
-            <a:pPr marL="0" indent="0">
-              <a:spcBef>
-                <a:spcPts val="100"/>
-              </a:spcBef>
-              <a:buFontTx/>
-              <a:buNone/>
-            </a:pPr>
-            <a:r>
-              <a:rPr lang="en-US" sz="1800" dirty="0">
-                <a:latin typeface="Consolas" pitchFamily="49" charset="0"/>
-              </a:rPr>
-              <a:t>public void beginSubprogramDecl(SubprogramDecl subprogDecl)</a:t>
-            </a:r>
-          </a:p>
-          <a:p>
-            <a:pPr marL="0" indent="0">
-              <a:spcBef>
-                <a:spcPts val="100"/>
-              </a:spcBef>
-              <a:buFontTx/>
-              <a:buNone/>
-            </a:pPr>
-            <a:endParaRPr lang="en-US" sz="1800" dirty="0">
-              <a:latin typeface="Consolas" pitchFamily="49" charset="0"/>
-            </a:endParaRPr>
-          </a:p>
-          <a:p>
-            <a:pPr marL="0" indent="0">
-              <a:spcBef>
-                <a:spcPts val="100"/>
-              </a:spcBef>
-              <a:buFontTx/>
-              <a:buNone/>
-            </a:pPr>
-            <a:r>
-              <a:rPr lang="en-US" sz="1800" dirty="0">
-                <a:latin typeface="Consolas" pitchFamily="49" charset="0"/>
-              </a:rPr>
-              <a:t>/**</a:t>
-            </a:r>
-          </a:p>
-          <a:p>
-            <a:pPr marL="0" indent="0">
-              <a:spcBef>
-                <a:spcPts val="100"/>
-              </a:spcBef>
-              <a:buFontTx/>
-              <a:buNone/>
-            </a:pPr>
-            <a:r>
-              <a:rPr lang="en-US" sz="1800" dirty="0">
-                <a:latin typeface="Consolas" pitchFamily="49" charset="0"/>
-              </a:rPr>
-              <a:t> * Called when finished parsing a subprogram declaration.</a:t>
-            </a:r>
-          </a:p>
-          <a:p>
-            <a:pPr marL="0" indent="0">
-              <a:spcBef>
-                <a:spcPts val="100"/>
-              </a:spcBef>
-              <a:buFontTx/>
-              <a:buNone/>
-            </a:pPr>
-            <a:r>
-              <a:rPr lang="en-US" sz="1800" dirty="0">
-                <a:latin typeface="Consolas" pitchFamily="49" charset="0"/>
-              </a:rPr>
-              <a:t> */</a:t>
-            </a:r>
-          </a:p>
-          <a:p>
-            <a:pPr marL="0" indent="0">
-              <a:spcBef>
-                <a:spcPts val="100"/>
-              </a:spcBef>
-              <a:buFontTx/>
-              <a:buNone/>
-            </a:pPr>
-            <a:r>
-              <a:rPr lang="en-US" sz="1800" dirty="0">
-                <a:latin typeface="Consolas" pitchFamily="49" charset="0"/>
-              </a:rPr>
-              <a:t>public void endSubprogramDecl()</a:t>
-            </a:r>
-          </a:p>
-        </p:txBody>
-      </p:sp>
     </p:spTree>
+    <p:extLst>
+      <p:ext uri="{BB962C8B-B14F-4D97-AF65-F5344CB8AC3E}">
+        <p14:creationId xmlns:p14="http://schemas.microsoft.com/office/powerpoint/2010/main" val="1930244420"/>
+      </p:ext>
+    </p:extLst>
   </p:cSld>
   <p:clrMapOvr>
     <a:masterClrMapping/>
@@ -20125,9 +19979,15 @@
       </p:grpSpPr>
       <p:sp>
         <p:nvSpPr>
-          <p:cNvPr id="24580" name="Rectangle 2"/>
-          <p:cNvSpPr>
-            <a:spLocks noGrp="1" noChangeArrowheads="1"/>
+          <p:cNvPr id="8" name="Title 7">
+            <a:extLst>
+              <a:ext uri="{FF2B5EF4-FFF2-40B4-BE49-F238E27FC236}">
+                <a16:creationId xmlns:a16="http://schemas.microsoft.com/office/drawing/2014/main" id="{563233BE-B20A-4E38-8D6C-3D8FB41B4336}"/>
+              </a:ext>
+            </a:extLst>
+          </p:cNvPr>
+          <p:cNvSpPr>
+            <a:spLocks noGrp="1"/>
           </p:cNvSpPr>
           <p:nvPr>
             <p:ph type="title"/>
@@ -20140,45 +20000,98 @@
           <a:p>
             <a:r>
               <a:rPr lang="en-US" dirty="0"/>
-              <a:t>Example: Using Context During Parsing</a:t>
-            </a:r>
-          </a:p>
-        </p:txBody>
-      </p:sp>
-      <p:sp>
-        <p:nvSpPr>
-          <p:cNvPr id="24581" name="Rectangle 3"/>
-          <p:cNvSpPr>
-            <a:spLocks noGrp="1" noChangeArrowheads="1"/>
-          </p:cNvSpPr>
-          <p:nvPr>
-            <p:ph type="body" idx="1"/>
-          </p:nvPr>
-        </p:nvSpPr>
-        <p:spPr/>
-        <p:txBody>
-          <a:bodyPr/>
-          <a:lstStyle/>
-          <a:p>
-            <a:r>
-              <a:rPr lang="en-US" dirty="0"/>
-              <a:t>When parsing a loop statement:</a:t>
-            </a:r>
-          </a:p>
-          <a:p>
-            <a:pPr lvl="1">
-              <a:buNone/>
-            </a:pPr>
-            <a:r>
-              <a:rPr lang="en-US" sz="1800" dirty="0">
-                <a:latin typeface="Consolas" pitchFamily="49" charset="0"/>
-                <a:cs typeface="Consolas" pitchFamily="49" charset="0"/>
-              </a:rPr>
-              <a:t>LoopStmt stmt = new LoopStmt();</a:t>
-            </a:r>
-          </a:p>
-          <a:p>
-            <a:pPr lvl="1">
+              <a:t>Example: </a:t>
+            </a:r>
+            <a:r>
+              <a:rPr lang="en-US" dirty="0" err="1">
+                <a:latin typeface="Consolas" panose="020B0609020204030204" pitchFamily="49" charset="0"/>
+              </a:rPr>
+              <a:t>AddingExpr</a:t>
+            </a:r>
+            <a:br>
+              <a:rPr lang="en-US" dirty="0">
+                <a:latin typeface="Consolas" panose="020B0609020204030204" pitchFamily="49" charset="0"/>
+              </a:rPr>
+            </a:br>
+            <a:r>
+              <a:rPr lang="en-US" sz="2400" dirty="0"/>
+              <a:t>(continued)</a:t>
+            </a:r>
+          </a:p>
+        </p:txBody>
+      </p:sp>
+      <p:sp>
+        <p:nvSpPr>
+          <p:cNvPr id="9" name="Content Placeholder 8">
+            <a:extLst>
+              <a:ext uri="{FF2B5EF4-FFF2-40B4-BE49-F238E27FC236}">
+                <a16:creationId xmlns:a16="http://schemas.microsoft.com/office/drawing/2014/main" id="{76E1210A-295D-4718-9E1A-27C835EA23E3}"/>
+              </a:ext>
+            </a:extLst>
+          </p:cNvPr>
+          <p:cNvSpPr>
+            <a:spLocks noGrp="1"/>
+          </p:cNvSpPr>
+          <p:nvPr>
+            <p:ph idx="1"/>
+          </p:nvPr>
+        </p:nvSpPr>
+        <p:spPr/>
+        <p:txBody>
+          <a:bodyPr/>
+          <a:lstStyle/>
+          <a:p>
+            <a:r>
+              <a:rPr lang="en-US" dirty="0"/>
+              <a:t>Constructor for </a:t>
+            </a:r>
+            <a:r>
+              <a:rPr lang="en-US" dirty="0" err="1">
+                <a:latin typeface="Consolas" panose="020B0609020204030204" pitchFamily="49" charset="0"/>
+              </a:rPr>
+              <a:t>AddingExpr</a:t>
+            </a:r>
+            <a:endParaRPr lang="en-US" dirty="0">
+              <a:latin typeface="Consolas" panose="020B0609020204030204" pitchFamily="49" charset="0"/>
+            </a:endParaRPr>
+          </a:p>
+          <a:p>
+            <a:pPr marL="457200" indent="0">
+              <a:buNone/>
+            </a:pPr>
+            <a:r>
+              <a:rPr lang="en-US" sz="1800" dirty="0">
+                <a:latin typeface="Consolas" panose="020B0609020204030204" pitchFamily="49" charset="0"/>
+              </a:rPr>
+              <a:t>public </a:t>
+            </a:r>
+            <a:r>
+              <a:rPr lang="en-US" sz="1800" dirty="0" err="1">
+                <a:latin typeface="Consolas" panose="020B0609020204030204" pitchFamily="49" charset="0"/>
+              </a:rPr>
+              <a:t>AddingExpr</a:t>
+            </a:r>
+            <a:r>
+              <a:rPr lang="en-US" sz="1800" dirty="0">
+                <a:latin typeface="Consolas" panose="020B0609020204030204" pitchFamily="49" charset="0"/>
+              </a:rPr>
+              <a:t>(Expression </a:t>
+            </a:r>
+            <a:r>
+              <a:rPr lang="en-US" sz="1800" dirty="0" err="1">
+                <a:latin typeface="Consolas" panose="020B0609020204030204" pitchFamily="49" charset="0"/>
+              </a:rPr>
+              <a:t>leftOperand</a:t>
+            </a:r>
+            <a:r>
+              <a:rPr lang="en-US" sz="1800" dirty="0">
+                <a:latin typeface="Consolas" panose="020B0609020204030204" pitchFamily="49" charset="0"/>
+              </a:rPr>
+              <a:t>, Token operator, </a:t>
+            </a:r>
+          </a:p>
+          <a:p>
+            <a:pPr marL="457200" indent="0">
               <a:spcBef>
                 <a:spcPts val="200"/>
               </a:spcBef>
@@ -20186,14 +20099,25 @@
             </a:pPr>
             <a:r>
               <a:rPr lang="en-US" sz="1800" dirty="0">
-                <a:latin typeface="Consolas" pitchFamily="49" charset="0"/>
-                <a:cs typeface="Consolas" pitchFamily="49" charset="0"/>
-              </a:rPr>
-              <a:t>...</a:t>
-            </a:r>
-          </a:p>
-          <a:p>
-            <a:pPr lvl="1">
+                <a:latin typeface="Consolas" panose="020B0609020204030204" pitchFamily="49" charset="0"/>
+              </a:rPr>
+              <a:t>                  Expression </a:t>
+            </a:r>
+            <a:r>
+              <a:rPr lang="en-US" sz="1800" dirty="0" err="1">
+                <a:latin typeface="Consolas" panose="020B0609020204030204" pitchFamily="49" charset="0"/>
+              </a:rPr>
+              <a:t>rightOperand</a:t>
+            </a:r>
+            <a:r>
+              <a:rPr lang="en-US" sz="1800" dirty="0">
+                <a:latin typeface="Consolas" panose="020B0609020204030204" pitchFamily="49" charset="0"/>
+              </a:rPr>
+              <a:t>)</a:t>
+            </a:r>
+          </a:p>
+          <a:p>
+            <a:pPr marL="457200" indent="0">
               <a:spcBef>
                 <a:spcPts val="200"/>
               </a:spcBef>
@@ -20201,14 +20125,13 @@
             </a:pPr>
             <a:r>
               <a:rPr lang="en-US" sz="1800" dirty="0">
-                <a:latin typeface="Consolas" pitchFamily="49" charset="0"/>
-                <a:cs typeface="Consolas" pitchFamily="49" charset="0"/>
-              </a:rPr>
-              <a:t>loopContext.beginLoop(stmt);</a:t>
-            </a:r>
-          </a:p>
-          <a:p>
-            <a:pPr lvl="1">
+                <a:latin typeface="Consolas" panose="020B0609020204030204" pitchFamily="49" charset="0"/>
+              </a:rPr>
+              <a:t>  {</a:t>
+            </a:r>
+          </a:p>
+          <a:p>
+            <a:pPr marL="457200" indent="0">
               <a:spcBef>
                 <a:spcPts val="200"/>
               </a:spcBef>
@@ -20216,14 +20139,37 @@
             </a:pPr>
             <a:r>
               <a:rPr lang="en-US" sz="1800" dirty="0">
-                <a:latin typeface="Consolas" pitchFamily="49" charset="0"/>
-                <a:cs typeface="Consolas" pitchFamily="49" charset="0"/>
-              </a:rPr>
-              <a:t>stmt.setStatements(parseStatements());</a:t>
-            </a:r>
-          </a:p>
-          <a:p>
-            <a:pPr lvl="1">
+                <a:latin typeface="Consolas" panose="020B0609020204030204" pitchFamily="49" charset="0"/>
+              </a:rPr>
+              <a:t>    super(</a:t>
+            </a:r>
+            <a:r>
+              <a:rPr lang="en-US" sz="1800" dirty="0" err="1">
+                <a:latin typeface="Consolas" panose="020B0609020204030204" pitchFamily="49" charset="0"/>
+              </a:rPr>
+              <a:t>leftOperand</a:t>
+            </a:r>
+            <a:r>
+              <a:rPr lang="en-US" sz="1800" dirty="0">
+                <a:latin typeface="Consolas" panose="020B0609020204030204" pitchFamily="49" charset="0"/>
+              </a:rPr>
+              <a:t>, operator, </a:t>
+            </a:r>
+            <a:r>
+              <a:rPr lang="en-US" sz="1800" dirty="0" err="1">
+                <a:latin typeface="Consolas" panose="020B0609020204030204" pitchFamily="49" charset="0"/>
+              </a:rPr>
+              <a:t>rightOperand</a:t>
+            </a:r>
+            <a:r>
+              <a:rPr lang="en-US" sz="1800" dirty="0">
+                <a:latin typeface="Consolas" panose="020B0609020204030204" pitchFamily="49" charset="0"/>
+              </a:rPr>
+              <a:t>);</a:t>
+            </a:r>
+          </a:p>
+          <a:p>
+            <a:pPr marL="457200" indent="0">
               <a:spcBef>
                 <a:spcPts val="200"/>
               </a:spcBef>
@@ -20231,70 +20177,51 @@
             </a:pPr>
             <a:r>
               <a:rPr lang="en-US" sz="1800" dirty="0">
-                <a:latin typeface="Consolas" pitchFamily="49" charset="0"/>
-                <a:cs typeface="Consolas" pitchFamily="49" charset="0"/>
-              </a:rPr>
-              <a:t>loopContext.endLoop();</a:t>
-            </a:r>
-          </a:p>
-          <a:p>
-            <a:r>
-              <a:rPr lang="en-US" dirty="0"/>
-              <a:t>When parsing an exit statement:</a:t>
-            </a:r>
-          </a:p>
-          <a:p>
-            <a:pPr lvl="1">
+                <a:latin typeface="Consolas" panose="020B0609020204030204" pitchFamily="49" charset="0"/>
+              </a:rPr>
+              <a:t>    </a:t>
+            </a:r>
+            <a:r>
+              <a:rPr lang="en-US" sz="1800" b="1" dirty="0" err="1">
+                <a:latin typeface="Consolas" panose="020B0609020204030204" pitchFamily="49" charset="0"/>
+              </a:rPr>
+              <a:t>setType</a:t>
+            </a:r>
+            <a:r>
+              <a:rPr lang="en-US" sz="1800" b="1" dirty="0">
+                <a:latin typeface="Consolas" panose="020B0609020204030204" pitchFamily="49" charset="0"/>
+              </a:rPr>
+              <a:t>(</a:t>
+            </a:r>
+            <a:r>
+              <a:rPr lang="en-US" sz="1800" b="1" dirty="0" err="1">
+                <a:latin typeface="Consolas" panose="020B0609020204030204" pitchFamily="49" charset="0"/>
+              </a:rPr>
+              <a:t>Type.Integer</a:t>
+            </a:r>
+            <a:r>
+              <a:rPr lang="en-US" sz="1800" b="1" dirty="0">
+                <a:latin typeface="Consolas" panose="020B0609020204030204" pitchFamily="49" charset="0"/>
+              </a:rPr>
+              <a:t>);</a:t>
+            </a:r>
+          </a:p>
+          <a:p>
+            <a:pPr marL="457200" indent="0">
               <a:spcBef>
                 <a:spcPts val="200"/>
               </a:spcBef>
               <a:buNone/>
             </a:pPr>
             <a:r>
-              <a:rPr lang="en-US" sz="1800" dirty="0" err="1">
-                <a:latin typeface="Consolas" pitchFamily="49" charset="0"/>
-                <a:cs typeface="Consolas" pitchFamily="49" charset="0"/>
-              </a:rPr>
-              <a:t>LoopStmt</a:t>
-            </a:r>
-            <a:r>
-              <a:rPr lang="en-US" sz="1800" dirty="0">
-                <a:latin typeface="Consolas" pitchFamily="49" charset="0"/>
-                <a:cs typeface="Consolas" pitchFamily="49" charset="0"/>
-              </a:rPr>
-              <a:t> </a:t>
-            </a:r>
-            <a:r>
-              <a:rPr lang="en-US" sz="1800" dirty="0" err="1">
-                <a:latin typeface="Consolas" pitchFamily="49" charset="0"/>
-                <a:cs typeface="Consolas" pitchFamily="49" charset="0"/>
-              </a:rPr>
-              <a:t>loopStmt</a:t>
-            </a:r>
-            <a:r>
-              <a:rPr lang="en-US" sz="1800" dirty="0">
-                <a:latin typeface="Consolas" pitchFamily="49" charset="0"/>
-                <a:cs typeface="Consolas" pitchFamily="49" charset="0"/>
-              </a:rPr>
-              <a:t> = </a:t>
-            </a:r>
-            <a:r>
-              <a:rPr lang="en-US" sz="1800" dirty="0" err="1">
-                <a:latin typeface="Consolas" pitchFamily="49" charset="0"/>
-                <a:cs typeface="Consolas" pitchFamily="49" charset="0"/>
-              </a:rPr>
-              <a:t>loopContext.getLoopStmt</a:t>
-            </a:r>
-            <a:r>
-              <a:rPr lang="en-US" sz="1800" dirty="0">
-                <a:latin typeface="Consolas" pitchFamily="49" charset="0"/>
-                <a:cs typeface="Consolas" pitchFamily="49" charset="0"/>
-              </a:rPr>
-              <a:t>();</a:t>
-            </a:r>
-          </a:p>
-          <a:p>
-            <a:pPr lvl="1">
+              <a:rPr lang="en-US" sz="1800" dirty="0">
+                <a:latin typeface="Consolas" panose="020B0609020204030204" pitchFamily="49" charset="0"/>
+              </a:rPr>
+              <a:t>    ...</a:t>
+            </a:r>
+          </a:p>
+          <a:p>
+            <a:pPr marL="457200" indent="0">
               <a:spcBef>
                 <a:spcPts val="200"/>
               </a:spcBef>
@@ -20302,55 +20229,40 @@
             </a:pPr>
             <a:r>
               <a:rPr lang="en-US" sz="1800" dirty="0">
-                <a:latin typeface="Consolas" pitchFamily="49" charset="0"/>
-                <a:cs typeface="Consolas" pitchFamily="49" charset="0"/>
-              </a:rPr>
-              <a:t>if (loopStmt == null)</a:t>
-            </a:r>
-          </a:p>
-          <a:p>
-            <a:pPr lvl="1">
-              <a:spcBef>
-                <a:spcPts val="200"/>
-              </a:spcBef>
-              <a:buNone/>
-            </a:pPr>
-            <a:r>
-              <a:rPr lang="en-US" sz="1800" dirty="0">
-                <a:latin typeface="Consolas" pitchFamily="49" charset="0"/>
-                <a:cs typeface="Consolas" pitchFamily="49" charset="0"/>
-              </a:rPr>
-              <a:t>    throw error(exitPosition,</a:t>
-            </a:r>
-          </a:p>
-          <a:p>
-            <a:pPr lvl="1">
-              <a:spcBef>
-                <a:spcPts val="200"/>
-              </a:spcBef>
-              <a:buNone/>
-            </a:pPr>
-            <a:r>
-              <a:rPr lang="en-US" sz="1800" dirty="0">
-                <a:latin typeface="Consolas" pitchFamily="49" charset="0"/>
-                <a:cs typeface="Consolas" pitchFamily="49" charset="0"/>
-              </a:rPr>
-              <a:t>        "Exit statement is not nested within a loop");</a:t>
-            </a:r>
-          </a:p>
-          <a:p>
-            <a:pPr lvl="1">
-              <a:spcBef>
-                <a:spcPts val="200"/>
-              </a:spcBef>
-              <a:buNone/>
-            </a:pPr>
-            <a:r>
-              <a:rPr lang="en-US" sz="1800" dirty="0">
-                <a:latin typeface="Consolas" pitchFamily="49" charset="0"/>
-                <a:cs typeface="Consolas" pitchFamily="49" charset="0"/>
-              </a:rPr>
-              <a:t>return new ExitStmt(expr, loopStmt);</a:t>
+                <a:latin typeface="Consolas" panose="020B0609020204030204" pitchFamily="49" charset="0"/>
+              </a:rPr>
+              <a:t>  }</a:t>
+            </a:r>
+          </a:p>
+        </p:txBody>
+      </p:sp>
+      <p:sp>
+        <p:nvSpPr>
+          <p:cNvPr id="3" name="Footer Placeholder 2">
+            <a:extLst>
+              <a:ext uri="{FF2B5EF4-FFF2-40B4-BE49-F238E27FC236}">
+                <a16:creationId xmlns:a16="http://schemas.microsoft.com/office/drawing/2014/main" id="{5A404E55-B647-4C7C-9D62-C9EA115DC92C}"/>
+              </a:ext>
+            </a:extLst>
+          </p:cNvPr>
+          <p:cNvSpPr>
+            <a:spLocks noGrp="1"/>
+          </p:cNvSpPr>
+          <p:nvPr>
+            <p:ph type="ftr" sz="quarter" idx="10"/>
+          </p:nvPr>
+        </p:nvSpPr>
+        <p:spPr/>
+        <p:txBody>
+          <a:bodyPr/>
+          <a:lstStyle/>
+          <a:p>
+            <a:pPr>
+              <a:defRPr/>
+            </a:pPr>
+            <a:r>
+              <a:rPr lang="en-US"/>
+              <a:t>©SoftMoore Consulting</a:t>
             </a:r>
             <a:endParaRPr lang="en-US" dirty="0"/>
           </a:p>
@@ -20358,33 +20270,17 @@
       </p:sp>
       <p:sp>
         <p:nvSpPr>
-          <p:cNvPr id="24578" name="Footer Placeholder 3"/>
+          <p:cNvPr id="4" name="Slide Number Placeholder 3">
+            <a:extLst>
+              <a:ext uri="{FF2B5EF4-FFF2-40B4-BE49-F238E27FC236}">
+                <a16:creationId xmlns:a16="http://schemas.microsoft.com/office/drawing/2014/main" id="{964B72F4-5156-47A8-BE64-4FAAF4115382}"/>
+              </a:ext>
+            </a:extLst>
+          </p:cNvPr>
           <p:cNvSpPr>
             <a:spLocks noGrp="1"/>
           </p:cNvSpPr>
           <p:nvPr>
-            <p:ph type="ftr" sz="quarter" idx="10"/>
-          </p:nvPr>
-        </p:nvSpPr>
-        <p:spPr/>
-        <p:txBody>
-          <a:bodyPr/>
-          <a:lstStyle/>
-          <a:p>
-            <a:r>
-              <a:rPr lang="en-US" dirty="0"/>
-              <a:t>©SoftMoore Consulting</a:t>
-            </a:r>
-          </a:p>
-        </p:txBody>
-      </p:sp>
-      <p:sp>
-        <p:nvSpPr>
-          <p:cNvPr id="24579" name="Slide Number Placeholder 4"/>
-          <p:cNvSpPr>
-            <a:spLocks noGrp="1"/>
-          </p:cNvSpPr>
-          <p:nvPr>
             <p:ph type="sldNum" sz="quarter" idx="11"/>
           </p:nvPr>
         </p:nvSpPr>
@@ -20393,13 +20289,18 @@
           <a:bodyPr/>
           <a:lstStyle/>
           <a:p>
-            <a:r>
-              <a:rPr lang="en-US" dirty="0"/>
+            <a:pPr>
+              <a:defRPr/>
+            </a:pPr>
+            <a:r>
+              <a:rPr lang="en-US"/>
               <a:t>Slide </a:t>
             </a:r>
-            <a:fld id="{5290820B-F486-4161-A33F-1CCFEEE1147B}" type="slidenum">
+            <a:fld id="{0493F5BC-5863-40DB-9BF6-90302664BBE6}" type="slidenum">
               <a:rPr lang="en-US" smtClean="0"/>
-              <a:pPr/>
+              <a:pPr>
+                <a:defRPr/>
+              </a:pPr>
               <a:t>46</a:t>
             </a:fld>
             <a:endParaRPr lang="en-US" dirty="0"/>
@@ -20407,6 +20308,11 @@
         </p:txBody>
       </p:sp>
     </p:spTree>
+    <p:extLst>
+      <p:ext uri="{BB962C8B-B14F-4D97-AF65-F5344CB8AC3E}">
+        <p14:creationId xmlns:p14="http://schemas.microsoft.com/office/powerpoint/2010/main" val="2587237733"/>
+      </p:ext>
+    </p:extLst>
   </p:cSld>
   <p:clrMapOvr>
     <a:masterClrMapping/>
@@ -20433,31 +20339,322 @@
       </p:grpSpPr>
       <p:sp>
         <p:nvSpPr>
-          <p:cNvPr id="16386" name="Footer Placeholder 3"/>
+          <p:cNvPr id="8" name="Title 7">
+            <a:extLst>
+              <a:ext uri="{FF2B5EF4-FFF2-40B4-BE49-F238E27FC236}">
+                <a16:creationId xmlns:a16="http://schemas.microsoft.com/office/drawing/2014/main" id="{563233BE-B20A-4E38-8D6C-3D8FB41B4336}"/>
+              </a:ext>
+            </a:extLst>
+          </p:cNvPr>
           <p:cNvSpPr>
             <a:spLocks noGrp="1"/>
           </p:cNvSpPr>
           <p:nvPr>
+            <p:ph type="title"/>
+          </p:nvPr>
+        </p:nvSpPr>
+        <p:spPr/>
+        <p:txBody>
+          <a:bodyPr/>
+          <a:lstStyle/>
+          <a:p>
+            <a:r>
+              <a:rPr lang="en-US" dirty="0"/>
+              <a:t>Example: </a:t>
+            </a:r>
+            <a:r>
+              <a:rPr lang="en-US" dirty="0">
+                <a:latin typeface="Consolas" panose="020B0609020204030204" pitchFamily="49" charset="0"/>
+              </a:rPr>
+              <a:t>Variable</a:t>
+            </a:r>
+          </a:p>
+        </p:txBody>
+      </p:sp>
+      <p:sp>
+        <p:nvSpPr>
+          <p:cNvPr id="9" name="Content Placeholder 8">
+            <a:extLst>
+              <a:ext uri="{FF2B5EF4-FFF2-40B4-BE49-F238E27FC236}">
+                <a16:creationId xmlns:a16="http://schemas.microsoft.com/office/drawing/2014/main" id="{76E1210A-295D-4718-9E1A-27C835EA23E3}"/>
+              </a:ext>
+            </a:extLst>
+          </p:cNvPr>
+          <p:cNvSpPr>
+            <a:spLocks noGrp="1"/>
+          </p:cNvSpPr>
+          <p:nvPr>
+            <p:ph idx="1"/>
+          </p:nvPr>
+        </p:nvSpPr>
+        <p:spPr/>
+        <p:txBody>
+          <a:bodyPr/>
+          <a:lstStyle/>
+          <a:p>
+            <a:r>
+              <a:rPr lang="en-US" dirty="0"/>
+              <a:t>The type for a variable (and therefore also for a named value) is initialized to the type specified in the variable’s declaration.</a:t>
+            </a:r>
+          </a:p>
+          <a:p>
+            <a:r>
+              <a:rPr lang="en-US" dirty="0"/>
+              <a:t>Constructor for Variable</a:t>
+            </a:r>
+          </a:p>
+          <a:p>
+            <a:pPr marL="457200" lvl="1" indent="0">
+              <a:buNone/>
+            </a:pPr>
+            <a:r>
+              <a:rPr lang="en-US" sz="1800" dirty="0">
+                <a:latin typeface="Consolas" panose="020B0609020204030204" pitchFamily="49" charset="0"/>
+              </a:rPr>
+              <a:t>public Variable(</a:t>
+            </a:r>
+            <a:r>
+              <a:rPr lang="en-US" sz="1800" dirty="0" err="1">
+                <a:latin typeface="Consolas" panose="020B0609020204030204" pitchFamily="49" charset="0"/>
+              </a:rPr>
+              <a:t>NamedDecl</a:t>
+            </a:r>
+            <a:r>
+              <a:rPr lang="en-US" sz="1800" dirty="0">
+                <a:latin typeface="Consolas" panose="020B0609020204030204" pitchFamily="49" charset="0"/>
+              </a:rPr>
+              <a:t> </a:t>
+            </a:r>
+            <a:r>
+              <a:rPr lang="en-US" sz="1800" dirty="0" err="1">
+                <a:latin typeface="Consolas" panose="020B0609020204030204" pitchFamily="49" charset="0"/>
+              </a:rPr>
+              <a:t>decl</a:t>
+            </a:r>
+            <a:r>
+              <a:rPr lang="en-US" sz="1800" dirty="0">
+                <a:latin typeface="Consolas" panose="020B0609020204030204" pitchFamily="49" charset="0"/>
+              </a:rPr>
+              <a:t>, Position </a:t>
+            </a:r>
+            <a:r>
+              <a:rPr lang="en-US" sz="1800" dirty="0" err="1">
+                <a:latin typeface="Consolas" panose="020B0609020204030204" pitchFamily="49" charset="0"/>
+              </a:rPr>
+              <a:t>position</a:t>
+            </a:r>
+            <a:r>
+              <a:rPr lang="en-US" sz="1800" dirty="0">
+                <a:latin typeface="Consolas" panose="020B0609020204030204" pitchFamily="49" charset="0"/>
+              </a:rPr>
+              <a:t>,</a:t>
+            </a:r>
+          </a:p>
+          <a:p>
+            <a:pPr marL="457200" lvl="1" indent="0">
+              <a:spcBef>
+                <a:spcPts val="200"/>
+              </a:spcBef>
+              <a:buNone/>
+            </a:pPr>
+            <a:r>
+              <a:rPr lang="en-US" sz="1800" dirty="0">
+                <a:latin typeface="Consolas" panose="020B0609020204030204" pitchFamily="49" charset="0"/>
+              </a:rPr>
+              <a:t>                List&lt;Expression&gt; </a:t>
+            </a:r>
+            <a:r>
+              <a:rPr lang="en-US" sz="1800" dirty="0" err="1">
+                <a:latin typeface="Consolas" panose="020B0609020204030204" pitchFamily="49" charset="0"/>
+              </a:rPr>
+              <a:t>indexExprs</a:t>
+            </a:r>
+            <a:r>
+              <a:rPr lang="en-US" sz="1800" dirty="0">
+                <a:latin typeface="Consolas" panose="020B0609020204030204" pitchFamily="49" charset="0"/>
+              </a:rPr>
+              <a:t>)</a:t>
+            </a:r>
+          </a:p>
+          <a:p>
+            <a:pPr marL="457200" lvl="1" indent="0">
+              <a:spcBef>
+                <a:spcPts val="200"/>
+              </a:spcBef>
+              <a:buNone/>
+            </a:pPr>
+            <a:r>
+              <a:rPr lang="en-US" sz="1800" dirty="0">
+                <a:latin typeface="Consolas" panose="020B0609020204030204" pitchFamily="49" charset="0"/>
+              </a:rPr>
+              <a:t>  {</a:t>
+            </a:r>
+          </a:p>
+          <a:p>
+            <a:pPr marL="457200" lvl="1" indent="0">
+              <a:spcBef>
+                <a:spcPts val="200"/>
+              </a:spcBef>
+              <a:buNone/>
+            </a:pPr>
+            <a:r>
+              <a:rPr lang="en-US" sz="1800" dirty="0">
+                <a:latin typeface="Consolas" panose="020B0609020204030204" pitchFamily="49" charset="0"/>
+              </a:rPr>
+              <a:t>    </a:t>
+            </a:r>
+            <a:r>
+              <a:rPr lang="en-US" sz="1800" b="1" dirty="0">
+                <a:latin typeface="Consolas" panose="020B0609020204030204" pitchFamily="49" charset="0"/>
+              </a:rPr>
+              <a:t>super(</a:t>
+            </a:r>
+            <a:r>
+              <a:rPr lang="en-US" sz="1800" b="1" dirty="0" err="1">
+                <a:latin typeface="Consolas" panose="020B0609020204030204" pitchFamily="49" charset="0"/>
+              </a:rPr>
+              <a:t>decl.getType</a:t>
+            </a:r>
+            <a:r>
+              <a:rPr lang="en-US" sz="1800" b="1" dirty="0">
+                <a:latin typeface="Consolas" panose="020B0609020204030204" pitchFamily="49" charset="0"/>
+              </a:rPr>
+              <a:t>(), position);</a:t>
+            </a:r>
+          </a:p>
+          <a:p>
+            <a:pPr marL="457200" lvl="1" indent="0">
+              <a:spcBef>
+                <a:spcPts val="200"/>
+              </a:spcBef>
+              <a:buNone/>
+            </a:pPr>
+            <a:r>
+              <a:rPr lang="en-US" sz="1800" dirty="0">
+                <a:latin typeface="Consolas" panose="020B0609020204030204" pitchFamily="49" charset="0"/>
+              </a:rPr>
+              <a:t>    </a:t>
+            </a:r>
+            <a:r>
+              <a:rPr lang="en-US" sz="1800" dirty="0" err="1">
+                <a:latin typeface="Consolas" panose="020B0609020204030204" pitchFamily="49" charset="0"/>
+              </a:rPr>
+              <a:t>this.decl</a:t>
+            </a:r>
+            <a:r>
+              <a:rPr lang="en-US" sz="1800" dirty="0">
+                <a:latin typeface="Consolas" panose="020B0609020204030204" pitchFamily="49" charset="0"/>
+              </a:rPr>
+              <a:t>       = </a:t>
+            </a:r>
+            <a:r>
+              <a:rPr lang="en-US" sz="1800" dirty="0" err="1">
+                <a:latin typeface="Consolas" panose="020B0609020204030204" pitchFamily="49" charset="0"/>
+              </a:rPr>
+              <a:t>decl</a:t>
+            </a:r>
+            <a:r>
+              <a:rPr lang="en-US" sz="1800" dirty="0">
+                <a:latin typeface="Consolas" panose="020B0609020204030204" pitchFamily="49" charset="0"/>
+              </a:rPr>
+              <a:t>;</a:t>
+            </a:r>
+          </a:p>
+          <a:p>
+            <a:pPr marL="457200" lvl="1" indent="0">
+              <a:spcBef>
+                <a:spcPts val="200"/>
+              </a:spcBef>
+              <a:buNone/>
+            </a:pPr>
+            <a:r>
+              <a:rPr lang="en-US" sz="1800" dirty="0">
+                <a:latin typeface="Consolas" panose="020B0609020204030204" pitchFamily="49" charset="0"/>
+              </a:rPr>
+              <a:t>    </a:t>
+            </a:r>
+            <a:r>
+              <a:rPr lang="en-US" sz="1800" dirty="0" err="1">
+                <a:latin typeface="Consolas" panose="020B0609020204030204" pitchFamily="49" charset="0"/>
+              </a:rPr>
+              <a:t>this.indexExprs</a:t>
+            </a:r>
+            <a:r>
+              <a:rPr lang="en-US" sz="1800" dirty="0">
+                <a:latin typeface="Consolas" panose="020B0609020204030204" pitchFamily="49" charset="0"/>
+              </a:rPr>
+              <a:t> = </a:t>
+            </a:r>
+            <a:r>
+              <a:rPr lang="en-US" sz="1800" dirty="0" err="1">
+                <a:latin typeface="Consolas" panose="020B0609020204030204" pitchFamily="49" charset="0"/>
+              </a:rPr>
+              <a:t>indexExprs</a:t>
+            </a:r>
+            <a:r>
+              <a:rPr lang="en-US" sz="1800" dirty="0">
+                <a:latin typeface="Consolas" panose="020B0609020204030204" pitchFamily="49" charset="0"/>
+              </a:rPr>
+              <a:t>;</a:t>
+            </a:r>
+          </a:p>
+          <a:p>
+            <a:pPr marL="457200" lvl="1" indent="0">
+              <a:spcBef>
+                <a:spcPts val="200"/>
+              </a:spcBef>
+              <a:buNone/>
+            </a:pPr>
+            <a:r>
+              <a:rPr lang="en-US" sz="1800" dirty="0">
+                <a:latin typeface="Consolas" panose="020B0609020204030204" pitchFamily="49" charset="0"/>
+              </a:rPr>
+              <a:t>  }</a:t>
+            </a:r>
+          </a:p>
+        </p:txBody>
+      </p:sp>
+      <p:sp>
+        <p:nvSpPr>
+          <p:cNvPr id="3" name="Footer Placeholder 2">
+            <a:extLst>
+              <a:ext uri="{FF2B5EF4-FFF2-40B4-BE49-F238E27FC236}">
+                <a16:creationId xmlns:a16="http://schemas.microsoft.com/office/drawing/2014/main" id="{5A404E55-B647-4C7C-9D62-C9EA115DC92C}"/>
+              </a:ext>
+            </a:extLst>
+          </p:cNvPr>
+          <p:cNvSpPr>
+            <a:spLocks noGrp="1"/>
+          </p:cNvSpPr>
+          <p:nvPr>
             <p:ph type="ftr" sz="quarter" idx="10"/>
           </p:nvPr>
         </p:nvSpPr>
-        <p:spPr>
-          <a:noFill/>
-        </p:spPr>
-        <p:txBody>
-          <a:bodyPr/>
-          <a:lstStyle/>
-          <a:p>
-            <a:r>
-              <a:rPr lang="en-US" dirty="0"/>
+        <p:spPr/>
+        <p:txBody>
+          <a:bodyPr/>
+          <a:lstStyle/>
+          <a:p>
+            <a:pPr>
+              <a:defRPr/>
+            </a:pPr>
+            <a:r>
+              <a:rPr lang="en-US"/>
               <a:t>©SoftMoore Consulting</a:t>
             </a:r>
-          </a:p>
-        </p:txBody>
-      </p:sp>
-      <p:sp>
-        <p:nvSpPr>
-          <p:cNvPr id="16387" name="Slide Number Placeholder 4"/>
+            <a:endParaRPr lang="en-US" dirty="0"/>
+          </a:p>
+        </p:txBody>
+      </p:sp>
+      <p:sp>
+        <p:nvSpPr>
+          <p:cNvPr id="4" name="Slide Number Placeholder 3">
+            <a:extLst>
+              <a:ext uri="{FF2B5EF4-FFF2-40B4-BE49-F238E27FC236}">
+                <a16:creationId xmlns:a16="http://schemas.microsoft.com/office/drawing/2014/main" id="{964B72F4-5156-47A8-BE64-4FAAF4115382}"/>
+              </a:ext>
+            </a:extLst>
+          </p:cNvPr>
           <p:cNvSpPr>
             <a:spLocks noGrp="1"/>
           </p:cNvSpPr>
@@ -20465,31 +20662,70 @@
             <p:ph type="sldNum" sz="quarter" idx="11"/>
           </p:nvPr>
         </p:nvSpPr>
-        <p:spPr>
-          <a:noFill/>
-        </p:spPr>
-        <p:txBody>
-          <a:bodyPr/>
-          <a:lstStyle/>
-          <a:p>
-            <a:r>
-              <a:rPr lang="en-US" dirty="0"/>
+        <p:spPr/>
+        <p:txBody>
+          <a:bodyPr/>
+          <a:lstStyle/>
+          <a:p>
+            <a:pPr>
+              <a:defRPr/>
+            </a:pPr>
+            <a:r>
+              <a:rPr lang="en-US"/>
               <a:t>Slide </a:t>
             </a:r>
-            <a:fld id="{134458ED-4E89-4858-9DDE-3B7F8D65D42C}" type="slidenum">
+            <a:fld id="{0493F5BC-5863-40DB-9BF6-90302664BBE6}" type="slidenum">
               <a:rPr lang="en-US" smtClean="0"/>
-              <a:pPr/>
+              <a:pPr>
+                <a:defRPr/>
+              </a:pPr>
               <a:t>47</a:t>
             </a:fld>
             <a:endParaRPr lang="en-US" dirty="0"/>
           </a:p>
         </p:txBody>
       </p:sp>
-      <p:sp>
-        <p:nvSpPr>
-          <p:cNvPr id="16388" name="Rectangle 2"/>
-          <p:cNvSpPr>
-            <a:spLocks noGrp="1" noChangeArrowheads="1"/>
+    </p:spTree>
+    <p:extLst>
+      <p:ext uri="{BB962C8B-B14F-4D97-AF65-F5344CB8AC3E}">
+        <p14:creationId xmlns:p14="http://schemas.microsoft.com/office/powerpoint/2010/main" val="3229506688"/>
+      </p:ext>
+    </p:extLst>
+  </p:cSld>
+  <p:clrMapOvr>
+    <a:masterClrMapping/>
+  </p:clrMapOvr>
+</p:sld>
+</file>
+
+<file path=ppt/slides/slide48.xml><?xml version="1.0" encoding="utf-8"?>
+<p:sld xmlns:a="http://schemas.openxmlformats.org/drawingml/2006/main" xmlns:r="http://schemas.openxmlformats.org/officeDocument/2006/relationships" xmlns:p="http://schemas.openxmlformats.org/presentationml/2006/main">
+  <p:cSld>
+    <p:spTree>
+      <p:nvGrpSpPr>
+        <p:cNvPr id="1" name=""/>
+        <p:cNvGrpSpPr/>
+        <p:nvPr/>
+      </p:nvGrpSpPr>
+      <p:grpSpPr>
+        <a:xfrm>
+          <a:off x="0" y="0"/>
+          <a:ext cx="0" cy="0"/>
+          <a:chOff x="0" y="0"/>
+          <a:chExt cx="0" cy="0"/>
+        </a:xfrm>
+      </p:grpSpPr>
+      <p:sp>
+        <p:nvSpPr>
+          <p:cNvPr id="8" name="Title 7">
+            <a:extLst>
+              <a:ext uri="{FF2B5EF4-FFF2-40B4-BE49-F238E27FC236}">
+                <a16:creationId xmlns:a16="http://schemas.microsoft.com/office/drawing/2014/main" id="{563233BE-B20A-4E38-8D6C-3D8FB41B4336}"/>
+              </a:ext>
+            </a:extLst>
+          </p:cNvPr>
+          <p:cNvSpPr>
+            <a:spLocks noGrp="1"/>
           </p:cNvSpPr>
           <p:nvPr>
             <p:ph type="title"/>
@@ -20502,32 +20738,44 @@
           <a:p>
             <a:r>
               <a:rPr lang="en-US" dirty="0"/>
-              <a:t>Version 3 of the Parser</a:t>
+              <a:t>Example: </a:t>
+            </a:r>
+            <a:r>
+              <a:rPr lang="en-US" dirty="0">
+                <a:latin typeface="Consolas" panose="020B0609020204030204" pitchFamily="49" charset="0"/>
+              </a:rPr>
+              <a:t>Variable</a:t>
             </a:r>
             <a:br>
               <a:rPr lang="en-US" dirty="0"/>
             </a:br>
             <a:r>
               <a:rPr lang="en-US" sz="2400" dirty="0"/>
-              <a:t>(Abstract Syntax Trees)</a:t>
-            </a:r>
-          </a:p>
-        </p:txBody>
-      </p:sp>
-      <p:sp>
-        <p:nvSpPr>
-          <p:cNvPr id="16389" name="Rectangle 3"/>
-          <p:cNvSpPr>
-            <a:spLocks noGrp="1" noChangeArrowheads="1"/>
-          </p:cNvSpPr>
-          <p:nvPr>
-            <p:ph type="body" idx="1"/>
+              <a:t>(continued)</a:t>
+            </a:r>
+          </a:p>
+        </p:txBody>
+      </p:sp>
+      <p:sp>
+        <p:nvSpPr>
+          <p:cNvPr id="9" name="Content Placeholder 8">
+            <a:extLst>
+              <a:ext uri="{FF2B5EF4-FFF2-40B4-BE49-F238E27FC236}">
+                <a16:creationId xmlns:a16="http://schemas.microsoft.com/office/drawing/2014/main" id="{76E1210A-295D-4718-9E1A-27C835EA23E3}"/>
+              </a:ext>
+            </a:extLst>
+          </p:cNvPr>
+          <p:cNvSpPr>
+            <a:spLocks noGrp="1"/>
+          </p:cNvSpPr>
+          <p:nvPr>
+            <p:ph idx="1"/>
           </p:nvPr>
         </p:nvSpPr>
         <p:spPr>
           <a:xfrm>
             <a:off x="458788" y="1363663"/>
-            <a:ext cx="8226425" cy="4935537"/>
+            <a:ext cx="8229600" cy="4935537"/>
           </a:xfrm>
         </p:spPr>
         <p:txBody>
@@ -20536,36 +20784,84 @@
           <a:p>
             <a:r>
               <a:rPr lang="en-US" dirty="0"/>
-              <a:t>Create AST classes in package “</a:t>
+              <a:t>The initialized type for a variable is correct for predefined types such as </a:t>
             </a:r>
             <a:r>
               <a:rPr lang="en-US" dirty="0">
-                <a:latin typeface="Consolas" pitchFamily="49" charset="0"/>
-              </a:rPr>
-              <a:t>…ast</a:t>
-            </a:r>
-            <a:r>
-              <a:rPr lang="en-US" dirty="0"/>
-              <a:t>”</a:t>
-            </a:r>
-          </a:p>
-          <a:p>
-            <a:r>
-              <a:rPr lang="en-US" dirty="0"/>
-              <a:t>Add generation of AST structure; i.e., parsing methods should return AST objects or lists of AST objects.</a:t>
-            </a:r>
-          </a:p>
-          <a:p>
-            <a:r>
-              <a:rPr lang="en-US" dirty="0"/>
-              <a:t>Use empty bodies when overriding abstract methods </a:t>
+                <a:latin typeface="Consolas" panose="020B0609020204030204" pitchFamily="49" charset="0"/>
+              </a:rPr>
+              <a:t>Integer</a:t>
+            </a:r>
+            <a:r>
+              <a:rPr lang="en-US" dirty="0"/>
+              <a:t> or </a:t>
             </a:r>
             <a:r>
               <a:rPr lang="en-US" dirty="0">
-                <a:latin typeface="Consolas" pitchFamily="49" charset="0"/>
-                <a:cs typeface="Consolas" pitchFamily="49" charset="0"/>
-              </a:rPr>
-              <a:t>checkConstraints()</a:t>
+                <a:latin typeface="Consolas" panose="020B0609020204030204" pitchFamily="49" charset="0"/>
+              </a:rPr>
+              <a:t>Char</a:t>
+            </a:r>
+            <a:r>
+              <a:rPr lang="en-US" dirty="0"/>
+              <a:t>, but additional work is required for arrays.</a:t>
+            </a:r>
+          </a:p>
+          <a:p>
+            <a:r>
+              <a:rPr lang="en-US" dirty="0"/>
+              <a:t>Consider the following declarations:</a:t>
+            </a:r>
+          </a:p>
+          <a:p>
+            <a:pPr marL="457200" lvl="1" indent="0">
+              <a:buNone/>
+            </a:pPr>
+            <a:r>
+              <a:rPr lang="en-US" dirty="0">
+                <a:latin typeface="Consolas" panose="020B0609020204030204" pitchFamily="49" charset="0"/>
+              </a:rPr>
+              <a:t>type T1 is array(10) of Integer;</a:t>
+            </a:r>
+          </a:p>
+          <a:p>
+            <a:pPr marL="457200" lvl="1" indent="0">
+              <a:spcBef>
+                <a:spcPts val="200"/>
+              </a:spcBef>
+              <a:buNone/>
+            </a:pPr>
+            <a:r>
+              <a:rPr lang="en-US" dirty="0">
+                <a:latin typeface="Consolas" panose="020B0609020204030204" pitchFamily="49" charset="0"/>
+              </a:rPr>
+              <a:t>type T2 is array(10) of T1;</a:t>
+            </a:r>
+          </a:p>
+          <a:p>
+            <a:pPr marL="457200" lvl="1" indent="0">
+              <a:spcBef>
+                <a:spcPts val="200"/>
+              </a:spcBef>
+              <a:buNone/>
+            </a:pPr>
+            <a:r>
+              <a:rPr lang="en-US" dirty="0">
+                <a:latin typeface="Consolas" panose="020B0609020204030204" pitchFamily="49" charset="0"/>
+              </a:rPr>
+              <a:t>var a, b : T2;</a:t>
+            </a:r>
+          </a:p>
+          <a:p>
+            <a:r>
+              <a:rPr lang="en-US" dirty="0"/>
+              <a:t>While the declared (initialized) type of both </a:t>
+            </a:r>
+            <a:r>
+              <a:rPr lang="en-US" dirty="0">
+                <a:latin typeface="Consolas" panose="020B0609020204030204" pitchFamily="49" charset="0"/>
+              </a:rPr>
+              <a:t>a</a:t>
             </a:r>
             <a:r>
               <a:rPr lang="en-US" dirty="0"/>
@@ -20573,105 +20869,434 @@
             </a:r>
             <a:r>
               <a:rPr lang="en-US" dirty="0">
-                <a:latin typeface="Consolas" pitchFamily="49" charset="0"/>
-                <a:cs typeface="Consolas" pitchFamily="49" charset="0"/>
-              </a:rPr>
-              <a:t>emit()</a:t>
-            </a:r>
-            <a:r>
-              <a:rPr lang="en-US" dirty="0"/>
-              <a:t>.</a:t>
-            </a:r>
-          </a:p>
-          <a:p>
-            <a:r>
-              <a:rPr lang="en-US" dirty="0"/>
-              <a:t>Use complete version of </a:t>
+                <a:latin typeface="Consolas" panose="020B0609020204030204" pitchFamily="49" charset="0"/>
+              </a:rPr>
+              <a:t>b</a:t>
+            </a:r>
+            <a:r>
+              <a:rPr lang="en-US" dirty="0"/>
+              <a:t> is </a:t>
             </a:r>
             <a:r>
               <a:rPr lang="en-US" dirty="0">
-                <a:latin typeface="Consolas" pitchFamily="49" charset="0"/>
-                <a:cs typeface="Consolas" pitchFamily="49" charset="0"/>
-              </a:rPr>
-              <a:t>IdTable</a:t>
-            </a:r>
-            <a:r>
-              <a:rPr lang="en-US" dirty="0"/>
-              <a:t> to check for scope errors.</a:t>
-            </a:r>
-          </a:p>
-          <a:p>
-            <a:r>
-              <a:rPr lang="en-US" dirty="0"/>
-              <a:t>Use class </a:t>
+                <a:latin typeface="Consolas" panose="020B0609020204030204" pitchFamily="49" charset="0"/>
+              </a:rPr>
+              <a:t>T2</a:t>
+            </a:r>
+            <a:r>
+              <a:rPr lang="en-US" dirty="0"/>
+              <a:t>, we could have a variable or named value with zero, one,</a:t>
+            </a:r>
+            <a:br>
+              <a:rPr lang="en-US" dirty="0"/>
+            </a:br>
+            <a:r>
+              <a:rPr lang="en-US" dirty="0"/>
+              <a:t>or two index expressions, as in the following:</a:t>
+            </a:r>
+          </a:p>
+          <a:p>
+            <a:pPr marL="457200" lvl="1" indent="0">
+              <a:buNone/>
+            </a:pPr>
+            <a:r>
+              <a:rPr lang="en-US" sz="1800" dirty="0">
+                <a:latin typeface="Consolas" panose="020B0609020204030204" pitchFamily="49" charset="0"/>
+              </a:rPr>
+              <a:t>a := b;              // type of var and named </a:t>
+            </a:r>
+            <a:r>
+              <a:rPr lang="en-US" sz="1800" dirty="0" err="1">
+                <a:latin typeface="Consolas" panose="020B0609020204030204" pitchFamily="49" charset="0"/>
+              </a:rPr>
+              <a:t>val</a:t>
+            </a:r>
+            <a:r>
+              <a:rPr lang="en-US" sz="1800" dirty="0">
+                <a:latin typeface="Consolas" panose="020B0609020204030204" pitchFamily="49" charset="0"/>
+              </a:rPr>
+              <a:t> is T2</a:t>
+            </a:r>
+          </a:p>
+          <a:p>
+            <a:pPr marL="457200" lvl="1" indent="0">
+              <a:spcBef>
+                <a:spcPts val="200"/>
+              </a:spcBef>
+              <a:buNone/>
+            </a:pPr>
+            <a:r>
+              <a:rPr lang="en-US" sz="1800" dirty="0">
+                <a:latin typeface="Consolas" panose="020B0609020204030204" pitchFamily="49" charset="0"/>
+              </a:rPr>
+              <a:t>a[0] := b[0];        // type of var and named </a:t>
+            </a:r>
+            <a:r>
+              <a:rPr lang="en-US" sz="1800" dirty="0" err="1">
+                <a:latin typeface="Consolas" panose="020B0609020204030204" pitchFamily="49" charset="0"/>
+              </a:rPr>
+              <a:t>val</a:t>
+            </a:r>
+            <a:r>
+              <a:rPr lang="en-US" sz="1800" dirty="0">
+                <a:latin typeface="Consolas" panose="020B0609020204030204" pitchFamily="49" charset="0"/>
+              </a:rPr>
+              <a:t> is T1</a:t>
+            </a:r>
+          </a:p>
+          <a:p>
+            <a:pPr marL="457200" lvl="1" indent="0">
+              <a:spcBef>
+                <a:spcPts val="200"/>
+              </a:spcBef>
+              <a:buNone/>
+            </a:pPr>
+            <a:r>
+              <a:rPr lang="en-US" sz="1800" dirty="0">
+                <a:latin typeface="Consolas" panose="020B0609020204030204" pitchFamily="49" charset="0"/>
+              </a:rPr>
+              <a:t>a[1][6] := b[5][7];  // type of var and named </a:t>
+            </a:r>
+            <a:r>
+              <a:rPr lang="en-US" sz="1800" dirty="0" err="1">
+                <a:latin typeface="Consolas" panose="020B0609020204030204" pitchFamily="49" charset="0"/>
+              </a:rPr>
+              <a:t>val</a:t>
+            </a:r>
+            <a:r>
+              <a:rPr lang="en-US" sz="1800" dirty="0">
+                <a:latin typeface="Consolas" panose="020B0609020204030204" pitchFamily="49" charset="0"/>
+              </a:rPr>
+              <a:t> is Integer</a:t>
+            </a:r>
+          </a:p>
+        </p:txBody>
+      </p:sp>
+      <p:sp>
+        <p:nvSpPr>
+          <p:cNvPr id="3" name="Footer Placeholder 2">
+            <a:extLst>
+              <a:ext uri="{FF2B5EF4-FFF2-40B4-BE49-F238E27FC236}">
+                <a16:creationId xmlns:a16="http://schemas.microsoft.com/office/drawing/2014/main" id="{5A404E55-B647-4C7C-9D62-C9EA115DC92C}"/>
+              </a:ext>
+            </a:extLst>
+          </p:cNvPr>
+          <p:cNvSpPr>
+            <a:spLocks noGrp="1"/>
+          </p:cNvSpPr>
+          <p:nvPr>
+            <p:ph type="ftr" sz="quarter" idx="10"/>
+          </p:nvPr>
+        </p:nvSpPr>
+        <p:spPr/>
+        <p:txBody>
+          <a:bodyPr/>
+          <a:lstStyle/>
+          <a:p>
+            <a:pPr>
+              <a:defRPr/>
+            </a:pPr>
+            <a:r>
+              <a:rPr lang="en-US"/>
+              <a:t>©SoftMoore Consulting</a:t>
+            </a:r>
+            <a:endParaRPr lang="en-US" dirty="0"/>
+          </a:p>
+        </p:txBody>
+      </p:sp>
+      <p:sp>
+        <p:nvSpPr>
+          <p:cNvPr id="4" name="Slide Number Placeholder 3">
+            <a:extLst>
+              <a:ext uri="{FF2B5EF4-FFF2-40B4-BE49-F238E27FC236}">
+                <a16:creationId xmlns:a16="http://schemas.microsoft.com/office/drawing/2014/main" id="{964B72F4-5156-47A8-BE64-4FAAF4115382}"/>
+              </a:ext>
+            </a:extLst>
+          </p:cNvPr>
+          <p:cNvSpPr>
+            <a:spLocks noGrp="1"/>
+          </p:cNvSpPr>
+          <p:nvPr>
+            <p:ph type="sldNum" sz="quarter" idx="11"/>
+          </p:nvPr>
+        </p:nvSpPr>
+        <p:spPr/>
+        <p:txBody>
+          <a:bodyPr/>
+          <a:lstStyle/>
+          <a:p>
+            <a:pPr>
+              <a:defRPr/>
+            </a:pPr>
+            <a:r>
+              <a:rPr lang="en-US"/>
+              <a:t>Slide </a:t>
+            </a:r>
+            <a:fld id="{0493F5BC-5863-40DB-9BF6-90302664BBE6}" type="slidenum">
+              <a:rPr lang="en-US" smtClean="0"/>
+              <a:pPr>
+                <a:defRPr/>
+              </a:pPr>
+              <a:t>48</a:t>
+            </a:fld>
+            <a:endParaRPr lang="en-US" dirty="0"/>
+          </a:p>
+        </p:txBody>
+      </p:sp>
+    </p:spTree>
+    <p:extLst>
+      <p:ext uri="{BB962C8B-B14F-4D97-AF65-F5344CB8AC3E}">
+        <p14:creationId xmlns:p14="http://schemas.microsoft.com/office/powerpoint/2010/main" val="3020442727"/>
+      </p:ext>
+    </p:extLst>
+  </p:cSld>
+  <p:clrMapOvr>
+    <a:masterClrMapping/>
+  </p:clrMapOvr>
+</p:sld>
+</file>
+
+<file path=ppt/slides/slide49.xml><?xml version="1.0" encoding="utf-8"?>
+<p:sld xmlns:a="http://schemas.openxmlformats.org/drawingml/2006/main" xmlns:r="http://schemas.openxmlformats.org/officeDocument/2006/relationships" xmlns:p="http://schemas.openxmlformats.org/presentationml/2006/main">
+  <p:cSld>
+    <p:spTree>
+      <p:nvGrpSpPr>
+        <p:cNvPr id="1" name=""/>
+        <p:cNvGrpSpPr/>
+        <p:nvPr/>
+      </p:nvGrpSpPr>
+      <p:grpSpPr>
+        <a:xfrm>
+          <a:off x="0" y="0"/>
+          <a:ext cx="0" cy="0"/>
+          <a:chOff x="0" y="0"/>
+          <a:chExt cx="0" cy="0"/>
+        </a:xfrm>
+      </p:grpSpPr>
+      <p:sp>
+        <p:nvSpPr>
+          <p:cNvPr id="8" name="Title 7">
+            <a:extLst>
+              <a:ext uri="{FF2B5EF4-FFF2-40B4-BE49-F238E27FC236}">
+                <a16:creationId xmlns:a16="http://schemas.microsoft.com/office/drawing/2014/main" id="{563233BE-B20A-4E38-8D6C-3D8FB41B4336}"/>
+              </a:ext>
+            </a:extLst>
+          </p:cNvPr>
+          <p:cNvSpPr>
+            <a:spLocks noGrp="1"/>
+          </p:cNvSpPr>
+          <p:nvPr>
+            <p:ph type="title"/>
+          </p:nvPr>
+        </p:nvSpPr>
+        <p:spPr/>
+        <p:txBody>
+          <a:bodyPr/>
+          <a:lstStyle/>
+          <a:p>
+            <a:r>
+              <a:rPr lang="en-US" dirty="0"/>
+              <a:t>Example: </a:t>
             </a:r>
             <a:r>
               <a:rPr lang="en-US" dirty="0">
-                <a:latin typeface="Consolas" pitchFamily="49" charset="0"/>
-                <a:cs typeface="Consolas" pitchFamily="49" charset="0"/>
-              </a:rPr>
-              <a:t>Context</a:t>
-            </a:r>
-            <a:r>
-              <a:rPr lang="en-US" dirty="0"/>
-              <a:t> to check exit and return statements.</a:t>
-            </a:r>
-          </a:p>
-          <a:p>
+                <a:latin typeface="Consolas" panose="020B0609020204030204" pitchFamily="49" charset="0"/>
+              </a:rPr>
+              <a:t>Variable</a:t>
+            </a:r>
+            <a:br>
+              <a:rPr lang="en-US" dirty="0"/>
+            </a:br>
+            <a:r>
+              <a:rPr lang="en-US" sz="2400" dirty="0"/>
+              <a:t>(continued)</a:t>
+            </a:r>
+          </a:p>
+        </p:txBody>
+      </p:sp>
+      <p:sp>
+        <p:nvSpPr>
+          <p:cNvPr id="9" name="Content Placeholder 8">
+            <a:extLst>
+              <a:ext uri="{FF2B5EF4-FFF2-40B4-BE49-F238E27FC236}">
+                <a16:creationId xmlns:a16="http://schemas.microsoft.com/office/drawing/2014/main" id="{76E1210A-295D-4718-9E1A-27C835EA23E3}"/>
+              </a:ext>
+            </a:extLst>
+          </p:cNvPr>
+          <p:cNvSpPr>
+            <a:spLocks noGrp="1"/>
+          </p:cNvSpPr>
+          <p:nvPr>
+            <p:ph idx="1"/>
+          </p:nvPr>
+        </p:nvSpPr>
+        <p:spPr/>
+        <p:txBody>
+          <a:bodyPr/>
+          <a:lstStyle/>
+          <a:p>
+            <a:r>
+              <a:rPr lang="en-US" dirty="0"/>
+              <a:t>For arrays, we determine the actual type of a variable or named value in method </a:t>
+            </a:r>
+            <a:r>
+              <a:rPr lang="en-US" dirty="0" err="1">
+                <a:latin typeface="Consolas" panose="020B0609020204030204" pitchFamily="49" charset="0"/>
+              </a:rPr>
+              <a:t>checkConstraints</a:t>
+            </a:r>
+            <a:r>
+              <a:rPr lang="en-US" dirty="0">
+                <a:latin typeface="Consolas" panose="020B0609020204030204" pitchFamily="49" charset="0"/>
+              </a:rPr>
+              <a:t>()</a:t>
+            </a:r>
+            <a:r>
+              <a:rPr lang="en-US" dirty="0"/>
+              <a:t> by</a:t>
+            </a:r>
+          </a:p>
+          <a:p>
+            <a:pPr lvl="1"/>
+            <a:r>
+              <a:rPr lang="en-US" dirty="0"/>
+              <a:t>looping through the index expressions</a:t>
+            </a:r>
+          </a:p>
+          <a:p>
+            <a:pPr lvl="1"/>
+            <a:r>
+              <a:rPr lang="en-US" dirty="0"/>
+              <a:t>calling </a:t>
+            </a:r>
+            <a:r>
+              <a:rPr lang="en-US" dirty="0" err="1">
+                <a:latin typeface="Consolas" panose="020B0609020204030204" pitchFamily="49" charset="0"/>
+              </a:rPr>
+              <a:t>getType</a:t>
+            </a:r>
+            <a:r>
+              <a:rPr lang="en-US" dirty="0">
+                <a:latin typeface="Consolas" panose="020B0609020204030204" pitchFamily="49" charset="0"/>
+              </a:rPr>
+              <a:t>()</a:t>
+            </a:r>
+            <a:r>
+              <a:rPr lang="en-US" dirty="0"/>
+              <a:t> to get the array type</a:t>
+            </a:r>
+          </a:p>
+          <a:p>
+            <a:pPr marL="914400" lvl="2" indent="0">
+              <a:buNone/>
+            </a:pPr>
+            <a:r>
+              <a:rPr lang="en-US" dirty="0"/>
+              <a:t>(generate an error message if the type is not an array type)</a:t>
+            </a:r>
+          </a:p>
+          <a:p>
+            <a:pPr lvl="1"/>
+            <a:r>
+              <a:rPr lang="en-US" dirty="0"/>
+              <a:t>calling </a:t>
+            </a:r>
+            <a:r>
+              <a:rPr lang="en-US" dirty="0" err="1">
+                <a:latin typeface="Consolas" panose="020B0609020204030204" pitchFamily="49" charset="0"/>
+              </a:rPr>
+              <a:t>setType</a:t>
+            </a:r>
+            <a:r>
+              <a:rPr lang="en-US" dirty="0">
+                <a:latin typeface="Consolas" panose="020B0609020204030204" pitchFamily="49" charset="0"/>
+              </a:rPr>
+              <a:t>()</a:t>
+            </a:r>
+            <a:r>
+              <a:rPr lang="en-US" dirty="0"/>
+              <a:t> to set the type to the element type of the array</a:t>
+            </a:r>
+          </a:p>
+        </p:txBody>
+      </p:sp>
+      <p:sp>
+        <p:nvSpPr>
+          <p:cNvPr id="3" name="Footer Placeholder 2">
+            <a:extLst>
+              <a:ext uri="{FF2B5EF4-FFF2-40B4-BE49-F238E27FC236}">
+                <a16:creationId xmlns:a16="http://schemas.microsoft.com/office/drawing/2014/main" id="{5A404E55-B647-4C7C-9D62-C9EA115DC92C}"/>
+              </a:ext>
+            </a:extLst>
+          </p:cNvPr>
+          <p:cNvSpPr>
+            <a:spLocks noGrp="1"/>
+          </p:cNvSpPr>
+          <p:nvPr>
+            <p:ph type="ftr" sz="quarter" idx="10"/>
+          </p:nvPr>
+        </p:nvSpPr>
+        <p:spPr/>
+        <p:txBody>
+          <a:bodyPr/>
+          <a:lstStyle/>
+          <a:p>
+            <a:pPr>
+              <a:defRPr/>
+            </a:pPr>
+            <a:r>
+              <a:rPr lang="en-US"/>
+              <a:t>©SoftMoore Consulting</a:t>
+            </a:r>
             <a:endParaRPr lang="en-US" dirty="0"/>
           </a:p>
         </p:txBody>
       </p:sp>
       <p:sp>
         <p:nvSpPr>
-          <p:cNvPr id="6" name="TextBox 5"/>
-          <p:cNvSpPr txBox="1"/>
-          <p:nvPr/>
-        </p:nvSpPr>
-        <p:spPr>
-          <a:xfrm>
-            <a:off x="758296" y="5191204"/>
-            <a:ext cx="7627409" cy="1107996"/>
-          </a:xfrm>
-          <a:prstGeom prst="rect">
-            <a:avLst/>
-          </a:prstGeom>
-          <a:noFill/>
-          <a:ln>
-            <a:solidFill>
-              <a:schemeClr val="tx1"/>
-            </a:solidFill>
-          </a:ln>
-        </p:spPr>
-        <p:txBody>
-          <a:bodyPr wrap="none" rtlCol="0">
-            <a:spAutoFit/>
-          </a:bodyPr>
-          <a:lstStyle/>
-          <a:p>
-            <a:pPr algn="l"/>
-            <a:r>
-              <a:rPr lang="en-US" sz="2200" dirty="0"/>
-              <a:t>At this point your compiler should accept all legal programs</a:t>
-            </a:r>
-          </a:p>
-          <a:p>
-            <a:pPr algn="l"/>
-            <a:r>
-              <a:rPr lang="en-US" sz="2200" dirty="0"/>
-              <a:t>and reject most illegal programs.  Some programs with type</a:t>
-            </a:r>
-          </a:p>
-          <a:p>
-            <a:pPr algn="l"/>
-            <a:r>
-              <a:rPr lang="en-US" sz="2200" dirty="0"/>
-              <a:t>or other miscellaneous errors will not yet be rejected.</a:t>
-            </a:r>
+          <p:cNvPr id="4" name="Slide Number Placeholder 3">
+            <a:extLst>
+              <a:ext uri="{FF2B5EF4-FFF2-40B4-BE49-F238E27FC236}">
+                <a16:creationId xmlns:a16="http://schemas.microsoft.com/office/drawing/2014/main" id="{964B72F4-5156-47A8-BE64-4FAAF4115382}"/>
+              </a:ext>
+            </a:extLst>
+          </p:cNvPr>
+          <p:cNvSpPr>
+            <a:spLocks noGrp="1"/>
+          </p:cNvSpPr>
+          <p:nvPr>
+            <p:ph type="sldNum" sz="quarter" idx="11"/>
+          </p:nvPr>
+        </p:nvSpPr>
+        <p:spPr/>
+        <p:txBody>
+          <a:bodyPr/>
+          <a:lstStyle/>
+          <a:p>
+            <a:pPr>
+              <a:defRPr/>
+            </a:pPr>
+            <a:r>
+              <a:rPr lang="en-US"/>
+              <a:t>Slide </a:t>
+            </a:r>
+            <a:fld id="{0493F5BC-5863-40DB-9BF6-90302664BBE6}" type="slidenum">
+              <a:rPr lang="en-US" smtClean="0"/>
+              <a:pPr>
+                <a:defRPr/>
+              </a:pPr>
+              <a:t>49</a:t>
+            </a:fld>
+            <a:endParaRPr lang="en-US" dirty="0"/>
           </a:p>
         </p:txBody>
       </p:sp>
     </p:spTree>
+    <p:extLst>
+      <p:ext uri="{BB962C8B-B14F-4D97-AF65-F5344CB8AC3E}">
+        <p14:creationId xmlns:p14="http://schemas.microsoft.com/office/powerpoint/2010/main" val="3760471126"/>
+      </p:ext>
+    </p:extLst>
   </p:cSld>
   <p:clrMapOvr>
     <a:masterClrMapping/>
@@ -21059,6 +21684,1460 @@
                 <a:latin typeface="Consolas" pitchFamily="49" charset="0"/>
               </a:rPr>
               <a:t>  }</a:t>
+            </a:r>
+          </a:p>
+        </p:txBody>
+      </p:sp>
+    </p:spTree>
+  </p:cSld>
+  <p:clrMapOvr>
+    <a:masterClrMapping/>
+  </p:clrMapOvr>
+</p:sld>
+</file>
+
+<file path=ppt/slides/slide50.xml><?xml version="1.0" encoding="utf-8"?>
+<p:sld xmlns:a="http://schemas.openxmlformats.org/drawingml/2006/main" xmlns:r="http://schemas.openxmlformats.org/officeDocument/2006/relationships" xmlns:p="http://schemas.openxmlformats.org/presentationml/2006/main">
+  <p:cSld>
+    <p:spTree>
+      <p:nvGrpSpPr>
+        <p:cNvPr id="1" name=""/>
+        <p:cNvGrpSpPr/>
+        <p:nvPr/>
+      </p:nvGrpSpPr>
+      <p:grpSpPr>
+        <a:xfrm>
+          <a:off x="0" y="0"/>
+          <a:ext cx="0" cy="0"/>
+          <a:chOff x="0" y="0"/>
+          <a:chExt cx="0" cy="0"/>
+        </a:xfrm>
+      </p:grpSpPr>
+      <p:sp>
+        <p:nvSpPr>
+          <p:cNvPr id="22530" name="Footer Placeholder 3"/>
+          <p:cNvSpPr>
+            <a:spLocks noGrp="1"/>
+          </p:cNvSpPr>
+          <p:nvPr>
+            <p:ph type="ftr" sz="quarter" idx="10"/>
+          </p:nvPr>
+        </p:nvSpPr>
+        <p:spPr>
+          <a:noFill/>
+        </p:spPr>
+        <p:txBody>
+          <a:bodyPr/>
+          <a:lstStyle/>
+          <a:p>
+            <a:r>
+              <a:rPr lang="en-US" dirty="0"/>
+              <a:t>©SoftMoore Consulting</a:t>
+            </a:r>
+          </a:p>
+        </p:txBody>
+      </p:sp>
+      <p:sp>
+        <p:nvSpPr>
+          <p:cNvPr id="22531" name="Slide Number Placeholder 4"/>
+          <p:cNvSpPr>
+            <a:spLocks noGrp="1"/>
+          </p:cNvSpPr>
+          <p:nvPr>
+            <p:ph type="sldNum" sz="quarter" idx="11"/>
+          </p:nvPr>
+        </p:nvSpPr>
+        <p:spPr>
+          <a:noFill/>
+        </p:spPr>
+        <p:txBody>
+          <a:bodyPr/>
+          <a:lstStyle/>
+          <a:p>
+            <a:r>
+              <a:rPr lang="en-US" dirty="0"/>
+              <a:t>Slide </a:t>
+            </a:r>
+            <a:fld id="{E181C637-EA7A-4AA2-BD9E-5103699E8BC5}" type="slidenum">
+              <a:rPr lang="en-US" smtClean="0"/>
+              <a:pPr/>
+              <a:t>50</a:t>
+            </a:fld>
+            <a:endParaRPr lang="en-US" dirty="0"/>
+          </a:p>
+        </p:txBody>
+      </p:sp>
+      <p:sp>
+        <p:nvSpPr>
+          <p:cNvPr id="22532" name="Rectangle 2"/>
+          <p:cNvSpPr>
+            <a:spLocks noGrp="1" noChangeArrowheads="1"/>
+          </p:cNvSpPr>
+          <p:nvPr>
+            <p:ph type="title"/>
+          </p:nvPr>
+        </p:nvSpPr>
+        <p:spPr/>
+        <p:txBody>
+          <a:bodyPr/>
+          <a:lstStyle/>
+          <a:p>
+            <a:r>
+              <a:rPr lang="en-US" dirty="0"/>
+              <a:t>Maintaining Context During Parsing</a:t>
+            </a:r>
+          </a:p>
+        </p:txBody>
+      </p:sp>
+      <p:sp>
+        <p:nvSpPr>
+          <p:cNvPr id="22533" name="Rectangle 3"/>
+          <p:cNvSpPr>
+            <a:spLocks noGrp="1" noChangeArrowheads="1"/>
+          </p:cNvSpPr>
+          <p:nvPr>
+            <p:ph type="body" idx="1"/>
+          </p:nvPr>
+        </p:nvSpPr>
+        <p:spPr/>
+        <p:txBody>
+          <a:bodyPr/>
+          <a:lstStyle/>
+          <a:p>
+            <a:r>
+              <a:rPr lang="en-US" dirty="0"/>
+              <a:t>Certain CPRL statements need access to an enclosing context for constraint checking and code generation.</a:t>
+            </a:r>
+          </a:p>
+          <a:p>
+            <a:r>
+              <a:rPr lang="en-US" dirty="0"/>
+              <a:t>Example: </a:t>
+            </a:r>
+            <a:r>
+              <a:rPr lang="en-US" sz="2000" dirty="0">
+                <a:latin typeface="Consolas" pitchFamily="49" charset="0"/>
+              </a:rPr>
+              <a:t>exit when n &gt; 10;</a:t>
+            </a:r>
+            <a:endParaRPr lang="en-US" dirty="0"/>
+          </a:p>
+          <a:p>
+            <a:pPr>
+              <a:spcBef>
+                <a:spcPts val="400"/>
+              </a:spcBef>
+              <a:buNone/>
+            </a:pPr>
+            <a:r>
+              <a:rPr lang="en-US" dirty="0"/>
+              <a:t>	An exit statement has meaning only when nested inside a loop., and code generation for an exit statement requires knowledge of which loop encloses it.</a:t>
+            </a:r>
+          </a:p>
+          <a:p>
+            <a:r>
+              <a:rPr lang="en-US" dirty="0"/>
+              <a:t>Similarly, a return statement needs to know which subprogram it is returning from.</a:t>
+            </a:r>
+          </a:p>
+          <a:p>
+            <a:r>
+              <a:rPr lang="en-US" dirty="0"/>
+              <a:t>Classes </a:t>
+            </a:r>
+            <a:r>
+              <a:rPr lang="en-US" dirty="0">
+                <a:latin typeface="Consolas" panose="020B0609020204030204" pitchFamily="49" charset="0"/>
+              </a:rPr>
+              <a:t>LoopContext</a:t>
+            </a:r>
+            <a:r>
+              <a:rPr lang="en-US" dirty="0"/>
+              <a:t> and </a:t>
+            </a:r>
+            <a:r>
+              <a:rPr lang="en-US" dirty="0">
+                <a:latin typeface="Consolas" pitchFamily="49" charset="0"/>
+                <a:cs typeface="Consolas" pitchFamily="49" charset="0"/>
+              </a:rPr>
+              <a:t>SubprogramContext</a:t>
+            </a:r>
+            <a:r>
+              <a:rPr lang="en-US" dirty="0"/>
+              <a:t> will be used to maintain contextual information in these cases.</a:t>
+            </a:r>
+          </a:p>
+        </p:txBody>
+      </p:sp>
+    </p:spTree>
+  </p:cSld>
+  <p:clrMapOvr>
+    <a:masterClrMapping/>
+  </p:clrMapOvr>
+</p:sld>
+</file>
+
+<file path=ppt/slides/slide51.xml><?xml version="1.0" encoding="utf-8"?>
+<p:sld xmlns:a="http://schemas.openxmlformats.org/drawingml/2006/main" xmlns:r="http://schemas.openxmlformats.org/officeDocument/2006/relationships" xmlns:p="http://schemas.openxmlformats.org/presentationml/2006/main">
+  <p:cSld>
+    <p:spTree>
+      <p:nvGrpSpPr>
+        <p:cNvPr id="1" name=""/>
+        <p:cNvGrpSpPr/>
+        <p:nvPr/>
+      </p:nvGrpSpPr>
+      <p:grpSpPr>
+        <a:xfrm>
+          <a:off x="0" y="0"/>
+          <a:ext cx="0" cy="0"/>
+          <a:chOff x="0" y="0"/>
+          <a:chExt cx="0" cy="0"/>
+        </a:xfrm>
+      </p:grpSpPr>
+      <p:sp>
+        <p:nvSpPr>
+          <p:cNvPr id="23554" name="Footer Placeholder 3"/>
+          <p:cNvSpPr>
+            <a:spLocks noGrp="1"/>
+          </p:cNvSpPr>
+          <p:nvPr>
+            <p:ph type="ftr" sz="quarter" idx="10"/>
+          </p:nvPr>
+        </p:nvSpPr>
+        <p:spPr>
+          <a:noFill/>
+        </p:spPr>
+        <p:txBody>
+          <a:bodyPr/>
+          <a:lstStyle/>
+          <a:p>
+            <a:r>
+              <a:rPr lang="en-US" dirty="0"/>
+              <a:t>©SoftMoore Consulting</a:t>
+            </a:r>
+          </a:p>
+        </p:txBody>
+      </p:sp>
+      <p:sp>
+        <p:nvSpPr>
+          <p:cNvPr id="23555" name="Slide Number Placeholder 4"/>
+          <p:cNvSpPr>
+            <a:spLocks noGrp="1"/>
+          </p:cNvSpPr>
+          <p:nvPr>
+            <p:ph type="sldNum" sz="quarter" idx="11"/>
+          </p:nvPr>
+        </p:nvSpPr>
+        <p:spPr>
+          <a:noFill/>
+        </p:spPr>
+        <p:txBody>
+          <a:bodyPr/>
+          <a:lstStyle/>
+          <a:p>
+            <a:r>
+              <a:rPr lang="en-US" dirty="0"/>
+              <a:t>Slide </a:t>
+            </a:r>
+            <a:fld id="{239EA5B9-23A7-4CC1-AF6B-C52A3FEA3809}" type="slidenum">
+              <a:rPr lang="en-US" smtClean="0"/>
+              <a:pPr/>
+              <a:t>51</a:t>
+            </a:fld>
+            <a:endParaRPr lang="en-US" dirty="0"/>
+          </a:p>
+        </p:txBody>
+      </p:sp>
+      <p:sp>
+        <p:nvSpPr>
+          <p:cNvPr id="23556" name="Rectangle 2"/>
+          <p:cNvSpPr>
+            <a:spLocks noGrp="1" noChangeArrowheads="1"/>
+          </p:cNvSpPr>
+          <p:nvPr>
+            <p:ph type="title"/>
+          </p:nvPr>
+        </p:nvSpPr>
+        <p:spPr/>
+        <p:txBody>
+          <a:bodyPr/>
+          <a:lstStyle/>
+          <a:p>
+            <a:r>
+              <a:rPr lang="en-US" dirty="0"/>
+              <a:t>Class </a:t>
+            </a:r>
+            <a:r>
+              <a:rPr lang="en-US" dirty="0">
+                <a:latin typeface="Consolas" panose="020B0609020204030204" pitchFamily="49" charset="0"/>
+              </a:rPr>
+              <a:t>Loop</a:t>
+            </a:r>
+            <a:r>
+              <a:rPr lang="en-US" dirty="0">
+                <a:latin typeface="Consolas" panose="020B0609020204030204" pitchFamily="49" charset="0"/>
+                <a:cs typeface="Consolas" pitchFamily="49" charset="0"/>
+              </a:rPr>
+              <a:t>Context</a:t>
+            </a:r>
+          </a:p>
+        </p:txBody>
+      </p:sp>
+      <p:sp>
+        <p:nvSpPr>
+          <p:cNvPr id="23557" name="Rectangle 3"/>
+          <p:cNvSpPr>
+            <a:spLocks noGrp="1" noChangeArrowheads="1"/>
+          </p:cNvSpPr>
+          <p:nvPr>
+            <p:ph type="body" idx="1"/>
+          </p:nvPr>
+        </p:nvSpPr>
+        <p:spPr/>
+        <p:txBody>
+          <a:bodyPr lIns="182880" tIns="91440"/>
+          <a:lstStyle/>
+          <a:p>
+            <a:pPr marL="0" indent="0">
+              <a:spcBef>
+                <a:spcPts val="100"/>
+              </a:spcBef>
+              <a:buFontTx/>
+              <a:buNone/>
+            </a:pPr>
+            <a:r>
+              <a:rPr lang="en-US" sz="1800" dirty="0">
+                <a:latin typeface="Consolas" pitchFamily="49" charset="0"/>
+              </a:rPr>
+              <a:t>/**</a:t>
+            </a:r>
+          </a:p>
+          <a:p>
+            <a:pPr marL="0" indent="0">
+              <a:spcBef>
+                <a:spcPts val="100"/>
+              </a:spcBef>
+              <a:buFontTx/>
+              <a:buNone/>
+            </a:pPr>
+            <a:r>
+              <a:rPr lang="en-US" sz="1800" dirty="0">
+                <a:latin typeface="Consolas" pitchFamily="49" charset="0"/>
+              </a:rPr>
+              <a:t> * Returns the loop statement currently being parsed;</a:t>
+            </a:r>
+          </a:p>
+          <a:p>
+            <a:pPr marL="0" indent="0">
+              <a:spcBef>
+                <a:spcPts val="100"/>
+              </a:spcBef>
+              <a:buFontTx/>
+              <a:buNone/>
+            </a:pPr>
+            <a:r>
+              <a:rPr lang="en-US" sz="1800" dirty="0">
+                <a:latin typeface="Consolas" pitchFamily="49" charset="0"/>
+              </a:rPr>
+              <a:t> * returns null if no such loop statement exists.</a:t>
+            </a:r>
+          </a:p>
+          <a:p>
+            <a:pPr marL="0" indent="0">
+              <a:spcBef>
+                <a:spcPts val="100"/>
+              </a:spcBef>
+              <a:buFontTx/>
+              <a:buNone/>
+            </a:pPr>
+            <a:r>
+              <a:rPr lang="en-US" sz="1800" dirty="0">
+                <a:latin typeface="Consolas" pitchFamily="49" charset="0"/>
+              </a:rPr>
+              <a:t> */</a:t>
+            </a:r>
+          </a:p>
+          <a:p>
+            <a:pPr marL="0" indent="0">
+              <a:spcBef>
+                <a:spcPts val="100"/>
+              </a:spcBef>
+              <a:buFontTx/>
+              <a:buNone/>
+            </a:pPr>
+            <a:r>
+              <a:rPr lang="en-US" sz="1800" dirty="0">
+                <a:latin typeface="Consolas" pitchFamily="49" charset="0"/>
+              </a:rPr>
+              <a:t>public LoopStmt getLoopStmt()</a:t>
+            </a:r>
+          </a:p>
+          <a:p>
+            <a:pPr marL="0" indent="0">
+              <a:spcBef>
+                <a:spcPts val="100"/>
+              </a:spcBef>
+              <a:buFontTx/>
+              <a:buNone/>
+            </a:pPr>
+            <a:endParaRPr lang="en-US" sz="1800" dirty="0">
+              <a:latin typeface="Consolas" pitchFamily="49" charset="0"/>
+            </a:endParaRPr>
+          </a:p>
+          <a:p>
+            <a:pPr marL="0" indent="0">
+              <a:spcBef>
+                <a:spcPts val="100"/>
+              </a:spcBef>
+              <a:buFontTx/>
+              <a:buNone/>
+            </a:pPr>
+            <a:r>
+              <a:rPr lang="en-US" sz="1800" dirty="0">
+                <a:latin typeface="Consolas" pitchFamily="49" charset="0"/>
+              </a:rPr>
+              <a:t>/**</a:t>
+            </a:r>
+          </a:p>
+          <a:p>
+            <a:pPr marL="0" indent="0">
+              <a:spcBef>
+                <a:spcPts val="100"/>
+              </a:spcBef>
+              <a:buFontTx/>
+              <a:buNone/>
+            </a:pPr>
+            <a:r>
+              <a:rPr lang="en-US" sz="1800" dirty="0">
+                <a:latin typeface="Consolas" pitchFamily="49" charset="0"/>
+              </a:rPr>
+              <a:t> * Called when starting to parse a loop statement.</a:t>
+            </a:r>
+          </a:p>
+          <a:p>
+            <a:pPr marL="0" indent="0">
+              <a:spcBef>
+                <a:spcPts val="100"/>
+              </a:spcBef>
+              <a:buFontTx/>
+              <a:buNone/>
+            </a:pPr>
+            <a:r>
+              <a:rPr lang="en-US" sz="1800" dirty="0">
+                <a:latin typeface="Consolas" pitchFamily="49" charset="0"/>
+              </a:rPr>
+              <a:t> */</a:t>
+            </a:r>
+          </a:p>
+          <a:p>
+            <a:pPr marL="0" indent="0">
+              <a:spcBef>
+                <a:spcPts val="100"/>
+              </a:spcBef>
+              <a:buFontTx/>
+              <a:buNone/>
+            </a:pPr>
+            <a:r>
+              <a:rPr lang="en-US" sz="1800" dirty="0">
+                <a:latin typeface="Consolas" pitchFamily="49" charset="0"/>
+              </a:rPr>
+              <a:t>public void beginLoop(LoopStmt stmt)</a:t>
+            </a:r>
+          </a:p>
+          <a:p>
+            <a:pPr marL="0" indent="0">
+              <a:spcBef>
+                <a:spcPts val="100"/>
+              </a:spcBef>
+              <a:buFontTx/>
+              <a:buNone/>
+            </a:pPr>
+            <a:endParaRPr lang="en-US" sz="1800" dirty="0">
+              <a:latin typeface="Consolas" pitchFamily="49" charset="0"/>
+            </a:endParaRPr>
+          </a:p>
+          <a:p>
+            <a:pPr marL="0" indent="0">
+              <a:spcBef>
+                <a:spcPts val="100"/>
+              </a:spcBef>
+              <a:buFontTx/>
+              <a:buNone/>
+            </a:pPr>
+            <a:r>
+              <a:rPr lang="en-US" sz="1800" dirty="0">
+                <a:latin typeface="Consolas" pitchFamily="49" charset="0"/>
+              </a:rPr>
+              <a:t>/**</a:t>
+            </a:r>
+          </a:p>
+          <a:p>
+            <a:pPr marL="0" indent="0">
+              <a:spcBef>
+                <a:spcPts val="100"/>
+              </a:spcBef>
+              <a:buFontTx/>
+              <a:buNone/>
+            </a:pPr>
+            <a:r>
+              <a:rPr lang="en-US" sz="1800" dirty="0">
+                <a:latin typeface="Consolas" pitchFamily="49" charset="0"/>
+              </a:rPr>
+              <a:t> * Called when finished parsing a loop statement.</a:t>
+            </a:r>
+          </a:p>
+          <a:p>
+            <a:pPr marL="0" indent="0">
+              <a:spcBef>
+                <a:spcPts val="100"/>
+              </a:spcBef>
+              <a:buFontTx/>
+              <a:buNone/>
+            </a:pPr>
+            <a:r>
+              <a:rPr lang="en-US" sz="1800" dirty="0">
+                <a:latin typeface="Consolas" pitchFamily="49" charset="0"/>
+              </a:rPr>
+              <a:t> */</a:t>
+            </a:r>
+          </a:p>
+          <a:p>
+            <a:pPr marL="0" indent="0">
+              <a:spcBef>
+                <a:spcPts val="100"/>
+              </a:spcBef>
+              <a:buFontTx/>
+              <a:buNone/>
+            </a:pPr>
+            <a:r>
+              <a:rPr lang="en-US" sz="1800" dirty="0">
+                <a:latin typeface="Consolas" pitchFamily="49" charset="0"/>
+              </a:rPr>
+              <a:t>public void endLoop()</a:t>
+            </a:r>
+          </a:p>
+        </p:txBody>
+      </p:sp>
+    </p:spTree>
+  </p:cSld>
+  <p:clrMapOvr>
+    <a:masterClrMapping/>
+  </p:clrMapOvr>
+</p:sld>
+</file>
+
+<file path=ppt/slides/slide52.xml><?xml version="1.0" encoding="utf-8"?>
+<p:sld xmlns:a="http://schemas.openxmlformats.org/drawingml/2006/main" xmlns:r="http://schemas.openxmlformats.org/officeDocument/2006/relationships" xmlns:p="http://schemas.openxmlformats.org/presentationml/2006/main">
+  <p:cSld>
+    <p:spTree>
+      <p:nvGrpSpPr>
+        <p:cNvPr id="1" name=""/>
+        <p:cNvGrpSpPr/>
+        <p:nvPr/>
+      </p:nvGrpSpPr>
+      <p:grpSpPr>
+        <a:xfrm>
+          <a:off x="0" y="0"/>
+          <a:ext cx="0" cy="0"/>
+          <a:chOff x="0" y="0"/>
+          <a:chExt cx="0" cy="0"/>
+        </a:xfrm>
+      </p:grpSpPr>
+      <p:sp>
+        <p:nvSpPr>
+          <p:cNvPr id="23554" name="Footer Placeholder 3"/>
+          <p:cNvSpPr>
+            <a:spLocks noGrp="1"/>
+          </p:cNvSpPr>
+          <p:nvPr>
+            <p:ph type="ftr" sz="quarter" idx="10"/>
+          </p:nvPr>
+        </p:nvSpPr>
+        <p:spPr>
+          <a:noFill/>
+        </p:spPr>
+        <p:txBody>
+          <a:bodyPr/>
+          <a:lstStyle/>
+          <a:p>
+            <a:r>
+              <a:rPr lang="en-US" dirty="0"/>
+              <a:t>©SoftMoore Consulting</a:t>
+            </a:r>
+          </a:p>
+        </p:txBody>
+      </p:sp>
+      <p:sp>
+        <p:nvSpPr>
+          <p:cNvPr id="23555" name="Slide Number Placeholder 4"/>
+          <p:cNvSpPr>
+            <a:spLocks noGrp="1"/>
+          </p:cNvSpPr>
+          <p:nvPr>
+            <p:ph type="sldNum" sz="quarter" idx="11"/>
+          </p:nvPr>
+        </p:nvSpPr>
+        <p:spPr>
+          <a:noFill/>
+        </p:spPr>
+        <p:txBody>
+          <a:bodyPr/>
+          <a:lstStyle/>
+          <a:p>
+            <a:r>
+              <a:rPr lang="en-US" dirty="0"/>
+              <a:t>Slide </a:t>
+            </a:r>
+            <a:fld id="{239EA5B9-23A7-4CC1-AF6B-C52A3FEA3809}" type="slidenum">
+              <a:rPr lang="en-US" smtClean="0"/>
+              <a:pPr/>
+              <a:t>52</a:t>
+            </a:fld>
+            <a:endParaRPr lang="en-US" dirty="0"/>
+          </a:p>
+        </p:txBody>
+      </p:sp>
+      <p:sp>
+        <p:nvSpPr>
+          <p:cNvPr id="23556" name="Rectangle 2"/>
+          <p:cNvSpPr>
+            <a:spLocks noGrp="1" noChangeArrowheads="1"/>
+          </p:cNvSpPr>
+          <p:nvPr>
+            <p:ph type="title"/>
+          </p:nvPr>
+        </p:nvSpPr>
+        <p:spPr/>
+        <p:txBody>
+          <a:bodyPr/>
+          <a:lstStyle/>
+          <a:p>
+            <a:r>
+              <a:rPr lang="en-US" dirty="0"/>
+              <a:t>Class </a:t>
+            </a:r>
+            <a:r>
+              <a:rPr lang="en-US" dirty="0">
+                <a:latin typeface="Consolas" pitchFamily="49" charset="0"/>
+                <a:cs typeface="Consolas" pitchFamily="49" charset="0"/>
+              </a:rPr>
+              <a:t>SubprogramContext</a:t>
+            </a:r>
+            <a:endParaRPr lang="en-US" sz="2800" dirty="0">
+              <a:cs typeface="Consolas" pitchFamily="49" charset="0"/>
+            </a:endParaRPr>
+          </a:p>
+        </p:txBody>
+      </p:sp>
+      <p:sp>
+        <p:nvSpPr>
+          <p:cNvPr id="23557" name="Rectangle 3"/>
+          <p:cNvSpPr>
+            <a:spLocks noGrp="1" noChangeArrowheads="1"/>
+          </p:cNvSpPr>
+          <p:nvPr>
+            <p:ph type="body" idx="1"/>
+          </p:nvPr>
+        </p:nvSpPr>
+        <p:spPr>
+          <a:xfrm>
+            <a:off x="458787" y="1363663"/>
+            <a:ext cx="8321040" cy="4935537"/>
+          </a:xfrm>
+        </p:spPr>
+        <p:txBody>
+          <a:bodyPr lIns="182880" tIns="91440"/>
+          <a:lstStyle/>
+          <a:p>
+            <a:pPr marL="0" indent="0">
+              <a:spcBef>
+                <a:spcPts val="100"/>
+              </a:spcBef>
+              <a:buFontTx/>
+              <a:buNone/>
+            </a:pPr>
+            <a:r>
+              <a:rPr lang="en-US" sz="1800" dirty="0">
+                <a:latin typeface="Consolas" pitchFamily="49" charset="0"/>
+              </a:rPr>
+              <a:t>/**</a:t>
+            </a:r>
+          </a:p>
+          <a:p>
+            <a:pPr marL="0" indent="0">
+              <a:spcBef>
+                <a:spcPts val="100"/>
+              </a:spcBef>
+              <a:buFontTx/>
+              <a:buNone/>
+            </a:pPr>
+            <a:r>
+              <a:rPr lang="en-US" sz="1800" dirty="0">
+                <a:latin typeface="Consolas" pitchFamily="49" charset="0"/>
+              </a:rPr>
+              <a:t> * Returns the subprogram declaration currently being</a:t>
+            </a:r>
+          </a:p>
+          <a:p>
+            <a:pPr marL="0" indent="0">
+              <a:spcBef>
+                <a:spcPts val="100"/>
+              </a:spcBef>
+              <a:buFontTx/>
+              <a:buNone/>
+            </a:pPr>
+            <a:r>
+              <a:rPr lang="en-US" sz="1800" dirty="0">
+                <a:latin typeface="Consolas" pitchFamily="49" charset="0"/>
+              </a:rPr>
+              <a:t> * parsed.  Returns null if no such procedure exists.</a:t>
+            </a:r>
+          </a:p>
+          <a:p>
+            <a:pPr marL="0" indent="0">
+              <a:spcBef>
+                <a:spcPts val="100"/>
+              </a:spcBef>
+              <a:buFontTx/>
+              <a:buNone/>
+            </a:pPr>
+            <a:r>
+              <a:rPr lang="en-US" sz="1800" dirty="0">
+                <a:latin typeface="Consolas" pitchFamily="49" charset="0"/>
+              </a:rPr>
+              <a:t> */</a:t>
+            </a:r>
+          </a:p>
+          <a:p>
+            <a:pPr marL="0" indent="0">
+              <a:spcBef>
+                <a:spcPts val="100"/>
+              </a:spcBef>
+              <a:buFontTx/>
+              <a:buNone/>
+            </a:pPr>
+            <a:r>
+              <a:rPr lang="en-US" sz="1800" dirty="0">
+                <a:latin typeface="Consolas" pitchFamily="49" charset="0"/>
+              </a:rPr>
+              <a:t>public SubprogramDecl getSubprogramDecl()</a:t>
+            </a:r>
+          </a:p>
+          <a:p>
+            <a:pPr marL="0" indent="0">
+              <a:spcBef>
+                <a:spcPts val="100"/>
+              </a:spcBef>
+              <a:buFontTx/>
+              <a:buNone/>
+            </a:pPr>
+            <a:endParaRPr lang="en-US" sz="1800" dirty="0">
+              <a:latin typeface="Consolas" pitchFamily="49" charset="0"/>
+            </a:endParaRPr>
+          </a:p>
+          <a:p>
+            <a:pPr marL="0" indent="0">
+              <a:spcBef>
+                <a:spcPts val="100"/>
+              </a:spcBef>
+              <a:buFontTx/>
+              <a:buNone/>
+            </a:pPr>
+            <a:r>
+              <a:rPr lang="en-US" sz="1800" dirty="0">
+                <a:latin typeface="Consolas" pitchFamily="49" charset="0"/>
+              </a:rPr>
+              <a:t>/**</a:t>
+            </a:r>
+          </a:p>
+          <a:p>
+            <a:pPr marL="0" indent="0">
+              <a:spcBef>
+                <a:spcPts val="100"/>
+              </a:spcBef>
+              <a:buFontTx/>
+              <a:buNone/>
+            </a:pPr>
+            <a:r>
+              <a:rPr lang="en-US" sz="1800" dirty="0">
+                <a:latin typeface="Consolas" pitchFamily="49" charset="0"/>
+              </a:rPr>
+              <a:t> * Called when starting to parse a subprogram declaration.</a:t>
+            </a:r>
+          </a:p>
+          <a:p>
+            <a:pPr marL="0" indent="0">
+              <a:spcBef>
+                <a:spcPts val="100"/>
+              </a:spcBef>
+              <a:buFontTx/>
+              <a:buNone/>
+            </a:pPr>
+            <a:r>
+              <a:rPr lang="en-US" sz="1800" dirty="0">
+                <a:latin typeface="Consolas" pitchFamily="49" charset="0"/>
+              </a:rPr>
+              <a:t> */</a:t>
+            </a:r>
+          </a:p>
+          <a:p>
+            <a:pPr marL="0" indent="0">
+              <a:spcBef>
+                <a:spcPts val="100"/>
+              </a:spcBef>
+              <a:buFontTx/>
+              <a:buNone/>
+            </a:pPr>
+            <a:r>
+              <a:rPr lang="en-US" sz="1800" dirty="0">
+                <a:latin typeface="Consolas" pitchFamily="49" charset="0"/>
+              </a:rPr>
+              <a:t>public void beginSubprogramDecl(SubprogramDecl subprogDecl)</a:t>
+            </a:r>
+          </a:p>
+          <a:p>
+            <a:pPr marL="0" indent="0">
+              <a:spcBef>
+                <a:spcPts val="100"/>
+              </a:spcBef>
+              <a:buFontTx/>
+              <a:buNone/>
+            </a:pPr>
+            <a:endParaRPr lang="en-US" sz="1800" dirty="0">
+              <a:latin typeface="Consolas" pitchFamily="49" charset="0"/>
+            </a:endParaRPr>
+          </a:p>
+          <a:p>
+            <a:pPr marL="0" indent="0">
+              <a:spcBef>
+                <a:spcPts val="100"/>
+              </a:spcBef>
+              <a:buFontTx/>
+              <a:buNone/>
+            </a:pPr>
+            <a:r>
+              <a:rPr lang="en-US" sz="1800" dirty="0">
+                <a:latin typeface="Consolas" pitchFamily="49" charset="0"/>
+              </a:rPr>
+              <a:t>/**</a:t>
+            </a:r>
+          </a:p>
+          <a:p>
+            <a:pPr marL="0" indent="0">
+              <a:spcBef>
+                <a:spcPts val="100"/>
+              </a:spcBef>
+              <a:buFontTx/>
+              <a:buNone/>
+            </a:pPr>
+            <a:r>
+              <a:rPr lang="en-US" sz="1800" dirty="0">
+                <a:latin typeface="Consolas" pitchFamily="49" charset="0"/>
+              </a:rPr>
+              <a:t> * Called when finished parsing a subprogram declaration.</a:t>
+            </a:r>
+          </a:p>
+          <a:p>
+            <a:pPr marL="0" indent="0">
+              <a:spcBef>
+                <a:spcPts val="100"/>
+              </a:spcBef>
+              <a:buFontTx/>
+              <a:buNone/>
+            </a:pPr>
+            <a:r>
+              <a:rPr lang="en-US" sz="1800" dirty="0">
+                <a:latin typeface="Consolas" pitchFamily="49" charset="0"/>
+              </a:rPr>
+              <a:t> */</a:t>
+            </a:r>
+          </a:p>
+          <a:p>
+            <a:pPr marL="0" indent="0">
+              <a:spcBef>
+                <a:spcPts val="100"/>
+              </a:spcBef>
+              <a:buFontTx/>
+              <a:buNone/>
+            </a:pPr>
+            <a:r>
+              <a:rPr lang="en-US" sz="1800" dirty="0">
+                <a:latin typeface="Consolas" pitchFamily="49" charset="0"/>
+              </a:rPr>
+              <a:t>public void endSubprogramDecl()</a:t>
+            </a:r>
+          </a:p>
+        </p:txBody>
+      </p:sp>
+    </p:spTree>
+  </p:cSld>
+  <p:clrMapOvr>
+    <a:masterClrMapping/>
+  </p:clrMapOvr>
+</p:sld>
+</file>
+
+<file path=ppt/slides/slide53.xml><?xml version="1.0" encoding="utf-8"?>
+<p:sld xmlns:a="http://schemas.openxmlformats.org/drawingml/2006/main" xmlns:r="http://schemas.openxmlformats.org/officeDocument/2006/relationships" xmlns:p="http://schemas.openxmlformats.org/presentationml/2006/main">
+  <p:cSld>
+    <p:spTree>
+      <p:nvGrpSpPr>
+        <p:cNvPr id="1" name=""/>
+        <p:cNvGrpSpPr/>
+        <p:nvPr/>
+      </p:nvGrpSpPr>
+      <p:grpSpPr>
+        <a:xfrm>
+          <a:off x="0" y="0"/>
+          <a:ext cx="0" cy="0"/>
+          <a:chOff x="0" y="0"/>
+          <a:chExt cx="0" cy="0"/>
+        </a:xfrm>
+      </p:grpSpPr>
+      <p:sp>
+        <p:nvSpPr>
+          <p:cNvPr id="24580" name="Rectangle 2"/>
+          <p:cNvSpPr>
+            <a:spLocks noGrp="1" noChangeArrowheads="1"/>
+          </p:cNvSpPr>
+          <p:nvPr>
+            <p:ph type="title"/>
+          </p:nvPr>
+        </p:nvSpPr>
+        <p:spPr/>
+        <p:txBody>
+          <a:bodyPr/>
+          <a:lstStyle/>
+          <a:p>
+            <a:r>
+              <a:rPr lang="en-US" dirty="0"/>
+              <a:t>Example: Using Context During Parsing</a:t>
+            </a:r>
+          </a:p>
+        </p:txBody>
+      </p:sp>
+      <p:sp>
+        <p:nvSpPr>
+          <p:cNvPr id="24581" name="Rectangle 3"/>
+          <p:cNvSpPr>
+            <a:spLocks noGrp="1" noChangeArrowheads="1"/>
+          </p:cNvSpPr>
+          <p:nvPr>
+            <p:ph type="body" idx="1"/>
+          </p:nvPr>
+        </p:nvSpPr>
+        <p:spPr/>
+        <p:txBody>
+          <a:bodyPr/>
+          <a:lstStyle/>
+          <a:p>
+            <a:r>
+              <a:rPr lang="en-US" dirty="0"/>
+              <a:t>When parsing a loop statement:</a:t>
+            </a:r>
+          </a:p>
+          <a:p>
+            <a:pPr lvl="1">
+              <a:buNone/>
+            </a:pPr>
+            <a:r>
+              <a:rPr lang="en-US" sz="1800" dirty="0">
+                <a:latin typeface="Consolas" pitchFamily="49" charset="0"/>
+                <a:cs typeface="Consolas" pitchFamily="49" charset="0"/>
+              </a:rPr>
+              <a:t>LoopStmt stmt = new LoopStmt();</a:t>
+            </a:r>
+          </a:p>
+          <a:p>
+            <a:pPr lvl="1">
+              <a:spcBef>
+                <a:spcPts val="200"/>
+              </a:spcBef>
+              <a:buNone/>
+            </a:pPr>
+            <a:r>
+              <a:rPr lang="en-US" sz="1800" dirty="0">
+                <a:latin typeface="Consolas" pitchFamily="49" charset="0"/>
+                <a:cs typeface="Consolas" pitchFamily="49" charset="0"/>
+              </a:rPr>
+              <a:t>...</a:t>
+            </a:r>
+          </a:p>
+          <a:p>
+            <a:pPr lvl="1">
+              <a:spcBef>
+                <a:spcPts val="200"/>
+              </a:spcBef>
+              <a:buNone/>
+            </a:pPr>
+            <a:r>
+              <a:rPr lang="en-US" sz="1800" dirty="0">
+                <a:latin typeface="Consolas" pitchFamily="49" charset="0"/>
+                <a:cs typeface="Consolas" pitchFamily="49" charset="0"/>
+              </a:rPr>
+              <a:t>loopContext.beginLoop(stmt);</a:t>
+            </a:r>
+          </a:p>
+          <a:p>
+            <a:pPr lvl="1">
+              <a:spcBef>
+                <a:spcPts val="200"/>
+              </a:spcBef>
+              <a:buNone/>
+            </a:pPr>
+            <a:r>
+              <a:rPr lang="en-US" sz="1800" dirty="0">
+                <a:latin typeface="Consolas" pitchFamily="49" charset="0"/>
+                <a:cs typeface="Consolas" pitchFamily="49" charset="0"/>
+              </a:rPr>
+              <a:t>stmt.setStatements(parseStatements());</a:t>
+            </a:r>
+          </a:p>
+          <a:p>
+            <a:pPr lvl="1">
+              <a:spcBef>
+                <a:spcPts val="200"/>
+              </a:spcBef>
+              <a:buNone/>
+            </a:pPr>
+            <a:r>
+              <a:rPr lang="en-US" sz="1800" dirty="0">
+                <a:latin typeface="Consolas" pitchFamily="49" charset="0"/>
+                <a:cs typeface="Consolas" pitchFamily="49" charset="0"/>
+              </a:rPr>
+              <a:t>loopContext.endLoop();</a:t>
+            </a:r>
+          </a:p>
+          <a:p>
+            <a:r>
+              <a:rPr lang="en-US" dirty="0"/>
+              <a:t>When parsing an exit statement:</a:t>
+            </a:r>
+          </a:p>
+          <a:p>
+            <a:pPr lvl="1">
+              <a:spcBef>
+                <a:spcPts val="200"/>
+              </a:spcBef>
+              <a:buNone/>
+            </a:pPr>
+            <a:r>
+              <a:rPr lang="en-US" sz="1800" dirty="0" err="1">
+                <a:latin typeface="Consolas" pitchFamily="49" charset="0"/>
+                <a:cs typeface="Consolas" pitchFamily="49" charset="0"/>
+              </a:rPr>
+              <a:t>LoopStmt</a:t>
+            </a:r>
+            <a:r>
+              <a:rPr lang="en-US" sz="1800" dirty="0">
+                <a:latin typeface="Consolas" pitchFamily="49" charset="0"/>
+                <a:cs typeface="Consolas" pitchFamily="49" charset="0"/>
+              </a:rPr>
+              <a:t> </a:t>
+            </a:r>
+            <a:r>
+              <a:rPr lang="en-US" sz="1800" dirty="0" err="1">
+                <a:latin typeface="Consolas" pitchFamily="49" charset="0"/>
+                <a:cs typeface="Consolas" pitchFamily="49" charset="0"/>
+              </a:rPr>
+              <a:t>loopStmt</a:t>
+            </a:r>
+            <a:r>
+              <a:rPr lang="en-US" sz="1800" dirty="0">
+                <a:latin typeface="Consolas" pitchFamily="49" charset="0"/>
+                <a:cs typeface="Consolas" pitchFamily="49" charset="0"/>
+              </a:rPr>
+              <a:t> = </a:t>
+            </a:r>
+            <a:r>
+              <a:rPr lang="en-US" sz="1800" dirty="0" err="1">
+                <a:latin typeface="Consolas" pitchFamily="49" charset="0"/>
+                <a:cs typeface="Consolas" pitchFamily="49" charset="0"/>
+              </a:rPr>
+              <a:t>loopContext.getLoopStmt</a:t>
+            </a:r>
+            <a:r>
+              <a:rPr lang="en-US" sz="1800" dirty="0">
+                <a:latin typeface="Consolas" pitchFamily="49" charset="0"/>
+                <a:cs typeface="Consolas" pitchFamily="49" charset="0"/>
+              </a:rPr>
+              <a:t>();</a:t>
+            </a:r>
+          </a:p>
+          <a:p>
+            <a:pPr lvl="1">
+              <a:spcBef>
+                <a:spcPts val="200"/>
+              </a:spcBef>
+              <a:buNone/>
+            </a:pPr>
+            <a:r>
+              <a:rPr lang="en-US" sz="1800" dirty="0">
+                <a:latin typeface="Consolas" pitchFamily="49" charset="0"/>
+                <a:cs typeface="Consolas" pitchFamily="49" charset="0"/>
+              </a:rPr>
+              <a:t>if (loopStmt == null)</a:t>
+            </a:r>
+          </a:p>
+          <a:p>
+            <a:pPr lvl="1">
+              <a:spcBef>
+                <a:spcPts val="200"/>
+              </a:spcBef>
+              <a:buNone/>
+            </a:pPr>
+            <a:r>
+              <a:rPr lang="en-US" sz="1800" dirty="0">
+                <a:latin typeface="Consolas" pitchFamily="49" charset="0"/>
+                <a:cs typeface="Consolas" pitchFamily="49" charset="0"/>
+              </a:rPr>
+              <a:t>    throw error(exitPosition,</a:t>
+            </a:r>
+          </a:p>
+          <a:p>
+            <a:pPr lvl="1">
+              <a:spcBef>
+                <a:spcPts val="200"/>
+              </a:spcBef>
+              <a:buNone/>
+            </a:pPr>
+            <a:r>
+              <a:rPr lang="en-US" sz="1800" dirty="0">
+                <a:latin typeface="Consolas" pitchFamily="49" charset="0"/>
+                <a:cs typeface="Consolas" pitchFamily="49" charset="0"/>
+              </a:rPr>
+              <a:t>        "Exit statement is not nested within a loop");</a:t>
+            </a:r>
+          </a:p>
+          <a:p>
+            <a:pPr lvl="1">
+              <a:spcBef>
+                <a:spcPts val="200"/>
+              </a:spcBef>
+              <a:buNone/>
+            </a:pPr>
+            <a:r>
+              <a:rPr lang="en-US" sz="1800" dirty="0">
+                <a:latin typeface="Consolas" pitchFamily="49" charset="0"/>
+                <a:cs typeface="Consolas" pitchFamily="49" charset="0"/>
+              </a:rPr>
+              <a:t>return new ExitStmt(expr, loopStmt);</a:t>
+            </a:r>
+            <a:endParaRPr lang="en-US" dirty="0"/>
+          </a:p>
+        </p:txBody>
+      </p:sp>
+      <p:sp>
+        <p:nvSpPr>
+          <p:cNvPr id="24578" name="Footer Placeholder 3"/>
+          <p:cNvSpPr>
+            <a:spLocks noGrp="1"/>
+          </p:cNvSpPr>
+          <p:nvPr>
+            <p:ph type="ftr" sz="quarter" idx="10"/>
+          </p:nvPr>
+        </p:nvSpPr>
+        <p:spPr/>
+        <p:txBody>
+          <a:bodyPr/>
+          <a:lstStyle/>
+          <a:p>
+            <a:r>
+              <a:rPr lang="en-US" dirty="0"/>
+              <a:t>©SoftMoore Consulting</a:t>
+            </a:r>
+          </a:p>
+        </p:txBody>
+      </p:sp>
+      <p:sp>
+        <p:nvSpPr>
+          <p:cNvPr id="24579" name="Slide Number Placeholder 4"/>
+          <p:cNvSpPr>
+            <a:spLocks noGrp="1"/>
+          </p:cNvSpPr>
+          <p:nvPr>
+            <p:ph type="sldNum" sz="quarter" idx="11"/>
+          </p:nvPr>
+        </p:nvSpPr>
+        <p:spPr/>
+        <p:txBody>
+          <a:bodyPr/>
+          <a:lstStyle/>
+          <a:p>
+            <a:r>
+              <a:rPr lang="en-US" dirty="0"/>
+              <a:t>Slide </a:t>
+            </a:r>
+            <a:fld id="{5290820B-F486-4161-A33F-1CCFEEE1147B}" type="slidenum">
+              <a:rPr lang="en-US" smtClean="0"/>
+              <a:pPr/>
+              <a:t>53</a:t>
+            </a:fld>
+            <a:endParaRPr lang="en-US" dirty="0"/>
+          </a:p>
+        </p:txBody>
+      </p:sp>
+    </p:spTree>
+  </p:cSld>
+  <p:clrMapOvr>
+    <a:masterClrMapping/>
+  </p:clrMapOvr>
+</p:sld>
+</file>
+
+<file path=ppt/slides/slide54.xml><?xml version="1.0" encoding="utf-8"?>
+<p:sld xmlns:a="http://schemas.openxmlformats.org/drawingml/2006/main" xmlns:r="http://schemas.openxmlformats.org/officeDocument/2006/relationships" xmlns:p="http://schemas.openxmlformats.org/presentationml/2006/main">
+  <p:cSld>
+    <p:spTree>
+      <p:nvGrpSpPr>
+        <p:cNvPr id="1" name=""/>
+        <p:cNvGrpSpPr/>
+        <p:nvPr/>
+      </p:nvGrpSpPr>
+      <p:grpSpPr>
+        <a:xfrm>
+          <a:off x="0" y="0"/>
+          <a:ext cx="0" cy="0"/>
+          <a:chOff x="0" y="0"/>
+          <a:chExt cx="0" cy="0"/>
+        </a:xfrm>
+      </p:grpSpPr>
+      <p:sp>
+        <p:nvSpPr>
+          <p:cNvPr id="16386" name="Footer Placeholder 3"/>
+          <p:cNvSpPr>
+            <a:spLocks noGrp="1"/>
+          </p:cNvSpPr>
+          <p:nvPr>
+            <p:ph type="ftr" sz="quarter" idx="10"/>
+          </p:nvPr>
+        </p:nvSpPr>
+        <p:spPr>
+          <a:noFill/>
+        </p:spPr>
+        <p:txBody>
+          <a:bodyPr/>
+          <a:lstStyle/>
+          <a:p>
+            <a:r>
+              <a:rPr lang="en-US" dirty="0"/>
+              <a:t>©SoftMoore Consulting</a:t>
+            </a:r>
+          </a:p>
+        </p:txBody>
+      </p:sp>
+      <p:sp>
+        <p:nvSpPr>
+          <p:cNvPr id="16387" name="Slide Number Placeholder 4"/>
+          <p:cNvSpPr>
+            <a:spLocks noGrp="1"/>
+          </p:cNvSpPr>
+          <p:nvPr>
+            <p:ph type="sldNum" sz="quarter" idx="11"/>
+          </p:nvPr>
+        </p:nvSpPr>
+        <p:spPr>
+          <a:noFill/>
+        </p:spPr>
+        <p:txBody>
+          <a:bodyPr/>
+          <a:lstStyle/>
+          <a:p>
+            <a:r>
+              <a:rPr lang="en-US" dirty="0"/>
+              <a:t>Slide </a:t>
+            </a:r>
+            <a:fld id="{134458ED-4E89-4858-9DDE-3B7F8D65D42C}" type="slidenum">
+              <a:rPr lang="en-US" smtClean="0"/>
+              <a:pPr/>
+              <a:t>54</a:t>
+            </a:fld>
+            <a:endParaRPr lang="en-US" dirty="0"/>
+          </a:p>
+        </p:txBody>
+      </p:sp>
+      <p:sp>
+        <p:nvSpPr>
+          <p:cNvPr id="16388" name="Rectangle 2"/>
+          <p:cNvSpPr>
+            <a:spLocks noGrp="1" noChangeArrowheads="1"/>
+          </p:cNvSpPr>
+          <p:nvPr>
+            <p:ph type="title"/>
+          </p:nvPr>
+        </p:nvSpPr>
+        <p:spPr/>
+        <p:txBody>
+          <a:bodyPr/>
+          <a:lstStyle/>
+          <a:p>
+            <a:r>
+              <a:rPr lang="en-US" dirty="0"/>
+              <a:t>Version 3 of the Parser</a:t>
+            </a:r>
+            <a:br>
+              <a:rPr lang="en-US" dirty="0"/>
+            </a:br>
+            <a:r>
+              <a:rPr lang="en-US" sz="2400" dirty="0"/>
+              <a:t>(Abstract Syntax Trees)</a:t>
+            </a:r>
+          </a:p>
+        </p:txBody>
+      </p:sp>
+      <p:sp>
+        <p:nvSpPr>
+          <p:cNvPr id="16389" name="Rectangle 3"/>
+          <p:cNvSpPr>
+            <a:spLocks noGrp="1" noChangeArrowheads="1"/>
+          </p:cNvSpPr>
+          <p:nvPr>
+            <p:ph type="body" idx="1"/>
+          </p:nvPr>
+        </p:nvSpPr>
+        <p:spPr>
+          <a:xfrm>
+            <a:off x="458788" y="1363663"/>
+            <a:ext cx="8226425" cy="4935537"/>
+          </a:xfrm>
+        </p:spPr>
+        <p:txBody>
+          <a:bodyPr/>
+          <a:lstStyle/>
+          <a:p>
+            <a:r>
+              <a:rPr lang="en-US" dirty="0"/>
+              <a:t>Create AST classes in package “</a:t>
+            </a:r>
+            <a:r>
+              <a:rPr lang="en-US" dirty="0">
+                <a:latin typeface="Consolas" pitchFamily="49" charset="0"/>
+              </a:rPr>
+              <a:t>…ast</a:t>
+            </a:r>
+            <a:r>
+              <a:rPr lang="en-US" dirty="0"/>
+              <a:t>”</a:t>
+            </a:r>
+          </a:p>
+          <a:p>
+            <a:r>
+              <a:rPr lang="en-US" dirty="0"/>
+              <a:t>Add generation of AST structure; i.e., parsing methods should return AST objects or lists of AST objects.</a:t>
+            </a:r>
+          </a:p>
+          <a:p>
+            <a:r>
+              <a:rPr lang="en-US" dirty="0"/>
+              <a:t>Use empty bodies when overriding abstract methods </a:t>
+            </a:r>
+            <a:r>
+              <a:rPr lang="en-US" dirty="0">
+                <a:latin typeface="Consolas" pitchFamily="49" charset="0"/>
+                <a:cs typeface="Consolas" pitchFamily="49" charset="0"/>
+              </a:rPr>
+              <a:t>checkConstraints()</a:t>
+            </a:r>
+            <a:r>
+              <a:rPr lang="en-US" dirty="0"/>
+              <a:t> and </a:t>
+            </a:r>
+            <a:r>
+              <a:rPr lang="en-US" dirty="0">
+                <a:latin typeface="Consolas" pitchFamily="49" charset="0"/>
+                <a:cs typeface="Consolas" pitchFamily="49" charset="0"/>
+              </a:rPr>
+              <a:t>emit()</a:t>
+            </a:r>
+            <a:r>
+              <a:rPr lang="en-US" dirty="0"/>
+              <a:t>.</a:t>
+            </a:r>
+          </a:p>
+          <a:p>
+            <a:r>
+              <a:rPr lang="en-US" dirty="0"/>
+              <a:t>Use complete version of </a:t>
+            </a:r>
+            <a:r>
+              <a:rPr lang="en-US" dirty="0">
+                <a:latin typeface="Consolas" pitchFamily="49" charset="0"/>
+                <a:cs typeface="Consolas" pitchFamily="49" charset="0"/>
+              </a:rPr>
+              <a:t>IdTable</a:t>
+            </a:r>
+            <a:r>
+              <a:rPr lang="en-US" dirty="0"/>
+              <a:t> to check for scope errors.</a:t>
+            </a:r>
+          </a:p>
+          <a:p>
+            <a:r>
+              <a:rPr lang="en-US" dirty="0"/>
+              <a:t>Use class </a:t>
+            </a:r>
+            <a:r>
+              <a:rPr lang="en-US" dirty="0">
+                <a:latin typeface="Consolas" pitchFamily="49" charset="0"/>
+                <a:cs typeface="Consolas" pitchFamily="49" charset="0"/>
+              </a:rPr>
+              <a:t>Context</a:t>
+            </a:r>
+            <a:r>
+              <a:rPr lang="en-US" dirty="0"/>
+              <a:t> to check exit and return statements.</a:t>
+            </a:r>
+          </a:p>
+          <a:p>
+            <a:endParaRPr lang="en-US" dirty="0"/>
+          </a:p>
+        </p:txBody>
+      </p:sp>
+      <p:sp>
+        <p:nvSpPr>
+          <p:cNvPr id="6" name="TextBox 5"/>
+          <p:cNvSpPr txBox="1"/>
+          <p:nvPr/>
+        </p:nvSpPr>
+        <p:spPr>
+          <a:xfrm>
+            <a:off x="758296" y="5191204"/>
+            <a:ext cx="7627409" cy="1107996"/>
+          </a:xfrm>
+          <a:prstGeom prst="rect">
+            <a:avLst/>
+          </a:prstGeom>
+          <a:noFill/>
+          <a:ln>
+            <a:solidFill>
+              <a:schemeClr val="tx1"/>
+            </a:solidFill>
+          </a:ln>
+        </p:spPr>
+        <p:txBody>
+          <a:bodyPr wrap="none" rtlCol="0">
+            <a:spAutoFit/>
+          </a:bodyPr>
+          <a:lstStyle/>
+          <a:p>
+            <a:pPr algn="l"/>
+            <a:r>
+              <a:rPr lang="en-US" sz="2200" dirty="0"/>
+              <a:t>At this point your compiler should accept all legal programs</a:t>
+            </a:r>
+          </a:p>
+          <a:p>
+            <a:pPr algn="l"/>
+            <a:r>
+              <a:rPr lang="en-US" sz="2200" dirty="0"/>
+              <a:t>and reject most illegal programs.  Some programs with type</a:t>
+            </a:r>
+          </a:p>
+          <a:p>
+            <a:pPr algn="l"/>
+            <a:r>
+              <a:rPr lang="en-US" sz="2200" dirty="0"/>
+              <a:t>or other miscellaneous errors will not yet be rejected.</a:t>
             </a:r>
           </a:p>
         </p:txBody>

</xml_diff>

<commit_message>
added additional details to one slide
</commit_message>
<xml_diff>
--- a/PowerPoint Slides/08 - Abstract Syntax Trees.pptx
+++ b/PowerPoint Slides/08 - Abstract Syntax Trees.pptx
@@ -279,13 +279,13 @@
           <a:effectLst/>
         </p:spPr>
         <p:txBody>
-          <a:bodyPr vert="horz" wrap="square" lIns="96647" tIns="48325" rIns="96647" bIns="48325" numCol="1" anchor="t" anchorCtr="0" compatLnSpc="1">
+          <a:bodyPr vert="horz" wrap="square" lIns="96633" tIns="48317" rIns="96633" bIns="48317" numCol="1" anchor="t" anchorCtr="0" compatLnSpc="1">
             <a:prstTxWarp prst="textNoShape">
               <a:avLst/>
             </a:prstTxWarp>
           </a:bodyPr>
           <a:lstStyle>
-            <a:lvl1pPr algn="r" defTabSz="966568">
+            <a:lvl1pPr algn="r" defTabSz="966426">
               <a:defRPr sz="1200"/>
             </a:lvl1pPr>
           </a:lstStyle>
@@ -330,13 +330,13 @@
           <a:effectLst/>
         </p:spPr>
         <p:txBody>
-          <a:bodyPr vert="horz" wrap="square" lIns="96647" tIns="48325" rIns="96647" bIns="48325" numCol="1" anchor="b" anchorCtr="0" compatLnSpc="1">
+          <a:bodyPr vert="horz" wrap="square" lIns="96633" tIns="48317" rIns="96633" bIns="48317" numCol="1" anchor="b" anchorCtr="0" compatLnSpc="1">
             <a:prstTxWarp prst="textNoShape">
               <a:avLst/>
             </a:prstTxWarp>
           </a:bodyPr>
           <a:lstStyle>
-            <a:lvl1pPr algn="r" defTabSz="966568">
+            <a:lvl1pPr algn="r" defTabSz="966426">
               <a:defRPr sz="1200"/>
             </a:lvl1pPr>
           </a:lstStyle>
@@ -429,13 +429,13 @@
           <a:effectLst/>
         </p:spPr>
         <p:txBody>
-          <a:bodyPr vert="horz" wrap="square" lIns="96647" tIns="48325" rIns="96647" bIns="48325" numCol="1" anchor="t" anchorCtr="0" compatLnSpc="1">
+          <a:bodyPr vert="horz" wrap="square" lIns="96633" tIns="48317" rIns="96633" bIns="48317" numCol="1" anchor="t" anchorCtr="0" compatLnSpc="1">
             <a:prstTxWarp prst="textNoShape">
               <a:avLst/>
             </a:prstTxWarp>
           </a:bodyPr>
           <a:lstStyle>
-            <a:lvl1pPr algn="l" defTabSz="966568">
+            <a:lvl1pPr algn="l" defTabSz="966426">
               <a:defRPr sz="1200"/>
             </a:lvl1pPr>
           </a:lstStyle>
@@ -478,13 +478,13 @@
           <a:effectLst/>
         </p:spPr>
         <p:txBody>
-          <a:bodyPr vert="horz" wrap="square" lIns="96647" tIns="48325" rIns="96647" bIns="48325" numCol="1" anchor="t" anchorCtr="0" compatLnSpc="1">
+          <a:bodyPr vert="horz" wrap="square" lIns="96633" tIns="48317" rIns="96633" bIns="48317" numCol="1" anchor="t" anchorCtr="0" compatLnSpc="1">
             <a:prstTxWarp prst="textNoShape">
               <a:avLst/>
             </a:prstTxWarp>
           </a:bodyPr>
           <a:lstStyle>
-            <a:lvl1pPr algn="r" defTabSz="966568">
+            <a:lvl1pPr algn="r" defTabSz="966426">
               <a:defRPr sz="1200"/>
             </a:lvl1pPr>
           </a:lstStyle>
@@ -553,7 +553,7 @@
           <a:effectLst/>
         </p:spPr>
         <p:txBody>
-          <a:bodyPr vert="horz" wrap="square" lIns="96647" tIns="48325" rIns="96647" bIns="48325" numCol="1" anchor="t" anchorCtr="0" compatLnSpc="1">
+          <a:bodyPr vert="horz" wrap="square" lIns="96633" tIns="48317" rIns="96633" bIns="48317" numCol="1" anchor="t" anchorCtr="0" compatLnSpc="1">
             <a:prstTxWarp prst="textNoShape">
               <a:avLst/>
             </a:prstTxWarp>
@@ -624,13 +624,13 @@
           <a:effectLst/>
         </p:spPr>
         <p:txBody>
-          <a:bodyPr vert="horz" wrap="square" lIns="96647" tIns="48325" rIns="96647" bIns="48325" numCol="1" anchor="b" anchorCtr="0" compatLnSpc="1">
+          <a:bodyPr vert="horz" wrap="square" lIns="96633" tIns="48317" rIns="96633" bIns="48317" numCol="1" anchor="b" anchorCtr="0" compatLnSpc="1">
             <a:prstTxWarp prst="textNoShape">
               <a:avLst/>
             </a:prstTxWarp>
           </a:bodyPr>
           <a:lstStyle>
-            <a:lvl1pPr algn="l" defTabSz="966568">
+            <a:lvl1pPr algn="l" defTabSz="966426">
               <a:defRPr sz="1200"/>
             </a:lvl1pPr>
           </a:lstStyle>
@@ -670,13 +670,13 @@
           <a:effectLst/>
         </p:spPr>
         <p:txBody>
-          <a:bodyPr vert="horz" wrap="square" lIns="96647" tIns="48325" rIns="96647" bIns="48325" numCol="1" anchor="b" anchorCtr="0" compatLnSpc="1">
+          <a:bodyPr vert="horz" wrap="square" lIns="96633" tIns="48317" rIns="96633" bIns="48317" numCol="1" anchor="b" anchorCtr="0" compatLnSpc="1">
             <a:prstTxWarp prst="textNoShape">
               <a:avLst/>
             </a:prstTxWarp>
           </a:bodyPr>
           <a:lstStyle>
-            <a:lvl1pPr algn="r" defTabSz="966568">
+            <a:lvl1pPr algn="r" defTabSz="966426">
               <a:defRPr sz="1200"/>
             </a:lvl1pPr>
           </a:lstStyle>
@@ -1916,7 +1916,7 @@
           <a:bodyPr/>
           <a:lstStyle/>
           <a:p>
-            <a:pPr defTabSz="966529"/>
+            <a:pPr defTabSz="966387"/>
             <a:r>
               <a:rPr lang="en-US" dirty="0"/>
               <a:t>AST</a:t>
@@ -1941,10 +1941,10 @@
           <a:bodyPr/>
           <a:lstStyle/>
           <a:p>
-            <a:pPr defTabSz="966529"/>
+            <a:pPr defTabSz="966387"/>
             <a:fld id="{D400509C-4A7C-4E42-967C-1577FDCCDE29}" type="slidenum">
               <a:rPr lang="en-US" smtClean="0"/>
-              <a:pPr defTabSz="966529"/>
+              <a:pPr defTabSz="966387"/>
               <a:t>19</a:t>
             </a:fld>
             <a:endParaRPr lang="en-US" dirty="0"/>
@@ -21153,69 +21153,352 @@
             </a:r>
             <a:r>
               <a:rPr lang="en-US" dirty="0"/>
-              <a:t> by</a:t>
-            </a:r>
-          </a:p>
-          <a:p>
-            <a:pPr lvl="1"/>
-            <a:r>
-              <a:rPr lang="en-US" dirty="0"/>
-              <a:t>looping through the index expressions</a:t>
-            </a:r>
-          </a:p>
-          <a:p>
-            <a:pPr lvl="1"/>
-            <a:r>
-              <a:rPr lang="en-US" dirty="0"/>
-              <a:t>calling </a:t>
-            </a:r>
-            <a:r>
-              <a:rPr lang="en-US" dirty="0" err="1">
+              <a:t>.</a:t>
+            </a:r>
+          </a:p>
+          <a:p>
+            <a:pPr marL="457200" lvl="1" indent="0">
+              <a:buNone/>
+            </a:pPr>
+            <a:r>
+              <a:rPr lang="en-US" sz="1750" dirty="0">
+                <a:latin typeface="Consolas" panose="020B0609020204030204" pitchFamily="49" charset="0"/>
+              </a:rPr>
+              <a:t>for (Expression expr : </a:t>
+            </a:r>
+            <a:r>
+              <a:rPr lang="en-US" sz="1750" dirty="0" err="1">
+                <a:latin typeface="Consolas" panose="020B0609020204030204" pitchFamily="49" charset="0"/>
+              </a:rPr>
+              <a:t>indexExprs</a:t>
+            </a:r>
+            <a:r>
+              <a:rPr lang="en-US" sz="1750" dirty="0">
+                <a:latin typeface="Consolas" panose="020B0609020204030204" pitchFamily="49" charset="0"/>
+              </a:rPr>
+              <a:t>)</a:t>
+            </a:r>
+          </a:p>
+          <a:p>
+            <a:pPr marL="457200" lvl="1" indent="0">
+              <a:spcBef>
+                <a:spcPts val="100"/>
+              </a:spcBef>
+              <a:buNone/>
+            </a:pPr>
+            <a:r>
+              <a:rPr lang="en-US" sz="1750" dirty="0">
+                <a:latin typeface="Consolas" panose="020B0609020204030204" pitchFamily="49" charset="0"/>
+              </a:rPr>
+              <a:t>  {</a:t>
+            </a:r>
+          </a:p>
+          <a:p>
+            <a:pPr marL="457200" lvl="1" indent="0">
+              <a:spcBef>
+                <a:spcPts val="100"/>
+              </a:spcBef>
+              <a:buNone/>
+            </a:pPr>
+            <a:r>
+              <a:rPr lang="en-US" sz="1750" dirty="0">
+                <a:latin typeface="Consolas" panose="020B0609020204030204" pitchFamily="49" charset="0"/>
+              </a:rPr>
+              <a:t>    </a:t>
+            </a:r>
+            <a:r>
+              <a:rPr lang="en-US" sz="1750" dirty="0" err="1">
+                <a:latin typeface="Consolas" panose="020B0609020204030204" pitchFamily="49" charset="0"/>
+              </a:rPr>
+              <a:t>expr.checkConstraints</a:t>
+            </a:r>
+            <a:r>
+              <a:rPr lang="en-US" sz="1750" dirty="0">
+                <a:latin typeface="Consolas" panose="020B0609020204030204" pitchFamily="49" charset="0"/>
+              </a:rPr>
+              <a:t>();</a:t>
+            </a:r>
+          </a:p>
+          <a:p>
+            <a:pPr marL="457200" lvl="1" indent="0">
+              <a:spcBef>
+                <a:spcPts val="100"/>
+              </a:spcBef>
+              <a:buNone/>
+            </a:pPr>
+            <a:endParaRPr lang="en-US" sz="1750" dirty="0">
+              <a:latin typeface="Consolas" panose="020B0609020204030204" pitchFamily="49" charset="0"/>
+            </a:endParaRPr>
+          </a:p>
+          <a:p>
+            <a:pPr marL="457200" lvl="1" indent="0">
+              <a:spcBef>
+                <a:spcPts val="0"/>
+              </a:spcBef>
+              <a:buNone/>
+            </a:pPr>
+            <a:r>
+              <a:rPr lang="en-US" sz="1750" dirty="0">
+                <a:latin typeface="Consolas" panose="020B0609020204030204" pitchFamily="49" charset="0"/>
+              </a:rPr>
+              <a:t>    if (</a:t>
+            </a:r>
+            <a:r>
+              <a:rPr lang="en-US" sz="1750" dirty="0" err="1">
+                <a:latin typeface="Consolas" panose="020B0609020204030204" pitchFamily="49" charset="0"/>
+              </a:rPr>
+              <a:t>expr.getType</a:t>
+            </a:r>
+            <a:r>
+              <a:rPr lang="en-US" sz="1750" dirty="0">
+                <a:latin typeface="Consolas" panose="020B0609020204030204" pitchFamily="49" charset="0"/>
+              </a:rPr>
+              <a:t>() != </a:t>
+            </a:r>
+            <a:r>
+              <a:rPr lang="en-US" sz="1750" dirty="0" err="1">
+                <a:latin typeface="Consolas" panose="020B0609020204030204" pitchFamily="49" charset="0"/>
+              </a:rPr>
+              <a:t>Type.Integer</a:t>
+            </a:r>
+            <a:r>
+              <a:rPr lang="en-US" sz="1750" dirty="0">
+                <a:latin typeface="Consolas" panose="020B0609020204030204" pitchFamily="49" charset="0"/>
+              </a:rPr>
+              <a:t>)</a:t>
+            </a:r>
+          </a:p>
+          <a:p>
+            <a:pPr marL="457200" lvl="1" indent="0">
+              <a:spcBef>
+                <a:spcPts val="100"/>
+              </a:spcBef>
+              <a:buNone/>
+            </a:pPr>
+            <a:r>
+              <a:rPr lang="en-US" sz="1750" dirty="0">
+                <a:latin typeface="Consolas" panose="020B0609020204030204" pitchFamily="49" charset="0"/>
+              </a:rPr>
+              <a:t>        throw error(...);</a:t>
+            </a:r>
+          </a:p>
+          <a:p>
+            <a:pPr marL="457200" lvl="1" indent="0">
+              <a:spcBef>
+                <a:spcPts val="100"/>
+              </a:spcBef>
+              <a:buNone/>
+            </a:pPr>
+            <a:endParaRPr lang="en-US" sz="1750" dirty="0">
+              <a:latin typeface="Consolas" panose="020B0609020204030204" pitchFamily="49" charset="0"/>
+            </a:endParaRPr>
+          </a:p>
+          <a:p>
+            <a:pPr marL="457200" lvl="1" indent="0">
+              <a:spcBef>
+                <a:spcPts val="0"/>
+              </a:spcBef>
+              <a:buNone/>
+            </a:pPr>
+            <a:r>
+              <a:rPr lang="en-US" sz="1750" dirty="0">
+                <a:latin typeface="Consolas" panose="020B0609020204030204" pitchFamily="49" charset="0"/>
+              </a:rPr>
+              <a:t>    if (</a:t>
+            </a:r>
+            <a:r>
+              <a:rPr lang="en-US" sz="1750" dirty="0" err="1">
                 <a:latin typeface="Consolas" panose="020B0609020204030204" pitchFamily="49" charset="0"/>
               </a:rPr>
               <a:t>getType</a:t>
             </a:r>
             <a:r>
-              <a:rPr lang="en-US" dirty="0">
-                <a:latin typeface="Consolas" panose="020B0609020204030204" pitchFamily="49" charset="0"/>
-              </a:rPr>
-              <a:t>()</a:t>
-            </a:r>
-            <a:r>
-              <a:rPr lang="en-US" dirty="0"/>
-              <a:t> to get the array type</a:t>
-            </a:r>
-          </a:p>
-          <a:p>
-            <a:pPr marL="914400" lvl="2" indent="0">
-              <a:buNone/>
-            </a:pPr>
-            <a:r>
-              <a:rPr lang="en-US" dirty="0"/>
-              <a:t>(generate an error message if the type is not an array type)</a:t>
-            </a:r>
-          </a:p>
-          <a:p>
-            <a:pPr lvl="1"/>
-            <a:r>
-              <a:rPr lang="en-US" dirty="0"/>
-              <a:t>calling </a:t>
-            </a:r>
-            <a:r>
-              <a:rPr lang="en-US" dirty="0" err="1">
+              <a:rPr lang="en-US" sz="1750" dirty="0">
+                <a:latin typeface="Consolas" panose="020B0609020204030204" pitchFamily="49" charset="0"/>
+              </a:rPr>
+              <a:t>() </a:t>
+            </a:r>
+            <a:r>
+              <a:rPr lang="en-US" sz="1750" dirty="0" err="1">
+                <a:latin typeface="Consolas" panose="020B0609020204030204" pitchFamily="49" charset="0"/>
+              </a:rPr>
+              <a:t>instanceof</a:t>
+            </a:r>
+            <a:r>
+              <a:rPr lang="en-US" sz="1750" dirty="0">
+                <a:latin typeface="Consolas" panose="020B0609020204030204" pitchFamily="49" charset="0"/>
+              </a:rPr>
+              <a:t> </a:t>
+            </a:r>
+            <a:r>
+              <a:rPr lang="en-US" sz="1750" dirty="0" err="1">
+                <a:latin typeface="Consolas" panose="020B0609020204030204" pitchFamily="49" charset="0"/>
+              </a:rPr>
+              <a:t>ArrayType</a:t>
+            </a:r>
+            <a:r>
+              <a:rPr lang="en-US" sz="1750" dirty="0">
+                <a:latin typeface="Consolas" panose="020B0609020204030204" pitchFamily="49" charset="0"/>
+              </a:rPr>
+              <a:t>)</a:t>
+            </a:r>
+          </a:p>
+          <a:p>
+            <a:pPr marL="457200" lvl="1" indent="0">
+              <a:spcBef>
+                <a:spcPts val="100"/>
+              </a:spcBef>
+              <a:buNone/>
+            </a:pPr>
+            <a:r>
+              <a:rPr lang="en-US" sz="1750" dirty="0">
+                <a:latin typeface="Consolas" panose="020B0609020204030204" pitchFamily="49" charset="0"/>
+              </a:rPr>
+              <a:t>      {</a:t>
+            </a:r>
+          </a:p>
+          <a:p>
+            <a:pPr marL="457200" lvl="1" indent="0">
+              <a:spcBef>
+                <a:spcPts val="100"/>
+              </a:spcBef>
+              <a:buNone/>
+            </a:pPr>
+            <a:r>
+              <a:rPr lang="en-US" sz="1750" dirty="0">
+                <a:latin typeface="Consolas" panose="020B0609020204030204" pitchFamily="49" charset="0"/>
+              </a:rPr>
+              <a:t>        </a:t>
+            </a:r>
+            <a:r>
+              <a:rPr lang="en-US" sz="1750" dirty="0" err="1">
+                <a:latin typeface="Consolas" panose="020B0609020204030204" pitchFamily="49" charset="0"/>
+              </a:rPr>
+              <a:t>ArrayType</a:t>
+            </a:r>
+            <a:r>
+              <a:rPr lang="en-US" sz="1750" dirty="0">
+                <a:latin typeface="Consolas" panose="020B0609020204030204" pitchFamily="49" charset="0"/>
+              </a:rPr>
+              <a:t> type = (</a:t>
+            </a:r>
+            <a:r>
+              <a:rPr lang="en-US" sz="1750" dirty="0" err="1">
+                <a:latin typeface="Consolas" panose="020B0609020204030204" pitchFamily="49" charset="0"/>
+              </a:rPr>
+              <a:t>ArrayType</a:t>
+            </a:r>
+            <a:r>
+              <a:rPr lang="en-US" sz="1750" dirty="0">
+                <a:latin typeface="Consolas" panose="020B0609020204030204" pitchFamily="49" charset="0"/>
+              </a:rPr>
+              <a:t>) </a:t>
+            </a:r>
+            <a:r>
+              <a:rPr lang="en-US" sz="1750" dirty="0" err="1">
+                <a:latin typeface="Consolas" panose="020B0609020204030204" pitchFamily="49" charset="0"/>
+              </a:rPr>
+              <a:t>getType</a:t>
+            </a:r>
+            <a:r>
+              <a:rPr lang="en-US" sz="1750" dirty="0">
+                <a:latin typeface="Consolas" panose="020B0609020204030204" pitchFamily="49" charset="0"/>
+              </a:rPr>
+              <a:t>();</a:t>
+            </a:r>
+          </a:p>
+          <a:p>
+            <a:pPr marL="457200" lvl="1" indent="0">
+              <a:spcBef>
+                <a:spcPts val="100"/>
+              </a:spcBef>
+              <a:buNone/>
+            </a:pPr>
+            <a:r>
+              <a:rPr lang="en-US" sz="1750" dirty="0">
+                <a:latin typeface="Consolas" panose="020B0609020204030204" pitchFamily="49" charset="0"/>
+              </a:rPr>
+              <a:t>        </a:t>
+            </a:r>
+            <a:r>
+              <a:rPr lang="en-US" sz="1750" dirty="0" err="1">
                 <a:latin typeface="Consolas" panose="020B0609020204030204" pitchFamily="49" charset="0"/>
               </a:rPr>
               <a:t>setType</a:t>
             </a:r>
             <a:r>
-              <a:rPr lang="en-US" dirty="0">
-                <a:latin typeface="Consolas" panose="020B0609020204030204" pitchFamily="49" charset="0"/>
-              </a:rPr>
-              <a:t>()</a:t>
-            </a:r>
-            <a:r>
-              <a:rPr lang="en-US" dirty="0"/>
-              <a:t> to set the type to the element type of the array</a:t>
+              <a:rPr lang="en-US" sz="1750" dirty="0">
+                <a:latin typeface="Consolas" panose="020B0609020204030204" pitchFamily="49" charset="0"/>
+              </a:rPr>
+              <a:t>(</a:t>
+            </a:r>
+            <a:r>
+              <a:rPr lang="en-US" sz="1750" dirty="0" err="1">
+                <a:latin typeface="Consolas" panose="020B0609020204030204" pitchFamily="49" charset="0"/>
+              </a:rPr>
+              <a:t>type.getElementType</a:t>
+            </a:r>
+            <a:r>
+              <a:rPr lang="en-US" sz="1750" dirty="0">
+                <a:latin typeface="Consolas" panose="020B0609020204030204" pitchFamily="49" charset="0"/>
+              </a:rPr>
+              <a:t>());</a:t>
+            </a:r>
+          </a:p>
+          <a:p>
+            <a:pPr marL="457200" lvl="1" indent="0">
+              <a:spcBef>
+                <a:spcPts val="100"/>
+              </a:spcBef>
+              <a:buNone/>
+            </a:pPr>
+            <a:r>
+              <a:rPr lang="en-US" sz="1750" dirty="0">
+                <a:latin typeface="Consolas" panose="020B0609020204030204" pitchFamily="49" charset="0"/>
+              </a:rPr>
+              <a:t>      }</a:t>
+            </a:r>
+          </a:p>
+          <a:p>
+            <a:pPr marL="457200" lvl="1" indent="0">
+              <a:spcBef>
+                <a:spcPts val="100"/>
+              </a:spcBef>
+              <a:buNone/>
+            </a:pPr>
+            <a:r>
+              <a:rPr lang="en-US" sz="1750" dirty="0">
+                <a:latin typeface="Consolas" panose="020B0609020204030204" pitchFamily="49" charset="0"/>
+              </a:rPr>
+              <a:t>    else</a:t>
+            </a:r>
+          </a:p>
+          <a:p>
+            <a:pPr marL="457200" lvl="1" indent="0">
+              <a:spcBef>
+                <a:spcPts val="100"/>
+              </a:spcBef>
+              <a:buNone/>
+            </a:pPr>
+            <a:r>
+              <a:rPr lang="en-US" sz="1750" dirty="0">
+                <a:latin typeface="Consolas" panose="020B0609020204030204" pitchFamily="49" charset="0"/>
+              </a:rPr>
+              <a:t>        throw error(...);</a:t>
+            </a:r>
+          </a:p>
+          <a:p>
+            <a:pPr marL="457200" lvl="1" indent="0">
+              <a:spcBef>
+                <a:spcPts val="100"/>
+              </a:spcBef>
+              <a:buNone/>
+            </a:pPr>
+            <a:r>
+              <a:rPr lang="en-US" sz="1750" dirty="0">
+                <a:latin typeface="Consolas" panose="020B0609020204030204" pitchFamily="49" charset="0"/>
+              </a:rPr>
+              <a:t>  }</a:t>
             </a:r>
           </a:p>
         </p:txBody>

</xml_diff>

<commit_message>
Updated slides to match recent code changes.
</commit_message>
<xml_diff>
--- a/PowerPoint Slides/08 - Abstract Syntax Trees.pptx
+++ b/PowerPoint Slides/08 - Abstract Syntax Trees.pptx
@@ -31,8 +31,8 @@
     <p:sldId id="283" r:id="rId19"/>
     <p:sldId id="292" r:id="rId20"/>
     <p:sldId id="293" r:id="rId21"/>
-    <p:sldId id="301" r:id="rId22"/>
-    <p:sldId id="344" r:id="rId23"/>
+    <p:sldId id="345" r:id="rId22"/>
+    <p:sldId id="346" r:id="rId23"/>
     <p:sldId id="311" r:id="rId24"/>
     <p:sldId id="332" r:id="rId25"/>
     <p:sldId id="343" r:id="rId26"/>
@@ -45,7 +45,7 @@
     <p:sldId id="285" r:id="rId33"/>
     <p:sldId id="334" r:id="rId34"/>
     <p:sldId id="335" r:id="rId35"/>
-    <p:sldId id="317" r:id="rId36"/>
+    <p:sldId id="347" r:id="rId36"/>
     <p:sldId id="320" r:id="rId37"/>
     <p:sldId id="314" r:id="rId38"/>
     <p:sldId id="315" r:id="rId39"/>
@@ -2282,7 +2282,7 @@
           </a:bodyPr>
           <a:lstStyle/>
           <a:p>
-            <a:endParaRPr lang="en-US" dirty="0"/>
+            <a:endParaRPr lang="en-US"/>
           </a:p>
         </p:txBody>
       </p:sp>
@@ -2305,7 +2305,7 @@
               <a:defRPr/>
             </a:pPr>
             <a:r>
-              <a:rPr lang="en-US" dirty="0"/>
+              <a:rPr lang="en-US"/>
               <a:t>Parsing</a:t>
             </a:r>
           </a:p>
@@ -2336,14 +2336,14 @@
               </a:pPr>
               <a:t>21</a:t>
             </a:fld>
-            <a:endParaRPr lang="en-US" dirty="0"/>
+            <a:endParaRPr lang="en-US"/>
           </a:p>
         </p:txBody>
       </p:sp>
     </p:spTree>
     <p:extLst>
       <p:ext uri="{BB962C8B-B14F-4D97-AF65-F5344CB8AC3E}">
-        <p14:creationId xmlns:p14="http://schemas.microsoft.com/office/powerpoint/2010/main" val="3296408794"/>
+        <p14:creationId xmlns:p14="http://schemas.microsoft.com/office/powerpoint/2010/main" val="3883283304"/>
       </p:ext>
     </p:extLst>
   </p:cSld>
@@ -6341,7 +6341,7 @@
               <a:buNone/>
             </a:pPr>
             <a:r>
-              <a:rPr lang="en-US" sz="1700" dirty="0">
+              <a:rPr lang="en-US" sz="1800" dirty="0">
                 <a:latin typeface="Consolas" pitchFamily="49" charset="0"/>
                 <a:cs typeface="Consolas" pitchFamily="49" charset="0"/>
               </a:rPr>
@@ -6356,7 +6356,7 @@
               <a:buNone/>
             </a:pPr>
             <a:r>
-              <a:rPr lang="en-US" sz="1700" dirty="0">
+              <a:rPr lang="en-US" sz="1800" dirty="0">
                 <a:latin typeface="Consolas" pitchFamily="49" charset="0"/>
                 <a:cs typeface="Consolas" pitchFamily="49" charset="0"/>
               </a:rPr>
@@ -6371,7 +6371,7 @@
               <a:buNone/>
             </a:pPr>
             <a:r>
-              <a:rPr lang="en-US" sz="1700" dirty="0">
+              <a:rPr lang="en-US" sz="1800" dirty="0">
                 <a:latin typeface="Consolas" pitchFamily="49" charset="0"/>
                 <a:cs typeface="Consolas" pitchFamily="49" charset="0"/>
               </a:rPr>
@@ -6386,7 +6386,7 @@
               <a:buNone/>
             </a:pPr>
             <a:r>
-              <a:rPr lang="en-US" sz="1700" dirty="0">
+              <a:rPr lang="en-US" sz="1800" dirty="0">
                 <a:latin typeface="Consolas" pitchFamily="49" charset="0"/>
                 <a:cs typeface="Consolas" pitchFamily="49" charset="0"/>
               </a:rPr>
@@ -6401,7 +6401,7 @@
               <a:buNone/>
             </a:pPr>
             <a:r>
-              <a:rPr lang="en-US" sz="1700" dirty="0">
+              <a:rPr lang="en-US" sz="1800" dirty="0">
                 <a:latin typeface="Consolas" pitchFamily="49" charset="0"/>
                 <a:cs typeface="Consolas" pitchFamily="49" charset="0"/>
               </a:rPr>
@@ -6415,7 +6415,7 @@
               </a:spcBef>
               <a:buNone/>
             </a:pPr>
-            <a:endParaRPr lang="en-US" sz="1700" dirty="0">
+            <a:endParaRPr lang="en-US" sz="1800" dirty="0">
               <a:latin typeface="Consolas" pitchFamily="49" charset="0"/>
               <a:cs typeface="Consolas" pitchFamily="49" charset="0"/>
             </a:endParaRPr>
@@ -6428,7 +6428,7 @@
               <a:buNone/>
             </a:pPr>
             <a:r>
-              <a:rPr lang="en-US" sz="1700" dirty="0">
+              <a:rPr lang="en-US" sz="1800" dirty="0">
                 <a:latin typeface="Consolas" pitchFamily="49" charset="0"/>
                 <a:cs typeface="Consolas" pitchFamily="49" charset="0"/>
               </a:rPr>
@@ -6443,7 +6443,7 @@
               <a:buNone/>
             </a:pPr>
             <a:r>
-              <a:rPr lang="en-US" sz="1700" dirty="0">
+              <a:rPr lang="en-US" sz="1800" dirty="0">
                 <a:latin typeface="Consolas" pitchFamily="49" charset="0"/>
                 <a:cs typeface="Consolas" pitchFamily="49" charset="0"/>
               </a:rPr>
@@ -6458,7 +6458,7 @@
               <a:buNone/>
             </a:pPr>
             <a:r>
-              <a:rPr lang="en-US" sz="1700" dirty="0">
+              <a:rPr lang="en-US" sz="1800" dirty="0">
                 <a:latin typeface="Consolas" pitchFamily="49" charset="0"/>
                 <a:cs typeface="Consolas" pitchFamily="49" charset="0"/>
               </a:rPr>
@@ -6473,7 +6473,7 @@
               <a:buNone/>
             </a:pPr>
             <a:r>
-              <a:rPr lang="en-US" sz="1700" dirty="0">
+              <a:rPr lang="en-US" sz="1800" dirty="0">
                 <a:latin typeface="Consolas" pitchFamily="49" charset="0"/>
                 <a:cs typeface="Consolas" pitchFamily="49" charset="0"/>
               </a:rPr>
@@ -6488,7 +6488,7 @@
               <a:buNone/>
             </a:pPr>
             <a:r>
-              <a:rPr lang="en-US" sz="1700" dirty="0">
+              <a:rPr lang="en-US" sz="1800" dirty="0">
                 <a:latin typeface="Consolas" pitchFamily="49" charset="0"/>
                 <a:cs typeface="Consolas" pitchFamily="49" charset="0"/>
               </a:rPr>
@@ -6503,7 +6503,7 @@
               <a:buNone/>
             </a:pPr>
             <a:r>
-              <a:rPr lang="en-US" sz="1700" dirty="0">
+              <a:rPr lang="en-US" sz="1800" dirty="0">
                 <a:latin typeface="Consolas" pitchFamily="49" charset="0"/>
                 <a:cs typeface="Consolas" pitchFamily="49" charset="0"/>
               </a:rPr>
@@ -6518,7 +6518,7 @@
               <a:buNone/>
             </a:pPr>
             <a:r>
-              <a:rPr lang="en-US" sz="1700" dirty="0">
+              <a:rPr lang="en-US" sz="1800" dirty="0">
                 <a:latin typeface="Consolas" pitchFamily="49" charset="0"/>
                 <a:cs typeface="Consolas" pitchFamily="49" charset="0"/>
               </a:rPr>
@@ -6533,7 +6533,7 @@
               <a:buNone/>
             </a:pPr>
             <a:r>
-              <a:rPr lang="en-US" sz="1700" dirty="0">
+              <a:rPr lang="en-US" sz="1800" dirty="0">
                 <a:latin typeface="Consolas" pitchFamily="49" charset="0"/>
                 <a:cs typeface="Consolas" pitchFamily="49" charset="0"/>
               </a:rPr>
@@ -6548,7 +6548,7 @@
               <a:buNone/>
             </a:pPr>
             <a:r>
-              <a:rPr lang="en-US" sz="1700" dirty="0">
+              <a:rPr lang="en-US" sz="1800" dirty="0">
                 <a:latin typeface="Consolas" pitchFamily="49" charset="0"/>
                 <a:cs typeface="Consolas" pitchFamily="49" charset="0"/>
               </a:rPr>
@@ -6563,7 +6563,7 @@
               <a:buNone/>
             </a:pPr>
             <a:r>
-              <a:rPr lang="en-US" sz="1700" dirty="0">
+              <a:rPr lang="en-US" sz="1800" dirty="0">
                 <a:latin typeface="Consolas" pitchFamily="49" charset="0"/>
                 <a:cs typeface="Consolas" pitchFamily="49" charset="0"/>
               </a:rPr>
@@ -10951,7 +10951,37 @@
             </a:r>
             <a:r>
               <a:rPr lang="en-US" dirty="0"/>
-              <a:t> for kinds of declarations; e.g., ConstDecl, VarDecl, ProcedureDecl, etc.</a:t>
+              <a:t> for kinds of declarations; e.g., </a:t>
+            </a:r>
+            <a:r>
+              <a:rPr lang="en-US" dirty="0">
+                <a:latin typeface="Consolas" panose="020B0609020204030204" pitchFamily="49" charset="0"/>
+              </a:rPr>
+              <a:t>ConstDecl</a:t>
+            </a:r>
+            <a:r>
+              <a:rPr lang="en-US" dirty="0"/>
+              <a:t>, </a:t>
+            </a:r>
+            <a:r>
+              <a:rPr lang="en-US" dirty="0">
+                <a:latin typeface="Consolas" panose="020B0609020204030204" pitchFamily="49" charset="0"/>
+              </a:rPr>
+              <a:t>VarDecl</a:t>
+            </a:r>
+            <a:r>
+              <a:rPr lang="en-US" dirty="0"/>
+              <a:t>, </a:t>
+            </a:r>
+            <a:r>
+              <a:rPr lang="en-US" dirty="0">
+                <a:latin typeface="Consolas" panose="020B0609020204030204" pitchFamily="49" charset="0"/>
+              </a:rPr>
+              <a:t>ProcedureDecl</a:t>
+            </a:r>
+            <a:r>
+              <a:rPr lang="en-US" dirty="0"/>
+              <a:t>, etc.</a:t>
             </a:r>
           </a:p>
         </p:txBody>
@@ -10998,17 +11028,10 @@
           <a:p>
             <a:r>
               <a:rPr lang="en-US" sz="2900" dirty="0"/>
-              <a:t>Selected Methods in the Modified</a:t>
-            </a:r>
-            <a:br>
-              <a:rPr lang="en-US" sz="2900" dirty="0"/>
-            </a:br>
-            <a:r>
-              <a:rPr lang="en-US" sz="2900" dirty="0"/>
-              <a:t>Version of </a:t>
-            </a:r>
-            <a:r>
-              <a:rPr lang="en-US" sz="2900" dirty="0">
+              <a:t>Selected Methods in Class </a:t>
+            </a:r>
+            <a:r>
+              <a:rPr lang="en-US" sz="2900" dirty="0" err="1">
                 <a:latin typeface="Consolas" pitchFamily="49" charset="0"/>
                 <a:cs typeface="Consolas" pitchFamily="49" charset="0"/>
               </a:rPr>
@@ -11035,7 +11058,7 @@
           <a:p>
             <a:pPr marL="91440" indent="0">
               <a:spcBef>
-                <a:spcPts val="0"/>
+                <a:spcPts val="100"/>
               </a:spcBef>
               <a:buNone/>
             </a:pPr>
@@ -11050,7 +11073,7 @@
           <a:p>
             <a:pPr marL="91440" indent="0">
               <a:spcBef>
-                <a:spcPts val="0"/>
+                <a:spcPts val="100"/>
               </a:spcBef>
               <a:buNone/>
             </a:pPr>
@@ -11059,13 +11082,13 @@
                 <a:latin typeface="Consolas" pitchFamily="49" charset="0"/>
                 <a:cs typeface="Consolas" pitchFamily="49" charset="0"/>
               </a:rPr>
-              <a:t> * Opens a new scope for identifiers.</a:t>
+              <a:t> * Returns the current scope level.</a:t>
             </a:r>
           </a:p>
           <a:p>
             <a:pPr marL="91440" indent="0">
               <a:spcBef>
-                <a:spcPts val="0"/>
+                <a:spcPts val="100"/>
               </a:spcBef>
               <a:buNone/>
             </a:pPr>
@@ -11080,7 +11103,7 @@
           <a:p>
             <a:pPr marL="91440" indent="0">
               <a:spcBef>
-                <a:spcPts val="0"/>
+                <a:spcPts val="100"/>
               </a:spcBef>
               <a:buNone/>
             </a:pPr>
@@ -11089,13 +11112,41 @@
                 <a:latin typeface="Consolas" pitchFamily="49" charset="0"/>
                 <a:cs typeface="Consolas" pitchFamily="49" charset="0"/>
               </a:rPr>
-              <a:t>public void openScope()</a:t>
+              <a:t>public </a:t>
+            </a:r>
+            <a:r>
+              <a:rPr lang="en-US" sz="1800" dirty="0" err="1">
+                <a:latin typeface="Consolas" pitchFamily="49" charset="0"/>
+                <a:cs typeface="Consolas" pitchFamily="49" charset="0"/>
+              </a:rPr>
+              <a:t>ScopeLevel</a:t>
+            </a:r>
+            <a:r>
+              <a:rPr lang="en-US" sz="1800" dirty="0">
+                <a:latin typeface="Consolas" pitchFamily="49" charset="0"/>
+                <a:cs typeface="Consolas" pitchFamily="49" charset="0"/>
+              </a:rPr>
+              <a:t> </a:t>
+            </a:r>
+            <a:r>
+              <a:rPr lang="en-US" sz="1800" dirty="0" err="1">
+                <a:latin typeface="Consolas" pitchFamily="49" charset="0"/>
+                <a:cs typeface="Consolas" pitchFamily="49" charset="0"/>
+              </a:rPr>
+              <a:t>getScopeLevel</a:t>
+            </a:r>
+            <a:r>
+              <a:rPr lang="en-US" sz="1800" dirty="0">
+                <a:latin typeface="Consolas" pitchFamily="49" charset="0"/>
+                <a:cs typeface="Consolas" pitchFamily="49" charset="0"/>
+              </a:rPr>
+              <a:t>()</a:t>
             </a:r>
           </a:p>
           <a:p>
             <a:pPr marL="91440" indent="0">
               <a:spcBef>
-                <a:spcPts val="0"/>
+                <a:spcPts val="100"/>
               </a:spcBef>
               <a:buNone/>
             </a:pPr>
@@ -11131,7 +11182,7 @@
                 <a:latin typeface="Consolas" pitchFamily="49" charset="0"/>
                 <a:cs typeface="Consolas" pitchFamily="49" charset="0"/>
               </a:rPr>
-              <a:t> * Closes the outermost scope.</a:t>
+              <a:t> * Opens a new scope for identifiers.</a:t>
             </a:r>
           </a:p>
           <a:p>
@@ -11161,7 +11212,21 @@
                 <a:latin typeface="Consolas" pitchFamily="49" charset="0"/>
                 <a:cs typeface="Consolas" pitchFamily="49" charset="0"/>
               </a:rPr>
-              <a:t>public void closeScope()</a:t>
+              <a:t>public void </a:t>
+            </a:r>
+            <a:r>
+              <a:rPr lang="en-US" sz="1800" dirty="0" err="1">
+                <a:latin typeface="Consolas" pitchFamily="49" charset="0"/>
+                <a:cs typeface="Consolas" pitchFamily="49" charset="0"/>
+              </a:rPr>
+              <a:t>openScope</a:t>
+            </a:r>
+            <a:r>
+              <a:rPr lang="en-US" sz="1800" dirty="0">
+                <a:latin typeface="Consolas" pitchFamily="49" charset="0"/>
+                <a:cs typeface="Consolas" pitchFamily="49" charset="0"/>
+              </a:rPr>
+              <a:t>()</a:t>
             </a:r>
           </a:p>
           <a:p>
@@ -11203,7 +11268,7 @@
                 <a:latin typeface="Consolas" pitchFamily="49" charset="0"/>
                 <a:cs typeface="Consolas" pitchFamily="49" charset="0"/>
               </a:rPr>
-              <a:t> * Add a declaration at the current scope level.</a:t>
+              <a:t> * Closes the outermost scope.</a:t>
             </a:r>
           </a:p>
           <a:p>
@@ -11218,7 +11283,7 @@
                 <a:latin typeface="Consolas" pitchFamily="49" charset="0"/>
                 <a:cs typeface="Consolas" pitchFamily="49" charset="0"/>
               </a:rPr>
-              <a:t> * @throws ParserException if the identifier token associated</a:t>
+              <a:t> */</a:t>
             </a:r>
           </a:p>
           <a:p>
@@ -11233,37 +11298,21 @@
                 <a:latin typeface="Consolas" pitchFamily="49" charset="0"/>
                 <a:cs typeface="Consolas" pitchFamily="49" charset="0"/>
               </a:rPr>
-              <a:t> *                         with the declaration is already</a:t>
-            </a:r>
-          </a:p>
-          <a:p>
-            <a:pPr marL="91440" indent="0">
-              <a:spcBef>
-                <a:spcPts val="0"/>
-              </a:spcBef>
-              <a:buNone/>
-            </a:pPr>
-            <a:r>
-              <a:rPr lang="en-US" sz="1800" dirty="0">
+              <a:t>public void </a:t>
+            </a:r>
+            <a:r>
+              <a:rPr lang="en-US" sz="1800" dirty="0" err="1">
                 <a:latin typeface="Consolas" pitchFamily="49" charset="0"/>
                 <a:cs typeface="Consolas" pitchFamily="49" charset="0"/>
               </a:rPr>
-              <a:t> *                         defined in the current scope.</a:t>
-            </a:r>
-          </a:p>
-          <a:p>
-            <a:pPr marL="91440" indent="0">
-              <a:spcBef>
-                <a:spcPts val="0"/>
-              </a:spcBef>
-              <a:buNone/>
-            </a:pPr>
+              <a:t>closeScope</a:t>
+            </a:r>
             <a:r>
               <a:rPr lang="en-US" sz="1800" dirty="0">
                 <a:latin typeface="Consolas" pitchFamily="49" charset="0"/>
                 <a:cs typeface="Consolas" pitchFamily="49" charset="0"/>
               </a:rPr>
-              <a:t> */</a:t>
+              <a:t>()</a:t>
             </a:r>
           </a:p>
           <a:p>
@@ -11273,13 +11322,10 @@
               </a:spcBef>
               <a:buNone/>
             </a:pPr>
-            <a:r>
-              <a:rPr lang="en-US" sz="1800" dirty="0">
-                <a:latin typeface="Consolas" pitchFamily="49" charset="0"/>
-                <a:cs typeface="Consolas" pitchFamily="49" charset="0"/>
-              </a:rPr>
-              <a:t>public void add(Declaration decl) throws ParserException</a:t>
-            </a:r>
+            <a:endParaRPr lang="en-US" sz="1800" dirty="0">
+              <a:latin typeface="Consolas" pitchFamily="49" charset="0"/>
+              <a:cs typeface="Consolas" pitchFamily="49" charset="0"/>
+            </a:endParaRPr>
           </a:p>
         </p:txBody>
       </p:sp>
@@ -11327,7 +11373,7 @@
               <a:defRPr/>
             </a:pPr>
             <a:r>
-              <a:rPr lang="en-US" dirty="0"/>
+              <a:rPr lang="en-US"/>
               <a:t>Slide </a:t>
             </a:r>
             <a:fld id="{0F05040F-3DD5-4422-8E21-6095A5B4132F}" type="slidenum">
@@ -11337,11 +11383,204 @@
               </a:pPr>
               <a:t>21</a:t>
             </a:fld>
-            <a:endParaRPr lang="en-US" dirty="0"/>
-          </a:p>
-        </p:txBody>
-      </p:sp>
+            <a:endParaRPr lang="en-US"/>
+          </a:p>
+        </p:txBody>
+      </p:sp>
+      <p:sp>
+        <p:nvSpPr>
+          <p:cNvPr id="6" name="TextBox 5">
+            <a:extLst>
+              <a:ext uri="{FF2B5EF4-FFF2-40B4-BE49-F238E27FC236}">
+                <a16:creationId xmlns:a16="http://schemas.microsoft.com/office/drawing/2014/main" id="{C65FA996-E692-477E-8CB0-D491030851D6}"/>
+              </a:ext>
+            </a:extLst>
+          </p:cNvPr>
+          <p:cNvSpPr txBox="1"/>
+          <p:nvPr/>
+        </p:nvSpPr>
+        <p:spPr>
+          <a:xfrm>
+            <a:off x="5616843" y="2413337"/>
+            <a:ext cx="3222357" cy="1015663"/>
+          </a:xfrm>
+          <a:prstGeom prst="rect">
+            <a:avLst/>
+          </a:prstGeom>
+          <a:noFill/>
+          <a:ln>
+            <a:solidFill>
+              <a:schemeClr val="tx1"/>
+            </a:solidFill>
+          </a:ln>
+        </p:spPr>
+        <p:txBody>
+          <a:bodyPr wrap="none" rtlCol="0">
+            <a:spAutoFit/>
+          </a:bodyPr>
+          <a:lstStyle/>
+          <a:p>
+            <a:pPr algn="l"/>
+            <a:r>
+              <a:rPr lang="en-US" sz="2000" dirty="0" err="1">
+                <a:latin typeface="Consolas" panose="020B0609020204030204" pitchFamily="49" charset="0"/>
+              </a:rPr>
+              <a:t>ScopeLevel</a:t>
+            </a:r>
+            <a:r>
+              <a:rPr lang="en-US" sz="2000" dirty="0"/>
+              <a:t> is an </a:t>
+            </a:r>
+            <a:r>
+              <a:rPr lang="en-US" sz="2000" dirty="0" err="1">
+                <a:latin typeface="Consolas" panose="020B0609020204030204" pitchFamily="49" charset="0"/>
+              </a:rPr>
+              <a:t>enum</a:t>
+            </a:r>
+            <a:br>
+              <a:rPr lang="en-US" sz="2000" dirty="0">
+                <a:latin typeface="Consolas" panose="020B0609020204030204" pitchFamily="49" charset="0"/>
+              </a:rPr>
+            </a:br>
+            <a:r>
+              <a:rPr lang="en-US" sz="2000" dirty="0"/>
+              <a:t>class with only two values,</a:t>
+            </a:r>
+            <a:br>
+              <a:rPr lang="en-US" sz="2000" dirty="0"/>
+            </a:br>
+            <a:r>
+              <a:rPr lang="en-US" sz="2000" dirty="0">
+                <a:latin typeface="Consolas" panose="020B0609020204030204" pitchFamily="49" charset="0"/>
+              </a:rPr>
+              <a:t>PROGRAM</a:t>
+            </a:r>
+            <a:r>
+              <a:rPr lang="en-US" sz="2000" dirty="0"/>
+              <a:t> and </a:t>
+            </a:r>
+            <a:r>
+              <a:rPr lang="en-US" sz="2000" dirty="0">
+                <a:latin typeface="Consolas" panose="020B0609020204030204" pitchFamily="49" charset="0"/>
+              </a:rPr>
+              <a:t>SUBPROGRAM</a:t>
+            </a:r>
+            <a:r>
+              <a:rPr lang="en-US" sz="2000" dirty="0"/>
+              <a:t>.</a:t>
+            </a:r>
+          </a:p>
+        </p:txBody>
+      </p:sp>
+      <p:sp>
+        <p:nvSpPr>
+          <p:cNvPr id="7" name="Diamond 6">
+            <a:extLst>
+              <a:ext uri="{FF2B5EF4-FFF2-40B4-BE49-F238E27FC236}">
+                <a16:creationId xmlns:a16="http://schemas.microsoft.com/office/drawing/2014/main" id="{54D2FBF8-47E5-42A2-9028-FA3EE27E6DEF}"/>
+              </a:ext>
+            </a:extLst>
+          </p:cNvPr>
+          <p:cNvSpPr/>
+          <p:nvPr/>
+        </p:nvSpPr>
+        <p:spPr bwMode="auto">
+          <a:xfrm>
+            <a:off x="2164773" y="2462645"/>
+            <a:ext cx="152400" cy="152400"/>
+          </a:xfrm>
+          <a:prstGeom prst="diamond">
+            <a:avLst/>
+          </a:prstGeom>
+          <a:noFill/>
+          <a:ln w="9525" cap="flat" cmpd="sng" algn="ctr">
+            <a:noFill/>
+            <a:prstDash val="solid"/>
+            <a:round/>
+            <a:headEnd type="none" w="med" len="med"/>
+            <a:tailEnd type="none" w="med" len="med"/>
+          </a:ln>
+          <a:effectLst/>
+        </p:spPr>
+        <p:txBody>
+          <a:bodyPr vert="horz" wrap="none" lIns="92075" tIns="46038" rIns="92075" bIns="46038" numCol="1" rtlCol="0" anchor="ctr" anchorCtr="0" compatLnSpc="1">
+            <a:prstTxWarp prst="textNoShape">
+              <a:avLst/>
+            </a:prstTxWarp>
+          </a:bodyPr>
+          <a:lstStyle/>
+          <a:p>
+            <a:pPr marL="0" marR="0" indent="0" algn="ctr" defTabSz="914400" rtl="0" eaLnBrk="0" fontAlgn="base" latinLnBrk="0" hangingPunct="0">
+              <a:lnSpc>
+                <a:spcPct val="100000"/>
+              </a:lnSpc>
+              <a:spcBef>
+                <a:spcPct val="0"/>
+              </a:spcBef>
+              <a:spcAft>
+                <a:spcPct val="0"/>
+              </a:spcAft>
+              <a:buClrTx/>
+              <a:buSzTx/>
+              <a:buFontTx/>
+              <a:buNone/>
+              <a:tabLst/>
+            </a:pPr>
+            <a:endParaRPr kumimoji="0" lang="en-US" sz="2400" b="0" i="0" u="none" strike="noStrike" cap="none" normalizeH="0" baseline="0">
+              <a:ln>
+                <a:noFill/>
+              </a:ln>
+              <a:solidFill>
+                <a:schemeClr val="tx1"/>
+              </a:solidFill>
+              <a:effectLst/>
+              <a:latin typeface="Arial" charset="0"/>
+            </a:endParaRPr>
+          </a:p>
+        </p:txBody>
+      </p:sp>
+      <p:cxnSp>
+        <p:nvCxnSpPr>
+          <p:cNvPr id="8" name="Elbow Connector 8">
+            <a:extLst>
+              <a:ext uri="{FF2B5EF4-FFF2-40B4-BE49-F238E27FC236}">
+                <a16:creationId xmlns:a16="http://schemas.microsoft.com/office/drawing/2014/main" id="{62320C38-430B-4FAB-96BF-AFD327EF7DC4}"/>
+              </a:ext>
+            </a:extLst>
+          </p:cNvPr>
+          <p:cNvCxnSpPr>
+            <a:stCxn id="6" idx="1"/>
+            <a:endCxn id="7" idx="2"/>
+          </p:cNvCxnSpPr>
+          <p:nvPr/>
+        </p:nvCxnSpPr>
+        <p:spPr bwMode="auto">
+          <a:xfrm rot="10800000">
+            <a:off x="2240973" y="2615045"/>
+            <a:ext cx="3375870" cy="306124"/>
+          </a:xfrm>
+          <a:prstGeom prst="bentConnector2">
+            <a:avLst/>
+          </a:prstGeom>
+          <a:noFill/>
+          <a:ln w="9525" cap="flat" cmpd="sng" algn="ctr">
+            <a:solidFill>
+              <a:schemeClr val="tx1"/>
+            </a:solidFill>
+            <a:prstDash val="solid"/>
+            <a:round/>
+            <a:headEnd type="none" w="med" len="med"/>
+            <a:tailEnd type="triangle"/>
+          </a:ln>
+          <a:effectLst/>
+        </p:spPr>
+      </p:cxnSp>
     </p:spTree>
+    <p:extLst>
+      <p:ext uri="{BB962C8B-B14F-4D97-AF65-F5344CB8AC3E}">
+        <p14:creationId xmlns:p14="http://schemas.microsoft.com/office/powerpoint/2010/main" val="3709065342"/>
+      </p:ext>
+    </p:extLst>
   </p:cSld>
   <p:clrMapOvr>
     <a:masterClrMapping/>
@@ -11435,7 +11674,7 @@
           <a:p>
             <a:pPr marL="91440" indent="0">
               <a:spcBef>
-                <a:spcPts val="100"/>
+                <a:spcPts val="0"/>
               </a:spcBef>
               <a:buNone/>
             </a:pPr>
@@ -11450,7 +11689,7 @@
           <a:p>
             <a:pPr marL="91440" indent="0">
               <a:spcBef>
-                <a:spcPts val="100"/>
+                <a:spcPts val="0"/>
               </a:spcBef>
               <a:buNone/>
             </a:pPr>
@@ -11459,13 +11698,13 @@
                 <a:latin typeface="Consolas" pitchFamily="49" charset="0"/>
                 <a:cs typeface="Consolas" pitchFamily="49" charset="0"/>
               </a:rPr>
-              <a:t> * Returns the Declaration associated with the identifier</a:t>
+              <a:t> * Add a declaration at the current scope level.</a:t>
             </a:r>
           </a:p>
           <a:p>
             <a:pPr marL="91440" indent="0">
               <a:spcBef>
-                <a:spcPts val="100"/>
+                <a:spcPts val="0"/>
               </a:spcBef>
               <a:buNone/>
             </a:pPr>
@@ -11474,75 +11713,103 @@
                 <a:latin typeface="Consolas" pitchFamily="49" charset="0"/>
                 <a:cs typeface="Consolas" pitchFamily="49" charset="0"/>
               </a:rPr>
-              <a:t> * token's text.  Returns null if the identifier is not found.  </a:t>
-            </a:r>
-          </a:p>
-          <a:p>
-            <a:pPr marL="91440" indent="0">
-              <a:spcBef>
-                <a:spcPts val="100"/>
-              </a:spcBef>
-              <a:buNone/>
-            </a:pPr>
-            <a:r>
-              <a:rPr lang="en-US" sz="1800" dirty="0">
-                <a:latin typeface="Consolas" pitchFamily="49" charset="0"/>
-                <a:cs typeface="Consolas" pitchFamily="49" charset="0"/>
-              </a:rPr>
-              <a:t> * Searches enclosing scopes if necessary.</a:t>
-            </a:r>
-          </a:p>
-          <a:p>
-            <a:pPr marL="91440" indent="0">
-              <a:spcBef>
-                <a:spcPts val="100"/>
-              </a:spcBef>
-              <a:buNone/>
-            </a:pPr>
-            <a:r>
-              <a:rPr lang="en-US" sz="1800" dirty="0">
-                <a:latin typeface="Consolas" pitchFamily="49" charset="0"/>
-                <a:cs typeface="Consolas" pitchFamily="49" charset="0"/>
-              </a:rPr>
-              <a:t> */</a:t>
-            </a:r>
-          </a:p>
-          <a:p>
-            <a:pPr marL="91440" indent="0">
-              <a:spcBef>
-                <a:spcPts val="100"/>
-              </a:spcBef>
-              <a:buNone/>
-            </a:pPr>
-            <a:r>
-              <a:rPr lang="en-US" sz="1800" dirty="0">
-                <a:latin typeface="Consolas" pitchFamily="49" charset="0"/>
-                <a:cs typeface="Consolas" pitchFamily="49" charset="0"/>
-              </a:rPr>
-              <a:t>public Declaration get(Token </a:t>
+              <a:t> * @throws </a:t>
             </a:r>
             <a:r>
               <a:rPr lang="en-US" sz="1800" dirty="0" err="1">
                 <a:latin typeface="Consolas" pitchFamily="49" charset="0"/>
                 <a:cs typeface="Consolas" pitchFamily="49" charset="0"/>
               </a:rPr>
-              <a:t>idToken</a:t>
+              <a:t>ParserException</a:t>
             </a:r>
             <a:r>
               <a:rPr lang="en-US" sz="1800" dirty="0">
                 <a:latin typeface="Consolas" pitchFamily="49" charset="0"/>
                 <a:cs typeface="Consolas" pitchFamily="49" charset="0"/>
               </a:rPr>
-              <a:t>)</a:t>
+              <a:t> if the identifier token associated</a:t>
             </a:r>
           </a:p>
           <a:p>
             <a:pPr marL="91440" indent="0">
               <a:spcBef>
-                <a:spcPts val="100"/>
-              </a:spcBef>
-              <a:buNone/>
-            </a:pPr>
+                <a:spcPts val="0"/>
+              </a:spcBef>
+              <a:buNone/>
+            </a:pPr>
+            <a:r>
+              <a:rPr lang="en-US" sz="1800" dirty="0">
+                <a:latin typeface="Consolas" pitchFamily="49" charset="0"/>
+                <a:cs typeface="Consolas" pitchFamily="49" charset="0"/>
+              </a:rPr>
+              <a:t> *                         with the declaration is already</a:t>
+            </a:r>
+          </a:p>
+          <a:p>
+            <a:pPr marL="91440" indent="0">
+              <a:spcBef>
+                <a:spcPts val="0"/>
+              </a:spcBef>
+              <a:buNone/>
+            </a:pPr>
+            <a:r>
+              <a:rPr lang="en-US" sz="1800" dirty="0">
+                <a:latin typeface="Consolas" pitchFamily="49" charset="0"/>
+                <a:cs typeface="Consolas" pitchFamily="49" charset="0"/>
+              </a:rPr>
+              <a:t> *                         defined in the current scope.</a:t>
+            </a:r>
+          </a:p>
+          <a:p>
+            <a:pPr marL="91440" indent="0">
+              <a:spcBef>
+                <a:spcPts val="0"/>
+              </a:spcBef>
+              <a:buNone/>
+            </a:pPr>
+            <a:r>
+              <a:rPr lang="en-US" sz="1800" dirty="0">
+                <a:latin typeface="Consolas" pitchFamily="49" charset="0"/>
+                <a:cs typeface="Consolas" pitchFamily="49" charset="0"/>
+              </a:rPr>
+              <a:t> */</a:t>
+            </a:r>
+          </a:p>
+          <a:p>
+            <a:pPr marL="91440" indent="0">
+              <a:spcBef>
+                <a:spcPts val="0"/>
+              </a:spcBef>
+              <a:buNone/>
+            </a:pPr>
+            <a:r>
+              <a:rPr lang="en-US" sz="1800" dirty="0">
+                <a:latin typeface="Consolas" pitchFamily="49" charset="0"/>
+                <a:cs typeface="Consolas" pitchFamily="49" charset="0"/>
+              </a:rPr>
+              <a:t>public void add(Declaration </a:t>
+            </a:r>
+            <a:r>
+              <a:rPr lang="en-US" sz="1800" dirty="0" err="1">
+                <a:latin typeface="Consolas" pitchFamily="49" charset="0"/>
+                <a:cs typeface="Consolas" pitchFamily="49" charset="0"/>
+              </a:rPr>
+              <a:t>decl</a:t>
+            </a:r>
+            <a:r>
+              <a:rPr lang="en-US" sz="1800" dirty="0">
+                <a:latin typeface="Consolas" pitchFamily="49" charset="0"/>
+                <a:cs typeface="Consolas" pitchFamily="49" charset="0"/>
+              </a:rPr>
+              <a:t>) throws </a:t>
+            </a:r>
+            <a:r>
+              <a:rPr lang="en-US" sz="1800" dirty="0" err="1">
+                <a:latin typeface="Consolas" pitchFamily="49" charset="0"/>
+                <a:cs typeface="Consolas" pitchFamily="49" charset="0"/>
+              </a:rPr>
+              <a:t>ParserException</a:t>
+            </a:r>
             <a:endParaRPr lang="en-US" sz="1800" dirty="0">
               <a:latin typeface="Consolas" pitchFamily="49" charset="0"/>
               <a:cs typeface="Consolas" pitchFamily="49" charset="0"/>
@@ -11555,6 +11822,18 @@
               </a:spcBef>
               <a:buNone/>
             </a:pPr>
+            <a:endParaRPr lang="en-US" sz="1800" dirty="0">
+              <a:latin typeface="Consolas" pitchFamily="49" charset="0"/>
+              <a:cs typeface="Consolas" pitchFamily="49" charset="0"/>
+            </a:endParaRPr>
+          </a:p>
+          <a:p>
+            <a:pPr marL="91440" indent="0">
+              <a:spcBef>
+                <a:spcPts val="100"/>
+              </a:spcBef>
+              <a:buNone/>
+            </a:pPr>
             <a:r>
               <a:rPr lang="en-US" sz="1800" dirty="0">
                 <a:latin typeface="Consolas" pitchFamily="49" charset="0"/>
@@ -11575,7 +11854,7 @@
                 <a:latin typeface="Consolas" pitchFamily="49" charset="0"/>
                 <a:cs typeface="Consolas" pitchFamily="49" charset="0"/>
               </a:rPr>
-              <a:t> * Returns the current scope level.</a:t>
+              <a:t> * Returns the Declaration associated with the identifier</a:t>
             </a:r>
           </a:p>
           <a:p>
@@ -11590,7 +11869,7 @@
                 <a:latin typeface="Consolas" pitchFamily="49" charset="0"/>
                 <a:cs typeface="Consolas" pitchFamily="49" charset="0"/>
               </a:rPr>
-              <a:t> */</a:t>
+              <a:t> * token's text.  Returns null if the identifier is not found.  </a:t>
             </a:r>
           </a:p>
           <a:p>
@@ -11605,35 +11884,51 @@
                 <a:latin typeface="Consolas" pitchFamily="49" charset="0"/>
                 <a:cs typeface="Consolas" pitchFamily="49" charset="0"/>
               </a:rPr>
-              <a:t>public </a:t>
+              <a:t> * Searches enclosing scopes if necessary.</a:t>
+            </a:r>
+          </a:p>
+          <a:p>
+            <a:pPr marL="91440" indent="0">
+              <a:spcBef>
+                <a:spcPts val="100"/>
+              </a:spcBef>
+              <a:buNone/>
+            </a:pPr>
+            <a:r>
+              <a:rPr lang="en-US" sz="1800" dirty="0">
+                <a:latin typeface="Consolas" pitchFamily="49" charset="0"/>
+                <a:cs typeface="Consolas" pitchFamily="49" charset="0"/>
+              </a:rPr>
+              <a:t> */</a:t>
+            </a:r>
+          </a:p>
+          <a:p>
+            <a:pPr marL="91440" indent="0">
+              <a:spcBef>
+                <a:spcPts val="100"/>
+              </a:spcBef>
+              <a:buNone/>
+            </a:pPr>
+            <a:r>
+              <a:rPr lang="en-US" sz="1800" dirty="0">
+                <a:latin typeface="Consolas" pitchFamily="49" charset="0"/>
+                <a:cs typeface="Consolas" pitchFamily="49" charset="0"/>
+              </a:rPr>
+              <a:t>public Declaration get(Token </a:t>
             </a:r>
             <a:r>
               <a:rPr lang="en-US" sz="1800" dirty="0" err="1">
                 <a:latin typeface="Consolas" pitchFamily="49" charset="0"/>
                 <a:cs typeface="Consolas" pitchFamily="49" charset="0"/>
               </a:rPr>
-              <a:t>ScopeLevel</a:t>
+              <a:t>idToken</a:t>
             </a:r>
             <a:r>
               <a:rPr lang="en-US" sz="1800" dirty="0">
                 <a:latin typeface="Consolas" pitchFamily="49" charset="0"/>
                 <a:cs typeface="Consolas" pitchFamily="49" charset="0"/>
               </a:rPr>
-              <a:t> </a:t>
-            </a:r>
-            <a:r>
-              <a:rPr lang="en-US" sz="1800" dirty="0" err="1">
-                <a:latin typeface="Consolas" pitchFamily="49" charset="0"/>
-                <a:cs typeface="Consolas" pitchFamily="49" charset="0"/>
-              </a:rPr>
-              <a:t>getCurrentLevel</a:t>
-            </a:r>
-            <a:r>
-              <a:rPr lang="en-US" sz="1800" dirty="0">
-                <a:latin typeface="Consolas" pitchFamily="49" charset="0"/>
-                <a:cs typeface="Consolas" pitchFamily="49" charset="0"/>
-              </a:rPr>
-              <a:t>()</a:t>
+              <a:t>)</a:t>
             </a:r>
           </a:p>
           <a:p>
@@ -11708,183 +12003,10 @@
           </a:p>
         </p:txBody>
       </p:sp>
-      <p:sp>
-        <p:nvSpPr>
-          <p:cNvPr id="6" name="TextBox 5"/>
-          <p:cNvSpPr txBox="1"/>
-          <p:nvPr/>
-        </p:nvSpPr>
-        <p:spPr>
-          <a:xfrm>
-            <a:off x="2819400" y="4945559"/>
-            <a:ext cx="5622052" cy="769441"/>
-          </a:xfrm>
-          <a:prstGeom prst="rect">
-            <a:avLst/>
-          </a:prstGeom>
-          <a:noFill/>
-          <a:ln>
-            <a:solidFill>
-              <a:schemeClr val="tx1"/>
-            </a:solidFill>
-          </a:ln>
-        </p:spPr>
-        <p:txBody>
-          <a:bodyPr wrap="none" rtlCol="0">
-            <a:spAutoFit/>
-          </a:bodyPr>
-          <a:lstStyle/>
-          <a:p>
-            <a:pPr algn="l"/>
-            <a:r>
-              <a:rPr lang="en-US" sz="2200" dirty="0"/>
-              <a:t>Note:  </a:t>
-            </a:r>
-            <a:r>
-              <a:rPr lang="en-US" sz="2200" dirty="0" err="1">
-                <a:latin typeface="Consolas" panose="020B0609020204030204" pitchFamily="49" charset="0"/>
-              </a:rPr>
-              <a:t>ScopeLevel</a:t>
-            </a:r>
-            <a:r>
-              <a:rPr lang="en-US" sz="2200" dirty="0"/>
-              <a:t> is an </a:t>
-            </a:r>
-            <a:r>
-              <a:rPr lang="en-US" sz="2200" dirty="0" err="1">
-                <a:latin typeface="Consolas" panose="020B0609020204030204" pitchFamily="49" charset="0"/>
-              </a:rPr>
-              <a:t>enum</a:t>
-            </a:r>
-            <a:r>
-              <a:rPr lang="en-US" sz="2200" dirty="0"/>
-              <a:t> class with</a:t>
-            </a:r>
-          </a:p>
-          <a:p>
-            <a:pPr algn="l"/>
-            <a:r>
-              <a:rPr lang="en-US" sz="2200" dirty="0"/>
-              <a:t>only two values, </a:t>
-            </a:r>
-            <a:r>
-              <a:rPr lang="en-US" sz="2200" dirty="0">
-                <a:latin typeface="Consolas" panose="020B0609020204030204" pitchFamily="49" charset="0"/>
-              </a:rPr>
-              <a:t>PROGRAM</a:t>
-            </a:r>
-            <a:r>
-              <a:rPr lang="en-US" sz="2200" dirty="0"/>
-              <a:t> and </a:t>
-            </a:r>
-            <a:r>
-              <a:rPr lang="en-US" sz="2200" dirty="0">
-                <a:latin typeface="Consolas" panose="020B0609020204030204" pitchFamily="49" charset="0"/>
-              </a:rPr>
-              <a:t>SUBPROGRAM</a:t>
-            </a:r>
-            <a:r>
-              <a:rPr lang="en-US" sz="2200" dirty="0"/>
-              <a:t>.</a:t>
-            </a:r>
-          </a:p>
-        </p:txBody>
-      </p:sp>
-      <p:sp>
-        <p:nvSpPr>
-          <p:cNvPr id="7" name="Diamond 6"/>
-          <p:cNvSpPr/>
-          <p:nvPr/>
-        </p:nvSpPr>
-        <p:spPr bwMode="auto">
-          <a:xfrm>
-            <a:off x="2151549" y="4470429"/>
-            <a:ext cx="152400" cy="152400"/>
-          </a:xfrm>
-          <a:prstGeom prst="diamond">
-            <a:avLst/>
-          </a:prstGeom>
-          <a:noFill/>
-          <a:ln w="9525" cap="flat" cmpd="sng" algn="ctr">
-            <a:noFill/>
-            <a:prstDash val="solid"/>
-            <a:round/>
-            <a:headEnd type="none" w="med" len="med"/>
-            <a:tailEnd type="none" w="med" len="med"/>
-          </a:ln>
-          <a:effectLst/>
-        </p:spPr>
-        <p:txBody>
-          <a:bodyPr vert="horz" wrap="none" lIns="92075" tIns="46038" rIns="92075" bIns="46038" numCol="1" rtlCol="0" anchor="ctr" anchorCtr="0" compatLnSpc="1">
-            <a:prstTxWarp prst="textNoShape">
-              <a:avLst/>
-            </a:prstTxWarp>
-          </a:bodyPr>
-          <a:lstStyle/>
-          <a:p>
-            <a:pPr marL="0" marR="0" indent="0" algn="ctr" defTabSz="914400" rtl="0" eaLnBrk="0" fontAlgn="base" latinLnBrk="0" hangingPunct="0">
-              <a:lnSpc>
-                <a:spcPct val="100000"/>
-              </a:lnSpc>
-              <a:spcBef>
-                <a:spcPct val="0"/>
-              </a:spcBef>
-              <a:spcAft>
-                <a:spcPct val="0"/>
-              </a:spcAft>
-              <a:buClrTx/>
-              <a:buSzTx/>
-              <a:buFontTx/>
-              <a:buNone/>
-              <a:tabLst/>
-            </a:pPr>
-            <a:endParaRPr kumimoji="0" lang="en-US" sz="2400" b="0" i="0" u="none" strike="noStrike" cap="none" normalizeH="0" baseline="0">
-              <a:ln>
-                <a:noFill/>
-              </a:ln>
-              <a:solidFill>
-                <a:schemeClr val="tx1"/>
-              </a:solidFill>
-              <a:effectLst/>
-              <a:latin typeface="Arial" charset="0"/>
-            </a:endParaRPr>
-          </a:p>
-        </p:txBody>
-      </p:sp>
-      <p:cxnSp>
-        <p:nvCxnSpPr>
-          <p:cNvPr id="9" name="Elbow Connector 8"/>
-          <p:cNvCxnSpPr>
-            <a:stCxn id="6" idx="1"/>
-            <a:endCxn id="7" idx="2"/>
-          </p:cNvCxnSpPr>
-          <p:nvPr/>
-        </p:nvCxnSpPr>
-        <p:spPr bwMode="auto">
-          <a:xfrm rot="10800000">
-            <a:off x="2227750" y="4622830"/>
-            <a:ext cx="591651" cy="707451"/>
-          </a:xfrm>
-          <a:prstGeom prst="bentConnector2">
-            <a:avLst/>
-          </a:prstGeom>
-          <a:noFill/>
-          <a:ln w="9525" cap="flat" cmpd="sng" algn="ctr">
-            <a:solidFill>
-              <a:schemeClr val="tx1"/>
-            </a:solidFill>
-            <a:prstDash val="solid"/>
-            <a:round/>
-            <a:headEnd type="none" w="med" len="med"/>
-            <a:tailEnd type="triangle"/>
-          </a:ln>
-          <a:effectLst/>
-        </p:spPr>
-      </p:cxnSp>
     </p:spTree>
     <p:extLst>
       <p:ext uri="{BB962C8B-B14F-4D97-AF65-F5344CB8AC3E}">
-        <p14:creationId xmlns:p14="http://schemas.microsoft.com/office/powerpoint/2010/main" val="2283086165"/>
+        <p14:creationId xmlns:p14="http://schemas.microsoft.com/office/powerpoint/2010/main" val="3655652361"/>
       </p:ext>
     </p:extLst>
   </p:cSld>
@@ -12086,7 +12208,7 @@
               <a:buNone/>
             </a:pPr>
             <a:r>
-              <a:rPr lang="en-US" sz="1800" dirty="0">
+              <a:rPr lang="en-US" sz="1800" b="1" dirty="0">
                 <a:latin typeface="Consolas" panose="020B0609020204030204" pitchFamily="49" charset="0"/>
               </a:rPr>
               <a:t>idTable.add(constDecl);</a:t>
@@ -12344,14 +12466,18 @@
               <a:t>Identifiers declared using </a:t>
             </a:r>
             <a:r>
-              <a:rPr lang="en-US" dirty="0">
+              <a:rPr lang="en-US" dirty="0" err="1">
                 <a:latin typeface="Consolas" panose="020B0609020204030204" pitchFamily="49" charset="0"/>
               </a:rPr>
               <a:t>VarDecl</a:t>
             </a:r>
             <a:r>
-              <a:rPr lang="en-US" dirty="0"/>
-              <a:t> ( which we convert to a list of </a:t>
+              <a:rPr lang="en-US"/>
+              <a:t> (which </a:t>
+            </a:r>
+            <a:r>
+              <a:rPr lang="en-US" dirty="0"/>
+              <a:t>we convert to a list of </a:t>
             </a:r>
             <a:r>
               <a:rPr lang="en-US" dirty="0">
@@ -15751,7 +15877,7 @@
               <a:t>Class </a:t>
             </a:r>
             <a:r>
-              <a:rPr lang="en-US" sz="2350" dirty="0">
+              <a:rPr lang="en-US" sz="2350" dirty="0" err="1">
                 <a:latin typeface="Consolas" panose="020B0609020204030204" pitchFamily="49" charset="0"/>
               </a:rPr>
               <a:t>IdTable</a:t>
@@ -15761,10 +15887,16 @@
               <a:t> contains a method </a:t>
             </a:r>
             <a:r>
+              <a:rPr lang="en-US" sz="2350" dirty="0" err="1">
+                <a:latin typeface="Consolas" panose="020B0609020204030204" pitchFamily="49" charset="0"/>
+              </a:rPr>
+              <a:t>getScopeLevel</a:t>
+            </a:r>
+            <a:r>
               <a:rPr lang="en-US" sz="2350" dirty="0">
                 <a:latin typeface="Consolas" panose="020B0609020204030204" pitchFamily="49" charset="0"/>
               </a:rPr>
-              <a:t>getCurrentLevel()</a:t>
+              <a:t>()</a:t>
             </a:r>
             <a:r>
               <a:rPr lang="en-US" sz="2350" dirty="0"/>
@@ -15813,48 +15945,75 @@
           </a:p>
           <a:p>
             <a:pPr marL="457200" lvl="1" indent="0">
-              <a:buNone/>
-            </a:pPr>
-            <a:r>
-              <a:rPr lang="en-US" sz="1800" dirty="0">
-                <a:latin typeface="Consolas" panose="020B0609020204030204" pitchFamily="49" charset="0"/>
-              </a:rPr>
-              <a:t>ScopeLevel </a:t>
-            </a:r>
+              <a:spcBef>
+                <a:spcPts val="300"/>
+              </a:spcBef>
+              <a:buNone/>
+            </a:pPr>
             <a:r>
               <a:rPr lang="en-US" sz="1800" dirty="0" err="1">
                 <a:latin typeface="Consolas" panose="020B0609020204030204" pitchFamily="49" charset="0"/>
               </a:rPr>
-              <a:t>scopeLevel</a:t>
-            </a:r>
-            <a:r>
-              <a:rPr lang="en-US" sz="1800" dirty="0">
-                <a:latin typeface="Consolas" panose="020B0609020204030204" pitchFamily="49" charset="0"/>
-              </a:rPr>
-              <a:t> = idTable.getCurrentLevel();</a:t>
-            </a:r>
-          </a:p>
-          <a:p>
-            <a:pPr marL="457200" lvl="1" indent="0">
-              <a:buNone/>
-            </a:pPr>
-            <a:r>
-              <a:rPr lang="en-US" sz="1800" dirty="0">
-                <a:latin typeface="Consolas" panose="020B0609020204030204" pitchFamily="49" charset="0"/>
-              </a:rPr>
-              <a:t>varDecl = new VarDecl(identifiers, varType, </a:t>
+              <a:t>varDecl</a:t>
+            </a:r>
+            <a:r>
+              <a:rPr lang="en-US" sz="1800" dirty="0">
+                <a:latin typeface="Consolas" panose="020B0609020204030204" pitchFamily="49" charset="0"/>
+              </a:rPr>
+              <a:t> = new </a:t>
             </a:r>
             <a:r>
               <a:rPr lang="en-US" sz="1800" dirty="0" err="1">
                 <a:latin typeface="Consolas" panose="020B0609020204030204" pitchFamily="49" charset="0"/>
               </a:rPr>
-              <a:t>scopeLevel</a:t>
-            </a:r>
-            <a:r>
-              <a:rPr lang="en-US" sz="1800" dirty="0">
-                <a:latin typeface="Consolas" panose="020B0609020204030204" pitchFamily="49" charset="0"/>
-              </a:rPr>
-              <a:t>);</a:t>
+              <a:t>VarDecl</a:t>
+            </a:r>
+            <a:r>
+              <a:rPr lang="en-US" sz="1800" dirty="0">
+                <a:latin typeface="Consolas" panose="020B0609020204030204" pitchFamily="49" charset="0"/>
+              </a:rPr>
+              <a:t>(identifiers, </a:t>
+            </a:r>
+            <a:r>
+              <a:rPr lang="en-US" sz="1800" dirty="0" err="1">
+                <a:latin typeface="Consolas" panose="020B0609020204030204" pitchFamily="49" charset="0"/>
+              </a:rPr>
+              <a:t>varType</a:t>
+            </a:r>
+            <a:r>
+              <a:rPr lang="en-US" sz="1800" dirty="0">
+                <a:latin typeface="Consolas" panose="020B0609020204030204" pitchFamily="49" charset="0"/>
+              </a:rPr>
+              <a:t>,</a:t>
+            </a:r>
+            <a:br>
+              <a:rPr lang="en-US" sz="1800" dirty="0">
+                <a:latin typeface="Consolas" panose="020B0609020204030204" pitchFamily="49" charset="0"/>
+              </a:rPr>
+            </a:br>
+            <a:r>
+              <a:rPr lang="en-US" sz="1800" dirty="0">
+                <a:latin typeface="Consolas" panose="020B0609020204030204" pitchFamily="49" charset="0"/>
+              </a:rPr>
+              <a:t>                      </a:t>
+            </a:r>
+            <a:r>
+              <a:rPr lang="en-US" sz="1800" b="1" dirty="0" err="1">
+                <a:latin typeface="Consolas" panose="020B0609020204030204" pitchFamily="49" charset="0"/>
+              </a:rPr>
+              <a:t>idTable.getScopeLevel</a:t>
+            </a:r>
+            <a:r>
+              <a:rPr lang="en-US" sz="1800" b="1" dirty="0">
+                <a:latin typeface="Consolas" panose="020B0609020204030204" pitchFamily="49" charset="0"/>
+              </a:rPr>
+              <a:t>()</a:t>
+            </a:r>
+            <a:r>
+              <a:rPr lang="en-US" sz="1800" dirty="0">
+                <a:latin typeface="Consolas" panose="020B0609020204030204" pitchFamily="49" charset="0"/>
+              </a:rPr>
+              <a:t>;</a:t>
             </a:r>
           </a:p>
         </p:txBody>
@@ -15878,7 +16037,7 @@
               <a:defRPr/>
             </a:pPr>
             <a:r>
-              <a:rPr lang="en-US" dirty="0"/>
+              <a:rPr lang="en-US"/>
               <a:t>©SoftMoore Consulting</a:t>
             </a:r>
           </a:p>
@@ -15903,7 +16062,7 @@
               <a:defRPr/>
             </a:pPr>
             <a:r>
-              <a:rPr lang="en-US" dirty="0"/>
+              <a:rPr lang="en-US"/>
               <a:t>Slide </a:t>
             </a:r>
             <a:fld id="{A413A2F6-7BFD-463C-B63A-922040FAF32C}" type="slidenum">
@@ -15913,14 +16072,14 @@
               </a:pPr>
               <a:t>35</a:t>
             </a:fld>
-            <a:endParaRPr lang="en-US" dirty="0"/>
+            <a:endParaRPr lang="en-US"/>
           </a:p>
         </p:txBody>
       </p:sp>
     </p:spTree>
     <p:extLst>
       <p:ext uri="{BB962C8B-B14F-4D97-AF65-F5344CB8AC3E}">
-        <p14:creationId xmlns:p14="http://schemas.microsoft.com/office/powerpoint/2010/main" val="954270582"/>
+        <p14:creationId xmlns:p14="http://schemas.microsoft.com/office/powerpoint/2010/main" val="720601150"/>
       </p:ext>
     </p:extLst>
   </p:cSld>
@@ -24502,7 +24661,7 @@
         <p:spPr>
           <a:xfrm>
             <a:off x="458788" y="1363663"/>
-            <a:ext cx="8503920" cy="4935537"/>
+            <a:ext cx="8229600" cy="4935537"/>
           </a:xfrm>
         </p:spPr>
         <p:txBody>
@@ -24516,7 +24675,7 @@
               <a:buNone/>
             </a:pPr>
             <a:r>
-              <a:rPr lang="en-US" sz="1700" dirty="0">
+              <a:rPr lang="en-US" sz="1800" dirty="0">
                 <a:latin typeface="Consolas" pitchFamily="49" charset="0"/>
                 <a:cs typeface="Consolas" pitchFamily="49" charset="0"/>
               </a:rPr>
@@ -24531,7 +24690,7 @@
               <a:buNone/>
             </a:pPr>
             <a:r>
-              <a:rPr lang="en-US" sz="1700" dirty="0">
+              <a:rPr lang="en-US" sz="1800" dirty="0">
                 <a:latin typeface="Consolas" pitchFamily="49" charset="0"/>
                 <a:cs typeface="Consolas" pitchFamily="49" charset="0"/>
               </a:rPr>
@@ -24546,7 +24705,7 @@
               <a:buNone/>
             </a:pPr>
             <a:r>
-              <a:rPr lang="en-US" sz="1700" dirty="0">
+              <a:rPr lang="en-US" sz="1800" dirty="0">
                 <a:latin typeface="Consolas" pitchFamily="49" charset="0"/>
                 <a:cs typeface="Consolas" pitchFamily="49" charset="0"/>
               </a:rPr>
@@ -24561,7 +24720,7 @@
               <a:buNone/>
             </a:pPr>
             <a:r>
-              <a:rPr lang="en-US" sz="1700" dirty="0">
+              <a:rPr lang="en-US" sz="1800" dirty="0">
                 <a:latin typeface="Consolas" pitchFamily="49" charset="0"/>
                 <a:cs typeface="Consolas" pitchFamily="49" charset="0"/>
               </a:rPr>
@@ -24575,7 +24734,7 @@
               </a:spcBef>
               <a:buNone/>
             </a:pPr>
-            <a:endParaRPr lang="en-US" sz="1700" dirty="0">
+            <a:endParaRPr lang="en-US" sz="1800" dirty="0">
               <a:latin typeface="Consolas" pitchFamily="49" charset="0"/>
               <a:cs typeface="Consolas" pitchFamily="49" charset="0"/>
             </a:endParaRPr>
@@ -24588,41 +24747,25 @@
               <a:buNone/>
             </a:pPr>
             <a:r>
-              <a:rPr lang="en-US" sz="1700" dirty="0">
+              <a:rPr lang="en-US" sz="1800" dirty="0">
                 <a:latin typeface="Consolas" pitchFamily="49" charset="0"/>
                 <a:cs typeface="Consolas" pitchFamily="49" charset="0"/>
               </a:rPr>
-              <a:t>    public LoopStmt(Expression whileExpr, List&lt;Statement&gt; statements)</a:t>
-            </a:r>
-          </a:p>
-          <a:p>
-            <a:pPr marL="0" indent="0">
-              <a:spcBef>
-                <a:spcPts val="200"/>
-              </a:spcBef>
-              <a:buNone/>
-            </a:pPr>
-            <a:r>
-              <a:rPr lang="en-US" sz="1700" dirty="0">
+              <a:t>    public LoopStmt(Expression </a:t>
+            </a:r>
+            <a:r>
+              <a:rPr lang="en-US" sz="1800" dirty="0" err="1">
                 <a:latin typeface="Consolas" pitchFamily="49" charset="0"/>
                 <a:cs typeface="Consolas" pitchFamily="49" charset="0"/>
               </a:rPr>
-              <a:t>      {</a:t>
-            </a:r>
-          </a:p>
-          <a:p>
-            <a:pPr marL="0" indent="0">
-              <a:spcBef>
-                <a:spcPts val="200"/>
-              </a:spcBef>
-              <a:buNone/>
-            </a:pPr>
-            <a:r>
-              <a:rPr lang="en-US" sz="1700" dirty="0">
+              <a:t>whileExpr</a:t>
+            </a:r>
+            <a:r>
+              <a:rPr lang="en-US" sz="1800" dirty="0">
                 <a:latin typeface="Consolas" pitchFamily="49" charset="0"/>
                 <a:cs typeface="Consolas" pitchFamily="49" charset="0"/>
               </a:rPr>
-              <a:t>        this.whileExpr  = whileExpr;</a:t>
+              <a:t>,</a:t>
             </a:r>
           </a:p>
           <a:p>
@@ -24633,11 +24776,11 @@
               <a:buNone/>
             </a:pPr>
             <a:r>
-              <a:rPr lang="en-US" sz="1700" dirty="0">
+              <a:rPr lang="en-US" sz="1800" dirty="0">
                 <a:latin typeface="Consolas" pitchFamily="49" charset="0"/>
                 <a:cs typeface="Consolas" pitchFamily="49" charset="0"/>
               </a:rPr>
-              <a:t>        this.statements = statements;</a:t>
+              <a:t>                    List&lt;Statement&gt; statements)</a:t>
             </a:r>
           </a:p>
           <a:p>
@@ -24648,11 +24791,11 @@
               <a:buNone/>
             </a:pPr>
             <a:r>
-              <a:rPr lang="en-US" sz="1700" dirty="0">
+              <a:rPr lang="en-US" sz="1800" dirty="0">
                 <a:latin typeface="Consolas" pitchFamily="49" charset="0"/>
                 <a:cs typeface="Consolas" pitchFamily="49" charset="0"/>
               </a:rPr>
-              <a:t>        ...</a:t>
+              <a:t>      {</a:t>
             </a:r>
           </a:p>
           <a:p>
@@ -24663,11 +24806,11 @@
               <a:buNone/>
             </a:pPr>
             <a:r>
-              <a:rPr lang="en-US" sz="1700" dirty="0">
+              <a:rPr lang="en-US" sz="1800" dirty="0">
                 <a:latin typeface="Consolas" pitchFamily="49" charset="0"/>
                 <a:cs typeface="Consolas" pitchFamily="49" charset="0"/>
               </a:rPr>
-              <a:t>      }</a:t>
+              <a:t>        this.whileExpr  = whileExpr;</a:t>
             </a:r>
           </a:p>
           <a:p>
@@ -24678,10 +24821,55 @@
               <a:buNone/>
             </a:pPr>
             <a:r>
-              <a:rPr lang="en-US" sz="1700" dirty="0">
+              <a:rPr lang="en-US" sz="1800" dirty="0">
                 <a:latin typeface="Consolas" pitchFamily="49" charset="0"/>
                 <a:cs typeface="Consolas" pitchFamily="49" charset="0"/>
               </a:rPr>
+              <a:t>        this.statements = statements;</a:t>
+            </a:r>
+          </a:p>
+          <a:p>
+            <a:pPr marL="0" indent="0">
+              <a:spcBef>
+                <a:spcPts val="200"/>
+              </a:spcBef>
+              <a:buNone/>
+            </a:pPr>
+            <a:r>
+              <a:rPr lang="en-US" sz="1800" dirty="0">
+                <a:latin typeface="Consolas" pitchFamily="49" charset="0"/>
+                <a:cs typeface="Consolas" pitchFamily="49" charset="0"/>
+              </a:rPr>
+              <a:t>        ...</a:t>
+            </a:r>
+          </a:p>
+          <a:p>
+            <a:pPr marL="0" indent="0">
+              <a:spcBef>
+                <a:spcPts val="200"/>
+              </a:spcBef>
+              <a:buNone/>
+            </a:pPr>
+            <a:r>
+              <a:rPr lang="en-US" sz="1800" dirty="0">
+                <a:latin typeface="Consolas" pitchFamily="49" charset="0"/>
+                <a:cs typeface="Consolas" pitchFamily="49" charset="0"/>
+              </a:rPr>
+              <a:t>      }</a:t>
+            </a:r>
+          </a:p>
+          <a:p>
+            <a:pPr marL="0" indent="0">
+              <a:spcBef>
+                <a:spcPts val="200"/>
+              </a:spcBef>
+              <a:buNone/>
+            </a:pPr>
+            <a:r>
+              <a:rPr lang="en-US" sz="1800" dirty="0">
+                <a:latin typeface="Consolas" pitchFamily="49" charset="0"/>
+                <a:cs typeface="Consolas" pitchFamily="49" charset="0"/>
+              </a:rPr>
               <a:t>    ...</a:t>
             </a:r>
           </a:p>
@@ -24693,7 +24881,7 @@
               <a:buNone/>
             </a:pPr>
             <a:r>
-              <a:rPr lang="en-US" sz="1700" dirty="0">
+              <a:rPr lang="en-US" sz="1800" dirty="0">
                 <a:latin typeface="Consolas" pitchFamily="49" charset="0"/>
                 <a:cs typeface="Consolas" pitchFamily="49" charset="0"/>
               </a:rPr>
@@ -24768,7 +24956,7 @@
         </p:nvSpPr>
         <p:spPr>
           <a:xfrm>
-            <a:off x="2217830" y="5329535"/>
+            <a:off x="2217830" y="5710535"/>
             <a:ext cx="4708341" cy="461665"/>
           </a:xfrm>
           <a:prstGeom prst="rect">

</xml_diff>

<commit_message>
added a slide on structural versus nonstructural references in the AST classes
</commit_message>
<xml_diff>
--- a/PowerPoint Slides/08 - Abstract Syntax Trees.pptx
+++ b/PowerPoint Slides/08 - Abstract Syntax Trees.pptx
@@ -5,10 +5,10 @@
     <p:sldMasterId id="2147483651" r:id="rId1"/>
   </p:sldMasterIdLst>
   <p:notesMasterIdLst>
-    <p:notesMasterId r:id="rId57"/>
+    <p:notesMasterId r:id="rId58"/>
   </p:notesMasterIdLst>
   <p:handoutMasterIdLst>
-    <p:handoutMasterId r:id="rId58"/>
+    <p:handoutMasterId r:id="rId59"/>
   </p:handoutMasterIdLst>
   <p:sldIdLst>
     <p:sldId id="256" r:id="rId2"/>
@@ -52,20 +52,21 @@
     <p:sldId id="316" r:id="rId40"/>
     <p:sldId id="324" r:id="rId41"/>
     <p:sldId id="325" r:id="rId42"/>
-    <p:sldId id="322" r:id="rId43"/>
-    <p:sldId id="330" r:id="rId44"/>
-    <p:sldId id="336" r:id="rId45"/>
-    <p:sldId id="337" r:id="rId46"/>
-    <p:sldId id="338" r:id="rId47"/>
-    <p:sldId id="340" r:id="rId48"/>
-    <p:sldId id="339" r:id="rId49"/>
-    <p:sldId id="341" r:id="rId50"/>
-    <p:sldId id="342" r:id="rId51"/>
-    <p:sldId id="289" r:id="rId52"/>
-    <p:sldId id="290" r:id="rId53"/>
-    <p:sldId id="305" r:id="rId54"/>
-    <p:sldId id="291" r:id="rId55"/>
-    <p:sldId id="295" r:id="rId56"/>
+    <p:sldId id="348" r:id="rId43"/>
+    <p:sldId id="322" r:id="rId44"/>
+    <p:sldId id="330" r:id="rId45"/>
+    <p:sldId id="336" r:id="rId46"/>
+    <p:sldId id="337" r:id="rId47"/>
+    <p:sldId id="338" r:id="rId48"/>
+    <p:sldId id="340" r:id="rId49"/>
+    <p:sldId id="339" r:id="rId50"/>
+    <p:sldId id="341" r:id="rId51"/>
+    <p:sldId id="342" r:id="rId52"/>
+    <p:sldId id="289" r:id="rId53"/>
+    <p:sldId id="290" r:id="rId54"/>
+    <p:sldId id="305" r:id="rId55"/>
+    <p:sldId id="291" r:id="rId56"/>
+    <p:sldId id="295" r:id="rId57"/>
   </p:sldIdLst>
   <p:sldSz cx="9144000" cy="6858000" type="screen4x3"/>
   <p:notesSz cx="7315200" cy="9601200"/>
@@ -3270,7 +3271,7 @@
               <a:pPr>
                 <a:defRPr/>
               </a:pPr>
-              <a:t>51</a:t>
+              <a:t>52</a:t>
             </a:fld>
             <a:endParaRPr lang="en-US" dirty="0"/>
           </a:p>
@@ -3387,7 +3388,7 @@
               <a:pPr>
                 <a:defRPr/>
               </a:pPr>
-              <a:t>52</a:t>
+              <a:t>53</a:t>
             </a:fld>
             <a:endParaRPr lang="en-US" dirty="0"/>
           </a:p>
@@ -3621,7 +3622,7 @@
               <a:pPr>
                 <a:defRPr/>
               </a:pPr>
-              <a:t>53</a:t>
+              <a:t>54</a:t>
             </a:fld>
             <a:endParaRPr lang="en-US" dirty="0"/>
           </a:p>
@@ -3738,7 +3739,7 @@
               <a:pPr>
                 <a:defRPr/>
               </a:pPr>
-              <a:t>54</a:t>
+              <a:t>55</a:t>
             </a:fld>
             <a:endParaRPr lang="en-US" dirty="0"/>
           </a:p>
@@ -3855,7 +3856,7 @@
               <a:pPr>
                 <a:defRPr/>
               </a:pPr>
-              <a:t>55</a:t>
+              <a:t>56</a:t>
             </a:fld>
             <a:endParaRPr lang="en-US" dirty="0"/>
           </a:p>
@@ -18525,6 +18526,270 @@
       </p:grpSpPr>
       <p:sp>
         <p:nvSpPr>
+          <p:cNvPr id="2" name="Title 1">
+            <a:extLst>
+              <a:ext uri="{FF2B5EF4-FFF2-40B4-BE49-F238E27FC236}">
+                <a16:creationId xmlns:a16="http://schemas.microsoft.com/office/drawing/2014/main" id="{04854790-DA14-4A77-B984-4C9A5957C412}"/>
+              </a:ext>
+            </a:extLst>
+          </p:cNvPr>
+          <p:cNvSpPr>
+            <a:spLocks noGrp="1"/>
+          </p:cNvSpPr>
+          <p:nvPr>
+            <p:ph type="title"/>
+          </p:nvPr>
+        </p:nvSpPr>
+        <p:spPr/>
+        <p:txBody>
+          <a:bodyPr/>
+          <a:lstStyle/>
+          <a:p>
+            <a:r>
+              <a:rPr lang="en-US" dirty="0"/>
+              <a:t>Structural References versus</a:t>
+            </a:r>
+            <a:br>
+              <a:rPr lang="en-US" dirty="0"/>
+            </a:br>
+            <a:r>
+              <a:rPr lang="en-US" dirty="0"/>
+              <a:t>Nonstructural References</a:t>
+            </a:r>
+          </a:p>
+        </p:txBody>
+      </p:sp>
+      <p:sp>
+        <p:nvSpPr>
+          <p:cNvPr id="3" name="Content Placeholder 2">
+            <a:extLst>
+              <a:ext uri="{FF2B5EF4-FFF2-40B4-BE49-F238E27FC236}">
+                <a16:creationId xmlns:a16="http://schemas.microsoft.com/office/drawing/2014/main" id="{8C013CF6-99C4-45B1-BF55-8F2537F01A64}"/>
+              </a:ext>
+            </a:extLst>
+          </p:cNvPr>
+          <p:cNvSpPr>
+            <a:spLocks noGrp="1"/>
+          </p:cNvSpPr>
+          <p:nvPr>
+            <p:ph idx="1"/>
+          </p:nvPr>
+        </p:nvSpPr>
+        <p:spPr>
+          <a:xfrm>
+            <a:off x="458788" y="1363663"/>
+            <a:ext cx="8321040" cy="4935537"/>
+          </a:xfrm>
+        </p:spPr>
+        <p:txBody>
+          <a:bodyPr/>
+          <a:lstStyle/>
+          <a:p>
+            <a:r>
+              <a:rPr lang="en-US" sz="2300" dirty="0"/>
+              <a:t>Most of the fields of AST classes represent structural references in that they correspond to the edges of the “tree”.</a:t>
+            </a:r>
+          </a:p>
+          <a:p>
+            <a:pPr lvl="1"/>
+            <a:r>
+              <a:rPr lang="en-US" dirty="0"/>
+              <a:t>Class </a:t>
+            </a:r>
+            <a:r>
+              <a:rPr lang="en-US" dirty="0">
+                <a:latin typeface="Consolas" panose="020B0609020204030204" pitchFamily="49" charset="0"/>
+              </a:rPr>
+              <a:t>Program</a:t>
+            </a:r>
+            <a:r>
+              <a:rPr lang="en-US" dirty="0"/>
+              <a:t> has a reference its declarative part and its statement part.</a:t>
+            </a:r>
+          </a:p>
+          <a:p>
+            <a:pPr lvl="1"/>
+            <a:r>
+              <a:rPr lang="en-US" dirty="0"/>
+              <a:t>Class </a:t>
+            </a:r>
+            <a:r>
+              <a:rPr lang="en-US" dirty="0" err="1">
+                <a:latin typeface="Consolas" panose="020B0609020204030204" pitchFamily="49" charset="0"/>
+              </a:rPr>
+              <a:t>BinaryExpr</a:t>
+            </a:r>
+            <a:r>
+              <a:rPr lang="en-US" dirty="0"/>
+              <a:t> has references its left operand, its operator, and its right operand.</a:t>
+            </a:r>
+          </a:p>
+          <a:p>
+            <a:r>
+              <a:rPr lang="en-US" sz="2300" dirty="0"/>
+              <a:t>Some AST classes have fields that do not correspond</a:t>
+            </a:r>
+            <a:br>
+              <a:rPr lang="en-US" sz="2300" dirty="0"/>
+            </a:br>
+            <a:r>
+              <a:rPr lang="en-US" sz="2300" dirty="0"/>
+              <a:t>to the edges of the “tree”.</a:t>
+            </a:r>
+          </a:p>
+          <a:p>
+            <a:pPr lvl="1"/>
+            <a:r>
+              <a:rPr lang="en-US" dirty="0"/>
+              <a:t>Class </a:t>
+            </a:r>
+            <a:r>
+              <a:rPr lang="en-US" dirty="0">
+                <a:latin typeface="Consolas" panose="020B0609020204030204" pitchFamily="49" charset="0"/>
+              </a:rPr>
+              <a:t>Variable</a:t>
+            </a:r>
+            <a:r>
+              <a:rPr lang="en-US" dirty="0"/>
+              <a:t> has a reference back to its declaration.</a:t>
+            </a:r>
+            <a:br>
+              <a:rPr lang="en-US" dirty="0"/>
+            </a:br>
+            <a:r>
+              <a:rPr lang="en-US" dirty="0"/>
+              <a:t>Similarly for class NamedValue.</a:t>
+            </a:r>
+          </a:p>
+          <a:p>
+            <a:pPr lvl="1"/>
+            <a:r>
+              <a:rPr lang="en-US" dirty="0"/>
+              <a:t>Class </a:t>
+            </a:r>
+            <a:r>
+              <a:rPr lang="en-US" dirty="0" err="1">
+                <a:latin typeface="Consolas" panose="020B0609020204030204" pitchFamily="49" charset="0"/>
+              </a:rPr>
+              <a:t>ExitStmt</a:t>
+            </a:r>
+            <a:r>
+              <a:rPr lang="en-US" dirty="0"/>
+              <a:t> has a reference its enclosing loop statement.</a:t>
+            </a:r>
+            <a:endParaRPr lang="en-US" sz="1950" dirty="0"/>
+          </a:p>
+          <a:p>
+            <a:r>
+              <a:rPr lang="en-US" sz="2300" dirty="0"/>
+              <a:t>These nonstructural references are used during constraint analysis and code generation. </a:t>
+            </a:r>
+          </a:p>
+        </p:txBody>
+      </p:sp>
+      <p:sp>
+        <p:nvSpPr>
+          <p:cNvPr id="4" name="Footer Placeholder 3">
+            <a:extLst>
+              <a:ext uri="{FF2B5EF4-FFF2-40B4-BE49-F238E27FC236}">
+                <a16:creationId xmlns:a16="http://schemas.microsoft.com/office/drawing/2014/main" id="{F2DFEBED-1FEC-4B5A-AEAA-24FEC06167AA}"/>
+              </a:ext>
+            </a:extLst>
+          </p:cNvPr>
+          <p:cNvSpPr>
+            <a:spLocks noGrp="1"/>
+          </p:cNvSpPr>
+          <p:nvPr>
+            <p:ph type="ftr" sz="quarter" idx="10"/>
+          </p:nvPr>
+        </p:nvSpPr>
+        <p:spPr/>
+        <p:txBody>
+          <a:bodyPr/>
+          <a:lstStyle/>
+          <a:p>
+            <a:pPr>
+              <a:defRPr/>
+            </a:pPr>
+            <a:r>
+              <a:rPr lang="en-US"/>
+              <a:t>©SoftMoore Consulting</a:t>
+            </a:r>
+            <a:endParaRPr lang="en-US" dirty="0"/>
+          </a:p>
+        </p:txBody>
+      </p:sp>
+      <p:sp>
+        <p:nvSpPr>
+          <p:cNvPr id="5" name="Slide Number Placeholder 4">
+            <a:extLst>
+              <a:ext uri="{FF2B5EF4-FFF2-40B4-BE49-F238E27FC236}">
+                <a16:creationId xmlns:a16="http://schemas.microsoft.com/office/drawing/2014/main" id="{E010081C-DE4F-4CF7-8DE1-4822B06B11FD}"/>
+              </a:ext>
+            </a:extLst>
+          </p:cNvPr>
+          <p:cNvSpPr>
+            <a:spLocks noGrp="1"/>
+          </p:cNvSpPr>
+          <p:nvPr>
+            <p:ph type="sldNum" sz="quarter" idx="11"/>
+          </p:nvPr>
+        </p:nvSpPr>
+        <p:spPr/>
+        <p:txBody>
+          <a:bodyPr/>
+          <a:lstStyle/>
+          <a:p>
+            <a:pPr>
+              <a:defRPr/>
+            </a:pPr>
+            <a:r>
+              <a:rPr lang="en-US"/>
+              <a:t>Slide </a:t>
+            </a:r>
+            <a:fld id="{A413A2F6-7BFD-463C-B63A-922040FAF32C}" type="slidenum">
+              <a:rPr lang="en-US" smtClean="0"/>
+              <a:pPr>
+                <a:defRPr/>
+              </a:pPr>
+              <a:t>42</a:t>
+            </a:fld>
+            <a:endParaRPr lang="en-US" dirty="0"/>
+          </a:p>
+        </p:txBody>
+      </p:sp>
+    </p:spTree>
+    <p:extLst>
+      <p:ext uri="{BB962C8B-B14F-4D97-AF65-F5344CB8AC3E}">
+        <p14:creationId xmlns:p14="http://schemas.microsoft.com/office/powerpoint/2010/main" val="628314858"/>
+      </p:ext>
+    </p:extLst>
+  </p:cSld>
+  <p:clrMapOvr>
+    <a:masterClrMapping/>
+  </p:clrMapOvr>
+</p:sld>
+</file>
+
+<file path=ppt/slides/slide43.xml><?xml version="1.0" encoding="utf-8"?>
+<p:sld xmlns:a="http://schemas.openxmlformats.org/drawingml/2006/main" xmlns:r="http://schemas.openxmlformats.org/officeDocument/2006/relationships" xmlns:p="http://schemas.openxmlformats.org/presentationml/2006/main">
+  <p:cSld>
+    <p:spTree>
+      <p:nvGrpSpPr>
+        <p:cNvPr id="1" name=""/>
+        <p:cNvGrpSpPr/>
+        <p:nvPr/>
+      </p:nvGrpSpPr>
+      <p:grpSpPr>
+        <a:xfrm>
+          <a:off x="0" y="0"/>
+          <a:ext cx="0" cy="0"/>
+          <a:chOff x="0" y="0"/>
+          <a:chExt cx="0" cy="0"/>
+        </a:xfrm>
+      </p:grpSpPr>
+      <p:sp>
+        <p:nvSpPr>
           <p:cNvPr id="3" name="Title 2"/>
           <p:cNvSpPr>
             <a:spLocks noGrp="1"/>
@@ -18678,7 +18943,7 @@
 </p:sld>
 </file>
 
-<file path=ppt/slides/slide43.xml><?xml version="1.0" encoding="utf-8"?>
+<file path=ppt/slides/slide44.xml><?xml version="1.0" encoding="utf-8"?>
 <p:sld xmlns:a="http://schemas.openxmlformats.org/drawingml/2006/main" xmlns:r="http://schemas.openxmlformats.org/officeDocument/2006/relationships" xmlns:p="http://schemas.openxmlformats.org/presentationml/2006/main">
   <p:cSld>
     <p:spTree>
@@ -19926,169 +20191,6 @@
 </p:sld>
 </file>
 
-<file path=ppt/slides/slide44.xml><?xml version="1.0" encoding="utf-8"?>
-<p:sld xmlns:a="http://schemas.openxmlformats.org/drawingml/2006/main" xmlns:r="http://schemas.openxmlformats.org/officeDocument/2006/relationships" xmlns:p="http://schemas.openxmlformats.org/presentationml/2006/main">
-  <p:cSld>
-    <p:spTree>
-      <p:nvGrpSpPr>
-        <p:cNvPr id="1" name=""/>
-        <p:cNvGrpSpPr/>
-        <p:nvPr/>
-      </p:nvGrpSpPr>
-      <p:grpSpPr>
-        <a:xfrm>
-          <a:off x="0" y="0"/>
-          <a:ext cx="0" cy="0"/>
-          <a:chOff x="0" y="0"/>
-          <a:chExt cx="0" cy="0"/>
-        </a:xfrm>
-      </p:grpSpPr>
-      <p:sp>
-        <p:nvSpPr>
-          <p:cNvPr id="8" name="Title 7">
-            <a:extLst>
-              <a:ext uri="{FF2B5EF4-FFF2-40B4-BE49-F238E27FC236}">
-                <a16:creationId xmlns:a16="http://schemas.microsoft.com/office/drawing/2014/main" id="{563233BE-B20A-4E38-8D6C-3D8FB41B4336}"/>
-              </a:ext>
-            </a:extLst>
-          </p:cNvPr>
-          <p:cNvSpPr>
-            <a:spLocks noGrp="1"/>
-          </p:cNvSpPr>
-          <p:nvPr>
-            <p:ph type="title"/>
-          </p:nvPr>
-        </p:nvSpPr>
-        <p:spPr/>
-        <p:txBody>
-          <a:bodyPr/>
-          <a:lstStyle/>
-          <a:p>
-            <a:r>
-              <a:rPr lang="en-US" dirty="0"/>
-              <a:t>Determining Types of Expressions</a:t>
-            </a:r>
-          </a:p>
-        </p:txBody>
-      </p:sp>
-      <p:sp>
-        <p:nvSpPr>
-          <p:cNvPr id="9" name="Content Placeholder 8">
-            <a:extLst>
-              <a:ext uri="{FF2B5EF4-FFF2-40B4-BE49-F238E27FC236}">
-                <a16:creationId xmlns:a16="http://schemas.microsoft.com/office/drawing/2014/main" id="{76E1210A-295D-4718-9E1A-27C835EA23E3}"/>
-              </a:ext>
-            </a:extLst>
-          </p:cNvPr>
-          <p:cNvSpPr>
-            <a:spLocks noGrp="1"/>
-          </p:cNvSpPr>
-          <p:nvPr>
-            <p:ph idx="1"/>
-          </p:nvPr>
-        </p:nvSpPr>
-        <p:spPr/>
-        <p:txBody>
-          <a:bodyPr/>
-          <a:lstStyle/>
-          <a:p>
-            <a:r>
-              <a:rPr lang="en-US" dirty="0"/>
-              <a:t>Since CPRL is statically typed, it is possible to determine the type of every expression at compile time, and AST class Expression has a property for the expression type that is inherited by all expression subclasses.</a:t>
-            </a:r>
-          </a:p>
-          <a:p>
-            <a:r>
-              <a:rPr lang="en-US" dirty="0"/>
-              <a:t>Where within the compiler should type determination take place?  In general, we will determine the type of an expression in the constructor for the expression’s AST class.</a:t>
-            </a:r>
-          </a:p>
-        </p:txBody>
-      </p:sp>
-      <p:sp>
-        <p:nvSpPr>
-          <p:cNvPr id="3" name="Footer Placeholder 2">
-            <a:extLst>
-              <a:ext uri="{FF2B5EF4-FFF2-40B4-BE49-F238E27FC236}">
-                <a16:creationId xmlns:a16="http://schemas.microsoft.com/office/drawing/2014/main" id="{5A404E55-B647-4C7C-9D62-C9EA115DC92C}"/>
-              </a:ext>
-            </a:extLst>
-          </p:cNvPr>
-          <p:cNvSpPr>
-            <a:spLocks noGrp="1"/>
-          </p:cNvSpPr>
-          <p:nvPr>
-            <p:ph type="ftr" sz="quarter" idx="10"/>
-          </p:nvPr>
-        </p:nvSpPr>
-        <p:spPr/>
-        <p:txBody>
-          <a:bodyPr/>
-          <a:lstStyle/>
-          <a:p>
-            <a:pPr>
-              <a:defRPr/>
-            </a:pPr>
-            <a:r>
-              <a:rPr lang="en-US"/>
-              <a:t>©SoftMoore Consulting</a:t>
-            </a:r>
-            <a:endParaRPr lang="en-US" dirty="0"/>
-          </a:p>
-        </p:txBody>
-      </p:sp>
-      <p:sp>
-        <p:nvSpPr>
-          <p:cNvPr id="4" name="Slide Number Placeholder 3">
-            <a:extLst>
-              <a:ext uri="{FF2B5EF4-FFF2-40B4-BE49-F238E27FC236}">
-                <a16:creationId xmlns:a16="http://schemas.microsoft.com/office/drawing/2014/main" id="{964B72F4-5156-47A8-BE64-4FAAF4115382}"/>
-              </a:ext>
-            </a:extLst>
-          </p:cNvPr>
-          <p:cNvSpPr>
-            <a:spLocks noGrp="1"/>
-          </p:cNvSpPr>
-          <p:nvPr>
-            <p:ph type="sldNum" sz="quarter" idx="11"/>
-          </p:nvPr>
-        </p:nvSpPr>
-        <p:spPr/>
-        <p:txBody>
-          <a:bodyPr/>
-          <a:lstStyle/>
-          <a:p>
-            <a:pPr>
-              <a:defRPr/>
-            </a:pPr>
-            <a:r>
-              <a:rPr lang="en-US"/>
-              <a:t>Slide </a:t>
-            </a:r>
-            <a:fld id="{0493F5BC-5863-40DB-9BF6-90302664BBE6}" type="slidenum">
-              <a:rPr lang="en-US" smtClean="0"/>
-              <a:pPr>
-                <a:defRPr/>
-              </a:pPr>
-              <a:t>44</a:t>
-            </a:fld>
-            <a:endParaRPr lang="en-US" dirty="0"/>
-          </a:p>
-        </p:txBody>
-      </p:sp>
-    </p:spTree>
-    <p:extLst>
-      <p:ext uri="{BB962C8B-B14F-4D97-AF65-F5344CB8AC3E}">
-        <p14:creationId xmlns:p14="http://schemas.microsoft.com/office/powerpoint/2010/main" val="2250100895"/>
-      </p:ext>
-    </p:extLst>
-  </p:cSld>
-  <p:clrMapOvr>
-    <a:masterClrMapping/>
-  </p:clrMapOvr>
-</p:sld>
-</file>
-
 <file path=ppt/slides/slide45.xml><?xml version="1.0" encoding="utf-8"?>
 <p:sld xmlns:a="http://schemas.openxmlformats.org/drawingml/2006/main" xmlns:r="http://schemas.openxmlformats.org/officeDocument/2006/relationships" xmlns:p="http://schemas.openxmlformats.org/presentationml/2006/main">
   <p:cSld>
@@ -20129,17 +20231,8 @@
           <a:p>
             <a:r>
               <a:rPr lang="en-US" dirty="0"/>
-              <a:t>Example: </a:t>
-            </a:r>
-            <a:r>
-              <a:rPr lang="en-US" dirty="0" err="1">
-                <a:latin typeface="Consolas" panose="020B0609020204030204" pitchFamily="49" charset="0"/>
-              </a:rPr>
-              <a:t>RelationalExpr</a:t>
-            </a:r>
-            <a:endParaRPr lang="en-US" dirty="0">
-              <a:latin typeface="Consolas" panose="020B0609020204030204" pitchFamily="49" charset="0"/>
-            </a:endParaRPr>
+              <a:t>Determining Types of Expressions</a:t>
+            </a:r>
           </a:p>
         </p:txBody>
       </p:sp>
@@ -20166,241 +20259,13 @@
           <a:p>
             <a:r>
               <a:rPr lang="en-US" dirty="0"/>
-              <a:t>A relational expression is a binary expression where the operator is a relational operator such as “</a:t>
-            </a:r>
-            <a:r>
-              <a:rPr lang="en-US" dirty="0">
-                <a:latin typeface="Consolas" panose="020B0609020204030204" pitchFamily="49" charset="0"/>
-              </a:rPr>
-              <a:t>&lt;=</a:t>
-            </a:r>
-            <a:r>
-              <a:rPr lang="en-US" dirty="0"/>
-              <a:t>” or “&gt;”.</a:t>
-            </a:r>
-          </a:p>
-          <a:p>
-            <a:r>
-              <a:rPr lang="en-US" dirty="0"/>
-              <a:t>Regardless of the types of the two operands, a relational expression always has type </a:t>
-            </a:r>
-            <a:r>
-              <a:rPr lang="en-US" dirty="0">
-                <a:latin typeface="Consolas" panose="020B0609020204030204" pitchFamily="49" charset="0"/>
-              </a:rPr>
-              <a:t>Boolean</a:t>
-            </a:r>
-            <a:r>
-              <a:rPr lang="en-US" dirty="0"/>
-              <a:t>.</a:t>
-            </a:r>
-          </a:p>
-          <a:p>
-            <a:r>
-              <a:rPr lang="en-US" dirty="0"/>
-              <a:t>Constructor for </a:t>
-            </a:r>
-            <a:r>
-              <a:rPr lang="en-US" dirty="0" err="1">
-                <a:latin typeface="Consolas" panose="020B0609020204030204" pitchFamily="49" charset="0"/>
-              </a:rPr>
-              <a:t>RelationalExpr</a:t>
-            </a:r>
-            <a:endParaRPr lang="en-US" dirty="0">
-              <a:latin typeface="Consolas" panose="020B0609020204030204" pitchFamily="49" charset="0"/>
-            </a:endParaRPr>
-          </a:p>
-          <a:p>
-            <a:pPr marL="365760" indent="0">
-              <a:buNone/>
-            </a:pPr>
-            <a:r>
-              <a:rPr lang="en-US" sz="1800" dirty="0">
-                <a:latin typeface="Consolas" panose="020B0609020204030204" pitchFamily="49" charset="0"/>
-              </a:rPr>
-              <a:t>public </a:t>
-            </a:r>
-            <a:r>
-              <a:rPr lang="en-US" sz="1800" dirty="0" err="1">
-                <a:latin typeface="Consolas" panose="020B0609020204030204" pitchFamily="49" charset="0"/>
-              </a:rPr>
-              <a:t>RelationalExpr</a:t>
-            </a:r>
-            <a:r>
-              <a:rPr lang="en-US" sz="1800" dirty="0">
-                <a:latin typeface="Consolas" panose="020B0609020204030204" pitchFamily="49" charset="0"/>
-              </a:rPr>
-              <a:t>(Expression </a:t>
-            </a:r>
-            <a:r>
-              <a:rPr lang="en-US" sz="1800" dirty="0" err="1">
-                <a:latin typeface="Consolas" panose="020B0609020204030204" pitchFamily="49" charset="0"/>
-              </a:rPr>
-              <a:t>leftOperand</a:t>
-            </a:r>
-            <a:r>
-              <a:rPr lang="en-US" sz="1800" dirty="0">
-                <a:latin typeface="Consolas" panose="020B0609020204030204" pitchFamily="49" charset="0"/>
-              </a:rPr>
-              <a:t>,</a:t>
-            </a:r>
-          </a:p>
-          <a:p>
-            <a:pPr marL="365760" indent="0">
-              <a:spcBef>
-                <a:spcPts val="200"/>
-              </a:spcBef>
-              <a:buNone/>
-            </a:pPr>
-            <a:r>
-              <a:rPr lang="en-US" sz="1800" dirty="0">
-                <a:latin typeface="Consolas" panose="020B0609020204030204" pitchFamily="49" charset="0"/>
-              </a:rPr>
-              <a:t>                      Token      operator,</a:t>
-            </a:r>
-          </a:p>
-          <a:p>
-            <a:pPr marL="365760" indent="0">
-              <a:spcBef>
-                <a:spcPts val="200"/>
-              </a:spcBef>
-              <a:buNone/>
-            </a:pPr>
-            <a:r>
-              <a:rPr lang="en-US" sz="1800" dirty="0">
-                <a:latin typeface="Consolas" panose="020B0609020204030204" pitchFamily="49" charset="0"/>
-              </a:rPr>
-              <a:t>                      Expression </a:t>
-            </a:r>
-            <a:r>
-              <a:rPr lang="en-US" sz="1800" dirty="0" err="1">
-                <a:latin typeface="Consolas" panose="020B0609020204030204" pitchFamily="49" charset="0"/>
-              </a:rPr>
-              <a:t>rightOperand</a:t>
-            </a:r>
-            <a:r>
-              <a:rPr lang="en-US" sz="1800" dirty="0">
-                <a:latin typeface="Consolas" panose="020B0609020204030204" pitchFamily="49" charset="0"/>
-              </a:rPr>
-              <a:t>)</a:t>
-            </a:r>
-          </a:p>
-          <a:p>
-            <a:pPr marL="365760" indent="0">
-              <a:spcBef>
-                <a:spcPts val="200"/>
-              </a:spcBef>
-              <a:buNone/>
-            </a:pPr>
-            <a:r>
-              <a:rPr lang="en-US" sz="1800" dirty="0">
-                <a:latin typeface="Consolas" panose="020B0609020204030204" pitchFamily="49" charset="0"/>
-              </a:rPr>
-              <a:t>  {</a:t>
-            </a:r>
-          </a:p>
-          <a:p>
-            <a:pPr marL="365760" indent="0">
-              <a:spcBef>
-                <a:spcPts val="200"/>
-              </a:spcBef>
-              <a:buNone/>
-            </a:pPr>
-            <a:r>
-              <a:rPr lang="en-US" sz="1800" dirty="0">
-                <a:latin typeface="Consolas" panose="020B0609020204030204" pitchFamily="49" charset="0"/>
-              </a:rPr>
-              <a:t>    super(</a:t>
-            </a:r>
-            <a:r>
-              <a:rPr lang="en-US" sz="1800" dirty="0" err="1">
-                <a:latin typeface="Consolas" panose="020B0609020204030204" pitchFamily="49" charset="0"/>
-              </a:rPr>
-              <a:t>leftOperand</a:t>
-            </a:r>
-            <a:r>
-              <a:rPr lang="en-US" sz="1800" dirty="0">
-                <a:latin typeface="Consolas" panose="020B0609020204030204" pitchFamily="49" charset="0"/>
-              </a:rPr>
-              <a:t>, operator, </a:t>
-            </a:r>
-            <a:r>
-              <a:rPr lang="en-US" sz="1800" dirty="0" err="1">
-                <a:latin typeface="Consolas" panose="020B0609020204030204" pitchFamily="49" charset="0"/>
-              </a:rPr>
-              <a:t>rightOperand</a:t>
-            </a:r>
-            <a:r>
-              <a:rPr lang="en-US" sz="1800" dirty="0">
-                <a:latin typeface="Consolas" panose="020B0609020204030204" pitchFamily="49" charset="0"/>
-              </a:rPr>
-              <a:t>);</a:t>
-            </a:r>
-          </a:p>
-          <a:p>
-            <a:pPr marL="365760" indent="0">
-              <a:spcBef>
-                <a:spcPts val="200"/>
-              </a:spcBef>
-              <a:buNone/>
-            </a:pPr>
-            <a:r>
-              <a:rPr lang="en-US" sz="1800" dirty="0">
-                <a:latin typeface="Consolas" panose="020B0609020204030204" pitchFamily="49" charset="0"/>
-              </a:rPr>
-              <a:t>    </a:t>
-            </a:r>
-            <a:r>
-              <a:rPr lang="en-US" sz="1800" b="1" dirty="0" err="1">
-                <a:latin typeface="Consolas" panose="020B0609020204030204" pitchFamily="49" charset="0"/>
-              </a:rPr>
-              <a:t>setType</a:t>
-            </a:r>
-            <a:r>
-              <a:rPr lang="en-US" sz="1800" b="1" dirty="0">
-                <a:latin typeface="Consolas" panose="020B0609020204030204" pitchFamily="49" charset="0"/>
-              </a:rPr>
-              <a:t>(</a:t>
-            </a:r>
-            <a:r>
-              <a:rPr lang="en-US" sz="1800" b="1" dirty="0" err="1">
-                <a:latin typeface="Consolas" panose="020B0609020204030204" pitchFamily="49" charset="0"/>
-              </a:rPr>
-              <a:t>Type.Boolean</a:t>
-            </a:r>
-            <a:r>
-              <a:rPr lang="en-US" sz="1800" b="1" dirty="0">
-                <a:latin typeface="Consolas" panose="020B0609020204030204" pitchFamily="49" charset="0"/>
-              </a:rPr>
-              <a:t>);</a:t>
-            </a:r>
-          </a:p>
-          <a:p>
-            <a:pPr marL="365760" indent="0">
-              <a:spcBef>
-                <a:spcPts val="200"/>
-              </a:spcBef>
-              <a:buNone/>
-            </a:pPr>
-            <a:r>
-              <a:rPr lang="en-US" sz="1800" dirty="0">
-                <a:latin typeface="Consolas" panose="020B0609020204030204" pitchFamily="49" charset="0"/>
-              </a:rPr>
-              <a:t>    ...</a:t>
-            </a:r>
-          </a:p>
-          <a:p>
-            <a:pPr marL="365760" indent="0">
-              <a:spcBef>
-                <a:spcPts val="200"/>
-              </a:spcBef>
-              <a:buNone/>
-            </a:pPr>
-            <a:r>
-              <a:rPr lang="en-US" sz="1800" dirty="0">
-                <a:latin typeface="Consolas" panose="020B0609020204030204" pitchFamily="49" charset="0"/>
-              </a:rPr>
-              <a:t>  }</a:t>
+              <a:t>Since CPRL is statically typed, it is possible to determine the type of every expression at compile time, and AST class Expression has a property for the expression type that is inherited by all expression subclasses.</a:t>
+            </a:r>
+          </a:p>
+          <a:p>
+            <a:r>
+              <a:rPr lang="en-US" dirty="0"/>
+              <a:t>Where within the compiler should type determination take place?  In general, we will determine the type of an expression in the constructor for the expression’s AST class.</a:t>
             </a:r>
           </a:p>
         </p:txBody>
@@ -20479,7 +20344,7 @@
     </p:spTree>
     <p:extLst>
       <p:ext uri="{BB962C8B-B14F-4D97-AF65-F5344CB8AC3E}">
-        <p14:creationId xmlns:p14="http://schemas.microsoft.com/office/powerpoint/2010/main" val="2714799205"/>
+        <p14:creationId xmlns:p14="http://schemas.microsoft.com/office/powerpoint/2010/main" val="2250100895"/>
       </p:ext>
     </p:extLst>
   </p:cSld>
@@ -20535,7 +20400,7 @@
               <a:rPr lang="en-US" dirty="0" err="1">
                 <a:latin typeface="Consolas" panose="020B0609020204030204" pitchFamily="49" charset="0"/>
               </a:rPr>
-              <a:t>AddingExpr</a:t>
+              <a:t>RelationalExpr</a:t>
             </a:r>
             <a:endParaRPr lang="en-US" dirty="0">
               <a:latin typeface="Consolas" panose="020B0609020204030204" pitchFamily="49" charset="0"/>
@@ -20566,20 +20431,241 @@
           <a:p>
             <a:r>
               <a:rPr lang="en-US" dirty="0"/>
-              <a:t>For most “real” programming languages, determining the type of an adding expression can be somewhat complicated.</a:t>
-            </a:r>
-          </a:p>
-          <a:p>
-            <a:pPr lvl="1"/>
-            <a:r>
-              <a:rPr lang="en-US" dirty="0"/>
-              <a:t>C and Java have multiple numeric types with rules about automatic conversions (coercions) when an operator has different operand types.</a:t>
-            </a:r>
-          </a:p>
-          <a:p>
-            <a:r>
-              <a:rPr lang="en-US" dirty="0"/>
-              <a:t>In CPRL, an adding expression always has type Integer.  (Similarly for a multiplying expression in CPRL.)</a:t>
+              <a:t>A relational expression is a binary expression where the operator is a relational operator such as “</a:t>
+            </a:r>
+            <a:r>
+              <a:rPr lang="en-US" dirty="0">
+                <a:latin typeface="Consolas" panose="020B0609020204030204" pitchFamily="49" charset="0"/>
+              </a:rPr>
+              <a:t>&lt;=</a:t>
+            </a:r>
+            <a:r>
+              <a:rPr lang="en-US" dirty="0"/>
+              <a:t>” or “&gt;”.</a:t>
+            </a:r>
+          </a:p>
+          <a:p>
+            <a:r>
+              <a:rPr lang="en-US" dirty="0"/>
+              <a:t>Regardless of the types of the two operands, a relational expression always has type </a:t>
+            </a:r>
+            <a:r>
+              <a:rPr lang="en-US" dirty="0">
+                <a:latin typeface="Consolas" panose="020B0609020204030204" pitchFamily="49" charset="0"/>
+              </a:rPr>
+              <a:t>Boolean</a:t>
+            </a:r>
+            <a:r>
+              <a:rPr lang="en-US" dirty="0"/>
+              <a:t>.</a:t>
+            </a:r>
+          </a:p>
+          <a:p>
+            <a:r>
+              <a:rPr lang="en-US" dirty="0"/>
+              <a:t>Constructor for </a:t>
+            </a:r>
+            <a:r>
+              <a:rPr lang="en-US" dirty="0" err="1">
+                <a:latin typeface="Consolas" panose="020B0609020204030204" pitchFamily="49" charset="0"/>
+              </a:rPr>
+              <a:t>RelationalExpr</a:t>
+            </a:r>
+            <a:endParaRPr lang="en-US" dirty="0">
+              <a:latin typeface="Consolas" panose="020B0609020204030204" pitchFamily="49" charset="0"/>
+            </a:endParaRPr>
+          </a:p>
+          <a:p>
+            <a:pPr marL="365760" indent="0">
+              <a:buNone/>
+            </a:pPr>
+            <a:r>
+              <a:rPr lang="en-US" sz="1800" dirty="0">
+                <a:latin typeface="Consolas" panose="020B0609020204030204" pitchFamily="49" charset="0"/>
+              </a:rPr>
+              <a:t>public </a:t>
+            </a:r>
+            <a:r>
+              <a:rPr lang="en-US" sz="1800" dirty="0" err="1">
+                <a:latin typeface="Consolas" panose="020B0609020204030204" pitchFamily="49" charset="0"/>
+              </a:rPr>
+              <a:t>RelationalExpr</a:t>
+            </a:r>
+            <a:r>
+              <a:rPr lang="en-US" sz="1800" dirty="0">
+                <a:latin typeface="Consolas" panose="020B0609020204030204" pitchFamily="49" charset="0"/>
+              </a:rPr>
+              <a:t>(Expression </a:t>
+            </a:r>
+            <a:r>
+              <a:rPr lang="en-US" sz="1800" dirty="0" err="1">
+                <a:latin typeface="Consolas" panose="020B0609020204030204" pitchFamily="49" charset="0"/>
+              </a:rPr>
+              <a:t>leftOperand</a:t>
+            </a:r>
+            <a:r>
+              <a:rPr lang="en-US" sz="1800" dirty="0">
+                <a:latin typeface="Consolas" panose="020B0609020204030204" pitchFamily="49" charset="0"/>
+              </a:rPr>
+              <a:t>,</a:t>
+            </a:r>
+          </a:p>
+          <a:p>
+            <a:pPr marL="365760" indent="0">
+              <a:spcBef>
+                <a:spcPts val="200"/>
+              </a:spcBef>
+              <a:buNone/>
+            </a:pPr>
+            <a:r>
+              <a:rPr lang="en-US" sz="1800" dirty="0">
+                <a:latin typeface="Consolas" panose="020B0609020204030204" pitchFamily="49" charset="0"/>
+              </a:rPr>
+              <a:t>                      Token      operator,</a:t>
+            </a:r>
+          </a:p>
+          <a:p>
+            <a:pPr marL="365760" indent="0">
+              <a:spcBef>
+                <a:spcPts val="200"/>
+              </a:spcBef>
+              <a:buNone/>
+            </a:pPr>
+            <a:r>
+              <a:rPr lang="en-US" sz="1800" dirty="0">
+                <a:latin typeface="Consolas" panose="020B0609020204030204" pitchFamily="49" charset="0"/>
+              </a:rPr>
+              <a:t>                      Expression </a:t>
+            </a:r>
+            <a:r>
+              <a:rPr lang="en-US" sz="1800" dirty="0" err="1">
+                <a:latin typeface="Consolas" panose="020B0609020204030204" pitchFamily="49" charset="0"/>
+              </a:rPr>
+              <a:t>rightOperand</a:t>
+            </a:r>
+            <a:r>
+              <a:rPr lang="en-US" sz="1800" dirty="0">
+                <a:latin typeface="Consolas" panose="020B0609020204030204" pitchFamily="49" charset="0"/>
+              </a:rPr>
+              <a:t>)</a:t>
+            </a:r>
+          </a:p>
+          <a:p>
+            <a:pPr marL="365760" indent="0">
+              <a:spcBef>
+                <a:spcPts val="200"/>
+              </a:spcBef>
+              <a:buNone/>
+            </a:pPr>
+            <a:r>
+              <a:rPr lang="en-US" sz="1800" dirty="0">
+                <a:latin typeface="Consolas" panose="020B0609020204030204" pitchFamily="49" charset="0"/>
+              </a:rPr>
+              <a:t>  {</a:t>
+            </a:r>
+          </a:p>
+          <a:p>
+            <a:pPr marL="365760" indent="0">
+              <a:spcBef>
+                <a:spcPts val="200"/>
+              </a:spcBef>
+              <a:buNone/>
+            </a:pPr>
+            <a:r>
+              <a:rPr lang="en-US" sz="1800" dirty="0">
+                <a:latin typeface="Consolas" panose="020B0609020204030204" pitchFamily="49" charset="0"/>
+              </a:rPr>
+              <a:t>    super(</a:t>
+            </a:r>
+            <a:r>
+              <a:rPr lang="en-US" sz="1800" dirty="0" err="1">
+                <a:latin typeface="Consolas" panose="020B0609020204030204" pitchFamily="49" charset="0"/>
+              </a:rPr>
+              <a:t>leftOperand</a:t>
+            </a:r>
+            <a:r>
+              <a:rPr lang="en-US" sz="1800" dirty="0">
+                <a:latin typeface="Consolas" panose="020B0609020204030204" pitchFamily="49" charset="0"/>
+              </a:rPr>
+              <a:t>, operator, </a:t>
+            </a:r>
+            <a:r>
+              <a:rPr lang="en-US" sz="1800" dirty="0" err="1">
+                <a:latin typeface="Consolas" panose="020B0609020204030204" pitchFamily="49" charset="0"/>
+              </a:rPr>
+              <a:t>rightOperand</a:t>
+            </a:r>
+            <a:r>
+              <a:rPr lang="en-US" sz="1800" dirty="0">
+                <a:latin typeface="Consolas" panose="020B0609020204030204" pitchFamily="49" charset="0"/>
+              </a:rPr>
+              <a:t>);</a:t>
+            </a:r>
+          </a:p>
+          <a:p>
+            <a:pPr marL="365760" indent="0">
+              <a:spcBef>
+                <a:spcPts val="200"/>
+              </a:spcBef>
+              <a:buNone/>
+            </a:pPr>
+            <a:r>
+              <a:rPr lang="en-US" sz="1800" dirty="0">
+                <a:latin typeface="Consolas" panose="020B0609020204030204" pitchFamily="49" charset="0"/>
+              </a:rPr>
+              <a:t>    </a:t>
+            </a:r>
+            <a:r>
+              <a:rPr lang="en-US" sz="1800" b="1" dirty="0" err="1">
+                <a:latin typeface="Consolas" panose="020B0609020204030204" pitchFamily="49" charset="0"/>
+              </a:rPr>
+              <a:t>setType</a:t>
+            </a:r>
+            <a:r>
+              <a:rPr lang="en-US" sz="1800" b="1" dirty="0">
+                <a:latin typeface="Consolas" panose="020B0609020204030204" pitchFamily="49" charset="0"/>
+              </a:rPr>
+              <a:t>(</a:t>
+            </a:r>
+            <a:r>
+              <a:rPr lang="en-US" sz="1800" b="1" dirty="0" err="1">
+                <a:latin typeface="Consolas" panose="020B0609020204030204" pitchFamily="49" charset="0"/>
+              </a:rPr>
+              <a:t>Type.Boolean</a:t>
+            </a:r>
+            <a:r>
+              <a:rPr lang="en-US" sz="1800" b="1" dirty="0">
+                <a:latin typeface="Consolas" panose="020B0609020204030204" pitchFamily="49" charset="0"/>
+              </a:rPr>
+              <a:t>);</a:t>
+            </a:r>
+          </a:p>
+          <a:p>
+            <a:pPr marL="365760" indent="0">
+              <a:spcBef>
+                <a:spcPts val="200"/>
+              </a:spcBef>
+              <a:buNone/>
+            </a:pPr>
+            <a:r>
+              <a:rPr lang="en-US" sz="1800" dirty="0">
+                <a:latin typeface="Consolas" panose="020B0609020204030204" pitchFamily="49" charset="0"/>
+              </a:rPr>
+              <a:t>    ...</a:t>
+            </a:r>
+          </a:p>
+          <a:p>
+            <a:pPr marL="365760" indent="0">
+              <a:spcBef>
+                <a:spcPts val="200"/>
+              </a:spcBef>
+              <a:buNone/>
+            </a:pPr>
+            <a:r>
+              <a:rPr lang="en-US" sz="1800" dirty="0">
+                <a:latin typeface="Consolas" panose="020B0609020204030204" pitchFamily="49" charset="0"/>
+              </a:rPr>
+              <a:t>  }</a:t>
             </a:r>
           </a:p>
         </p:txBody>
@@ -20658,7 +20744,7 @@
     </p:spTree>
     <p:extLst>
       <p:ext uri="{BB962C8B-B14F-4D97-AF65-F5344CB8AC3E}">
-        <p14:creationId xmlns:p14="http://schemas.microsoft.com/office/powerpoint/2010/main" val="1930244420"/>
+        <p14:creationId xmlns:p14="http://schemas.microsoft.com/office/powerpoint/2010/main" val="2714799205"/>
       </p:ext>
     </p:extLst>
   </p:cSld>
@@ -20716,15 +20802,9 @@
               </a:rPr>
               <a:t>AddingExpr</a:t>
             </a:r>
-            <a:br>
-              <a:rPr lang="en-US" dirty="0">
-                <a:latin typeface="Consolas" panose="020B0609020204030204" pitchFamily="49" charset="0"/>
-              </a:rPr>
-            </a:br>
-            <a:r>
-              <a:rPr lang="en-US" sz="2400" dirty="0"/>
-              <a:t>(continued)</a:t>
-            </a:r>
+            <a:endParaRPr lang="en-US" dirty="0">
+              <a:latin typeface="Consolas" panose="020B0609020204030204" pitchFamily="49" charset="0"/>
+            </a:endParaRPr>
           </a:p>
         </p:txBody>
       </p:sp>
@@ -20751,195 +20831,20 @@
           <a:p>
             <a:r>
               <a:rPr lang="en-US" dirty="0"/>
-              <a:t>Constructor for </a:t>
-            </a:r>
-            <a:r>
-              <a:rPr lang="en-US" dirty="0" err="1">
-                <a:latin typeface="Consolas" panose="020B0609020204030204" pitchFamily="49" charset="0"/>
-              </a:rPr>
-              <a:t>AddingExpr</a:t>
-            </a:r>
-            <a:endParaRPr lang="en-US" dirty="0">
-              <a:latin typeface="Consolas" panose="020B0609020204030204" pitchFamily="49" charset="0"/>
-            </a:endParaRPr>
-          </a:p>
-          <a:p>
-            <a:pPr marL="457200" indent="0">
-              <a:buNone/>
-            </a:pPr>
-            <a:r>
-              <a:rPr lang="en-US" sz="1800" dirty="0">
-                <a:latin typeface="Consolas" panose="020B0609020204030204" pitchFamily="49" charset="0"/>
-              </a:rPr>
-              <a:t>public </a:t>
-            </a:r>
-            <a:r>
-              <a:rPr lang="en-US" sz="1800" dirty="0" err="1">
-                <a:latin typeface="Consolas" panose="020B0609020204030204" pitchFamily="49" charset="0"/>
-              </a:rPr>
-              <a:t>AddingExpr</a:t>
-            </a:r>
-            <a:r>
-              <a:rPr lang="en-US" sz="1800" dirty="0">
-                <a:latin typeface="Consolas" panose="020B0609020204030204" pitchFamily="49" charset="0"/>
-              </a:rPr>
-              <a:t>(Expression </a:t>
-            </a:r>
-            <a:r>
-              <a:rPr lang="en-US" sz="1800" dirty="0" err="1">
-                <a:latin typeface="Consolas" panose="020B0609020204030204" pitchFamily="49" charset="0"/>
-              </a:rPr>
-              <a:t>leftOperand</a:t>
-            </a:r>
-            <a:r>
-              <a:rPr lang="en-US" sz="1800" dirty="0">
-                <a:latin typeface="Consolas" panose="020B0609020204030204" pitchFamily="49" charset="0"/>
-              </a:rPr>
-              <a:t>, Token operator, </a:t>
-            </a:r>
-          </a:p>
-          <a:p>
-            <a:pPr marL="457200" indent="0">
-              <a:spcBef>
-                <a:spcPts val="200"/>
-              </a:spcBef>
-              <a:buNone/>
-            </a:pPr>
-            <a:r>
-              <a:rPr lang="en-US" sz="1800" dirty="0">
-                <a:latin typeface="Consolas" panose="020B0609020204030204" pitchFamily="49" charset="0"/>
-              </a:rPr>
-              <a:t>                  Expression </a:t>
-            </a:r>
-            <a:r>
-              <a:rPr lang="en-US" sz="1800" dirty="0" err="1">
-                <a:latin typeface="Consolas" panose="020B0609020204030204" pitchFamily="49" charset="0"/>
-              </a:rPr>
-              <a:t>rightOperand</a:t>
-            </a:r>
-            <a:r>
-              <a:rPr lang="en-US" sz="1800" dirty="0">
-                <a:latin typeface="Consolas" panose="020B0609020204030204" pitchFamily="49" charset="0"/>
-              </a:rPr>
-              <a:t>)</a:t>
-            </a:r>
-          </a:p>
-          <a:p>
-            <a:pPr marL="457200" indent="0">
-              <a:spcBef>
-                <a:spcPts val="200"/>
-              </a:spcBef>
-              <a:buNone/>
-            </a:pPr>
-            <a:r>
-              <a:rPr lang="en-US" sz="1800" dirty="0">
-                <a:latin typeface="Consolas" panose="020B0609020204030204" pitchFamily="49" charset="0"/>
-              </a:rPr>
-              <a:t>  {</a:t>
-            </a:r>
-          </a:p>
-          <a:p>
-            <a:pPr marL="457200" indent="0">
-              <a:spcBef>
-                <a:spcPts val="200"/>
-              </a:spcBef>
-              <a:buNone/>
-            </a:pPr>
-            <a:r>
-              <a:rPr lang="en-US" sz="1800" dirty="0">
-                <a:latin typeface="Consolas" panose="020B0609020204030204" pitchFamily="49" charset="0"/>
-              </a:rPr>
-              <a:t>    super(</a:t>
-            </a:r>
-            <a:r>
-              <a:rPr lang="en-US" sz="1800" dirty="0" err="1">
-                <a:latin typeface="Consolas" panose="020B0609020204030204" pitchFamily="49" charset="0"/>
-              </a:rPr>
-              <a:t>leftOperand</a:t>
-            </a:r>
-            <a:r>
-              <a:rPr lang="en-US" sz="1800" dirty="0">
-                <a:latin typeface="Consolas" panose="020B0609020204030204" pitchFamily="49" charset="0"/>
-              </a:rPr>
-              <a:t>, operator, </a:t>
-            </a:r>
-            <a:r>
-              <a:rPr lang="en-US" sz="1800" dirty="0" err="1">
-                <a:latin typeface="Consolas" panose="020B0609020204030204" pitchFamily="49" charset="0"/>
-              </a:rPr>
-              <a:t>rightOperand</a:t>
-            </a:r>
-            <a:r>
-              <a:rPr lang="en-US" sz="1800" dirty="0">
-                <a:latin typeface="Consolas" panose="020B0609020204030204" pitchFamily="49" charset="0"/>
-              </a:rPr>
-              <a:t>);</a:t>
-            </a:r>
-          </a:p>
-          <a:p>
-            <a:pPr marL="457200" indent="0">
-              <a:spcBef>
-                <a:spcPts val="200"/>
-              </a:spcBef>
-              <a:buNone/>
-            </a:pPr>
-            <a:r>
-              <a:rPr lang="en-US" sz="1800" dirty="0">
-                <a:latin typeface="Consolas" panose="020B0609020204030204" pitchFamily="49" charset="0"/>
-              </a:rPr>
-              <a:t>    </a:t>
-            </a:r>
-            <a:r>
-              <a:rPr lang="en-US" sz="1800" b="1" dirty="0" err="1">
-                <a:latin typeface="Consolas" panose="020B0609020204030204" pitchFamily="49" charset="0"/>
-              </a:rPr>
-              <a:t>setType</a:t>
-            </a:r>
-            <a:r>
-              <a:rPr lang="en-US" sz="1800" b="1" dirty="0">
-                <a:latin typeface="Consolas" panose="020B0609020204030204" pitchFamily="49" charset="0"/>
-              </a:rPr>
-              <a:t>(</a:t>
-            </a:r>
-            <a:r>
-              <a:rPr lang="en-US" sz="1800" b="1" dirty="0" err="1">
-                <a:latin typeface="Consolas" panose="020B0609020204030204" pitchFamily="49" charset="0"/>
-              </a:rPr>
-              <a:t>Type.Integer</a:t>
-            </a:r>
-            <a:r>
-              <a:rPr lang="en-US" sz="1800" b="1" dirty="0">
-                <a:latin typeface="Consolas" panose="020B0609020204030204" pitchFamily="49" charset="0"/>
-              </a:rPr>
-              <a:t>);</a:t>
-            </a:r>
-          </a:p>
-          <a:p>
-            <a:pPr marL="457200" indent="0">
-              <a:spcBef>
-                <a:spcPts val="200"/>
-              </a:spcBef>
-              <a:buNone/>
-            </a:pPr>
-            <a:r>
-              <a:rPr lang="en-US" sz="1800" dirty="0">
-                <a:latin typeface="Consolas" panose="020B0609020204030204" pitchFamily="49" charset="0"/>
-              </a:rPr>
-              <a:t>    ...</a:t>
-            </a:r>
-          </a:p>
-          <a:p>
-            <a:pPr marL="457200" indent="0">
-              <a:spcBef>
-                <a:spcPts val="200"/>
-              </a:spcBef>
-              <a:buNone/>
-            </a:pPr>
-            <a:r>
-              <a:rPr lang="en-US" sz="1800" dirty="0">
-                <a:latin typeface="Consolas" panose="020B0609020204030204" pitchFamily="49" charset="0"/>
-              </a:rPr>
-              <a:t>  }</a:t>
+              <a:t>For most “real” programming languages, determining the type of an adding expression can be somewhat complicated.</a:t>
+            </a:r>
+          </a:p>
+          <a:p>
+            <a:pPr lvl="1"/>
+            <a:r>
+              <a:rPr lang="en-US" dirty="0"/>
+              <a:t>C and Java have multiple numeric types with rules about automatic conversions (coercions) when an operator has different operand types.</a:t>
+            </a:r>
+          </a:p>
+          <a:p>
+            <a:r>
+              <a:rPr lang="en-US" dirty="0"/>
+              <a:t>In CPRL, an adding expression always has type Integer.  (Similarly for a multiplying expression in CPRL.)</a:t>
             </a:r>
           </a:p>
         </p:txBody>
@@ -21018,7 +20923,7 @@
     </p:spTree>
     <p:extLst>
       <p:ext uri="{BB962C8B-B14F-4D97-AF65-F5344CB8AC3E}">
-        <p14:creationId xmlns:p14="http://schemas.microsoft.com/office/powerpoint/2010/main" val="2587237733"/>
+        <p14:creationId xmlns:p14="http://schemas.microsoft.com/office/powerpoint/2010/main" val="1930244420"/>
       </p:ext>
     </p:extLst>
   </p:cSld>
@@ -21071,10 +20976,19 @@
               <a:t>Example: </a:t>
             </a:r>
             <a:r>
+              <a:rPr lang="en-US" dirty="0" err="1">
+                <a:latin typeface="Consolas" panose="020B0609020204030204" pitchFamily="49" charset="0"/>
+              </a:rPr>
+              <a:t>AddingExpr</a:t>
+            </a:r>
+            <a:br>
               <a:rPr lang="en-US" dirty="0">
                 <a:latin typeface="Consolas" panose="020B0609020204030204" pitchFamily="49" charset="0"/>
               </a:rPr>
-              <a:t>Variable</a:t>
+            </a:br>
+            <a:r>
+              <a:rPr lang="en-US" sz="2400" dirty="0"/>
+              <a:t>(continued)</a:t>
             </a:r>
           </a:p>
         </p:txBody>
@@ -21102,64 +21016,81 @@
           <a:p>
             <a:r>
               <a:rPr lang="en-US" dirty="0"/>
-              <a:t>The type for a variable (and therefore also for a named value) is initialized to the type specified in the variable’s declaration.</a:t>
-            </a:r>
-          </a:p>
-          <a:p>
-            <a:r>
-              <a:rPr lang="en-US" dirty="0"/>
-              <a:t>Constructor for Variable</a:t>
-            </a:r>
-          </a:p>
-          <a:p>
-            <a:pPr marL="457200" lvl="1" indent="0">
-              <a:buNone/>
-            </a:pPr>
-            <a:r>
-              <a:rPr lang="en-US" sz="1800" dirty="0">
-                <a:latin typeface="Consolas" panose="020B0609020204030204" pitchFamily="49" charset="0"/>
-              </a:rPr>
-              <a:t>public Variable(</a:t>
+              <a:t>Constructor for </a:t>
+            </a:r>
+            <a:r>
+              <a:rPr lang="en-US" dirty="0" err="1">
+                <a:latin typeface="Consolas" panose="020B0609020204030204" pitchFamily="49" charset="0"/>
+              </a:rPr>
+              <a:t>AddingExpr</a:t>
+            </a:r>
+            <a:endParaRPr lang="en-US" dirty="0">
+              <a:latin typeface="Consolas" panose="020B0609020204030204" pitchFamily="49" charset="0"/>
+            </a:endParaRPr>
+          </a:p>
+          <a:p>
+            <a:pPr marL="457200" indent="0">
+              <a:buNone/>
+            </a:pPr>
+            <a:r>
+              <a:rPr lang="en-US" sz="1800" dirty="0">
+                <a:latin typeface="Consolas" panose="020B0609020204030204" pitchFamily="49" charset="0"/>
+              </a:rPr>
+              <a:t>public </a:t>
             </a:r>
             <a:r>
               <a:rPr lang="en-US" sz="1800" dirty="0" err="1">
                 <a:latin typeface="Consolas" panose="020B0609020204030204" pitchFamily="49" charset="0"/>
               </a:rPr>
-              <a:t>NamedDecl</a:t>
-            </a:r>
-            <a:r>
-              <a:rPr lang="en-US" sz="1800" dirty="0">
-                <a:latin typeface="Consolas" panose="020B0609020204030204" pitchFamily="49" charset="0"/>
-              </a:rPr>
-              <a:t> </a:t>
+              <a:t>AddingExpr</a:t>
+            </a:r>
+            <a:r>
+              <a:rPr lang="en-US" sz="1800" dirty="0">
+                <a:latin typeface="Consolas" panose="020B0609020204030204" pitchFamily="49" charset="0"/>
+              </a:rPr>
+              <a:t>(Expression </a:t>
             </a:r>
             <a:r>
               <a:rPr lang="en-US" sz="1800" dirty="0" err="1">
                 <a:latin typeface="Consolas" panose="020B0609020204030204" pitchFamily="49" charset="0"/>
               </a:rPr>
-              <a:t>decl</a:t>
-            </a:r>
-            <a:r>
-              <a:rPr lang="en-US" sz="1800" dirty="0">
-                <a:latin typeface="Consolas" panose="020B0609020204030204" pitchFamily="49" charset="0"/>
-              </a:rPr>
-              <a:t>, Position </a:t>
+              <a:t>leftOperand</a:t>
+            </a:r>
+            <a:r>
+              <a:rPr lang="en-US" sz="1800" dirty="0">
+                <a:latin typeface="Consolas" panose="020B0609020204030204" pitchFamily="49" charset="0"/>
+              </a:rPr>
+              <a:t>, Token operator, </a:t>
+            </a:r>
+          </a:p>
+          <a:p>
+            <a:pPr marL="457200" indent="0">
+              <a:spcBef>
+                <a:spcPts val="200"/>
+              </a:spcBef>
+              <a:buNone/>
+            </a:pPr>
+            <a:r>
+              <a:rPr lang="en-US" sz="1800" dirty="0">
+                <a:latin typeface="Consolas" panose="020B0609020204030204" pitchFamily="49" charset="0"/>
+              </a:rPr>
+              <a:t>                  Expression </a:t>
             </a:r>
             <a:r>
               <a:rPr lang="en-US" sz="1800" dirty="0" err="1">
                 <a:latin typeface="Consolas" panose="020B0609020204030204" pitchFamily="49" charset="0"/>
               </a:rPr>
-              <a:t>position</a:t>
-            </a:r>
-            <a:r>
-              <a:rPr lang="en-US" sz="1800" dirty="0">
-                <a:latin typeface="Consolas" panose="020B0609020204030204" pitchFamily="49" charset="0"/>
-              </a:rPr>
-              <a:t>,</a:t>
-            </a:r>
-          </a:p>
-          <a:p>
-            <a:pPr marL="457200" lvl="1" indent="0">
+              <a:t>rightOperand</a:t>
+            </a:r>
+            <a:r>
+              <a:rPr lang="en-US" sz="1800" dirty="0">
+                <a:latin typeface="Consolas" panose="020B0609020204030204" pitchFamily="49" charset="0"/>
+              </a:rPr>
+              <a:t>)</a:t>
+            </a:r>
+          </a:p>
+          <a:p>
+            <a:pPr marL="457200" indent="0">
               <a:spcBef>
                 <a:spcPts val="200"/>
               </a:spcBef>
@@ -21169,23 +21100,49 @@
               <a:rPr lang="en-US" sz="1800" dirty="0">
                 <a:latin typeface="Consolas" panose="020B0609020204030204" pitchFamily="49" charset="0"/>
               </a:rPr>
-              <a:t>                List&lt;Expression&gt; </a:t>
+              <a:t>  {</a:t>
+            </a:r>
+          </a:p>
+          <a:p>
+            <a:pPr marL="457200" indent="0">
+              <a:spcBef>
+                <a:spcPts val="200"/>
+              </a:spcBef>
+              <a:buNone/>
+            </a:pPr>
+            <a:r>
+              <a:rPr lang="en-US" sz="1800" dirty="0">
+                <a:latin typeface="Consolas" panose="020B0609020204030204" pitchFamily="49" charset="0"/>
+              </a:rPr>
+              <a:t>    super(</a:t>
             </a:r>
             <a:r>
               <a:rPr lang="en-US" sz="1800" dirty="0" err="1">
                 <a:latin typeface="Consolas" panose="020B0609020204030204" pitchFamily="49" charset="0"/>
               </a:rPr>
-              <a:t>indexExprs</a:t>
-            </a:r>
-            <a:r>
-              <a:rPr lang="en-US" sz="1800" dirty="0">
-                <a:latin typeface="Consolas" panose="020B0609020204030204" pitchFamily="49" charset="0"/>
-              </a:rPr>
-              <a:t>)</a:t>
-            </a:r>
-          </a:p>
-          <a:p>
-            <a:pPr marL="457200" lvl="1" indent="0">
+              <a:t>leftOperand</a:t>
+            </a:r>
+            <a:r>
+              <a:rPr lang="en-US" sz="1800" dirty="0">
+                <a:latin typeface="Consolas" panose="020B0609020204030204" pitchFamily="49" charset="0"/>
+              </a:rPr>
+              <a:t>, operator, </a:t>
+            </a:r>
+            <a:r>
+              <a:rPr lang="en-US" sz="1800" dirty="0" err="1">
+                <a:latin typeface="Consolas" panose="020B0609020204030204" pitchFamily="49" charset="0"/>
+              </a:rPr>
+              <a:t>rightOperand</a:t>
+            </a:r>
+            <a:r>
+              <a:rPr lang="en-US" sz="1800" dirty="0">
+                <a:latin typeface="Consolas" panose="020B0609020204030204" pitchFamily="49" charset="0"/>
+              </a:rPr>
+              <a:t>);</a:t>
+            </a:r>
+          </a:p>
+          <a:p>
+            <a:pPr marL="457200" indent="0">
               <a:spcBef>
                 <a:spcPts val="200"/>
               </a:spcBef>
@@ -21195,11 +21152,35 @@
               <a:rPr lang="en-US" sz="1800" dirty="0">
                 <a:latin typeface="Consolas" panose="020B0609020204030204" pitchFamily="49" charset="0"/>
               </a:rPr>
-              <a:t>  {</a:t>
-            </a:r>
-          </a:p>
-          <a:p>
-            <a:pPr marL="457200" lvl="1" indent="0">
+              <a:t>    </a:t>
+            </a:r>
+            <a:r>
+              <a:rPr lang="en-US" sz="1800" b="1" dirty="0" err="1">
+                <a:latin typeface="Consolas" panose="020B0609020204030204" pitchFamily="49" charset="0"/>
+              </a:rPr>
+              <a:t>setType</a:t>
+            </a:r>
+            <a:r>
+              <a:rPr lang="en-US" sz="1800" b="1" dirty="0">
+                <a:latin typeface="Consolas" panose="020B0609020204030204" pitchFamily="49" charset="0"/>
+              </a:rPr>
+              <a:t>(</a:t>
+            </a:r>
+            <a:r>
+              <a:rPr lang="en-US" sz="1800" b="1" dirty="0" err="1">
+                <a:latin typeface="Consolas" panose="020B0609020204030204" pitchFamily="49" charset="0"/>
+              </a:rPr>
+              <a:t>Type.Integer</a:t>
+            </a:r>
+            <a:r>
+              <a:rPr lang="en-US" sz="1800" b="1" dirty="0">
+                <a:latin typeface="Consolas" panose="020B0609020204030204" pitchFamily="49" charset="0"/>
+              </a:rPr>
+              <a:t>);</a:t>
+            </a:r>
+          </a:p>
+          <a:p>
+            <a:pPr marL="457200" indent="0">
               <a:spcBef>
                 <a:spcPts val="200"/>
               </a:spcBef>
@@ -21209,105 +21190,11 @@
               <a:rPr lang="en-US" sz="1800" dirty="0">
                 <a:latin typeface="Consolas" panose="020B0609020204030204" pitchFamily="49" charset="0"/>
               </a:rPr>
-              <a:t>    </a:t>
-            </a:r>
-            <a:r>
-              <a:rPr lang="en-US" sz="1800" b="1" dirty="0">
-                <a:latin typeface="Consolas" panose="020B0609020204030204" pitchFamily="49" charset="0"/>
-              </a:rPr>
-              <a:t>super(</a:t>
-            </a:r>
-            <a:r>
-              <a:rPr lang="en-US" sz="1800" b="1" dirty="0" err="1">
-                <a:latin typeface="Consolas" panose="020B0609020204030204" pitchFamily="49" charset="0"/>
-              </a:rPr>
-              <a:t>decl.getType</a:t>
-            </a:r>
-            <a:r>
-              <a:rPr lang="en-US" sz="1800" b="1" dirty="0">
-                <a:latin typeface="Consolas" panose="020B0609020204030204" pitchFamily="49" charset="0"/>
-              </a:rPr>
-              <a:t>(), position);</a:t>
-            </a:r>
-          </a:p>
-          <a:p>
-            <a:pPr marL="457200" lvl="1" indent="0">
-              <a:spcBef>
-                <a:spcPts val="200"/>
-              </a:spcBef>
-              <a:buNone/>
-            </a:pPr>
-            <a:r>
-              <a:rPr lang="en-US" sz="1800" dirty="0">
-                <a:latin typeface="Consolas" panose="020B0609020204030204" pitchFamily="49" charset="0"/>
-              </a:rPr>
-              <a:t>    </a:t>
-            </a:r>
-            <a:r>
-              <a:rPr lang="en-US" sz="1800" dirty="0" err="1">
-                <a:latin typeface="Consolas" panose="020B0609020204030204" pitchFamily="49" charset="0"/>
-              </a:rPr>
-              <a:t>this.decl</a:t>
-            </a:r>
-            <a:r>
-              <a:rPr lang="en-US" sz="1800" dirty="0">
-                <a:latin typeface="Consolas" panose="020B0609020204030204" pitchFamily="49" charset="0"/>
-              </a:rPr>
-              <a:t>       = </a:t>
-            </a:r>
-            <a:r>
-              <a:rPr lang="en-US" sz="1800" dirty="0" err="1">
-                <a:latin typeface="Consolas" panose="020B0609020204030204" pitchFamily="49" charset="0"/>
-              </a:rPr>
-              <a:t>decl</a:t>
-            </a:r>
-            <a:r>
-              <a:rPr lang="en-US" sz="1800" dirty="0">
-                <a:latin typeface="Consolas" panose="020B0609020204030204" pitchFamily="49" charset="0"/>
-              </a:rPr>
-              <a:t>;</a:t>
-            </a:r>
-          </a:p>
-          <a:p>
-            <a:pPr marL="457200" lvl="1" indent="0">
-              <a:spcBef>
-                <a:spcPts val="200"/>
-              </a:spcBef>
-              <a:buNone/>
-            </a:pPr>
-            <a:r>
-              <a:rPr lang="en-US" sz="1800" dirty="0">
-                <a:latin typeface="Consolas" panose="020B0609020204030204" pitchFamily="49" charset="0"/>
-              </a:rPr>
-              <a:t>    </a:t>
-            </a:r>
-            <a:r>
-              <a:rPr lang="en-US" sz="1800" dirty="0" err="1">
-                <a:latin typeface="Consolas" panose="020B0609020204030204" pitchFamily="49" charset="0"/>
-              </a:rPr>
-              <a:t>this.indexExprs</a:t>
-            </a:r>
-            <a:r>
-              <a:rPr lang="en-US" sz="1800" dirty="0">
-                <a:latin typeface="Consolas" panose="020B0609020204030204" pitchFamily="49" charset="0"/>
-              </a:rPr>
-              <a:t> = </a:t>
-            </a:r>
-            <a:r>
-              <a:rPr lang="en-US" sz="1800" dirty="0" err="1">
-                <a:latin typeface="Consolas" panose="020B0609020204030204" pitchFamily="49" charset="0"/>
-              </a:rPr>
-              <a:t>indexExprs</a:t>
-            </a:r>
-            <a:r>
-              <a:rPr lang="en-US" sz="1800" dirty="0">
-                <a:latin typeface="Consolas" panose="020B0609020204030204" pitchFamily="49" charset="0"/>
-              </a:rPr>
-              <a:t>;</a:t>
-            </a:r>
-          </a:p>
-          <a:p>
-            <a:pPr marL="457200" lvl="1" indent="0">
+              <a:t>    ...</a:t>
+            </a:r>
+          </a:p>
+          <a:p>
+            <a:pPr marL="457200" indent="0">
               <a:spcBef>
                 <a:spcPts val="200"/>
               </a:spcBef>
@@ -21396,7 +21283,7 @@
     </p:spTree>
     <p:extLst>
       <p:ext uri="{BB962C8B-B14F-4D97-AF65-F5344CB8AC3E}">
-        <p14:creationId xmlns:p14="http://schemas.microsoft.com/office/powerpoint/2010/main" val="3229506688"/>
+        <p14:creationId xmlns:p14="http://schemas.microsoft.com/office/powerpoint/2010/main" val="2587237733"/>
       </p:ext>
     </p:extLst>
   </p:cSld>
@@ -21454,13 +21341,6 @@
               </a:rPr>
               <a:t>Variable</a:t>
             </a:r>
-            <a:br>
-              <a:rPr lang="en-US" dirty="0"/>
-            </a:br>
-            <a:r>
-              <a:rPr lang="en-US" sz="2400" dirty="0"/>
-              <a:t>(continued)</a:t>
-            </a:r>
           </a:p>
         </p:txBody>
       </p:sp>
@@ -21480,45 +21360,20 @@
             <p:ph idx="1"/>
           </p:nvPr>
         </p:nvSpPr>
-        <p:spPr>
-          <a:xfrm>
-            <a:off x="458788" y="1363663"/>
-            <a:ext cx="8229600" cy="4935537"/>
-          </a:xfrm>
-        </p:spPr>
-        <p:txBody>
-          <a:bodyPr/>
-          <a:lstStyle/>
-          <a:p>
-            <a:r>
-              <a:rPr lang="en-US" dirty="0"/>
-              <a:t>The initialized type for a variable is correct for predefined types such as </a:t>
-            </a:r>
-            <a:r>
-              <a:rPr lang="en-US" dirty="0">
-                <a:latin typeface="Consolas" panose="020B0609020204030204" pitchFamily="49" charset="0"/>
-              </a:rPr>
-              <a:t>Integer</a:t>
-            </a:r>
-            <a:r>
-              <a:rPr lang="en-US" dirty="0"/>
-              <a:t> or </a:t>
-            </a:r>
-            <a:r>
-              <a:rPr lang="en-US" dirty="0">
-                <a:latin typeface="Consolas" panose="020B0609020204030204" pitchFamily="49" charset="0"/>
-              </a:rPr>
-              <a:t>Char</a:t>
-            </a:r>
-            <a:r>
-              <a:rPr lang="en-US" dirty="0"/>
-              <a:t>, but additional work is required for arrays.</a:t>
-            </a:r>
-          </a:p>
-          <a:p>
-            <a:r>
-              <a:rPr lang="en-US" dirty="0"/>
-              <a:t>Consider the following declarations:</a:t>
+        <p:spPr/>
+        <p:txBody>
+          <a:bodyPr/>
+          <a:lstStyle/>
+          <a:p>
+            <a:r>
+              <a:rPr lang="en-US" dirty="0"/>
+              <a:t>The type for a variable (and therefore also for a named value) is initialized to the type specified in the variable’s declaration.</a:t>
+            </a:r>
+          </a:p>
+          <a:p>
+            <a:r>
+              <a:rPr lang="en-US" dirty="0"/>
+              <a:t>Constructor for Variable</a:t>
             </a:r>
           </a:p>
           <a:p>
@@ -21526,10 +21381,46 @@
               <a:buNone/>
             </a:pPr>
             <a:r>
-              <a:rPr lang="en-US" dirty="0">
-                <a:latin typeface="Consolas" panose="020B0609020204030204" pitchFamily="49" charset="0"/>
-              </a:rPr>
-              <a:t>type T1 is array(10) of Integer;</a:t>
+              <a:rPr lang="en-US" sz="1800" dirty="0">
+                <a:latin typeface="Consolas" panose="020B0609020204030204" pitchFamily="49" charset="0"/>
+              </a:rPr>
+              <a:t>public Variable(</a:t>
+            </a:r>
+            <a:r>
+              <a:rPr lang="en-US" sz="1800" dirty="0" err="1">
+                <a:latin typeface="Consolas" panose="020B0609020204030204" pitchFamily="49" charset="0"/>
+              </a:rPr>
+              <a:t>NamedDecl</a:t>
+            </a:r>
+            <a:r>
+              <a:rPr lang="en-US" sz="1800" dirty="0">
+                <a:latin typeface="Consolas" panose="020B0609020204030204" pitchFamily="49" charset="0"/>
+              </a:rPr>
+              <a:t> </a:t>
+            </a:r>
+            <a:r>
+              <a:rPr lang="en-US" sz="1800" dirty="0" err="1">
+                <a:latin typeface="Consolas" panose="020B0609020204030204" pitchFamily="49" charset="0"/>
+              </a:rPr>
+              <a:t>decl</a:t>
+            </a:r>
+            <a:r>
+              <a:rPr lang="en-US" sz="1800" dirty="0">
+                <a:latin typeface="Consolas" panose="020B0609020204030204" pitchFamily="49" charset="0"/>
+              </a:rPr>
+              <a:t>, Position </a:t>
+            </a:r>
+            <a:r>
+              <a:rPr lang="en-US" sz="1800" dirty="0" err="1">
+                <a:latin typeface="Consolas" panose="020B0609020204030204" pitchFamily="49" charset="0"/>
+              </a:rPr>
+              <a:t>position</a:t>
+            </a:r>
+            <a:r>
+              <a:rPr lang="en-US" sz="1800" dirty="0">
+                <a:latin typeface="Consolas" panose="020B0609020204030204" pitchFamily="49" charset="0"/>
+              </a:rPr>
+              <a:t>,</a:t>
             </a:r>
           </a:p>
           <a:p>
@@ -21540,10 +21431,22 @@
               <a:buNone/>
             </a:pPr>
             <a:r>
-              <a:rPr lang="en-US" dirty="0">
-                <a:latin typeface="Consolas" panose="020B0609020204030204" pitchFamily="49" charset="0"/>
-              </a:rPr>
-              <a:t>type T2 is array(10) of T1;</a:t>
+              <a:rPr lang="en-US" sz="1800" dirty="0">
+                <a:latin typeface="Consolas" panose="020B0609020204030204" pitchFamily="49" charset="0"/>
+              </a:rPr>
+              <a:t>                List&lt;Expression&gt; </a:t>
+            </a:r>
+            <a:r>
+              <a:rPr lang="en-US" sz="1800" dirty="0" err="1">
+                <a:latin typeface="Consolas" panose="020B0609020204030204" pitchFamily="49" charset="0"/>
+              </a:rPr>
+              <a:t>indexExprs</a:t>
+            </a:r>
+            <a:r>
+              <a:rPr lang="en-US" sz="1800" dirty="0">
+                <a:latin typeface="Consolas" panose="020B0609020204030204" pitchFamily="49" charset="0"/>
+              </a:rPr>
+              <a:t>)</a:t>
             </a:r>
           </a:p>
           <a:p>
@@ -21554,76 +21457,80 @@
               <a:buNone/>
             </a:pPr>
             <a:r>
-              <a:rPr lang="en-US" dirty="0">
-                <a:latin typeface="Consolas" panose="020B0609020204030204" pitchFamily="49" charset="0"/>
-              </a:rPr>
-              <a:t>var a, b : T2;</a:t>
-            </a:r>
-          </a:p>
-          <a:p>
-            <a:r>
-              <a:rPr lang="en-US" dirty="0"/>
-              <a:t>While the declared (initialized) type of both </a:t>
-            </a:r>
-            <a:r>
-              <a:rPr lang="en-US" dirty="0">
-                <a:latin typeface="Consolas" panose="020B0609020204030204" pitchFamily="49" charset="0"/>
-              </a:rPr>
-              <a:t>a</a:t>
-            </a:r>
-            <a:r>
-              <a:rPr lang="en-US" dirty="0"/>
-              <a:t> and </a:t>
-            </a:r>
-            <a:r>
-              <a:rPr lang="en-US" dirty="0">
-                <a:latin typeface="Consolas" panose="020B0609020204030204" pitchFamily="49" charset="0"/>
-              </a:rPr>
-              <a:t>b</a:t>
-            </a:r>
-            <a:r>
-              <a:rPr lang="en-US" dirty="0"/>
-              <a:t> is </a:t>
-            </a:r>
-            <a:r>
-              <a:rPr lang="en-US" dirty="0">
-                <a:latin typeface="Consolas" panose="020B0609020204030204" pitchFamily="49" charset="0"/>
-              </a:rPr>
-              <a:t>T2</a:t>
-            </a:r>
-            <a:r>
-              <a:rPr lang="en-US" dirty="0"/>
-              <a:t>, we could have a variable or named value with zero, one,</a:t>
-            </a:r>
-            <a:br>
-              <a:rPr lang="en-US" dirty="0"/>
-            </a:br>
-            <a:r>
-              <a:rPr lang="en-US" dirty="0"/>
-              <a:t>or two index expressions, as in the following:</a:t>
+              <a:rPr lang="en-US" sz="1800" dirty="0">
+                <a:latin typeface="Consolas" panose="020B0609020204030204" pitchFamily="49" charset="0"/>
+              </a:rPr>
+              <a:t>  {</a:t>
             </a:r>
           </a:p>
           <a:p>
             <a:pPr marL="457200" lvl="1" indent="0">
-              <a:buNone/>
-            </a:pPr>
-            <a:r>
-              <a:rPr lang="en-US" sz="1800" dirty="0">
-                <a:latin typeface="Consolas" panose="020B0609020204030204" pitchFamily="49" charset="0"/>
-              </a:rPr>
-              <a:t>a := b;              // type of var and named </a:t>
+              <a:spcBef>
+                <a:spcPts val="200"/>
+              </a:spcBef>
+              <a:buNone/>
+            </a:pPr>
+            <a:r>
+              <a:rPr lang="en-US" sz="1800" dirty="0">
+                <a:latin typeface="Consolas" panose="020B0609020204030204" pitchFamily="49" charset="0"/>
+              </a:rPr>
+              <a:t>    </a:t>
+            </a:r>
+            <a:r>
+              <a:rPr lang="en-US" sz="1800" b="1" dirty="0">
+                <a:latin typeface="Consolas" panose="020B0609020204030204" pitchFamily="49" charset="0"/>
+              </a:rPr>
+              <a:t>super(</a:t>
+            </a:r>
+            <a:r>
+              <a:rPr lang="en-US" sz="1800" b="1" dirty="0" err="1">
+                <a:latin typeface="Consolas" panose="020B0609020204030204" pitchFamily="49" charset="0"/>
+              </a:rPr>
+              <a:t>decl.getType</a:t>
+            </a:r>
+            <a:r>
+              <a:rPr lang="en-US" sz="1800" b="1" dirty="0">
+                <a:latin typeface="Consolas" panose="020B0609020204030204" pitchFamily="49" charset="0"/>
+              </a:rPr>
+              <a:t>(), position);</a:t>
+            </a:r>
+          </a:p>
+          <a:p>
+            <a:pPr marL="457200" lvl="1" indent="0">
+              <a:spcBef>
+                <a:spcPts val="200"/>
+              </a:spcBef>
+              <a:buNone/>
+            </a:pPr>
+            <a:r>
+              <a:rPr lang="en-US" sz="1800" dirty="0">
+                <a:latin typeface="Consolas" panose="020B0609020204030204" pitchFamily="49" charset="0"/>
+              </a:rPr>
+              <a:t>    </a:t>
             </a:r>
             <a:r>
               <a:rPr lang="en-US" sz="1800" dirty="0" err="1">
                 <a:latin typeface="Consolas" panose="020B0609020204030204" pitchFamily="49" charset="0"/>
               </a:rPr>
-              <a:t>val</a:t>
-            </a:r>
-            <a:r>
-              <a:rPr lang="en-US" sz="1800" dirty="0">
-                <a:latin typeface="Consolas" panose="020B0609020204030204" pitchFamily="49" charset="0"/>
-              </a:rPr>
-              <a:t> is T2</a:t>
+              <a:t>this.decl</a:t>
+            </a:r>
+            <a:r>
+              <a:rPr lang="en-US" sz="1800" dirty="0">
+                <a:latin typeface="Consolas" panose="020B0609020204030204" pitchFamily="49" charset="0"/>
+              </a:rPr>
+              <a:t>       = </a:t>
+            </a:r>
+            <a:r>
+              <a:rPr lang="en-US" sz="1800" dirty="0" err="1">
+                <a:latin typeface="Consolas" panose="020B0609020204030204" pitchFamily="49" charset="0"/>
+              </a:rPr>
+              <a:t>decl</a:t>
+            </a:r>
+            <a:r>
+              <a:rPr lang="en-US" sz="1800" dirty="0">
+                <a:latin typeface="Consolas" panose="020B0609020204030204" pitchFamily="49" charset="0"/>
+              </a:rPr>
+              <a:t>;</a:t>
             </a:r>
           </a:p>
           <a:p>
@@ -21637,19 +21544,31 @@
               <a:rPr lang="en-US" sz="1800" dirty="0">
                 <a:latin typeface="Consolas" panose="020B0609020204030204" pitchFamily="49" charset="0"/>
               </a:rPr>
-              <a:t>a[0] := b[0];        // type of var and named </a:t>
+              <a:t>    </a:t>
             </a:r>
             <a:r>
               <a:rPr lang="en-US" sz="1800" dirty="0" err="1">
                 <a:latin typeface="Consolas" panose="020B0609020204030204" pitchFamily="49" charset="0"/>
               </a:rPr>
-              <a:t>val</a:t>
-            </a:r>
-            <a:r>
-              <a:rPr lang="en-US" sz="1800" dirty="0">
-                <a:latin typeface="Consolas" panose="020B0609020204030204" pitchFamily="49" charset="0"/>
-              </a:rPr>
-              <a:t> is T1</a:t>
+              <a:t>this.indexExprs</a:t>
+            </a:r>
+            <a:r>
+              <a:rPr lang="en-US" sz="1800" dirty="0">
+                <a:latin typeface="Consolas" panose="020B0609020204030204" pitchFamily="49" charset="0"/>
+              </a:rPr>
+              <a:t> = </a:t>
+            </a:r>
+            <a:r>
+              <a:rPr lang="en-US" sz="1800" dirty="0" err="1">
+                <a:latin typeface="Consolas" panose="020B0609020204030204" pitchFamily="49" charset="0"/>
+              </a:rPr>
+              <a:t>indexExprs</a:t>
+            </a:r>
+            <a:r>
+              <a:rPr lang="en-US" sz="1800" dirty="0">
+                <a:latin typeface="Consolas" panose="020B0609020204030204" pitchFamily="49" charset="0"/>
+              </a:rPr>
+              <a:t>;</a:t>
             </a:r>
           </a:p>
           <a:p>
@@ -21663,19 +21582,7 @@
               <a:rPr lang="en-US" sz="1800" dirty="0">
                 <a:latin typeface="Consolas" panose="020B0609020204030204" pitchFamily="49" charset="0"/>
               </a:rPr>
-              <a:t>a[1][6] := b[5][7];  // type of var and named </a:t>
-            </a:r>
-            <a:r>
-              <a:rPr lang="en-US" sz="1800" dirty="0" err="1">
-                <a:latin typeface="Consolas" panose="020B0609020204030204" pitchFamily="49" charset="0"/>
-              </a:rPr>
-              <a:t>val</a:t>
-            </a:r>
-            <a:r>
-              <a:rPr lang="en-US" sz="1800" dirty="0">
-                <a:latin typeface="Consolas" panose="020B0609020204030204" pitchFamily="49" charset="0"/>
-              </a:rPr>
-              <a:t> is Integer</a:t>
+              <a:t>  }</a:t>
             </a:r>
           </a:p>
         </p:txBody>
@@ -21754,7 +21661,7 @@
     </p:spTree>
     <p:extLst>
       <p:ext uri="{BB962C8B-B14F-4D97-AF65-F5344CB8AC3E}">
-        <p14:creationId xmlns:p14="http://schemas.microsoft.com/office/powerpoint/2010/main" val="3020442727"/>
+        <p14:creationId xmlns:p14="http://schemas.microsoft.com/office/powerpoint/2010/main" val="3229506688"/>
       </p:ext>
     </p:extLst>
   </p:cSld>
@@ -22230,30 +22137,45 @@
             <p:ph idx="1"/>
           </p:nvPr>
         </p:nvSpPr>
-        <p:spPr/>
-        <p:txBody>
-          <a:bodyPr/>
-          <a:lstStyle/>
-          <a:p>
-            <a:r>
-              <a:rPr lang="en-US" dirty="0"/>
-              <a:t>For arrays, we determine the actual type of a variable or named value in method </a:t>
-            </a:r>
-            <a:r>
-              <a:rPr lang="en-US" dirty="0" err="1">
-                <a:latin typeface="Consolas" panose="020B0609020204030204" pitchFamily="49" charset="0"/>
-              </a:rPr>
-              <a:t>checkConstraints</a:t>
+        <p:spPr>
+          <a:xfrm>
+            <a:off x="458788" y="1363663"/>
+            <a:ext cx="8229600" cy="4935537"/>
+          </a:xfrm>
+        </p:spPr>
+        <p:txBody>
+          <a:bodyPr/>
+          <a:lstStyle/>
+          <a:p>
+            <a:r>
+              <a:rPr lang="en-US" dirty="0"/>
+              <a:t>The initialized type for a variable is correct for predefined types such as </a:t>
             </a:r>
             <a:r>
               <a:rPr lang="en-US" dirty="0">
                 <a:latin typeface="Consolas" panose="020B0609020204030204" pitchFamily="49" charset="0"/>
               </a:rPr>
-              <a:t>()</a:t>
-            </a:r>
-            <a:r>
-              <a:rPr lang="en-US" dirty="0"/>
-              <a:t>.</a:t>
+              <a:t>Integer</a:t>
+            </a:r>
+            <a:r>
+              <a:rPr lang="en-US" dirty="0"/>
+              <a:t> or </a:t>
+            </a:r>
+            <a:r>
+              <a:rPr lang="en-US" dirty="0">
+                <a:latin typeface="Consolas" panose="020B0609020204030204" pitchFamily="49" charset="0"/>
+              </a:rPr>
+              <a:t>Char</a:t>
+            </a:r>
+            <a:r>
+              <a:rPr lang="en-US" dirty="0"/>
+              <a:t>, but additional work is required for arrays.</a:t>
+            </a:r>
+          </a:p>
+          <a:p>
+            <a:r>
+              <a:rPr lang="en-US" dirty="0"/>
+              <a:t>Consider the following declarations:</a:t>
             </a:r>
           </a:p>
           <a:p>
@@ -22261,344 +22183,156 @@
               <a:buNone/>
             </a:pPr>
             <a:r>
-              <a:rPr lang="en-US" sz="1750" dirty="0">
-                <a:latin typeface="Consolas" panose="020B0609020204030204" pitchFamily="49" charset="0"/>
-              </a:rPr>
-              <a:t>for (Expression expr : </a:t>
-            </a:r>
-            <a:r>
-              <a:rPr lang="en-US" sz="1750" dirty="0" err="1">
-                <a:latin typeface="Consolas" panose="020B0609020204030204" pitchFamily="49" charset="0"/>
-              </a:rPr>
-              <a:t>indexExprs</a:t>
-            </a:r>
-            <a:r>
-              <a:rPr lang="en-US" sz="1750" dirty="0">
-                <a:latin typeface="Consolas" panose="020B0609020204030204" pitchFamily="49" charset="0"/>
-              </a:rPr>
-              <a:t>)</a:t>
+              <a:rPr lang="en-US" dirty="0">
+                <a:latin typeface="Consolas" panose="020B0609020204030204" pitchFamily="49" charset="0"/>
+              </a:rPr>
+              <a:t>type T1 is array(10) of Integer;</a:t>
             </a:r>
           </a:p>
           <a:p>
             <a:pPr marL="457200" lvl="1" indent="0">
               <a:spcBef>
-                <a:spcPts val="100"/>
-              </a:spcBef>
-              <a:buNone/>
-            </a:pPr>
-            <a:r>
-              <a:rPr lang="en-US" sz="1750" dirty="0">
-                <a:latin typeface="Consolas" panose="020B0609020204030204" pitchFamily="49" charset="0"/>
-              </a:rPr>
-              <a:t>  {</a:t>
+                <a:spcPts val="200"/>
+              </a:spcBef>
+              <a:buNone/>
+            </a:pPr>
+            <a:r>
+              <a:rPr lang="en-US" dirty="0">
+                <a:latin typeface="Consolas" panose="020B0609020204030204" pitchFamily="49" charset="0"/>
+              </a:rPr>
+              <a:t>type T2 is array(10) of T1;</a:t>
             </a:r>
           </a:p>
           <a:p>
             <a:pPr marL="457200" lvl="1" indent="0">
               <a:spcBef>
-                <a:spcPts val="100"/>
-              </a:spcBef>
-              <a:buNone/>
-            </a:pPr>
-            <a:r>
-              <a:rPr lang="en-US" sz="1750" dirty="0">
-                <a:latin typeface="Consolas" panose="020B0609020204030204" pitchFamily="49" charset="0"/>
-              </a:rPr>
-              <a:t>    </a:t>
-            </a:r>
-            <a:r>
-              <a:rPr lang="en-US" sz="1750" dirty="0" err="1">
-                <a:latin typeface="Consolas" panose="020B0609020204030204" pitchFamily="49" charset="0"/>
-              </a:rPr>
-              <a:t>expr.checkConstraints</a:t>
-            </a:r>
-            <a:r>
-              <a:rPr lang="en-US" sz="1750" dirty="0">
-                <a:latin typeface="Consolas" panose="020B0609020204030204" pitchFamily="49" charset="0"/>
-              </a:rPr>
-              <a:t>();</a:t>
+                <a:spcPts val="200"/>
+              </a:spcBef>
+              <a:buNone/>
+            </a:pPr>
+            <a:r>
+              <a:rPr lang="en-US" dirty="0">
+                <a:latin typeface="Consolas" panose="020B0609020204030204" pitchFamily="49" charset="0"/>
+              </a:rPr>
+              <a:t>var a, b : T2;</a:t>
+            </a:r>
+          </a:p>
+          <a:p>
+            <a:r>
+              <a:rPr lang="en-US" dirty="0"/>
+              <a:t>While the declared (initialized) type of both </a:t>
+            </a:r>
+            <a:r>
+              <a:rPr lang="en-US" dirty="0">
+                <a:latin typeface="Consolas" panose="020B0609020204030204" pitchFamily="49" charset="0"/>
+              </a:rPr>
+              <a:t>a</a:t>
+            </a:r>
+            <a:r>
+              <a:rPr lang="en-US" dirty="0"/>
+              <a:t> and </a:t>
+            </a:r>
+            <a:r>
+              <a:rPr lang="en-US" dirty="0">
+                <a:latin typeface="Consolas" panose="020B0609020204030204" pitchFamily="49" charset="0"/>
+              </a:rPr>
+              <a:t>b</a:t>
+            </a:r>
+            <a:r>
+              <a:rPr lang="en-US" dirty="0"/>
+              <a:t> is </a:t>
+            </a:r>
+            <a:r>
+              <a:rPr lang="en-US" dirty="0">
+                <a:latin typeface="Consolas" panose="020B0609020204030204" pitchFamily="49" charset="0"/>
+              </a:rPr>
+              <a:t>T2</a:t>
+            </a:r>
+            <a:r>
+              <a:rPr lang="en-US" dirty="0"/>
+              <a:t>, we could have a variable or named value with zero, one,</a:t>
+            </a:r>
+            <a:br>
+              <a:rPr lang="en-US" dirty="0"/>
+            </a:br>
+            <a:r>
+              <a:rPr lang="en-US" dirty="0"/>
+              <a:t>or two index expressions, as in the following:</a:t>
             </a:r>
           </a:p>
           <a:p>
             <a:pPr marL="457200" lvl="1" indent="0">
-              <a:spcBef>
-                <a:spcPts val="100"/>
-              </a:spcBef>
-              <a:buNone/>
-            </a:pPr>
-            <a:endParaRPr lang="en-US" sz="1750" dirty="0">
-              <a:latin typeface="Consolas" panose="020B0609020204030204" pitchFamily="49" charset="0"/>
-            </a:endParaRPr>
+              <a:buNone/>
+            </a:pPr>
+            <a:r>
+              <a:rPr lang="en-US" sz="1800" dirty="0">
+                <a:latin typeface="Consolas" panose="020B0609020204030204" pitchFamily="49" charset="0"/>
+              </a:rPr>
+              <a:t>a := b;              // type of var and named </a:t>
+            </a:r>
+            <a:r>
+              <a:rPr lang="en-US" sz="1800" dirty="0" err="1">
+                <a:latin typeface="Consolas" panose="020B0609020204030204" pitchFamily="49" charset="0"/>
+              </a:rPr>
+              <a:t>val</a:t>
+            </a:r>
+            <a:r>
+              <a:rPr lang="en-US" sz="1800" dirty="0">
+                <a:latin typeface="Consolas" panose="020B0609020204030204" pitchFamily="49" charset="0"/>
+              </a:rPr>
+              <a:t> is T2</a:t>
+            </a:r>
           </a:p>
           <a:p>
             <a:pPr marL="457200" lvl="1" indent="0">
               <a:spcBef>
-                <a:spcPts val="0"/>
-              </a:spcBef>
-              <a:buNone/>
-            </a:pPr>
-            <a:r>
-              <a:rPr lang="en-US" sz="1750" dirty="0">
-                <a:latin typeface="Consolas" panose="020B0609020204030204" pitchFamily="49" charset="0"/>
-              </a:rPr>
-              <a:t>    if (</a:t>
-            </a:r>
-            <a:r>
-              <a:rPr lang="en-US" sz="1750" dirty="0" err="1">
-                <a:latin typeface="Consolas" panose="020B0609020204030204" pitchFamily="49" charset="0"/>
-              </a:rPr>
-              <a:t>expr.getType</a:t>
-            </a:r>
-            <a:r>
-              <a:rPr lang="en-US" sz="1750" dirty="0">
-                <a:latin typeface="Consolas" panose="020B0609020204030204" pitchFamily="49" charset="0"/>
-              </a:rPr>
-              <a:t>() != </a:t>
-            </a:r>
-            <a:r>
-              <a:rPr lang="en-US" sz="1750" dirty="0" err="1">
-                <a:latin typeface="Consolas" panose="020B0609020204030204" pitchFamily="49" charset="0"/>
-              </a:rPr>
-              <a:t>Type.Integer</a:t>
-            </a:r>
-            <a:r>
-              <a:rPr lang="en-US" sz="1750" dirty="0">
-                <a:latin typeface="Consolas" panose="020B0609020204030204" pitchFamily="49" charset="0"/>
-              </a:rPr>
-              <a:t>)</a:t>
+                <a:spcPts val="200"/>
+              </a:spcBef>
+              <a:buNone/>
+            </a:pPr>
+            <a:r>
+              <a:rPr lang="en-US" sz="1800" dirty="0">
+                <a:latin typeface="Consolas" panose="020B0609020204030204" pitchFamily="49" charset="0"/>
+              </a:rPr>
+              <a:t>a[0] := b[0];        // type of var and named </a:t>
+            </a:r>
+            <a:r>
+              <a:rPr lang="en-US" sz="1800" dirty="0" err="1">
+                <a:latin typeface="Consolas" panose="020B0609020204030204" pitchFamily="49" charset="0"/>
+              </a:rPr>
+              <a:t>val</a:t>
+            </a:r>
+            <a:r>
+              <a:rPr lang="en-US" sz="1800" dirty="0">
+                <a:latin typeface="Consolas" panose="020B0609020204030204" pitchFamily="49" charset="0"/>
+              </a:rPr>
+              <a:t> is T1</a:t>
             </a:r>
           </a:p>
           <a:p>
             <a:pPr marL="457200" lvl="1" indent="0">
               <a:spcBef>
-                <a:spcPts val="100"/>
-              </a:spcBef>
-              <a:buNone/>
-            </a:pPr>
-            <a:r>
-              <a:rPr lang="en-US" sz="1750" dirty="0">
-                <a:latin typeface="Consolas" panose="020B0609020204030204" pitchFamily="49" charset="0"/>
-              </a:rPr>
-              <a:t>        throw error(...);</a:t>
-            </a:r>
-          </a:p>
-          <a:p>
-            <a:pPr marL="457200" lvl="1" indent="0">
-              <a:spcBef>
-                <a:spcPts val="100"/>
-              </a:spcBef>
-              <a:buNone/>
-            </a:pPr>
-            <a:endParaRPr lang="en-US" sz="1750" dirty="0">
-              <a:latin typeface="Consolas" panose="020B0609020204030204" pitchFamily="49" charset="0"/>
-            </a:endParaRPr>
-          </a:p>
-          <a:p>
-            <a:pPr marL="457200" lvl="1" indent="0">
-              <a:spcBef>
-                <a:spcPts val="0"/>
-              </a:spcBef>
-              <a:buNone/>
-            </a:pPr>
-            <a:r>
-              <a:rPr lang="en-US" sz="1750" dirty="0">
-                <a:latin typeface="Consolas" panose="020B0609020204030204" pitchFamily="49" charset="0"/>
-              </a:rPr>
-              <a:t>    if (</a:t>
-            </a:r>
-            <a:r>
-              <a:rPr lang="en-US" sz="1750" dirty="0" err="1">
-                <a:latin typeface="Consolas" panose="020B0609020204030204" pitchFamily="49" charset="0"/>
-              </a:rPr>
-              <a:t>getType</a:t>
-            </a:r>
-            <a:r>
-              <a:rPr lang="en-US" sz="1750" dirty="0">
-                <a:latin typeface="Consolas" panose="020B0609020204030204" pitchFamily="49" charset="0"/>
-              </a:rPr>
-              <a:t>() </a:t>
-            </a:r>
-            <a:r>
-              <a:rPr lang="en-US" sz="1750" dirty="0" err="1">
-                <a:latin typeface="Consolas" panose="020B0609020204030204" pitchFamily="49" charset="0"/>
-              </a:rPr>
-              <a:t>instanceof</a:t>
-            </a:r>
-            <a:r>
-              <a:rPr lang="en-US" sz="1750" dirty="0">
-                <a:latin typeface="Consolas" panose="020B0609020204030204" pitchFamily="49" charset="0"/>
-              </a:rPr>
-              <a:t> </a:t>
-            </a:r>
-            <a:r>
-              <a:rPr lang="en-US" sz="1750" dirty="0" err="1">
-                <a:latin typeface="Consolas" panose="020B0609020204030204" pitchFamily="49" charset="0"/>
-              </a:rPr>
-              <a:t>ArrayType</a:t>
-            </a:r>
-            <a:r>
-              <a:rPr lang="en-US" sz="1750" dirty="0">
-                <a:latin typeface="Consolas" panose="020B0609020204030204" pitchFamily="49" charset="0"/>
-              </a:rPr>
-              <a:t>)</a:t>
-            </a:r>
-          </a:p>
-          <a:p>
-            <a:pPr marL="457200" lvl="1" indent="0">
-              <a:spcBef>
-                <a:spcPts val="100"/>
-              </a:spcBef>
-              <a:buNone/>
-            </a:pPr>
-            <a:r>
-              <a:rPr lang="en-US" sz="1750" dirty="0">
-                <a:latin typeface="Consolas" panose="020B0609020204030204" pitchFamily="49" charset="0"/>
-              </a:rPr>
-              <a:t>      {</a:t>
-            </a:r>
-          </a:p>
-          <a:p>
-            <a:pPr marL="457200" lvl="1" indent="0">
-              <a:spcBef>
-                <a:spcPts val="100"/>
-              </a:spcBef>
-              <a:buNone/>
-            </a:pPr>
-            <a:r>
-              <a:rPr lang="en-US" sz="1750" dirty="0">
-                <a:latin typeface="Consolas" panose="020B0609020204030204" pitchFamily="49" charset="0"/>
-              </a:rPr>
-              <a:t>        </a:t>
-            </a:r>
-            <a:r>
-              <a:rPr lang="en-US" sz="1750" b="1" dirty="0" err="1">
-                <a:latin typeface="Consolas" panose="020B0609020204030204" pitchFamily="49" charset="0"/>
-              </a:rPr>
-              <a:t>ArrayType</a:t>
-            </a:r>
-            <a:r>
-              <a:rPr lang="en-US" sz="1750" b="1" dirty="0">
-                <a:latin typeface="Consolas" panose="020B0609020204030204" pitchFamily="49" charset="0"/>
-              </a:rPr>
-              <a:t> type = (</a:t>
-            </a:r>
-            <a:r>
-              <a:rPr lang="en-US" sz="1750" b="1" dirty="0" err="1">
-                <a:latin typeface="Consolas" panose="020B0609020204030204" pitchFamily="49" charset="0"/>
-              </a:rPr>
-              <a:t>ArrayType</a:t>
-            </a:r>
-            <a:r>
-              <a:rPr lang="en-US" sz="1750" b="1" dirty="0">
-                <a:latin typeface="Consolas" panose="020B0609020204030204" pitchFamily="49" charset="0"/>
-              </a:rPr>
-              <a:t>) </a:t>
-            </a:r>
-            <a:r>
-              <a:rPr lang="en-US" sz="1750" b="1" dirty="0" err="1">
-                <a:latin typeface="Consolas" panose="020B0609020204030204" pitchFamily="49" charset="0"/>
-              </a:rPr>
-              <a:t>getType</a:t>
-            </a:r>
-            <a:r>
-              <a:rPr lang="en-US" sz="1750" b="1" dirty="0">
-                <a:latin typeface="Consolas" panose="020B0609020204030204" pitchFamily="49" charset="0"/>
-              </a:rPr>
-              <a:t>();</a:t>
-            </a:r>
-          </a:p>
-          <a:p>
-            <a:pPr marL="457200" lvl="1" indent="0">
-              <a:spcBef>
-                <a:spcPts val="100"/>
-              </a:spcBef>
-              <a:buNone/>
-            </a:pPr>
-            <a:r>
-              <a:rPr lang="en-US" sz="1750" b="1" dirty="0">
-                <a:latin typeface="Consolas" panose="020B0609020204030204" pitchFamily="49" charset="0"/>
-              </a:rPr>
-              <a:t>        </a:t>
-            </a:r>
-            <a:r>
-              <a:rPr lang="en-US" sz="1750" b="1" dirty="0" err="1">
-                <a:latin typeface="Consolas" panose="020B0609020204030204" pitchFamily="49" charset="0"/>
-              </a:rPr>
-              <a:t>setType</a:t>
-            </a:r>
-            <a:r>
-              <a:rPr lang="en-US" sz="1750" b="1" dirty="0">
-                <a:latin typeface="Consolas" panose="020B0609020204030204" pitchFamily="49" charset="0"/>
-              </a:rPr>
-              <a:t>(</a:t>
-            </a:r>
-            <a:r>
-              <a:rPr lang="en-US" sz="1750" b="1" dirty="0" err="1">
-                <a:latin typeface="Consolas" panose="020B0609020204030204" pitchFamily="49" charset="0"/>
-              </a:rPr>
-              <a:t>type.getElementType</a:t>
-            </a:r>
-            <a:r>
-              <a:rPr lang="en-US" sz="1750" b="1" dirty="0">
-                <a:latin typeface="Consolas" panose="020B0609020204030204" pitchFamily="49" charset="0"/>
-              </a:rPr>
-              <a:t>());</a:t>
-            </a:r>
-          </a:p>
-          <a:p>
-            <a:pPr marL="457200" lvl="1" indent="0">
-              <a:spcBef>
-                <a:spcPts val="100"/>
-              </a:spcBef>
-              <a:buNone/>
-            </a:pPr>
-            <a:r>
-              <a:rPr lang="en-US" sz="1750" dirty="0">
-                <a:latin typeface="Consolas" panose="020B0609020204030204" pitchFamily="49" charset="0"/>
-              </a:rPr>
-              <a:t>      }</a:t>
-            </a:r>
-          </a:p>
-          <a:p>
-            <a:pPr marL="457200" lvl="1" indent="0">
-              <a:spcBef>
-                <a:spcPts val="100"/>
-              </a:spcBef>
-              <a:buNone/>
-            </a:pPr>
-            <a:r>
-              <a:rPr lang="en-US" sz="1750" dirty="0">
-                <a:latin typeface="Consolas" panose="020B0609020204030204" pitchFamily="49" charset="0"/>
-              </a:rPr>
-              <a:t>    else</a:t>
-            </a:r>
-          </a:p>
-          <a:p>
-            <a:pPr marL="457200" lvl="1" indent="0">
-              <a:spcBef>
-                <a:spcPts val="100"/>
-              </a:spcBef>
-              <a:buNone/>
-            </a:pPr>
-            <a:r>
-              <a:rPr lang="en-US" sz="1750" dirty="0">
-                <a:latin typeface="Consolas" panose="020B0609020204030204" pitchFamily="49" charset="0"/>
-              </a:rPr>
-              <a:t>        throw error(...);</a:t>
-            </a:r>
-          </a:p>
-          <a:p>
-            <a:pPr marL="457200" lvl="1" indent="0">
-              <a:spcBef>
-                <a:spcPts val="100"/>
-              </a:spcBef>
-              <a:buNone/>
-            </a:pPr>
-            <a:r>
-              <a:rPr lang="en-US" sz="1750" dirty="0">
-                <a:latin typeface="Consolas" panose="020B0609020204030204" pitchFamily="49" charset="0"/>
-              </a:rPr>
-              <a:t>  }</a:t>
+                <a:spcPts val="200"/>
+              </a:spcBef>
+              <a:buNone/>
+            </a:pPr>
+            <a:r>
+              <a:rPr lang="en-US" sz="1800" dirty="0">
+                <a:latin typeface="Consolas" panose="020B0609020204030204" pitchFamily="49" charset="0"/>
+              </a:rPr>
+              <a:t>a[1][6] := b[5][7];  // type of var and named </a:t>
+            </a:r>
+            <a:r>
+              <a:rPr lang="en-US" sz="1800" dirty="0" err="1">
+                <a:latin typeface="Consolas" panose="020B0609020204030204" pitchFamily="49" charset="0"/>
+              </a:rPr>
+              <a:t>val</a:t>
+            </a:r>
+            <a:r>
+              <a:rPr lang="en-US" sz="1800" dirty="0">
+                <a:latin typeface="Consolas" panose="020B0609020204030204" pitchFamily="49" charset="0"/>
+              </a:rPr>
+              <a:t> is Integer</a:t>
             </a:r>
           </a:p>
         </p:txBody>
@@ -22677,7 +22411,7 @@
     </p:spTree>
     <p:extLst>
       <p:ext uri="{BB962C8B-B14F-4D97-AF65-F5344CB8AC3E}">
-        <p14:creationId xmlns:p14="http://schemas.microsoft.com/office/powerpoint/2010/main" val="3760471126"/>
+        <p14:creationId xmlns:p14="http://schemas.microsoft.com/office/powerpoint/2010/main" val="3020442727"/>
       </p:ext>
     </p:extLst>
   </p:cSld>
@@ -22706,31 +22440,475 @@
       </p:grpSpPr>
       <p:sp>
         <p:nvSpPr>
-          <p:cNvPr id="22530" name="Footer Placeholder 3"/>
+          <p:cNvPr id="8" name="Title 7">
+            <a:extLst>
+              <a:ext uri="{FF2B5EF4-FFF2-40B4-BE49-F238E27FC236}">
+                <a16:creationId xmlns:a16="http://schemas.microsoft.com/office/drawing/2014/main" id="{563233BE-B20A-4E38-8D6C-3D8FB41B4336}"/>
+              </a:ext>
+            </a:extLst>
+          </p:cNvPr>
           <p:cNvSpPr>
             <a:spLocks noGrp="1"/>
           </p:cNvSpPr>
           <p:nvPr>
+            <p:ph type="title"/>
+          </p:nvPr>
+        </p:nvSpPr>
+        <p:spPr/>
+        <p:txBody>
+          <a:bodyPr/>
+          <a:lstStyle/>
+          <a:p>
+            <a:r>
+              <a:rPr lang="en-US" dirty="0"/>
+              <a:t>Example: </a:t>
+            </a:r>
+            <a:r>
+              <a:rPr lang="en-US" dirty="0">
+                <a:latin typeface="Consolas" panose="020B0609020204030204" pitchFamily="49" charset="0"/>
+              </a:rPr>
+              <a:t>Variable</a:t>
+            </a:r>
+            <a:br>
+              <a:rPr lang="en-US" dirty="0"/>
+            </a:br>
+            <a:r>
+              <a:rPr lang="en-US" sz="2400" dirty="0"/>
+              <a:t>(continued)</a:t>
+            </a:r>
+          </a:p>
+        </p:txBody>
+      </p:sp>
+      <p:sp>
+        <p:nvSpPr>
+          <p:cNvPr id="9" name="Content Placeholder 8">
+            <a:extLst>
+              <a:ext uri="{FF2B5EF4-FFF2-40B4-BE49-F238E27FC236}">
+                <a16:creationId xmlns:a16="http://schemas.microsoft.com/office/drawing/2014/main" id="{76E1210A-295D-4718-9E1A-27C835EA23E3}"/>
+              </a:ext>
+            </a:extLst>
+          </p:cNvPr>
+          <p:cNvSpPr>
+            <a:spLocks noGrp="1"/>
+          </p:cNvSpPr>
+          <p:nvPr>
+            <p:ph idx="1"/>
+          </p:nvPr>
+        </p:nvSpPr>
+        <p:spPr/>
+        <p:txBody>
+          <a:bodyPr/>
+          <a:lstStyle/>
+          <a:p>
+            <a:r>
+              <a:rPr lang="en-US" dirty="0"/>
+              <a:t>For arrays, we determine the actual type of a variable or named value in method </a:t>
+            </a:r>
+            <a:r>
+              <a:rPr lang="en-US" dirty="0" err="1">
+                <a:latin typeface="Consolas" panose="020B0609020204030204" pitchFamily="49" charset="0"/>
+              </a:rPr>
+              <a:t>checkConstraints</a:t>
+            </a:r>
+            <a:r>
+              <a:rPr lang="en-US" dirty="0">
+                <a:latin typeface="Consolas" panose="020B0609020204030204" pitchFamily="49" charset="0"/>
+              </a:rPr>
+              <a:t>()</a:t>
+            </a:r>
+            <a:r>
+              <a:rPr lang="en-US" dirty="0"/>
+              <a:t>.</a:t>
+            </a:r>
+          </a:p>
+          <a:p>
+            <a:pPr marL="457200" lvl="1" indent="0">
+              <a:buNone/>
+            </a:pPr>
+            <a:r>
+              <a:rPr lang="en-US" sz="1750" dirty="0">
+                <a:latin typeface="Consolas" panose="020B0609020204030204" pitchFamily="49" charset="0"/>
+              </a:rPr>
+              <a:t>for (Expression expr : </a:t>
+            </a:r>
+            <a:r>
+              <a:rPr lang="en-US" sz="1750" dirty="0" err="1">
+                <a:latin typeface="Consolas" panose="020B0609020204030204" pitchFamily="49" charset="0"/>
+              </a:rPr>
+              <a:t>indexExprs</a:t>
+            </a:r>
+            <a:r>
+              <a:rPr lang="en-US" sz="1750" dirty="0">
+                <a:latin typeface="Consolas" panose="020B0609020204030204" pitchFamily="49" charset="0"/>
+              </a:rPr>
+              <a:t>)</a:t>
+            </a:r>
+          </a:p>
+          <a:p>
+            <a:pPr marL="457200" lvl="1" indent="0">
+              <a:spcBef>
+                <a:spcPts val="100"/>
+              </a:spcBef>
+              <a:buNone/>
+            </a:pPr>
+            <a:r>
+              <a:rPr lang="en-US" sz="1750" dirty="0">
+                <a:latin typeface="Consolas" panose="020B0609020204030204" pitchFamily="49" charset="0"/>
+              </a:rPr>
+              <a:t>  {</a:t>
+            </a:r>
+          </a:p>
+          <a:p>
+            <a:pPr marL="457200" lvl="1" indent="0">
+              <a:spcBef>
+                <a:spcPts val="100"/>
+              </a:spcBef>
+              <a:buNone/>
+            </a:pPr>
+            <a:r>
+              <a:rPr lang="en-US" sz="1750" dirty="0">
+                <a:latin typeface="Consolas" panose="020B0609020204030204" pitchFamily="49" charset="0"/>
+              </a:rPr>
+              <a:t>    </a:t>
+            </a:r>
+            <a:r>
+              <a:rPr lang="en-US" sz="1750" dirty="0" err="1">
+                <a:latin typeface="Consolas" panose="020B0609020204030204" pitchFamily="49" charset="0"/>
+              </a:rPr>
+              <a:t>expr.checkConstraints</a:t>
+            </a:r>
+            <a:r>
+              <a:rPr lang="en-US" sz="1750" dirty="0">
+                <a:latin typeface="Consolas" panose="020B0609020204030204" pitchFamily="49" charset="0"/>
+              </a:rPr>
+              <a:t>();</a:t>
+            </a:r>
+          </a:p>
+          <a:p>
+            <a:pPr marL="457200" lvl="1" indent="0">
+              <a:spcBef>
+                <a:spcPts val="100"/>
+              </a:spcBef>
+              <a:buNone/>
+            </a:pPr>
+            <a:endParaRPr lang="en-US" sz="1750" dirty="0">
+              <a:latin typeface="Consolas" panose="020B0609020204030204" pitchFamily="49" charset="0"/>
+            </a:endParaRPr>
+          </a:p>
+          <a:p>
+            <a:pPr marL="457200" lvl="1" indent="0">
+              <a:spcBef>
+                <a:spcPts val="0"/>
+              </a:spcBef>
+              <a:buNone/>
+            </a:pPr>
+            <a:r>
+              <a:rPr lang="en-US" sz="1750" dirty="0">
+                <a:latin typeface="Consolas" panose="020B0609020204030204" pitchFamily="49" charset="0"/>
+              </a:rPr>
+              <a:t>    if (</a:t>
+            </a:r>
+            <a:r>
+              <a:rPr lang="en-US" sz="1750" dirty="0" err="1">
+                <a:latin typeface="Consolas" panose="020B0609020204030204" pitchFamily="49" charset="0"/>
+              </a:rPr>
+              <a:t>expr.getType</a:t>
+            </a:r>
+            <a:r>
+              <a:rPr lang="en-US" sz="1750" dirty="0">
+                <a:latin typeface="Consolas" panose="020B0609020204030204" pitchFamily="49" charset="0"/>
+              </a:rPr>
+              <a:t>() != </a:t>
+            </a:r>
+            <a:r>
+              <a:rPr lang="en-US" sz="1750" dirty="0" err="1">
+                <a:latin typeface="Consolas" panose="020B0609020204030204" pitchFamily="49" charset="0"/>
+              </a:rPr>
+              <a:t>Type.Integer</a:t>
+            </a:r>
+            <a:r>
+              <a:rPr lang="en-US" sz="1750" dirty="0">
+                <a:latin typeface="Consolas" panose="020B0609020204030204" pitchFamily="49" charset="0"/>
+              </a:rPr>
+              <a:t>)</a:t>
+            </a:r>
+          </a:p>
+          <a:p>
+            <a:pPr marL="457200" lvl="1" indent="0">
+              <a:spcBef>
+                <a:spcPts val="100"/>
+              </a:spcBef>
+              <a:buNone/>
+            </a:pPr>
+            <a:r>
+              <a:rPr lang="en-US" sz="1750" dirty="0">
+                <a:latin typeface="Consolas" panose="020B0609020204030204" pitchFamily="49" charset="0"/>
+              </a:rPr>
+              <a:t>        throw error(...);</a:t>
+            </a:r>
+          </a:p>
+          <a:p>
+            <a:pPr marL="457200" lvl="1" indent="0">
+              <a:spcBef>
+                <a:spcPts val="100"/>
+              </a:spcBef>
+              <a:buNone/>
+            </a:pPr>
+            <a:endParaRPr lang="en-US" sz="1750" dirty="0">
+              <a:latin typeface="Consolas" panose="020B0609020204030204" pitchFamily="49" charset="0"/>
+            </a:endParaRPr>
+          </a:p>
+          <a:p>
+            <a:pPr marL="457200" lvl="1" indent="0">
+              <a:spcBef>
+                <a:spcPts val="0"/>
+              </a:spcBef>
+              <a:buNone/>
+            </a:pPr>
+            <a:r>
+              <a:rPr lang="en-US" sz="1750" dirty="0">
+                <a:latin typeface="Consolas" panose="020B0609020204030204" pitchFamily="49" charset="0"/>
+              </a:rPr>
+              <a:t>    if (</a:t>
+            </a:r>
+            <a:r>
+              <a:rPr lang="en-US" sz="1750" dirty="0" err="1">
+                <a:latin typeface="Consolas" panose="020B0609020204030204" pitchFamily="49" charset="0"/>
+              </a:rPr>
+              <a:t>getType</a:t>
+            </a:r>
+            <a:r>
+              <a:rPr lang="en-US" sz="1750" dirty="0">
+                <a:latin typeface="Consolas" panose="020B0609020204030204" pitchFamily="49" charset="0"/>
+              </a:rPr>
+              <a:t>() </a:t>
+            </a:r>
+            <a:r>
+              <a:rPr lang="en-US" sz="1750" dirty="0" err="1">
+                <a:latin typeface="Consolas" panose="020B0609020204030204" pitchFamily="49" charset="0"/>
+              </a:rPr>
+              <a:t>instanceof</a:t>
+            </a:r>
+            <a:r>
+              <a:rPr lang="en-US" sz="1750" dirty="0">
+                <a:latin typeface="Consolas" panose="020B0609020204030204" pitchFamily="49" charset="0"/>
+              </a:rPr>
+              <a:t> </a:t>
+            </a:r>
+            <a:r>
+              <a:rPr lang="en-US" sz="1750" dirty="0" err="1">
+                <a:latin typeface="Consolas" panose="020B0609020204030204" pitchFamily="49" charset="0"/>
+              </a:rPr>
+              <a:t>ArrayType</a:t>
+            </a:r>
+            <a:r>
+              <a:rPr lang="en-US" sz="1750" dirty="0">
+                <a:latin typeface="Consolas" panose="020B0609020204030204" pitchFamily="49" charset="0"/>
+              </a:rPr>
+              <a:t>)</a:t>
+            </a:r>
+          </a:p>
+          <a:p>
+            <a:pPr marL="457200" lvl="1" indent="0">
+              <a:spcBef>
+                <a:spcPts val="100"/>
+              </a:spcBef>
+              <a:buNone/>
+            </a:pPr>
+            <a:r>
+              <a:rPr lang="en-US" sz="1750" dirty="0">
+                <a:latin typeface="Consolas" panose="020B0609020204030204" pitchFamily="49" charset="0"/>
+              </a:rPr>
+              <a:t>      {</a:t>
+            </a:r>
+          </a:p>
+          <a:p>
+            <a:pPr marL="457200" lvl="1" indent="0">
+              <a:spcBef>
+                <a:spcPts val="100"/>
+              </a:spcBef>
+              <a:buNone/>
+            </a:pPr>
+            <a:r>
+              <a:rPr lang="en-US" sz="1750" dirty="0">
+                <a:latin typeface="Consolas" panose="020B0609020204030204" pitchFamily="49" charset="0"/>
+              </a:rPr>
+              <a:t>        </a:t>
+            </a:r>
+            <a:r>
+              <a:rPr lang="en-US" sz="1750" b="1" dirty="0" err="1">
+                <a:latin typeface="Consolas" panose="020B0609020204030204" pitchFamily="49" charset="0"/>
+              </a:rPr>
+              <a:t>ArrayType</a:t>
+            </a:r>
+            <a:r>
+              <a:rPr lang="en-US" sz="1750" b="1" dirty="0">
+                <a:latin typeface="Consolas" panose="020B0609020204030204" pitchFamily="49" charset="0"/>
+              </a:rPr>
+              <a:t> type = (</a:t>
+            </a:r>
+            <a:r>
+              <a:rPr lang="en-US" sz="1750" b="1" dirty="0" err="1">
+                <a:latin typeface="Consolas" panose="020B0609020204030204" pitchFamily="49" charset="0"/>
+              </a:rPr>
+              <a:t>ArrayType</a:t>
+            </a:r>
+            <a:r>
+              <a:rPr lang="en-US" sz="1750" b="1" dirty="0">
+                <a:latin typeface="Consolas" panose="020B0609020204030204" pitchFamily="49" charset="0"/>
+              </a:rPr>
+              <a:t>) </a:t>
+            </a:r>
+            <a:r>
+              <a:rPr lang="en-US" sz="1750" b="1" dirty="0" err="1">
+                <a:latin typeface="Consolas" panose="020B0609020204030204" pitchFamily="49" charset="0"/>
+              </a:rPr>
+              <a:t>getType</a:t>
+            </a:r>
+            <a:r>
+              <a:rPr lang="en-US" sz="1750" b="1" dirty="0">
+                <a:latin typeface="Consolas" panose="020B0609020204030204" pitchFamily="49" charset="0"/>
+              </a:rPr>
+              <a:t>();</a:t>
+            </a:r>
+          </a:p>
+          <a:p>
+            <a:pPr marL="457200" lvl="1" indent="0">
+              <a:spcBef>
+                <a:spcPts val="100"/>
+              </a:spcBef>
+              <a:buNone/>
+            </a:pPr>
+            <a:r>
+              <a:rPr lang="en-US" sz="1750" b="1" dirty="0">
+                <a:latin typeface="Consolas" panose="020B0609020204030204" pitchFamily="49" charset="0"/>
+              </a:rPr>
+              <a:t>        </a:t>
+            </a:r>
+            <a:r>
+              <a:rPr lang="en-US" sz="1750" b="1" dirty="0" err="1">
+                <a:latin typeface="Consolas" panose="020B0609020204030204" pitchFamily="49" charset="0"/>
+              </a:rPr>
+              <a:t>setType</a:t>
+            </a:r>
+            <a:r>
+              <a:rPr lang="en-US" sz="1750" b="1" dirty="0">
+                <a:latin typeface="Consolas" panose="020B0609020204030204" pitchFamily="49" charset="0"/>
+              </a:rPr>
+              <a:t>(</a:t>
+            </a:r>
+            <a:r>
+              <a:rPr lang="en-US" sz="1750" b="1" dirty="0" err="1">
+                <a:latin typeface="Consolas" panose="020B0609020204030204" pitchFamily="49" charset="0"/>
+              </a:rPr>
+              <a:t>type.getElementType</a:t>
+            </a:r>
+            <a:r>
+              <a:rPr lang="en-US" sz="1750" b="1" dirty="0">
+                <a:latin typeface="Consolas" panose="020B0609020204030204" pitchFamily="49" charset="0"/>
+              </a:rPr>
+              <a:t>());</a:t>
+            </a:r>
+          </a:p>
+          <a:p>
+            <a:pPr marL="457200" lvl="1" indent="0">
+              <a:spcBef>
+                <a:spcPts val="100"/>
+              </a:spcBef>
+              <a:buNone/>
+            </a:pPr>
+            <a:r>
+              <a:rPr lang="en-US" sz="1750" dirty="0">
+                <a:latin typeface="Consolas" panose="020B0609020204030204" pitchFamily="49" charset="0"/>
+              </a:rPr>
+              <a:t>      }</a:t>
+            </a:r>
+          </a:p>
+          <a:p>
+            <a:pPr marL="457200" lvl="1" indent="0">
+              <a:spcBef>
+                <a:spcPts val="100"/>
+              </a:spcBef>
+              <a:buNone/>
+            </a:pPr>
+            <a:r>
+              <a:rPr lang="en-US" sz="1750" dirty="0">
+                <a:latin typeface="Consolas" panose="020B0609020204030204" pitchFamily="49" charset="0"/>
+              </a:rPr>
+              <a:t>    else</a:t>
+            </a:r>
+          </a:p>
+          <a:p>
+            <a:pPr marL="457200" lvl="1" indent="0">
+              <a:spcBef>
+                <a:spcPts val="100"/>
+              </a:spcBef>
+              <a:buNone/>
+            </a:pPr>
+            <a:r>
+              <a:rPr lang="en-US" sz="1750" dirty="0">
+                <a:latin typeface="Consolas" panose="020B0609020204030204" pitchFamily="49" charset="0"/>
+              </a:rPr>
+              <a:t>        throw error(...);</a:t>
+            </a:r>
+          </a:p>
+          <a:p>
+            <a:pPr marL="457200" lvl="1" indent="0">
+              <a:spcBef>
+                <a:spcPts val="100"/>
+              </a:spcBef>
+              <a:buNone/>
+            </a:pPr>
+            <a:r>
+              <a:rPr lang="en-US" sz="1750" dirty="0">
+                <a:latin typeface="Consolas" panose="020B0609020204030204" pitchFamily="49" charset="0"/>
+              </a:rPr>
+              <a:t>  }</a:t>
+            </a:r>
+          </a:p>
+        </p:txBody>
+      </p:sp>
+      <p:sp>
+        <p:nvSpPr>
+          <p:cNvPr id="3" name="Footer Placeholder 2">
+            <a:extLst>
+              <a:ext uri="{FF2B5EF4-FFF2-40B4-BE49-F238E27FC236}">
+                <a16:creationId xmlns:a16="http://schemas.microsoft.com/office/drawing/2014/main" id="{5A404E55-B647-4C7C-9D62-C9EA115DC92C}"/>
+              </a:ext>
+            </a:extLst>
+          </p:cNvPr>
+          <p:cNvSpPr>
+            <a:spLocks noGrp="1"/>
+          </p:cNvSpPr>
+          <p:nvPr>
             <p:ph type="ftr" sz="quarter" idx="10"/>
           </p:nvPr>
         </p:nvSpPr>
-        <p:spPr>
-          <a:noFill/>
-        </p:spPr>
-        <p:txBody>
-          <a:bodyPr/>
-          <a:lstStyle/>
-          <a:p>
-            <a:r>
-              <a:rPr lang="en-US" dirty="0"/>
+        <p:spPr/>
+        <p:txBody>
+          <a:bodyPr/>
+          <a:lstStyle/>
+          <a:p>
+            <a:pPr>
+              <a:defRPr/>
+            </a:pPr>
+            <a:r>
+              <a:rPr lang="en-US"/>
               <a:t>©SoftMoore Consulting</a:t>
             </a:r>
-          </a:p>
-        </p:txBody>
-      </p:sp>
-      <p:sp>
-        <p:nvSpPr>
-          <p:cNvPr id="22531" name="Slide Number Placeholder 4"/>
+            <a:endParaRPr lang="en-US" dirty="0"/>
+          </a:p>
+        </p:txBody>
+      </p:sp>
+      <p:sp>
+        <p:nvSpPr>
+          <p:cNvPr id="4" name="Slide Number Placeholder 3">
+            <a:extLst>
+              <a:ext uri="{FF2B5EF4-FFF2-40B4-BE49-F238E27FC236}">
+                <a16:creationId xmlns:a16="http://schemas.microsoft.com/office/drawing/2014/main" id="{964B72F4-5156-47A8-BE64-4FAAF4115382}"/>
+              </a:ext>
+            </a:extLst>
+          </p:cNvPr>
           <p:cNvSpPr>
             <a:spLocks noGrp="1"/>
           </p:cNvSpPr>
@@ -22738,129 +22916,35 @@
             <p:ph type="sldNum" sz="quarter" idx="11"/>
           </p:nvPr>
         </p:nvSpPr>
-        <p:spPr>
-          <a:noFill/>
-        </p:spPr>
-        <p:txBody>
-          <a:bodyPr/>
-          <a:lstStyle/>
-          <a:p>
-            <a:r>
-              <a:rPr lang="en-US" dirty="0"/>
+        <p:spPr/>
+        <p:txBody>
+          <a:bodyPr/>
+          <a:lstStyle/>
+          <a:p>
+            <a:pPr>
+              <a:defRPr/>
+            </a:pPr>
+            <a:r>
+              <a:rPr lang="en-US"/>
               <a:t>Slide </a:t>
             </a:r>
-            <a:fld id="{E181C637-EA7A-4AA2-BD9E-5103699E8BC5}" type="slidenum">
+            <a:fld id="{0493F5BC-5863-40DB-9BF6-90302664BBE6}" type="slidenum">
               <a:rPr lang="en-US" smtClean="0"/>
-              <a:pPr/>
+              <a:pPr>
+                <a:defRPr/>
+              </a:pPr>
               <a:t>51</a:t>
             </a:fld>
             <a:endParaRPr lang="en-US" dirty="0"/>
           </a:p>
         </p:txBody>
       </p:sp>
-      <p:sp>
-        <p:nvSpPr>
-          <p:cNvPr id="22532" name="Rectangle 2"/>
-          <p:cNvSpPr>
-            <a:spLocks noGrp="1" noChangeArrowheads="1"/>
-          </p:cNvSpPr>
-          <p:nvPr>
-            <p:ph type="title"/>
-          </p:nvPr>
-        </p:nvSpPr>
-        <p:spPr/>
-        <p:txBody>
-          <a:bodyPr/>
-          <a:lstStyle/>
-          <a:p>
-            <a:r>
-              <a:rPr lang="en-US" dirty="0"/>
-              <a:t>Maintaining Context During Parsing</a:t>
-            </a:r>
-          </a:p>
-        </p:txBody>
-      </p:sp>
-      <p:sp>
-        <p:nvSpPr>
-          <p:cNvPr id="22533" name="Rectangle 3"/>
-          <p:cNvSpPr>
-            <a:spLocks noGrp="1" noChangeArrowheads="1"/>
-          </p:cNvSpPr>
-          <p:nvPr>
-            <p:ph type="body" idx="1"/>
-          </p:nvPr>
-        </p:nvSpPr>
-        <p:spPr/>
-        <p:txBody>
-          <a:bodyPr/>
-          <a:lstStyle/>
-          <a:p>
-            <a:r>
-              <a:rPr lang="en-US" dirty="0"/>
-              <a:t>Certain CPRL statements need access to an enclosing context for constraint checking and code generation.</a:t>
-            </a:r>
-          </a:p>
-          <a:p>
-            <a:r>
-              <a:rPr lang="en-US" dirty="0"/>
-              <a:t>Example: </a:t>
-            </a:r>
-            <a:r>
-              <a:rPr lang="en-US" sz="2000" dirty="0">
-                <a:latin typeface="Consolas" pitchFamily="49" charset="0"/>
-              </a:rPr>
-              <a:t>exit when n &gt; 10;</a:t>
-            </a:r>
-            <a:endParaRPr lang="en-US" dirty="0"/>
-          </a:p>
-          <a:p>
-            <a:pPr>
-              <a:spcBef>
-                <a:spcPts val="400"/>
-              </a:spcBef>
-              <a:buNone/>
-            </a:pPr>
-            <a:r>
-              <a:rPr lang="en-US" dirty="0"/>
-              <a:t>	An exit statement has meaning only when nested inside a loop., and code generation for an exit statement requires knowledge of which loop encloses it.</a:t>
-            </a:r>
-          </a:p>
-          <a:p>
-            <a:r>
-              <a:rPr lang="en-US" dirty="0"/>
-              <a:t>Similarly, a return statement needs to know which subprogram it is returning from.</a:t>
-            </a:r>
-          </a:p>
-          <a:p>
-            <a:r>
-              <a:rPr lang="en-US" dirty="0"/>
-              <a:t>Classes </a:t>
-            </a:r>
-            <a:r>
-              <a:rPr lang="en-US" dirty="0">
-                <a:latin typeface="Consolas" panose="020B0609020204030204" pitchFamily="49" charset="0"/>
-              </a:rPr>
-              <a:t>LoopContext</a:t>
-            </a:r>
-            <a:r>
-              <a:rPr lang="en-US" dirty="0"/>
-              <a:t> and </a:t>
-            </a:r>
-            <a:r>
-              <a:rPr lang="en-US" dirty="0">
-                <a:latin typeface="Consolas" pitchFamily="49" charset="0"/>
-                <a:cs typeface="Consolas" pitchFamily="49" charset="0"/>
-              </a:rPr>
-              <a:t>SubprogramContext</a:t>
-            </a:r>
-            <a:r>
-              <a:rPr lang="en-US" dirty="0"/>
-              <a:t> will be used to maintain contextual information in these cases.</a:t>
-            </a:r>
-          </a:p>
-        </p:txBody>
-      </p:sp>
     </p:spTree>
+    <p:extLst>
+      <p:ext uri="{BB962C8B-B14F-4D97-AF65-F5344CB8AC3E}">
+        <p14:creationId xmlns:p14="http://schemas.microsoft.com/office/powerpoint/2010/main" val="3760471126"/>
+      </p:ext>
+    </p:extLst>
   </p:cSld>
   <p:clrMapOvr>
     <a:masterClrMapping/>
@@ -22887,7 +22971,7 @@
       </p:grpSpPr>
       <p:sp>
         <p:nvSpPr>
-          <p:cNvPr id="23554" name="Footer Placeholder 3"/>
+          <p:cNvPr id="22530" name="Footer Placeholder 3"/>
           <p:cNvSpPr>
             <a:spLocks noGrp="1"/>
           </p:cNvSpPr>
@@ -22911,7 +22995,7 @@
       </p:sp>
       <p:sp>
         <p:nvSpPr>
-          <p:cNvPr id="23555" name="Slide Number Placeholder 4"/>
+          <p:cNvPr id="22531" name="Slide Number Placeholder 4"/>
           <p:cNvSpPr>
             <a:spLocks noGrp="1"/>
           </p:cNvSpPr>
@@ -22930,7 +23014,7 @@
               <a:rPr lang="en-US" dirty="0"/>
               <a:t>Slide </a:t>
             </a:r>
-            <a:fld id="{239EA5B9-23A7-4CC1-AF6B-C52A3FEA3809}" type="slidenum">
+            <a:fld id="{E181C637-EA7A-4AA2-BD9E-5103699E8BC5}" type="slidenum">
               <a:rPr lang="en-US" smtClean="0"/>
               <a:pPr/>
               <a:t>52</a:t>
@@ -22941,7 +23025,7 @@
       </p:sp>
       <p:sp>
         <p:nvSpPr>
-          <p:cNvPr id="23556" name="Rectangle 2"/>
+          <p:cNvPr id="22532" name="Rectangle 2"/>
           <p:cNvSpPr>
             <a:spLocks noGrp="1" noChangeArrowheads="1"/>
           </p:cNvSpPr>
@@ -22956,255 +23040,87 @@
           <a:p>
             <a:r>
               <a:rPr lang="en-US" dirty="0"/>
-              <a:t>Class </a:t>
+              <a:t>Maintaining Context During Parsing</a:t>
+            </a:r>
+          </a:p>
+        </p:txBody>
+      </p:sp>
+      <p:sp>
+        <p:nvSpPr>
+          <p:cNvPr id="22533" name="Rectangle 3"/>
+          <p:cNvSpPr>
+            <a:spLocks noGrp="1" noChangeArrowheads="1"/>
+          </p:cNvSpPr>
+          <p:nvPr>
+            <p:ph type="body" idx="1"/>
+          </p:nvPr>
+        </p:nvSpPr>
+        <p:spPr/>
+        <p:txBody>
+          <a:bodyPr/>
+          <a:lstStyle/>
+          <a:p>
+            <a:r>
+              <a:rPr lang="en-US" dirty="0"/>
+              <a:t>Certain CPRL statements need access to an enclosing context for constraint checking and code generation.</a:t>
+            </a:r>
+          </a:p>
+          <a:p>
+            <a:r>
+              <a:rPr lang="en-US" dirty="0"/>
+              <a:t>Example: </a:t>
+            </a:r>
+            <a:r>
+              <a:rPr lang="en-US" sz="2000" dirty="0">
+                <a:latin typeface="Consolas" pitchFamily="49" charset="0"/>
+              </a:rPr>
+              <a:t>exit when n &gt; 10;</a:t>
+            </a:r>
+            <a:endParaRPr lang="en-US" dirty="0"/>
+          </a:p>
+          <a:p>
+            <a:pPr>
+              <a:spcBef>
+                <a:spcPts val="400"/>
+              </a:spcBef>
+              <a:buNone/>
+            </a:pPr>
+            <a:r>
+              <a:rPr lang="en-US" dirty="0"/>
+              <a:t>	An exit statement has meaning only when nested inside a loop., and code generation for an exit statement requires knowledge of which loop encloses it.</a:t>
+            </a:r>
+          </a:p>
+          <a:p>
+            <a:r>
+              <a:rPr lang="en-US" dirty="0"/>
+              <a:t>Similarly, a return statement needs to know which subprogram it is returning from.</a:t>
+            </a:r>
+          </a:p>
+          <a:p>
+            <a:r>
+              <a:rPr lang="en-US" dirty="0"/>
+              <a:t>Classes </a:t>
             </a:r>
             <a:r>
               <a:rPr lang="en-US" dirty="0">
                 <a:latin typeface="Consolas" panose="020B0609020204030204" pitchFamily="49" charset="0"/>
               </a:rPr>
-              <a:t>Loop</a:t>
+              <a:t>LoopContext</a:t>
+            </a:r>
+            <a:r>
+              <a:rPr lang="en-US" dirty="0"/>
+              <a:t> and </a:t>
             </a:r>
             <a:r>
               <a:rPr lang="en-US" dirty="0">
-                <a:latin typeface="Consolas" panose="020B0609020204030204" pitchFamily="49" charset="0"/>
+                <a:latin typeface="Consolas" pitchFamily="49" charset="0"/>
                 <a:cs typeface="Consolas" pitchFamily="49" charset="0"/>
               </a:rPr>
-              <a:t>Context</a:t>
-            </a:r>
-          </a:p>
-        </p:txBody>
-      </p:sp>
-      <p:sp>
-        <p:nvSpPr>
-          <p:cNvPr id="23557" name="Rectangle 3"/>
-          <p:cNvSpPr>
-            <a:spLocks noGrp="1" noChangeArrowheads="1"/>
-          </p:cNvSpPr>
-          <p:nvPr>
-            <p:ph type="body" idx="1"/>
-          </p:nvPr>
-        </p:nvSpPr>
-        <p:spPr/>
-        <p:txBody>
-          <a:bodyPr lIns="182880" tIns="91440"/>
-          <a:lstStyle/>
-          <a:p>
-            <a:pPr marL="91440" indent="0">
-              <a:spcBef>
-                <a:spcPts val="100"/>
-              </a:spcBef>
-              <a:buFontTx/>
-              <a:buNone/>
-            </a:pPr>
-            <a:r>
-              <a:rPr lang="en-US" sz="1800" dirty="0">
-                <a:latin typeface="Consolas" pitchFamily="49" charset="0"/>
-              </a:rPr>
-              <a:t>/**</a:t>
-            </a:r>
-          </a:p>
-          <a:p>
-            <a:pPr marL="91440" indent="0">
-              <a:spcBef>
-                <a:spcPts val="100"/>
-              </a:spcBef>
-              <a:buFontTx/>
-              <a:buNone/>
-            </a:pPr>
-            <a:r>
-              <a:rPr lang="en-US" sz="1800" dirty="0">
-                <a:latin typeface="Consolas" pitchFamily="49" charset="0"/>
-              </a:rPr>
-              <a:t> * Returns the loop statement currently being parsed;</a:t>
-            </a:r>
-          </a:p>
-          <a:p>
-            <a:pPr marL="91440" indent="0">
-              <a:spcBef>
-                <a:spcPts val="100"/>
-              </a:spcBef>
-              <a:buFontTx/>
-              <a:buNone/>
-            </a:pPr>
-            <a:r>
-              <a:rPr lang="en-US" sz="1800" dirty="0">
-                <a:latin typeface="Consolas" pitchFamily="49" charset="0"/>
-              </a:rPr>
-              <a:t> * returns null if no such loop statement exists.</a:t>
-            </a:r>
-          </a:p>
-          <a:p>
-            <a:pPr marL="91440" indent="0">
-              <a:spcBef>
-                <a:spcPts val="100"/>
-              </a:spcBef>
-              <a:buFontTx/>
-              <a:buNone/>
-            </a:pPr>
-            <a:r>
-              <a:rPr lang="en-US" sz="1800" dirty="0">
-                <a:latin typeface="Consolas" pitchFamily="49" charset="0"/>
-              </a:rPr>
-              <a:t> */</a:t>
-            </a:r>
-          </a:p>
-          <a:p>
-            <a:pPr marL="91440" indent="0">
-              <a:spcBef>
-                <a:spcPts val="100"/>
-              </a:spcBef>
-              <a:buFontTx/>
-              <a:buNone/>
-            </a:pPr>
-            <a:r>
-              <a:rPr lang="en-US" sz="1800" dirty="0">
-                <a:latin typeface="Consolas" pitchFamily="49" charset="0"/>
-              </a:rPr>
-              <a:t>public LoopStmt getLoopStmt()</a:t>
-            </a:r>
-          </a:p>
-          <a:p>
-            <a:pPr marL="91440" indent="0">
-              <a:spcBef>
-                <a:spcPts val="100"/>
-              </a:spcBef>
-              <a:buFontTx/>
-              <a:buNone/>
-            </a:pPr>
-            <a:endParaRPr lang="en-US" sz="1800" dirty="0">
-              <a:latin typeface="Consolas" pitchFamily="49" charset="0"/>
-            </a:endParaRPr>
-          </a:p>
-          <a:p>
-            <a:pPr marL="91440" indent="0">
-              <a:spcBef>
-                <a:spcPts val="100"/>
-              </a:spcBef>
-              <a:buFontTx/>
-              <a:buNone/>
-            </a:pPr>
-            <a:r>
-              <a:rPr lang="en-US" sz="1800" dirty="0">
-                <a:latin typeface="Consolas" pitchFamily="49" charset="0"/>
-              </a:rPr>
-              <a:t>/**</a:t>
-            </a:r>
-          </a:p>
-          <a:p>
-            <a:pPr marL="91440" indent="0">
-              <a:spcBef>
-                <a:spcPts val="100"/>
-              </a:spcBef>
-              <a:buFontTx/>
-              <a:buNone/>
-            </a:pPr>
-            <a:r>
-              <a:rPr lang="en-US" sz="1800" dirty="0">
-                <a:latin typeface="Consolas" pitchFamily="49" charset="0"/>
-              </a:rPr>
-              <a:t> * Called when starting to parse a loop statement.</a:t>
-            </a:r>
-          </a:p>
-          <a:p>
-            <a:pPr marL="91440" indent="0">
-              <a:spcBef>
-                <a:spcPts val="100"/>
-              </a:spcBef>
-              <a:buFontTx/>
-              <a:buNone/>
-            </a:pPr>
-            <a:r>
-              <a:rPr lang="en-US" sz="1800" dirty="0">
-                <a:latin typeface="Consolas" pitchFamily="49" charset="0"/>
-              </a:rPr>
-              <a:t> */</a:t>
-            </a:r>
-          </a:p>
-          <a:p>
-            <a:pPr marL="91440" indent="0">
-              <a:spcBef>
-                <a:spcPts val="100"/>
-              </a:spcBef>
-              <a:buFontTx/>
-              <a:buNone/>
-            </a:pPr>
-            <a:r>
-              <a:rPr lang="en-US" sz="1800" dirty="0">
-                <a:latin typeface="Consolas" pitchFamily="49" charset="0"/>
-              </a:rPr>
-              <a:t>public void beginLoop(LoopStmt stmt)</a:t>
-            </a:r>
-          </a:p>
-          <a:p>
-            <a:pPr marL="91440" indent="0">
-              <a:spcBef>
-                <a:spcPts val="100"/>
-              </a:spcBef>
-              <a:buFontTx/>
-              <a:buNone/>
-            </a:pPr>
-            <a:endParaRPr lang="en-US" sz="1800" dirty="0">
-              <a:latin typeface="Consolas" pitchFamily="49" charset="0"/>
-            </a:endParaRPr>
-          </a:p>
-          <a:p>
-            <a:pPr marL="91440" indent="0">
-              <a:spcBef>
-                <a:spcPts val="100"/>
-              </a:spcBef>
-              <a:buFontTx/>
-              <a:buNone/>
-            </a:pPr>
-            <a:r>
-              <a:rPr lang="en-US" sz="1800" dirty="0">
-                <a:latin typeface="Consolas" pitchFamily="49" charset="0"/>
-              </a:rPr>
-              <a:t>/**</a:t>
-            </a:r>
-          </a:p>
-          <a:p>
-            <a:pPr marL="91440" indent="0">
-              <a:spcBef>
-                <a:spcPts val="100"/>
-              </a:spcBef>
-              <a:buFontTx/>
-              <a:buNone/>
-            </a:pPr>
-            <a:r>
-              <a:rPr lang="en-US" sz="1800" dirty="0">
-                <a:latin typeface="Consolas" pitchFamily="49" charset="0"/>
-              </a:rPr>
-              <a:t> * Called when finished parsing a loop statement.</a:t>
-            </a:r>
-          </a:p>
-          <a:p>
-            <a:pPr marL="91440" indent="0">
-              <a:spcBef>
-                <a:spcPts val="100"/>
-              </a:spcBef>
-              <a:buFontTx/>
-              <a:buNone/>
-            </a:pPr>
-            <a:r>
-              <a:rPr lang="en-US" sz="1800" dirty="0">
-                <a:latin typeface="Consolas" pitchFamily="49" charset="0"/>
-              </a:rPr>
-              <a:t> */</a:t>
-            </a:r>
-          </a:p>
-          <a:p>
-            <a:pPr marL="91440" indent="0">
-              <a:spcBef>
-                <a:spcPts val="100"/>
-              </a:spcBef>
-              <a:buFontTx/>
-              <a:buNone/>
-            </a:pPr>
-            <a:r>
-              <a:rPr lang="en-US" sz="1800" dirty="0">
-                <a:latin typeface="Consolas" pitchFamily="49" charset="0"/>
-              </a:rPr>
-              <a:t>public void endLoop()</a:t>
+              <a:t>SubprogramContext</a:t>
+            </a:r>
+            <a:r>
+              <a:rPr lang="en-US" dirty="0"/>
+              <a:t> will be used to maintain contextual information in these cases.</a:t>
             </a:r>
           </a:p>
         </p:txBody>
@@ -23309,36 +23225,49 @@
             </a:r>
             <a:r>
               <a:rPr lang="en-US" dirty="0">
+                <a:latin typeface="Consolas" panose="020B0609020204030204" pitchFamily="49" charset="0"/>
+              </a:rPr>
+              <a:t>Loop</a:t>
+            </a:r>
+            <a:r>
+              <a:rPr lang="en-US" dirty="0">
+                <a:latin typeface="Consolas" panose="020B0609020204030204" pitchFamily="49" charset="0"/>
+                <a:cs typeface="Consolas" pitchFamily="49" charset="0"/>
+              </a:rPr>
+              <a:t>Context</a:t>
+            </a:r>
+          </a:p>
+        </p:txBody>
+      </p:sp>
+      <p:sp>
+        <p:nvSpPr>
+          <p:cNvPr id="23557" name="Rectangle 3"/>
+          <p:cNvSpPr>
+            <a:spLocks noGrp="1" noChangeArrowheads="1"/>
+          </p:cNvSpPr>
+          <p:nvPr>
+            <p:ph type="body" idx="1"/>
+          </p:nvPr>
+        </p:nvSpPr>
+        <p:spPr/>
+        <p:txBody>
+          <a:bodyPr lIns="182880" tIns="91440"/>
+          <a:lstStyle/>
+          <a:p>
+            <a:pPr marL="91440" indent="0">
+              <a:spcBef>
+                <a:spcPts val="100"/>
+              </a:spcBef>
+              <a:buFontTx/>
+              <a:buNone/>
+            </a:pPr>
+            <a:r>
+              <a:rPr lang="en-US" sz="1800" dirty="0">
                 <a:latin typeface="Consolas" pitchFamily="49" charset="0"/>
-                <a:cs typeface="Consolas" pitchFamily="49" charset="0"/>
-              </a:rPr>
-              <a:t>SubprogramContext</a:t>
-            </a:r>
-            <a:endParaRPr lang="en-US" sz="2800" dirty="0">
-              <a:cs typeface="Consolas" pitchFamily="49" charset="0"/>
-            </a:endParaRPr>
-          </a:p>
-        </p:txBody>
-      </p:sp>
-      <p:sp>
-        <p:nvSpPr>
-          <p:cNvPr id="23557" name="Rectangle 3"/>
-          <p:cNvSpPr>
-            <a:spLocks noGrp="1" noChangeArrowheads="1"/>
-          </p:cNvSpPr>
-          <p:nvPr>
-            <p:ph type="body" idx="1"/>
-          </p:nvPr>
-        </p:nvSpPr>
-        <p:spPr>
-          <a:xfrm>
-            <a:off x="458787" y="1363663"/>
-            <a:ext cx="8321040" cy="4935537"/>
-          </a:xfrm>
-        </p:spPr>
-        <p:txBody>
-          <a:bodyPr lIns="182880" tIns="91440"/>
-          <a:lstStyle/>
+              </a:rPr>
+              <a:t>/**</a:t>
+            </a:r>
+          </a:p>
           <a:p>
             <a:pPr marL="91440" indent="0">
               <a:spcBef>
@@ -23351,7 +23280,7 @@
               <a:rPr lang="en-US" sz="1800" dirty="0">
                 <a:latin typeface="Consolas" pitchFamily="49" charset="0"/>
               </a:rPr>
-              <a:t>/**</a:t>
+              <a:t> * Returns the loop statement currently being parsed;</a:t>
             </a:r>
           </a:p>
           <a:p>
@@ -23366,7 +23295,7 @@
               <a:rPr lang="en-US" sz="1800" dirty="0">
                 <a:latin typeface="Consolas" pitchFamily="49" charset="0"/>
               </a:rPr>
-              <a:t> * Returns the subprogram declaration currently being</a:t>
+              <a:t> * returns null if no such loop statement exists.</a:t>
             </a:r>
           </a:p>
           <a:p>
@@ -23381,7 +23310,7 @@
               <a:rPr lang="en-US" sz="1800" dirty="0">
                 <a:latin typeface="Consolas" pitchFamily="49" charset="0"/>
               </a:rPr>
-              <a:t> * parsed.  Returns null if no such procedure exists.</a:t>
+              <a:t> */</a:t>
             </a:r>
           </a:p>
           <a:p>
@@ -23396,22 +23325,7 @@
               <a:rPr lang="en-US" sz="1800" dirty="0">
                 <a:latin typeface="Consolas" pitchFamily="49" charset="0"/>
               </a:rPr>
-              <a:t> */</a:t>
-            </a:r>
-          </a:p>
-          <a:p>
-            <a:pPr marL="91440" indent="0">
-              <a:spcBef>
-                <a:spcPts val="100"/>
-              </a:spcBef>
-              <a:buFontTx/>
-              <a:buNone/>
-            </a:pPr>
-            <a:r>
-              <a:rPr lang="en-US" sz="1800" dirty="0">
-                <a:latin typeface="Consolas" pitchFamily="49" charset="0"/>
-              </a:rPr>
-              <a:t>public SubprogramDecl getSubprogramDecl()</a:t>
+              <a:t>public LoopStmt getLoopStmt()</a:t>
             </a:r>
           </a:p>
           <a:p>
@@ -23453,7 +23367,7 @@
               <a:rPr lang="en-US" sz="1800" dirty="0">
                 <a:latin typeface="Consolas" pitchFamily="49" charset="0"/>
               </a:rPr>
-              <a:t> * Called when starting to parse a subprogram declaration.</a:t>
+              <a:t> * Called when starting to parse a loop statement.</a:t>
             </a:r>
           </a:p>
           <a:p>
@@ -23483,7 +23397,7 @@
               <a:rPr lang="en-US" sz="1800" dirty="0">
                 <a:latin typeface="Consolas" pitchFamily="49" charset="0"/>
               </a:rPr>
-              <a:t>public void beginSubprogramDecl(SubprogramDecl subprogDecl)</a:t>
+              <a:t>public void beginLoop(LoopStmt stmt)</a:t>
             </a:r>
           </a:p>
           <a:p>
@@ -23525,7 +23439,7 @@
               <a:rPr lang="en-US" sz="1800" dirty="0">
                 <a:latin typeface="Consolas" pitchFamily="49" charset="0"/>
               </a:rPr>
-              <a:t> * Called when finished parsing a subprogram declaration.</a:t>
+              <a:t> * Called when finished parsing a loop statement.</a:t>
             </a:r>
           </a:p>
           <a:p>
@@ -23555,7 +23469,7 @@
               <a:rPr lang="en-US" sz="1800" dirty="0">
                 <a:latin typeface="Consolas" pitchFamily="49" charset="0"/>
               </a:rPr>
-              <a:t>public void endSubprogramDecl()</a:t>
+              <a:t>public void endLoop()</a:t>
             </a:r>
           </a:p>
         </p:txBody>
@@ -23587,240 +23501,7 @@
       </p:grpSpPr>
       <p:sp>
         <p:nvSpPr>
-          <p:cNvPr id="24580" name="Rectangle 2"/>
-          <p:cNvSpPr>
-            <a:spLocks noGrp="1" noChangeArrowheads="1"/>
-          </p:cNvSpPr>
-          <p:nvPr>
-            <p:ph type="title"/>
-          </p:nvPr>
-        </p:nvSpPr>
-        <p:spPr/>
-        <p:txBody>
-          <a:bodyPr/>
-          <a:lstStyle/>
-          <a:p>
-            <a:r>
-              <a:rPr lang="en-US" dirty="0"/>
-              <a:t>Example: Using Context During Parsing</a:t>
-            </a:r>
-          </a:p>
-        </p:txBody>
-      </p:sp>
-      <p:sp>
-        <p:nvSpPr>
-          <p:cNvPr id="24581" name="Rectangle 3"/>
-          <p:cNvSpPr>
-            <a:spLocks noGrp="1" noChangeArrowheads="1"/>
-          </p:cNvSpPr>
-          <p:nvPr>
-            <p:ph type="body" idx="1"/>
-          </p:nvPr>
-        </p:nvSpPr>
-        <p:spPr/>
-        <p:txBody>
-          <a:bodyPr/>
-          <a:lstStyle/>
-          <a:p>
-            <a:r>
-              <a:rPr lang="en-US" dirty="0"/>
-              <a:t>When parsing a loop statement:</a:t>
-            </a:r>
-          </a:p>
-          <a:p>
-            <a:pPr lvl="1">
-              <a:buNone/>
-            </a:pPr>
-            <a:r>
-              <a:rPr lang="en-US" sz="1800" dirty="0">
-                <a:latin typeface="Consolas" pitchFamily="49" charset="0"/>
-                <a:cs typeface="Consolas" pitchFamily="49" charset="0"/>
-              </a:rPr>
-              <a:t>LoopStmt stmt = new LoopStmt();</a:t>
-            </a:r>
-          </a:p>
-          <a:p>
-            <a:pPr lvl="1">
-              <a:spcBef>
-                <a:spcPts val="200"/>
-              </a:spcBef>
-              <a:buNone/>
-            </a:pPr>
-            <a:r>
-              <a:rPr lang="en-US" sz="1800" dirty="0">
-                <a:latin typeface="Consolas" pitchFamily="49" charset="0"/>
-                <a:cs typeface="Consolas" pitchFamily="49" charset="0"/>
-              </a:rPr>
-              <a:t>...</a:t>
-            </a:r>
-          </a:p>
-          <a:p>
-            <a:pPr lvl="1">
-              <a:spcBef>
-                <a:spcPts val="200"/>
-              </a:spcBef>
-              <a:buNone/>
-            </a:pPr>
-            <a:r>
-              <a:rPr lang="en-US" sz="1800" dirty="0">
-                <a:latin typeface="Consolas" pitchFamily="49" charset="0"/>
-                <a:cs typeface="Consolas" pitchFamily="49" charset="0"/>
-              </a:rPr>
-              <a:t>loopContext.beginLoop(stmt);</a:t>
-            </a:r>
-          </a:p>
-          <a:p>
-            <a:pPr lvl="1">
-              <a:spcBef>
-                <a:spcPts val="200"/>
-              </a:spcBef>
-              <a:buNone/>
-            </a:pPr>
-            <a:r>
-              <a:rPr lang="en-US" sz="1800" dirty="0">
-                <a:latin typeface="Consolas" pitchFamily="49" charset="0"/>
-                <a:cs typeface="Consolas" pitchFamily="49" charset="0"/>
-              </a:rPr>
-              <a:t>stmt.setStatements(parseStatements());</a:t>
-            </a:r>
-          </a:p>
-          <a:p>
-            <a:pPr lvl="1">
-              <a:spcBef>
-                <a:spcPts val="200"/>
-              </a:spcBef>
-              <a:buNone/>
-            </a:pPr>
-            <a:r>
-              <a:rPr lang="en-US" sz="1800" dirty="0">
-                <a:latin typeface="Consolas" pitchFamily="49" charset="0"/>
-                <a:cs typeface="Consolas" pitchFamily="49" charset="0"/>
-              </a:rPr>
-              <a:t>loopContext.endLoop();</a:t>
-            </a:r>
-          </a:p>
-          <a:p>
-            <a:r>
-              <a:rPr lang="en-US" dirty="0"/>
-              <a:t>When parsing an exit statement:</a:t>
-            </a:r>
-          </a:p>
-          <a:p>
-            <a:pPr lvl="1">
-              <a:spcBef>
-                <a:spcPts val="200"/>
-              </a:spcBef>
-              <a:buNone/>
-            </a:pPr>
-            <a:r>
-              <a:rPr lang="en-US" sz="1800" dirty="0" err="1">
-                <a:latin typeface="Consolas" pitchFamily="49" charset="0"/>
-                <a:cs typeface="Consolas" pitchFamily="49" charset="0"/>
-              </a:rPr>
-              <a:t>LoopStmt</a:t>
-            </a:r>
-            <a:r>
-              <a:rPr lang="en-US" sz="1800" dirty="0">
-                <a:latin typeface="Consolas" pitchFamily="49" charset="0"/>
-                <a:cs typeface="Consolas" pitchFamily="49" charset="0"/>
-              </a:rPr>
-              <a:t> </a:t>
-            </a:r>
-            <a:r>
-              <a:rPr lang="en-US" sz="1800" dirty="0" err="1">
-                <a:latin typeface="Consolas" pitchFamily="49" charset="0"/>
-                <a:cs typeface="Consolas" pitchFamily="49" charset="0"/>
-              </a:rPr>
-              <a:t>loopStmt</a:t>
-            </a:r>
-            <a:r>
-              <a:rPr lang="en-US" sz="1800" dirty="0">
-                <a:latin typeface="Consolas" pitchFamily="49" charset="0"/>
-                <a:cs typeface="Consolas" pitchFamily="49" charset="0"/>
-              </a:rPr>
-              <a:t> = </a:t>
-            </a:r>
-            <a:r>
-              <a:rPr lang="en-US" sz="1800" dirty="0" err="1">
-                <a:latin typeface="Consolas" pitchFamily="49" charset="0"/>
-                <a:cs typeface="Consolas" pitchFamily="49" charset="0"/>
-              </a:rPr>
-              <a:t>loopContext.getLoopStmt</a:t>
-            </a:r>
-            <a:r>
-              <a:rPr lang="en-US" sz="1800" dirty="0">
-                <a:latin typeface="Consolas" pitchFamily="49" charset="0"/>
-                <a:cs typeface="Consolas" pitchFamily="49" charset="0"/>
-              </a:rPr>
-              <a:t>();</a:t>
-            </a:r>
-          </a:p>
-          <a:p>
-            <a:pPr lvl="1">
-              <a:spcBef>
-                <a:spcPts val="200"/>
-              </a:spcBef>
-              <a:buNone/>
-            </a:pPr>
-            <a:r>
-              <a:rPr lang="en-US" sz="1800" dirty="0">
-                <a:latin typeface="Consolas" pitchFamily="49" charset="0"/>
-                <a:cs typeface="Consolas" pitchFamily="49" charset="0"/>
-              </a:rPr>
-              <a:t>if (loopStmt == null)</a:t>
-            </a:r>
-          </a:p>
-          <a:p>
-            <a:pPr lvl="1">
-              <a:spcBef>
-                <a:spcPts val="200"/>
-              </a:spcBef>
-              <a:buNone/>
-            </a:pPr>
-            <a:r>
-              <a:rPr lang="en-US" sz="1800" dirty="0">
-                <a:latin typeface="Consolas" pitchFamily="49" charset="0"/>
-                <a:cs typeface="Consolas" pitchFamily="49" charset="0"/>
-              </a:rPr>
-              <a:t>    throw error(exitPosition,</a:t>
-            </a:r>
-          </a:p>
-          <a:p>
-            <a:pPr lvl="1">
-              <a:spcBef>
-                <a:spcPts val="200"/>
-              </a:spcBef>
-              <a:buNone/>
-            </a:pPr>
-            <a:r>
-              <a:rPr lang="en-US" sz="1800" dirty="0">
-                <a:latin typeface="Consolas" pitchFamily="49" charset="0"/>
-                <a:cs typeface="Consolas" pitchFamily="49" charset="0"/>
-              </a:rPr>
-              <a:t>        "Exit statement is not nested within a loop");</a:t>
-            </a:r>
-          </a:p>
-          <a:p>
-            <a:pPr lvl="1">
-              <a:spcBef>
-                <a:spcPts val="200"/>
-              </a:spcBef>
-              <a:buNone/>
-            </a:pPr>
-            <a:r>
-              <a:rPr lang="en-US" sz="1800" dirty="0">
-                <a:latin typeface="Consolas" pitchFamily="49" charset="0"/>
-                <a:cs typeface="Consolas" pitchFamily="49" charset="0"/>
-              </a:rPr>
-              <a:t>return new ExitStmt(expr, loopStmt);</a:t>
-            </a:r>
-            <a:endParaRPr lang="en-US" dirty="0"/>
-          </a:p>
-        </p:txBody>
-      </p:sp>
-      <p:sp>
-        <p:nvSpPr>
-          <p:cNvPr id="24578" name="Footer Placeholder 3"/>
+          <p:cNvPr id="23554" name="Footer Placeholder 3"/>
           <p:cNvSpPr>
             <a:spLocks noGrp="1"/>
           </p:cNvSpPr>
@@ -23828,7 +23509,9 @@
             <p:ph type="ftr" sz="quarter" idx="10"/>
           </p:nvPr>
         </p:nvSpPr>
-        <p:spPr/>
+        <p:spPr>
+          <a:noFill/>
+        </p:spPr>
         <p:txBody>
           <a:bodyPr/>
           <a:lstStyle/>
@@ -23842,7 +23525,7 @@
       </p:sp>
       <p:sp>
         <p:nvSpPr>
-          <p:cNvPr id="24579" name="Slide Number Placeholder 4"/>
+          <p:cNvPr id="23555" name="Slide Number Placeholder 4"/>
           <p:cNvSpPr>
             <a:spLocks noGrp="1"/>
           </p:cNvSpPr>
@@ -23850,7 +23533,9 @@
             <p:ph type="sldNum" sz="quarter" idx="11"/>
           </p:nvPr>
         </p:nvSpPr>
-        <p:spPr/>
+        <p:spPr>
+          <a:noFill/>
+        </p:spPr>
         <p:txBody>
           <a:bodyPr/>
           <a:lstStyle/>
@@ -23859,12 +23544,284 @@
               <a:rPr lang="en-US" dirty="0"/>
               <a:t>Slide </a:t>
             </a:r>
-            <a:fld id="{5290820B-F486-4161-A33F-1CCFEEE1147B}" type="slidenum">
+            <a:fld id="{239EA5B9-23A7-4CC1-AF6B-C52A3FEA3809}" type="slidenum">
               <a:rPr lang="en-US" smtClean="0"/>
               <a:pPr/>
               <a:t>54</a:t>
             </a:fld>
             <a:endParaRPr lang="en-US" dirty="0"/>
+          </a:p>
+        </p:txBody>
+      </p:sp>
+      <p:sp>
+        <p:nvSpPr>
+          <p:cNvPr id="23556" name="Rectangle 2"/>
+          <p:cNvSpPr>
+            <a:spLocks noGrp="1" noChangeArrowheads="1"/>
+          </p:cNvSpPr>
+          <p:nvPr>
+            <p:ph type="title"/>
+          </p:nvPr>
+        </p:nvSpPr>
+        <p:spPr/>
+        <p:txBody>
+          <a:bodyPr/>
+          <a:lstStyle/>
+          <a:p>
+            <a:r>
+              <a:rPr lang="en-US" dirty="0"/>
+              <a:t>Class </a:t>
+            </a:r>
+            <a:r>
+              <a:rPr lang="en-US" dirty="0">
+                <a:latin typeface="Consolas" pitchFamily="49" charset="0"/>
+                <a:cs typeface="Consolas" pitchFamily="49" charset="0"/>
+              </a:rPr>
+              <a:t>SubprogramContext</a:t>
+            </a:r>
+            <a:endParaRPr lang="en-US" sz="2800" dirty="0">
+              <a:cs typeface="Consolas" pitchFamily="49" charset="0"/>
+            </a:endParaRPr>
+          </a:p>
+        </p:txBody>
+      </p:sp>
+      <p:sp>
+        <p:nvSpPr>
+          <p:cNvPr id="23557" name="Rectangle 3"/>
+          <p:cNvSpPr>
+            <a:spLocks noGrp="1" noChangeArrowheads="1"/>
+          </p:cNvSpPr>
+          <p:nvPr>
+            <p:ph type="body" idx="1"/>
+          </p:nvPr>
+        </p:nvSpPr>
+        <p:spPr>
+          <a:xfrm>
+            <a:off x="458787" y="1363663"/>
+            <a:ext cx="8321040" cy="4935537"/>
+          </a:xfrm>
+        </p:spPr>
+        <p:txBody>
+          <a:bodyPr lIns="182880" tIns="91440"/>
+          <a:lstStyle/>
+          <a:p>
+            <a:pPr marL="91440" indent="0">
+              <a:spcBef>
+                <a:spcPts val="100"/>
+              </a:spcBef>
+              <a:buFontTx/>
+              <a:buNone/>
+            </a:pPr>
+            <a:r>
+              <a:rPr lang="en-US" sz="1800" dirty="0">
+                <a:latin typeface="Consolas" pitchFamily="49" charset="0"/>
+              </a:rPr>
+              <a:t>/**</a:t>
+            </a:r>
+          </a:p>
+          <a:p>
+            <a:pPr marL="91440" indent="0">
+              <a:spcBef>
+                <a:spcPts val="100"/>
+              </a:spcBef>
+              <a:buFontTx/>
+              <a:buNone/>
+            </a:pPr>
+            <a:r>
+              <a:rPr lang="en-US" sz="1800" dirty="0">
+                <a:latin typeface="Consolas" pitchFamily="49" charset="0"/>
+              </a:rPr>
+              <a:t> * Returns the subprogram declaration currently being</a:t>
+            </a:r>
+          </a:p>
+          <a:p>
+            <a:pPr marL="91440" indent="0">
+              <a:spcBef>
+                <a:spcPts val="100"/>
+              </a:spcBef>
+              <a:buFontTx/>
+              <a:buNone/>
+            </a:pPr>
+            <a:r>
+              <a:rPr lang="en-US" sz="1800" dirty="0">
+                <a:latin typeface="Consolas" pitchFamily="49" charset="0"/>
+              </a:rPr>
+              <a:t> * parsed.  Returns null if no such procedure exists.</a:t>
+            </a:r>
+          </a:p>
+          <a:p>
+            <a:pPr marL="91440" indent="0">
+              <a:spcBef>
+                <a:spcPts val="100"/>
+              </a:spcBef>
+              <a:buFontTx/>
+              <a:buNone/>
+            </a:pPr>
+            <a:r>
+              <a:rPr lang="en-US" sz="1800" dirty="0">
+                <a:latin typeface="Consolas" pitchFamily="49" charset="0"/>
+              </a:rPr>
+              <a:t> */</a:t>
+            </a:r>
+          </a:p>
+          <a:p>
+            <a:pPr marL="91440" indent="0">
+              <a:spcBef>
+                <a:spcPts val="100"/>
+              </a:spcBef>
+              <a:buFontTx/>
+              <a:buNone/>
+            </a:pPr>
+            <a:r>
+              <a:rPr lang="en-US" sz="1800" dirty="0">
+                <a:latin typeface="Consolas" pitchFamily="49" charset="0"/>
+              </a:rPr>
+              <a:t>public SubprogramDecl getSubprogramDecl()</a:t>
+            </a:r>
+          </a:p>
+          <a:p>
+            <a:pPr marL="91440" indent="0">
+              <a:spcBef>
+                <a:spcPts val="100"/>
+              </a:spcBef>
+              <a:buFontTx/>
+              <a:buNone/>
+            </a:pPr>
+            <a:endParaRPr lang="en-US" sz="1800" dirty="0">
+              <a:latin typeface="Consolas" pitchFamily="49" charset="0"/>
+            </a:endParaRPr>
+          </a:p>
+          <a:p>
+            <a:pPr marL="91440" indent="0">
+              <a:spcBef>
+                <a:spcPts val="100"/>
+              </a:spcBef>
+              <a:buFontTx/>
+              <a:buNone/>
+            </a:pPr>
+            <a:r>
+              <a:rPr lang="en-US" sz="1800" dirty="0">
+                <a:latin typeface="Consolas" pitchFamily="49" charset="0"/>
+              </a:rPr>
+              <a:t>/**</a:t>
+            </a:r>
+          </a:p>
+          <a:p>
+            <a:pPr marL="91440" indent="0">
+              <a:spcBef>
+                <a:spcPts val="100"/>
+              </a:spcBef>
+              <a:buFontTx/>
+              <a:buNone/>
+            </a:pPr>
+            <a:r>
+              <a:rPr lang="en-US" sz="1800" dirty="0">
+                <a:latin typeface="Consolas" pitchFamily="49" charset="0"/>
+              </a:rPr>
+              <a:t> * Called when starting to parse a subprogram declaration.</a:t>
+            </a:r>
+          </a:p>
+          <a:p>
+            <a:pPr marL="91440" indent="0">
+              <a:spcBef>
+                <a:spcPts val="100"/>
+              </a:spcBef>
+              <a:buFontTx/>
+              <a:buNone/>
+            </a:pPr>
+            <a:r>
+              <a:rPr lang="en-US" sz="1800" dirty="0">
+                <a:latin typeface="Consolas" pitchFamily="49" charset="0"/>
+              </a:rPr>
+              <a:t> */</a:t>
+            </a:r>
+          </a:p>
+          <a:p>
+            <a:pPr marL="91440" indent="0">
+              <a:spcBef>
+                <a:spcPts val="100"/>
+              </a:spcBef>
+              <a:buFontTx/>
+              <a:buNone/>
+            </a:pPr>
+            <a:r>
+              <a:rPr lang="en-US" sz="1800" dirty="0">
+                <a:latin typeface="Consolas" pitchFamily="49" charset="0"/>
+              </a:rPr>
+              <a:t>public void beginSubprogramDecl(SubprogramDecl subprogDecl)</a:t>
+            </a:r>
+          </a:p>
+          <a:p>
+            <a:pPr marL="91440" indent="0">
+              <a:spcBef>
+                <a:spcPts val="100"/>
+              </a:spcBef>
+              <a:buFontTx/>
+              <a:buNone/>
+            </a:pPr>
+            <a:endParaRPr lang="en-US" sz="1800" dirty="0">
+              <a:latin typeface="Consolas" pitchFamily="49" charset="0"/>
+            </a:endParaRPr>
+          </a:p>
+          <a:p>
+            <a:pPr marL="91440" indent="0">
+              <a:spcBef>
+                <a:spcPts val="100"/>
+              </a:spcBef>
+              <a:buFontTx/>
+              <a:buNone/>
+            </a:pPr>
+            <a:r>
+              <a:rPr lang="en-US" sz="1800" dirty="0">
+                <a:latin typeface="Consolas" pitchFamily="49" charset="0"/>
+              </a:rPr>
+              <a:t>/**</a:t>
+            </a:r>
+          </a:p>
+          <a:p>
+            <a:pPr marL="91440" indent="0">
+              <a:spcBef>
+                <a:spcPts val="100"/>
+              </a:spcBef>
+              <a:buFontTx/>
+              <a:buNone/>
+            </a:pPr>
+            <a:r>
+              <a:rPr lang="en-US" sz="1800" dirty="0">
+                <a:latin typeface="Consolas" pitchFamily="49" charset="0"/>
+              </a:rPr>
+              <a:t> * Called when finished parsing a subprogram declaration.</a:t>
+            </a:r>
+          </a:p>
+          <a:p>
+            <a:pPr marL="91440" indent="0">
+              <a:spcBef>
+                <a:spcPts val="100"/>
+              </a:spcBef>
+              <a:buFontTx/>
+              <a:buNone/>
+            </a:pPr>
+            <a:r>
+              <a:rPr lang="en-US" sz="1800" dirty="0">
+                <a:latin typeface="Consolas" pitchFamily="49" charset="0"/>
+              </a:rPr>
+              <a:t> */</a:t>
+            </a:r>
+          </a:p>
+          <a:p>
+            <a:pPr marL="91440" indent="0">
+              <a:spcBef>
+                <a:spcPts val="100"/>
+              </a:spcBef>
+              <a:buFontTx/>
+              <a:buNone/>
+            </a:pPr>
+            <a:r>
+              <a:rPr lang="en-US" sz="1800" dirty="0">
+                <a:latin typeface="Consolas" pitchFamily="49" charset="0"/>
+              </a:rPr>
+              <a:t>public void endSubprogramDecl()</a:t>
+            </a:r>
           </a:p>
         </p:txBody>
       </p:sp>
@@ -23895,6 +23852,314 @@
       </p:grpSpPr>
       <p:sp>
         <p:nvSpPr>
+          <p:cNvPr id="24580" name="Rectangle 2"/>
+          <p:cNvSpPr>
+            <a:spLocks noGrp="1" noChangeArrowheads="1"/>
+          </p:cNvSpPr>
+          <p:nvPr>
+            <p:ph type="title"/>
+          </p:nvPr>
+        </p:nvSpPr>
+        <p:spPr/>
+        <p:txBody>
+          <a:bodyPr/>
+          <a:lstStyle/>
+          <a:p>
+            <a:r>
+              <a:rPr lang="en-US" dirty="0"/>
+              <a:t>Example: Using Context During Parsing</a:t>
+            </a:r>
+          </a:p>
+        </p:txBody>
+      </p:sp>
+      <p:sp>
+        <p:nvSpPr>
+          <p:cNvPr id="24581" name="Rectangle 3"/>
+          <p:cNvSpPr>
+            <a:spLocks noGrp="1" noChangeArrowheads="1"/>
+          </p:cNvSpPr>
+          <p:nvPr>
+            <p:ph type="body" idx="1"/>
+          </p:nvPr>
+        </p:nvSpPr>
+        <p:spPr/>
+        <p:txBody>
+          <a:bodyPr/>
+          <a:lstStyle/>
+          <a:p>
+            <a:r>
+              <a:rPr lang="en-US" dirty="0"/>
+              <a:t>When parsing a loop statement:</a:t>
+            </a:r>
+          </a:p>
+          <a:p>
+            <a:pPr lvl="1">
+              <a:buNone/>
+            </a:pPr>
+            <a:r>
+              <a:rPr lang="en-US" sz="1800" dirty="0">
+                <a:latin typeface="Consolas" pitchFamily="49" charset="0"/>
+                <a:cs typeface="Consolas" pitchFamily="49" charset="0"/>
+              </a:rPr>
+              <a:t>LoopStmt stmt = new LoopStmt();</a:t>
+            </a:r>
+          </a:p>
+          <a:p>
+            <a:pPr lvl="1">
+              <a:spcBef>
+                <a:spcPts val="200"/>
+              </a:spcBef>
+              <a:buNone/>
+            </a:pPr>
+            <a:r>
+              <a:rPr lang="en-US" sz="1800" dirty="0">
+                <a:latin typeface="Consolas" pitchFamily="49" charset="0"/>
+                <a:cs typeface="Consolas" pitchFamily="49" charset="0"/>
+              </a:rPr>
+              <a:t>...</a:t>
+            </a:r>
+          </a:p>
+          <a:p>
+            <a:pPr lvl="1">
+              <a:spcBef>
+                <a:spcPts val="200"/>
+              </a:spcBef>
+              <a:buNone/>
+            </a:pPr>
+            <a:r>
+              <a:rPr lang="en-US" sz="1800" dirty="0">
+                <a:latin typeface="Consolas" pitchFamily="49" charset="0"/>
+                <a:cs typeface="Consolas" pitchFamily="49" charset="0"/>
+              </a:rPr>
+              <a:t>loopContext.beginLoop(stmt);</a:t>
+            </a:r>
+          </a:p>
+          <a:p>
+            <a:pPr lvl="1">
+              <a:spcBef>
+                <a:spcPts val="200"/>
+              </a:spcBef>
+              <a:buNone/>
+            </a:pPr>
+            <a:r>
+              <a:rPr lang="en-US" sz="1800" dirty="0">
+                <a:latin typeface="Consolas" pitchFamily="49" charset="0"/>
+                <a:cs typeface="Consolas" pitchFamily="49" charset="0"/>
+              </a:rPr>
+              <a:t>stmt.setStatements(parseStatements());</a:t>
+            </a:r>
+          </a:p>
+          <a:p>
+            <a:pPr lvl="1">
+              <a:spcBef>
+                <a:spcPts val="200"/>
+              </a:spcBef>
+              <a:buNone/>
+            </a:pPr>
+            <a:r>
+              <a:rPr lang="en-US" sz="1800" dirty="0">
+                <a:latin typeface="Consolas" pitchFamily="49" charset="0"/>
+                <a:cs typeface="Consolas" pitchFamily="49" charset="0"/>
+              </a:rPr>
+              <a:t>loopContext.endLoop();</a:t>
+            </a:r>
+          </a:p>
+          <a:p>
+            <a:r>
+              <a:rPr lang="en-US" dirty="0"/>
+              <a:t>When parsing an exit statement:</a:t>
+            </a:r>
+          </a:p>
+          <a:p>
+            <a:pPr lvl="1">
+              <a:spcBef>
+                <a:spcPts val="200"/>
+              </a:spcBef>
+              <a:buNone/>
+            </a:pPr>
+            <a:r>
+              <a:rPr lang="en-US" sz="1800" dirty="0" err="1">
+                <a:latin typeface="Consolas" pitchFamily="49" charset="0"/>
+                <a:cs typeface="Consolas" pitchFamily="49" charset="0"/>
+              </a:rPr>
+              <a:t>LoopStmt</a:t>
+            </a:r>
+            <a:r>
+              <a:rPr lang="en-US" sz="1800" dirty="0">
+                <a:latin typeface="Consolas" pitchFamily="49" charset="0"/>
+                <a:cs typeface="Consolas" pitchFamily="49" charset="0"/>
+              </a:rPr>
+              <a:t> </a:t>
+            </a:r>
+            <a:r>
+              <a:rPr lang="en-US" sz="1800" dirty="0" err="1">
+                <a:latin typeface="Consolas" pitchFamily="49" charset="0"/>
+                <a:cs typeface="Consolas" pitchFamily="49" charset="0"/>
+              </a:rPr>
+              <a:t>loopStmt</a:t>
+            </a:r>
+            <a:r>
+              <a:rPr lang="en-US" sz="1800" dirty="0">
+                <a:latin typeface="Consolas" pitchFamily="49" charset="0"/>
+                <a:cs typeface="Consolas" pitchFamily="49" charset="0"/>
+              </a:rPr>
+              <a:t> = </a:t>
+            </a:r>
+            <a:r>
+              <a:rPr lang="en-US" sz="1800" dirty="0" err="1">
+                <a:latin typeface="Consolas" pitchFamily="49" charset="0"/>
+                <a:cs typeface="Consolas" pitchFamily="49" charset="0"/>
+              </a:rPr>
+              <a:t>loopContext.getLoopStmt</a:t>
+            </a:r>
+            <a:r>
+              <a:rPr lang="en-US" sz="1800" dirty="0">
+                <a:latin typeface="Consolas" pitchFamily="49" charset="0"/>
+                <a:cs typeface="Consolas" pitchFamily="49" charset="0"/>
+              </a:rPr>
+              <a:t>();</a:t>
+            </a:r>
+          </a:p>
+          <a:p>
+            <a:pPr lvl="1">
+              <a:spcBef>
+                <a:spcPts val="200"/>
+              </a:spcBef>
+              <a:buNone/>
+            </a:pPr>
+            <a:r>
+              <a:rPr lang="en-US" sz="1800" dirty="0">
+                <a:latin typeface="Consolas" pitchFamily="49" charset="0"/>
+                <a:cs typeface="Consolas" pitchFamily="49" charset="0"/>
+              </a:rPr>
+              <a:t>if (loopStmt == null)</a:t>
+            </a:r>
+          </a:p>
+          <a:p>
+            <a:pPr lvl="1">
+              <a:spcBef>
+                <a:spcPts val="200"/>
+              </a:spcBef>
+              <a:buNone/>
+            </a:pPr>
+            <a:r>
+              <a:rPr lang="en-US" sz="1800" dirty="0">
+                <a:latin typeface="Consolas" pitchFamily="49" charset="0"/>
+                <a:cs typeface="Consolas" pitchFamily="49" charset="0"/>
+              </a:rPr>
+              <a:t>    throw error(exitPosition,</a:t>
+            </a:r>
+          </a:p>
+          <a:p>
+            <a:pPr lvl="1">
+              <a:spcBef>
+                <a:spcPts val="200"/>
+              </a:spcBef>
+              <a:buNone/>
+            </a:pPr>
+            <a:r>
+              <a:rPr lang="en-US" sz="1800" dirty="0">
+                <a:latin typeface="Consolas" pitchFamily="49" charset="0"/>
+                <a:cs typeface="Consolas" pitchFamily="49" charset="0"/>
+              </a:rPr>
+              <a:t>        "Exit statement is not nested within a loop");</a:t>
+            </a:r>
+          </a:p>
+          <a:p>
+            <a:pPr lvl="1">
+              <a:spcBef>
+                <a:spcPts val="200"/>
+              </a:spcBef>
+              <a:buNone/>
+            </a:pPr>
+            <a:r>
+              <a:rPr lang="en-US" sz="1800" dirty="0">
+                <a:latin typeface="Consolas" pitchFamily="49" charset="0"/>
+                <a:cs typeface="Consolas" pitchFamily="49" charset="0"/>
+              </a:rPr>
+              <a:t>return new ExitStmt(expr, loopStmt);</a:t>
+            </a:r>
+            <a:endParaRPr lang="en-US" dirty="0"/>
+          </a:p>
+        </p:txBody>
+      </p:sp>
+      <p:sp>
+        <p:nvSpPr>
+          <p:cNvPr id="24578" name="Footer Placeholder 3"/>
+          <p:cNvSpPr>
+            <a:spLocks noGrp="1"/>
+          </p:cNvSpPr>
+          <p:nvPr>
+            <p:ph type="ftr" sz="quarter" idx="10"/>
+          </p:nvPr>
+        </p:nvSpPr>
+        <p:spPr/>
+        <p:txBody>
+          <a:bodyPr/>
+          <a:lstStyle/>
+          <a:p>
+            <a:r>
+              <a:rPr lang="en-US" dirty="0"/>
+              <a:t>©SoftMoore Consulting</a:t>
+            </a:r>
+          </a:p>
+        </p:txBody>
+      </p:sp>
+      <p:sp>
+        <p:nvSpPr>
+          <p:cNvPr id="24579" name="Slide Number Placeholder 4"/>
+          <p:cNvSpPr>
+            <a:spLocks noGrp="1"/>
+          </p:cNvSpPr>
+          <p:nvPr>
+            <p:ph type="sldNum" sz="quarter" idx="11"/>
+          </p:nvPr>
+        </p:nvSpPr>
+        <p:spPr/>
+        <p:txBody>
+          <a:bodyPr/>
+          <a:lstStyle/>
+          <a:p>
+            <a:r>
+              <a:rPr lang="en-US" dirty="0"/>
+              <a:t>Slide </a:t>
+            </a:r>
+            <a:fld id="{5290820B-F486-4161-A33F-1CCFEEE1147B}" type="slidenum">
+              <a:rPr lang="en-US" smtClean="0"/>
+              <a:pPr/>
+              <a:t>55</a:t>
+            </a:fld>
+            <a:endParaRPr lang="en-US" dirty="0"/>
+          </a:p>
+        </p:txBody>
+      </p:sp>
+    </p:spTree>
+  </p:cSld>
+  <p:clrMapOvr>
+    <a:masterClrMapping/>
+  </p:clrMapOvr>
+</p:sld>
+</file>
+
+<file path=ppt/slides/slide56.xml><?xml version="1.0" encoding="utf-8"?>
+<p:sld xmlns:a="http://schemas.openxmlformats.org/drawingml/2006/main" xmlns:r="http://schemas.openxmlformats.org/officeDocument/2006/relationships" xmlns:p="http://schemas.openxmlformats.org/presentationml/2006/main">
+  <p:cSld>
+    <p:spTree>
+      <p:nvGrpSpPr>
+        <p:cNvPr id="1" name=""/>
+        <p:cNvGrpSpPr/>
+        <p:nvPr/>
+      </p:nvGrpSpPr>
+      <p:grpSpPr>
+        <a:xfrm>
+          <a:off x="0" y="0"/>
+          <a:ext cx="0" cy="0"/>
+          <a:chOff x="0" y="0"/>
+          <a:chExt cx="0" cy="0"/>
+        </a:xfrm>
+      </p:grpSpPr>
+      <p:sp>
+        <p:nvSpPr>
           <p:cNvPr id="16386" name="Footer Placeholder 3"/>
           <p:cNvSpPr>
             <a:spLocks noGrp="1"/>
@@ -23941,7 +24206,7 @@
             <a:fld id="{134458ED-4E89-4858-9DDE-3B7F8D65D42C}" type="slidenum">
               <a:rPr lang="en-US" smtClean="0"/>
               <a:pPr/>
-              <a:t>55</a:t>
+              <a:t>56</a:t>
             </a:fld>
             <a:endParaRPr lang="en-US" dirty="0"/>
           </a:p>

</xml_diff>

<commit_message>
minor correction to one slide
</commit_message>
<xml_diff>
--- a/PowerPoint Slides/08 - Abstract Syntax Trees.pptx
+++ b/PowerPoint Slides/08 - Abstract Syntax Trees.pptx
@@ -8592,23 +8592,64 @@
           </a:p>
         </p:txBody>
       </p:sp>
+      <p:sp>
+        <p:nvSpPr>
+          <p:cNvPr id="23" name="TextBox 22"/>
+          <p:cNvSpPr txBox="1"/>
+          <p:nvPr/>
+        </p:nvSpPr>
+        <p:spPr>
+          <a:xfrm>
+            <a:off x="1752959" y="5638800"/>
+            <a:ext cx="5638083" cy="400110"/>
+          </a:xfrm>
+          <a:prstGeom prst="rect">
+            <a:avLst/>
+          </a:prstGeom>
+          <a:noFill/>
+        </p:spPr>
+        <p:txBody>
+          <a:bodyPr wrap="none" rtlCol="0">
+            <a:spAutoFit/>
+          </a:bodyPr>
+          <a:lstStyle/>
+          <a:p>
+            <a:r>
+              <a:rPr lang="en-US" sz="2000" dirty="0"/>
+              <a:t>(names for abstract classes are shown in italics)</a:t>
+            </a:r>
+          </a:p>
+        </p:txBody>
+      </p:sp>
       <p:grpSp>
         <p:nvGrpSpPr>
-          <p:cNvPr id="3" name="Group 2"/>
+          <p:cNvPr id="52" name="Group 51">
+            <a:extLst>
+              <a:ext uri="{FF2B5EF4-FFF2-40B4-BE49-F238E27FC236}">
+                <a16:creationId xmlns:a16="http://schemas.microsoft.com/office/drawing/2014/main" id="{61FA90AB-AFE3-4D39-8F3F-C441D9B07DA1}"/>
+              </a:ext>
+            </a:extLst>
+          </p:cNvPr>
           <p:cNvGrpSpPr/>
           <p:nvPr/>
         </p:nvGrpSpPr>
         <p:grpSpPr>
           <a:xfrm>
-            <a:off x="191123" y="1790785"/>
-            <a:ext cx="8761755" cy="3467015"/>
+            <a:off x="91440" y="1790785"/>
+            <a:ext cx="8961120" cy="3467015"/>
             <a:chOff x="134366" y="1752600"/>
-            <a:chExt cx="8761755" cy="3467015"/>
+            <a:chExt cx="8978210" cy="3467015"/>
           </a:xfrm>
         </p:grpSpPr>
         <p:sp>
           <p:nvSpPr>
-            <p:cNvPr id="11269" name="Text Box 4"/>
+            <p:cNvPr id="53" name="Text Box 4">
+              <a:extLst>
+                <a:ext uri="{FF2B5EF4-FFF2-40B4-BE49-F238E27FC236}">
+                  <a16:creationId xmlns:a16="http://schemas.microsoft.com/office/drawing/2014/main" id="{B01D5247-4A28-4C80-88A2-035C6F67EE87}"/>
+                </a:ext>
+              </a:extLst>
+            </p:cNvPr>
             <p:cNvSpPr txBox="1">
               <a:spLocks noChangeArrowheads="1"/>
             </p:cNvSpPr>
@@ -8654,7 +8695,13 @@
         </p:sp>
         <p:sp>
           <p:nvSpPr>
-            <p:cNvPr id="11270" name="Text Box 5"/>
+            <p:cNvPr id="54" name="Text Box 5">
+              <a:extLst>
+                <a:ext uri="{FF2B5EF4-FFF2-40B4-BE49-F238E27FC236}">
+                  <a16:creationId xmlns:a16="http://schemas.microsoft.com/office/drawing/2014/main" id="{61C4E822-A31B-4C8F-9A19-45F7D8CA1B35}"/>
+                </a:ext>
+              </a:extLst>
+            </p:cNvPr>
             <p:cNvSpPr txBox="1">
               <a:spLocks noChangeArrowheads="1"/>
             </p:cNvSpPr>
@@ -8698,7 +8745,13 @@
         </p:sp>
         <p:sp>
           <p:nvSpPr>
-            <p:cNvPr id="11271" name="Rectangle 6"/>
+            <p:cNvPr id="55" name="Rectangle 6">
+              <a:extLst>
+                <a:ext uri="{FF2B5EF4-FFF2-40B4-BE49-F238E27FC236}">
+                  <a16:creationId xmlns:a16="http://schemas.microsoft.com/office/drawing/2014/main" id="{8307769E-1648-45F2-8028-402429E4751B}"/>
+                </a:ext>
+              </a:extLst>
+            </p:cNvPr>
             <p:cNvSpPr>
               <a:spLocks noChangeArrowheads="1"/>
             </p:cNvSpPr>
@@ -8739,7 +8792,13 @@
         </p:sp>
         <p:sp>
           <p:nvSpPr>
-            <p:cNvPr id="11272" name="Rectangle 7"/>
+            <p:cNvPr id="56" name="Rectangle 7">
+              <a:extLst>
+                <a:ext uri="{FF2B5EF4-FFF2-40B4-BE49-F238E27FC236}">
+                  <a16:creationId xmlns:a16="http://schemas.microsoft.com/office/drawing/2014/main" id="{D9B8518C-24CB-4AEB-8297-F9D26EA63808}"/>
+                </a:ext>
+              </a:extLst>
+            </p:cNvPr>
             <p:cNvSpPr>
               <a:spLocks noChangeArrowheads="1"/>
             </p:cNvSpPr>
@@ -8780,7 +8839,13 @@
         </p:sp>
         <p:sp>
           <p:nvSpPr>
-            <p:cNvPr id="11273" name="Text Box 9"/>
+            <p:cNvPr id="57" name="Text Box 9">
+              <a:extLst>
+                <a:ext uri="{FF2B5EF4-FFF2-40B4-BE49-F238E27FC236}">
+                  <a16:creationId xmlns:a16="http://schemas.microsoft.com/office/drawing/2014/main" id="{B8184A2B-0F51-4ABC-B916-E2C3A1D2D0E2}"/>
+                </a:ext>
+              </a:extLst>
+            </p:cNvPr>
             <p:cNvSpPr txBox="1">
               <a:spLocks noChangeArrowheads="1"/>
             </p:cNvSpPr>
@@ -8826,7 +8891,13 @@
         </p:sp>
         <p:sp>
           <p:nvSpPr>
-            <p:cNvPr id="11274" name="Text Box 10"/>
+            <p:cNvPr id="58" name="Text Box 10">
+              <a:extLst>
+                <a:ext uri="{FF2B5EF4-FFF2-40B4-BE49-F238E27FC236}">
+                  <a16:creationId xmlns:a16="http://schemas.microsoft.com/office/drawing/2014/main" id="{98E9E087-EA18-4D3B-998F-E6F89D803797}"/>
+                </a:ext>
+              </a:extLst>
+            </p:cNvPr>
             <p:cNvSpPr txBox="1">
               <a:spLocks noChangeArrowheads="1"/>
             </p:cNvSpPr>
@@ -8872,7 +8943,13 @@
         </p:sp>
         <p:sp>
           <p:nvSpPr>
-            <p:cNvPr id="11275" name="Text Box 11"/>
+            <p:cNvPr id="59" name="Text Box 11">
+              <a:extLst>
+                <a:ext uri="{FF2B5EF4-FFF2-40B4-BE49-F238E27FC236}">
+                  <a16:creationId xmlns:a16="http://schemas.microsoft.com/office/drawing/2014/main" id="{EC298976-BD72-4A6D-BDD6-08BBE14AB5C8}"/>
+                </a:ext>
+              </a:extLst>
+            </p:cNvPr>
             <p:cNvSpPr txBox="1">
               <a:spLocks noChangeArrowheads="1"/>
             </p:cNvSpPr>
@@ -8880,7 +8957,7 @@
           </p:nvSpPr>
           <p:spPr bwMode="auto">
             <a:xfrm>
-              <a:off x="4704377" y="3842494"/>
+              <a:off x="4704377" y="3834800"/>
               <a:ext cx="724557" cy="339196"/>
             </a:xfrm>
             <a:prstGeom prst="rect">
@@ -8918,7 +8995,13 @@
         </p:sp>
         <p:sp>
           <p:nvSpPr>
-            <p:cNvPr id="11276" name="Text Box 12"/>
+            <p:cNvPr id="60" name="Text Box 12">
+              <a:extLst>
+                <a:ext uri="{FF2B5EF4-FFF2-40B4-BE49-F238E27FC236}">
+                  <a16:creationId xmlns:a16="http://schemas.microsoft.com/office/drawing/2014/main" id="{A00F3BD4-F1DD-48B4-B938-D98DAC603BA5}"/>
+                </a:ext>
+              </a:extLst>
+            </p:cNvPr>
             <p:cNvSpPr txBox="1">
               <a:spLocks noChangeArrowheads="1"/>
             </p:cNvSpPr>
@@ -8926,7 +9009,7 @@
           </p:nvSpPr>
           <p:spPr bwMode="auto">
             <a:xfrm>
-              <a:off x="5585101" y="3842494"/>
+              <a:off x="5489822" y="3834800"/>
               <a:ext cx="1064394" cy="339196"/>
             </a:xfrm>
             <a:prstGeom prst="rect">
@@ -8964,7 +9047,13 @@
         </p:sp>
         <p:sp>
           <p:nvSpPr>
-            <p:cNvPr id="11277" name="Rectangle 13"/>
+            <p:cNvPr id="61" name="Rectangle 13">
+              <a:extLst>
+                <a:ext uri="{FF2B5EF4-FFF2-40B4-BE49-F238E27FC236}">
+                  <a16:creationId xmlns:a16="http://schemas.microsoft.com/office/drawing/2014/main" id="{3EF30726-986A-4B75-818E-897918466167}"/>
+                </a:ext>
+              </a:extLst>
+            </p:cNvPr>
             <p:cNvSpPr>
               <a:spLocks noChangeArrowheads="1"/>
             </p:cNvSpPr>
@@ -8972,7 +9061,7 @@
           </p:nvSpPr>
           <p:spPr bwMode="auto">
             <a:xfrm>
-              <a:off x="7313068" y="2754656"/>
+              <a:off x="7253880" y="2754656"/>
               <a:ext cx="1199047" cy="339196"/>
             </a:xfrm>
             <a:prstGeom prst="rect">
@@ -9005,7 +9094,13 @@
         </p:sp>
         <p:sp>
           <p:nvSpPr>
-            <p:cNvPr id="11278" name="Text Box 15"/>
+            <p:cNvPr id="62" name="Text Box 15">
+              <a:extLst>
+                <a:ext uri="{FF2B5EF4-FFF2-40B4-BE49-F238E27FC236}">
+                  <a16:creationId xmlns:a16="http://schemas.microsoft.com/office/drawing/2014/main" id="{B261F822-BA62-4D43-9C1D-C665FA744622}"/>
+                </a:ext>
+              </a:extLst>
+            </p:cNvPr>
             <p:cNvSpPr txBox="1">
               <a:spLocks noChangeArrowheads="1"/>
             </p:cNvSpPr>
@@ -9013,7 +9108,7 @@
           </p:nvSpPr>
           <p:spPr bwMode="auto">
             <a:xfrm>
-              <a:off x="6079647" y="4880419"/>
+              <a:off x="5925566" y="4880419"/>
               <a:ext cx="1243931" cy="339196"/>
             </a:xfrm>
             <a:prstGeom prst="rect">
@@ -9051,7 +9146,13 @@
         </p:sp>
         <p:sp>
           <p:nvSpPr>
-            <p:cNvPr id="11279" name="Text Box 16"/>
+            <p:cNvPr id="63" name="Text Box 16">
+              <a:extLst>
+                <a:ext uri="{FF2B5EF4-FFF2-40B4-BE49-F238E27FC236}">
+                  <a16:creationId xmlns:a16="http://schemas.microsoft.com/office/drawing/2014/main" id="{E2D1585D-B978-4781-A091-7C3F564FBEF6}"/>
+                </a:ext>
+              </a:extLst>
+            </p:cNvPr>
             <p:cNvSpPr txBox="1">
               <a:spLocks noChangeArrowheads="1"/>
             </p:cNvSpPr>
@@ -9059,7 +9160,7 @@
           </p:nvSpPr>
           <p:spPr bwMode="auto">
             <a:xfrm>
-              <a:off x="7379679" y="4880419"/>
+              <a:off x="7225598" y="4880419"/>
               <a:ext cx="1516442" cy="339196"/>
             </a:xfrm>
             <a:prstGeom prst="rect">
@@ -9097,11 +9198,17 @@
         </p:sp>
         <p:cxnSp>
           <p:nvCxnSpPr>
-            <p:cNvPr id="11280" name="AutoShape 17"/>
+            <p:cNvPr id="64" name="AutoShape 17">
+              <a:extLst>
+                <a:ext uri="{FF2B5EF4-FFF2-40B4-BE49-F238E27FC236}">
+                  <a16:creationId xmlns:a16="http://schemas.microsoft.com/office/drawing/2014/main" id="{1C8564F0-06E5-4380-BC2E-47C87CED7863}"/>
+                </a:ext>
+              </a:extLst>
+            </p:cNvPr>
             <p:cNvCxnSpPr>
               <a:cxnSpLocks noChangeShapeType="1"/>
-              <a:stCxn id="11270" idx="0"/>
-              <a:endCxn id="2" idx="3"/>
+              <a:stCxn id="54" idx="0"/>
+              <a:endCxn id="86" idx="3"/>
             </p:cNvCxnSpPr>
             <p:nvPr/>
           </p:nvCxnSpPr>
@@ -9128,11 +9235,17 @@
         </p:cxnSp>
         <p:cxnSp>
           <p:nvCxnSpPr>
-            <p:cNvPr id="11281" name="AutoShape 18"/>
+            <p:cNvPr id="65" name="AutoShape 18">
+              <a:extLst>
+                <a:ext uri="{FF2B5EF4-FFF2-40B4-BE49-F238E27FC236}">
+                  <a16:creationId xmlns:a16="http://schemas.microsoft.com/office/drawing/2014/main" id="{469E7BA1-232D-4C04-8555-C794A5F8A3C7}"/>
+                </a:ext>
+              </a:extLst>
+            </p:cNvPr>
             <p:cNvCxnSpPr>
               <a:cxnSpLocks noChangeShapeType="1"/>
-              <a:stCxn id="11271" idx="0"/>
-              <a:endCxn id="2" idx="3"/>
+              <a:stCxn id="55" idx="0"/>
+              <a:endCxn id="86" idx="3"/>
             </p:cNvCxnSpPr>
             <p:nvPr/>
           </p:nvCxnSpPr>
@@ -9159,11 +9272,17 @@
         </p:cxnSp>
         <p:cxnSp>
           <p:nvCxnSpPr>
-            <p:cNvPr id="11282" name="AutoShape 20"/>
+            <p:cNvPr id="66" name="AutoShape 20">
+              <a:extLst>
+                <a:ext uri="{FF2B5EF4-FFF2-40B4-BE49-F238E27FC236}">
+                  <a16:creationId xmlns:a16="http://schemas.microsoft.com/office/drawing/2014/main" id="{58ADFA27-4F2C-4392-B8CA-DAE109F05D46}"/>
+                </a:ext>
+              </a:extLst>
+            </p:cNvPr>
             <p:cNvCxnSpPr>
               <a:cxnSpLocks noChangeShapeType="1"/>
-              <a:stCxn id="11272" idx="0"/>
-              <a:endCxn id="2" idx="3"/>
+              <a:stCxn id="56" idx="0"/>
+              <a:endCxn id="86" idx="3"/>
             </p:cNvCxnSpPr>
             <p:nvPr/>
           </p:nvCxnSpPr>
@@ -9190,18 +9309,24 @@
         </p:cxnSp>
         <p:cxnSp>
           <p:nvCxnSpPr>
-            <p:cNvPr id="11283" name="AutoShape 21"/>
+            <p:cNvPr id="67" name="AutoShape 21">
+              <a:extLst>
+                <a:ext uri="{FF2B5EF4-FFF2-40B4-BE49-F238E27FC236}">
+                  <a16:creationId xmlns:a16="http://schemas.microsoft.com/office/drawing/2014/main" id="{4FECA268-9106-4812-8789-1E126C707420}"/>
+                </a:ext>
+              </a:extLst>
+            </p:cNvPr>
             <p:cNvCxnSpPr>
               <a:cxnSpLocks noChangeShapeType="1"/>
-              <a:stCxn id="11277" idx="0"/>
-              <a:endCxn id="2" idx="3"/>
+              <a:stCxn id="61" idx="0"/>
+              <a:endCxn id="86" idx="3"/>
             </p:cNvCxnSpPr>
             <p:nvPr/>
           </p:nvCxnSpPr>
           <p:spPr bwMode="auto">
             <a:xfrm rot="16200000" flipV="1">
-              <a:off x="5995706" y="837770"/>
-              <a:ext cx="493181" cy="3340592"/>
+              <a:off x="5966113" y="867364"/>
+              <a:ext cx="493181" cy="3281403"/>
             </a:xfrm>
             <a:prstGeom prst="bentConnector3">
               <a:avLst>
@@ -9221,18 +9346,24 @@
         </p:cxnSp>
         <p:cxnSp>
           <p:nvCxnSpPr>
-            <p:cNvPr id="11284" name="AutoShape 22"/>
+            <p:cNvPr id="68" name="AutoShape 22">
+              <a:extLst>
+                <a:ext uri="{FF2B5EF4-FFF2-40B4-BE49-F238E27FC236}">
+                  <a16:creationId xmlns:a16="http://schemas.microsoft.com/office/drawing/2014/main" id="{1A9CD038-5523-464B-A668-534186B50AF4}"/>
+                </a:ext>
+              </a:extLst>
+            </p:cNvPr>
             <p:cNvCxnSpPr>
               <a:cxnSpLocks noChangeShapeType="1"/>
-              <a:stCxn id="39" idx="0"/>
-              <a:endCxn id="46" idx="3"/>
+              <a:stCxn id="83" idx="0"/>
+              <a:endCxn id="87" idx="3"/>
             </p:cNvCxnSpPr>
             <p:nvPr/>
           </p:nvCxnSpPr>
           <p:spPr bwMode="auto">
             <a:xfrm rot="5400000" flipH="1" flipV="1">
-              <a:off x="1594389" y="2923429"/>
-              <a:ext cx="575557" cy="1262575"/>
+              <a:off x="1598236" y="2919581"/>
+              <a:ext cx="567863" cy="1262576"/>
             </a:xfrm>
             <a:prstGeom prst="bentConnector3">
               <a:avLst>
@@ -9252,7 +9383,13 @@
         </p:cxnSp>
         <p:sp>
           <p:nvSpPr>
-            <p:cNvPr id="11286" name="Text Box 24"/>
+            <p:cNvPr id="69" name="Text Box 24">
+              <a:extLst>
+                <a:ext uri="{FF2B5EF4-FFF2-40B4-BE49-F238E27FC236}">
+                  <a16:creationId xmlns:a16="http://schemas.microsoft.com/office/drawing/2014/main" id="{228BBDEC-C8FE-4554-9DC9-C7B806BBFA97}"/>
+                </a:ext>
+              </a:extLst>
+            </p:cNvPr>
             <p:cNvSpPr txBox="1">
               <a:spLocks noChangeArrowheads="1"/>
             </p:cNvSpPr>
@@ -9260,8 +9397,8 @@
           </p:nvSpPr>
           <p:spPr bwMode="auto">
             <a:xfrm>
-              <a:off x="8126914" y="3842494"/>
-              <a:ext cx="743793" cy="339196"/>
+              <a:off x="7883906" y="3834800"/>
+              <a:ext cx="1228670" cy="339196"/>
             </a:xfrm>
             <a:prstGeom prst="rect">
               <a:avLst/>
@@ -9291,25 +9428,31 @@
                 <a:rPr lang="en-US" sz="1600" dirty="0">
                   <a:latin typeface="+mn-lt"/>
                 </a:rPr>
-                <a:t>Literal</a:t>
+                <a:t>ConstValue</a:t>
               </a:r>
             </a:p>
           </p:txBody>
         </p:sp>
         <p:cxnSp>
           <p:nvCxnSpPr>
-            <p:cNvPr id="11287" name="AutoShape 25"/>
+            <p:cNvPr id="70" name="AutoShape 25">
+              <a:extLst>
+                <a:ext uri="{FF2B5EF4-FFF2-40B4-BE49-F238E27FC236}">
+                  <a16:creationId xmlns:a16="http://schemas.microsoft.com/office/drawing/2014/main" id="{05E43508-6C5F-4ECC-BE60-4615E4D196F6}"/>
+                </a:ext>
+              </a:extLst>
+            </p:cNvPr>
             <p:cNvCxnSpPr>
               <a:cxnSpLocks noChangeShapeType="1"/>
-              <a:stCxn id="11275" idx="0"/>
-              <a:endCxn id="47" idx="3"/>
+              <a:stCxn id="59" idx="0"/>
+              <a:endCxn id="88" idx="3"/>
             </p:cNvCxnSpPr>
             <p:nvPr/>
           </p:nvCxnSpPr>
           <p:spPr bwMode="auto">
             <a:xfrm rot="5400000" flipH="1" flipV="1">
-              <a:off x="5030074" y="3297910"/>
-              <a:ext cx="581167" cy="508002"/>
+              <a:off x="5033921" y="3294063"/>
+              <a:ext cx="573473" cy="508003"/>
             </a:xfrm>
             <a:prstGeom prst="bentConnector3">
               <a:avLst>
@@ -9329,18 +9472,24 @@
         </p:cxnSp>
         <p:cxnSp>
           <p:nvCxnSpPr>
-            <p:cNvPr id="11288" name="AutoShape 26"/>
+            <p:cNvPr id="71" name="AutoShape 26">
+              <a:extLst>
+                <a:ext uri="{FF2B5EF4-FFF2-40B4-BE49-F238E27FC236}">
+                  <a16:creationId xmlns:a16="http://schemas.microsoft.com/office/drawing/2014/main" id="{153109A7-0603-4207-9C91-FA63405391A1}"/>
+                </a:ext>
+              </a:extLst>
+            </p:cNvPr>
             <p:cNvCxnSpPr>
               <a:cxnSpLocks noChangeShapeType="1"/>
-              <a:stCxn id="11276" idx="0"/>
-              <a:endCxn id="47" idx="3"/>
+              <a:stCxn id="60" idx="0"/>
+              <a:endCxn id="88" idx="3"/>
             </p:cNvCxnSpPr>
             <p:nvPr/>
           </p:nvCxnSpPr>
           <p:spPr bwMode="auto">
             <a:xfrm rot="16200000" flipV="1">
-              <a:off x="5555395" y="3280591"/>
-              <a:ext cx="581167" cy="542640"/>
+              <a:off x="5511603" y="3324383"/>
+              <a:ext cx="573473" cy="447361"/>
             </a:xfrm>
             <a:prstGeom prst="bentConnector3">
               <a:avLst>
@@ -9360,18 +9509,24 @@
         </p:cxnSp>
         <p:cxnSp>
           <p:nvCxnSpPr>
-            <p:cNvPr id="11289" name="AutoShape 27"/>
+            <p:cNvPr id="72" name="AutoShape 27">
+              <a:extLst>
+                <a:ext uri="{FF2B5EF4-FFF2-40B4-BE49-F238E27FC236}">
+                  <a16:creationId xmlns:a16="http://schemas.microsoft.com/office/drawing/2014/main" id="{197C9490-3649-42BD-BD8D-53E5F2139B59}"/>
+                </a:ext>
+              </a:extLst>
+            </p:cNvPr>
             <p:cNvCxnSpPr>
               <a:cxnSpLocks noChangeShapeType="1"/>
-              <a:stCxn id="11293" idx="0"/>
-              <a:endCxn id="48" idx="3"/>
+              <a:stCxn id="76" idx="0"/>
+              <a:endCxn id="89" idx="3"/>
             </p:cNvCxnSpPr>
             <p:nvPr/>
           </p:nvCxnSpPr>
           <p:spPr bwMode="auto">
             <a:xfrm rot="5400000" flipH="1" flipV="1">
-              <a:off x="7361094" y="3283304"/>
-              <a:ext cx="573473" cy="529521"/>
+              <a:off x="7254461" y="3235857"/>
+              <a:ext cx="573473" cy="624415"/>
             </a:xfrm>
             <a:prstGeom prst="bentConnector3">
               <a:avLst>
@@ -9391,18 +9546,24 @@
         </p:cxnSp>
         <p:cxnSp>
           <p:nvCxnSpPr>
-            <p:cNvPr id="11290" name="AutoShape 28"/>
+            <p:cNvPr id="73" name="AutoShape 28">
+              <a:extLst>
+                <a:ext uri="{FF2B5EF4-FFF2-40B4-BE49-F238E27FC236}">
+                  <a16:creationId xmlns:a16="http://schemas.microsoft.com/office/drawing/2014/main" id="{6E46632A-B268-4544-86F7-0D6CA0A8B0FF}"/>
+                </a:ext>
+              </a:extLst>
+            </p:cNvPr>
             <p:cNvCxnSpPr>
               <a:cxnSpLocks noChangeShapeType="1"/>
-              <a:stCxn id="11286" idx="0"/>
-              <a:endCxn id="48" idx="3"/>
+              <a:stCxn id="69" idx="0"/>
+              <a:endCxn id="89" idx="3"/>
             </p:cNvCxnSpPr>
             <p:nvPr/>
           </p:nvCxnSpPr>
           <p:spPr bwMode="auto">
             <a:xfrm rot="16200000" flipV="1">
-              <a:off x="7915118" y="3258801"/>
-              <a:ext cx="581167" cy="586220"/>
+              <a:off x="7889087" y="3225645"/>
+              <a:ext cx="573473" cy="644837"/>
             </a:xfrm>
             <a:prstGeom prst="bentConnector3">
               <a:avLst>
@@ -9422,17 +9583,23 @@
         </p:cxnSp>
         <p:cxnSp>
           <p:nvCxnSpPr>
-            <p:cNvPr id="11291" name="AutoShape 29"/>
+            <p:cNvPr id="74" name="AutoShape 29">
+              <a:extLst>
+                <a:ext uri="{FF2B5EF4-FFF2-40B4-BE49-F238E27FC236}">
+                  <a16:creationId xmlns:a16="http://schemas.microsoft.com/office/drawing/2014/main" id="{9541BFF3-38A2-41B2-A78C-1A630F62CB4D}"/>
+                </a:ext>
+              </a:extLst>
+            </p:cNvPr>
             <p:cNvCxnSpPr>
               <a:cxnSpLocks noChangeShapeType="1"/>
-              <a:stCxn id="11278" idx="0"/>
-              <a:endCxn id="49" idx="3"/>
+              <a:stCxn id="62" idx="0"/>
+              <a:endCxn id="90" idx="3"/>
             </p:cNvCxnSpPr>
             <p:nvPr/>
           </p:nvCxnSpPr>
           <p:spPr bwMode="auto">
             <a:xfrm rot="5400000" flipH="1" flipV="1">
-              <a:off x="6774610" y="4271960"/>
+              <a:off x="6620529" y="4271960"/>
               <a:ext cx="535462" cy="681457"/>
             </a:xfrm>
             <a:prstGeom prst="bentConnector3">
@@ -9453,17 +9620,23 @@
         </p:cxnSp>
         <p:cxnSp>
           <p:nvCxnSpPr>
-            <p:cNvPr id="11292" name="AutoShape 30"/>
+            <p:cNvPr id="75" name="AutoShape 30">
+              <a:extLst>
+                <a:ext uri="{FF2B5EF4-FFF2-40B4-BE49-F238E27FC236}">
+                  <a16:creationId xmlns:a16="http://schemas.microsoft.com/office/drawing/2014/main" id="{3E2CC8D7-9FB6-407A-A147-E224177F183B}"/>
+                </a:ext>
+              </a:extLst>
+            </p:cNvPr>
             <p:cNvCxnSpPr>
               <a:cxnSpLocks noChangeShapeType="1"/>
-              <a:stCxn id="11279" idx="0"/>
-              <a:endCxn id="49" idx="3"/>
+              <a:stCxn id="63" idx="0"/>
+              <a:endCxn id="90" idx="3"/>
             </p:cNvCxnSpPr>
             <p:nvPr/>
           </p:nvCxnSpPr>
           <p:spPr bwMode="auto">
             <a:xfrm rot="16200000" flipV="1">
-              <a:off x="7492754" y="4235273"/>
+              <a:off x="7338673" y="4235273"/>
               <a:ext cx="535462" cy="754830"/>
             </a:xfrm>
             <a:prstGeom prst="bentConnector3">
@@ -9484,7 +9657,13 @@
         </p:cxnSp>
         <p:sp>
           <p:nvSpPr>
-            <p:cNvPr id="11293" name="Rectangle 14"/>
+            <p:cNvPr id="76" name="Rectangle 14">
+              <a:extLst>
+                <a:ext uri="{FF2B5EF4-FFF2-40B4-BE49-F238E27FC236}">
+                  <a16:creationId xmlns:a16="http://schemas.microsoft.com/office/drawing/2014/main" id="{17DED6A0-5770-4549-B0CC-0E12988BD0FF}"/>
+                </a:ext>
+              </a:extLst>
+            </p:cNvPr>
             <p:cNvSpPr>
               <a:spLocks noChangeArrowheads="1"/>
             </p:cNvSpPr>
@@ -9492,7 +9671,7 @@
           </p:nvSpPr>
           <p:spPr bwMode="auto">
             <a:xfrm>
-              <a:off x="6789157" y="3834800"/>
+              <a:off x="6635076" y="3834800"/>
               <a:ext cx="1187826" cy="339196"/>
             </a:xfrm>
             <a:prstGeom prst="rect">
@@ -9525,7 +9704,13 @@
         </p:sp>
         <p:sp>
           <p:nvSpPr>
-            <p:cNvPr id="30" name="Text Box 9"/>
+            <p:cNvPr id="77" name="Text Box 9">
+              <a:extLst>
+                <a:ext uri="{FF2B5EF4-FFF2-40B4-BE49-F238E27FC236}">
+                  <a16:creationId xmlns:a16="http://schemas.microsoft.com/office/drawing/2014/main" id="{C9F23716-FB59-415A-986E-CF1209C686AC}"/>
+                </a:ext>
+              </a:extLst>
+            </p:cNvPr>
             <p:cNvSpPr txBox="1">
               <a:spLocks noChangeArrowheads="1"/>
             </p:cNvSpPr>
@@ -9533,7 +9718,7 @@
           </p:nvSpPr>
           <p:spPr bwMode="auto">
             <a:xfrm>
-              <a:off x="2899792" y="3842494"/>
+              <a:off x="2899792" y="3834800"/>
               <a:ext cx="1723229" cy="339196"/>
             </a:xfrm>
             <a:prstGeom prst="rect">
@@ -9571,17 +9756,24 @@
         </p:sp>
         <p:cxnSp>
           <p:nvCxnSpPr>
-            <p:cNvPr id="32" name="Elbow Connector 31"/>
+            <p:cNvPr id="78" name="Elbow Connector 31">
+              <a:extLst>
+                <a:ext uri="{FF2B5EF4-FFF2-40B4-BE49-F238E27FC236}">
+                  <a16:creationId xmlns:a16="http://schemas.microsoft.com/office/drawing/2014/main" id="{C54AF0AD-A7E8-47DE-A496-07D9598E25F7}"/>
+                </a:ext>
+              </a:extLst>
+            </p:cNvPr>
             <p:cNvCxnSpPr>
-              <a:stCxn id="30" idx="0"/>
-              <a:endCxn id="46" idx="3"/>
+              <a:cxnSpLocks/>
+              <a:stCxn id="77" idx="0"/>
+              <a:endCxn id="87" idx="3"/>
             </p:cNvCxnSpPr>
             <p:nvPr/>
           </p:nvCxnSpPr>
           <p:spPr bwMode="auto">
             <a:xfrm rot="16200000" flipV="1">
-              <a:off x="2849653" y="2930740"/>
-              <a:ext cx="575557" cy="1247952"/>
+              <a:off x="2853500" y="2926893"/>
+              <a:ext cx="567863" cy="1247951"/>
             </a:xfrm>
             <a:prstGeom prst="bentConnector3">
               <a:avLst>
@@ -9601,7 +9793,13 @@
         </p:cxnSp>
         <p:sp>
           <p:nvSpPr>
-            <p:cNvPr id="33" name="Text Box 9"/>
+            <p:cNvPr id="79" name="Text Box 9">
+              <a:extLst>
+                <a:ext uri="{FF2B5EF4-FFF2-40B4-BE49-F238E27FC236}">
+                  <a16:creationId xmlns:a16="http://schemas.microsoft.com/office/drawing/2014/main" id="{9B790620-C9F8-4700-B91A-F0EF4DCBC843}"/>
+                </a:ext>
+              </a:extLst>
+            </p:cNvPr>
             <p:cNvSpPr txBox="1">
               <a:spLocks noChangeArrowheads="1"/>
             </p:cNvSpPr>
@@ -9647,7 +9845,13 @@
         </p:sp>
         <p:sp>
           <p:nvSpPr>
-            <p:cNvPr id="34" name="Text Box 9"/>
+            <p:cNvPr id="80" name="Text Box 9">
+              <a:extLst>
+                <a:ext uri="{FF2B5EF4-FFF2-40B4-BE49-F238E27FC236}">
+                  <a16:creationId xmlns:a16="http://schemas.microsoft.com/office/drawing/2014/main" id="{335FBB95-8BFA-4A2F-A432-A58E8A64445D}"/>
+                </a:ext>
+              </a:extLst>
+            </p:cNvPr>
             <p:cNvSpPr txBox="1">
               <a:spLocks noChangeArrowheads="1"/>
             </p:cNvSpPr>
@@ -9693,10 +9897,17 @@
         </p:sp>
         <p:cxnSp>
           <p:nvCxnSpPr>
-            <p:cNvPr id="36" name="Elbow Connector 35"/>
+            <p:cNvPr id="81" name="Elbow Connector 35">
+              <a:extLst>
+                <a:ext uri="{FF2B5EF4-FFF2-40B4-BE49-F238E27FC236}">
+                  <a16:creationId xmlns:a16="http://schemas.microsoft.com/office/drawing/2014/main" id="{BB8FAE5C-A368-49D5-AC53-442D599F69A9}"/>
+                </a:ext>
+              </a:extLst>
+            </p:cNvPr>
             <p:cNvCxnSpPr>
-              <a:stCxn id="33" idx="0"/>
-              <a:endCxn id="50" idx="3"/>
+              <a:cxnSpLocks/>
+              <a:stCxn id="79" idx="0"/>
+              <a:endCxn id="91" idx="3"/>
             </p:cNvCxnSpPr>
             <p:nvPr/>
           </p:nvCxnSpPr>
@@ -9723,10 +9934,17 @@
         </p:cxnSp>
         <p:cxnSp>
           <p:nvCxnSpPr>
-            <p:cNvPr id="38" name="Elbow Connector 37"/>
+            <p:cNvPr id="82" name="Elbow Connector 37">
+              <a:extLst>
+                <a:ext uri="{FF2B5EF4-FFF2-40B4-BE49-F238E27FC236}">
+                  <a16:creationId xmlns:a16="http://schemas.microsoft.com/office/drawing/2014/main" id="{F3D493A6-9B03-4FF3-BBF0-9AC88FE51A72}"/>
+                </a:ext>
+              </a:extLst>
+            </p:cNvPr>
             <p:cNvCxnSpPr>
-              <a:stCxn id="34" idx="0"/>
-              <a:endCxn id="50" idx="3"/>
+              <a:cxnSpLocks/>
+              <a:stCxn id="80" idx="0"/>
+              <a:endCxn id="91" idx="3"/>
             </p:cNvCxnSpPr>
             <p:nvPr/>
           </p:nvCxnSpPr>
@@ -9753,7 +9971,13 @@
         </p:cxnSp>
         <p:sp>
           <p:nvSpPr>
-            <p:cNvPr id="39" name="Text Box 9"/>
+            <p:cNvPr id="83" name="Text Box 9">
+              <a:extLst>
+                <a:ext uri="{FF2B5EF4-FFF2-40B4-BE49-F238E27FC236}">
+                  <a16:creationId xmlns:a16="http://schemas.microsoft.com/office/drawing/2014/main" id="{F414C239-7E1B-4DE7-BCB7-3ADD2B5CE68D}"/>
+                </a:ext>
+              </a:extLst>
+            </p:cNvPr>
             <p:cNvSpPr txBox="1">
               <a:spLocks noChangeArrowheads="1"/>
             </p:cNvSpPr>
@@ -9761,7 +9985,7 @@
           </p:nvSpPr>
           <p:spPr bwMode="auto">
             <a:xfrm>
-              <a:off x="714675" y="3842494"/>
+              <a:off x="714675" y="3834800"/>
               <a:ext cx="1072409" cy="339196"/>
             </a:xfrm>
             <a:prstGeom prst="rect">
@@ -9799,10 +10023,17 @@
         </p:sp>
         <p:cxnSp>
           <p:nvCxnSpPr>
-            <p:cNvPr id="43" name="Elbow Connector 42"/>
+            <p:cNvPr id="84" name="Elbow Connector 42">
+              <a:extLst>
+                <a:ext uri="{FF2B5EF4-FFF2-40B4-BE49-F238E27FC236}">
+                  <a16:creationId xmlns:a16="http://schemas.microsoft.com/office/drawing/2014/main" id="{0EE98565-039D-4DB9-898D-2177728AFE9E}"/>
+                </a:ext>
+              </a:extLst>
+            </p:cNvPr>
             <p:cNvCxnSpPr>
-              <a:stCxn id="11273" idx="0"/>
-              <a:endCxn id="51" idx="3"/>
+              <a:cxnSpLocks/>
+              <a:stCxn id="57" idx="0"/>
+              <a:endCxn id="92" idx="3"/>
             </p:cNvCxnSpPr>
             <p:nvPr/>
           </p:nvCxnSpPr>
@@ -9829,10 +10060,17 @@
         </p:cxnSp>
         <p:cxnSp>
           <p:nvCxnSpPr>
-            <p:cNvPr id="45" name="Elbow Connector 44"/>
+            <p:cNvPr id="85" name="Elbow Connector 44">
+              <a:extLst>
+                <a:ext uri="{FF2B5EF4-FFF2-40B4-BE49-F238E27FC236}">
+                  <a16:creationId xmlns:a16="http://schemas.microsoft.com/office/drawing/2014/main" id="{F4023867-B28B-405A-85A3-4DC805E0A6DA}"/>
+                </a:ext>
+              </a:extLst>
+            </p:cNvPr>
             <p:cNvCxnSpPr>
-              <a:stCxn id="11274" idx="0"/>
-              <a:endCxn id="51" idx="3"/>
+              <a:cxnSpLocks/>
+              <a:stCxn id="58" idx="0"/>
+              <a:endCxn id="92" idx="3"/>
             </p:cNvCxnSpPr>
             <p:nvPr/>
           </p:nvCxnSpPr>
@@ -9859,7 +10097,13 @@
         </p:cxnSp>
         <p:sp>
           <p:nvSpPr>
-            <p:cNvPr id="2" name="Isosceles Triangle 1"/>
+            <p:cNvPr id="86" name="Isosceles Triangle 85">
+              <a:extLst>
+                <a:ext uri="{FF2B5EF4-FFF2-40B4-BE49-F238E27FC236}">
+                  <a16:creationId xmlns:a16="http://schemas.microsoft.com/office/drawing/2014/main" id="{E8AF821E-09EB-43F1-AC58-3B880BD82154}"/>
+                </a:ext>
+              </a:extLst>
+            </p:cNvPr>
             <p:cNvSpPr/>
             <p:nvPr/>
           </p:nvSpPr>
@@ -9922,7 +10166,13 @@
         </p:sp>
         <p:sp>
           <p:nvSpPr>
-            <p:cNvPr id="46" name="Isosceles Triangle 45"/>
+            <p:cNvPr id="87" name="Isosceles Triangle 86">
+              <a:extLst>
+                <a:ext uri="{FF2B5EF4-FFF2-40B4-BE49-F238E27FC236}">
+                  <a16:creationId xmlns:a16="http://schemas.microsoft.com/office/drawing/2014/main" id="{120BEAE9-88F7-4AD8-AB4C-C8106BE80AD7}"/>
+                </a:ext>
+              </a:extLst>
+            </p:cNvPr>
             <p:cNvSpPr/>
             <p:nvPr/>
           </p:nvSpPr>
@@ -9985,7 +10235,13 @@
         </p:sp>
         <p:sp>
           <p:nvSpPr>
-            <p:cNvPr id="47" name="Isosceles Triangle 46"/>
+            <p:cNvPr id="88" name="Isosceles Triangle 87">
+              <a:extLst>
+                <a:ext uri="{FF2B5EF4-FFF2-40B4-BE49-F238E27FC236}">
+                  <a16:creationId xmlns:a16="http://schemas.microsoft.com/office/drawing/2014/main" id="{981C18AD-C79F-4084-959B-2A2ACFD3B4A4}"/>
+                </a:ext>
+              </a:extLst>
+            </p:cNvPr>
             <p:cNvSpPr/>
             <p:nvPr/>
           </p:nvSpPr>
@@ -10048,13 +10304,19 @@
         </p:sp>
         <p:sp>
           <p:nvSpPr>
-            <p:cNvPr id="48" name="Isosceles Triangle 47"/>
+            <p:cNvPr id="89" name="Isosceles Triangle 88">
+              <a:extLst>
+                <a:ext uri="{FF2B5EF4-FFF2-40B4-BE49-F238E27FC236}">
+                  <a16:creationId xmlns:a16="http://schemas.microsoft.com/office/drawing/2014/main" id="{9C8DBBD4-A218-4C74-8D73-ADEEF7769C8C}"/>
+                </a:ext>
+              </a:extLst>
+            </p:cNvPr>
             <p:cNvSpPr/>
             <p:nvPr/>
           </p:nvSpPr>
           <p:spPr bwMode="auto">
             <a:xfrm>
-              <a:off x="7830295" y="3096735"/>
+              <a:off x="7771108" y="3096735"/>
               <a:ext cx="164592" cy="164592"/>
             </a:xfrm>
             <a:prstGeom prst="triangle">
@@ -10111,13 +10373,19 @@
         </p:sp>
         <p:sp>
           <p:nvSpPr>
-            <p:cNvPr id="49" name="Isosceles Triangle 48"/>
+            <p:cNvPr id="90" name="Isosceles Triangle 89">
+              <a:extLst>
+                <a:ext uri="{FF2B5EF4-FFF2-40B4-BE49-F238E27FC236}">
+                  <a16:creationId xmlns:a16="http://schemas.microsoft.com/office/drawing/2014/main" id="{7A5A11E5-E91B-4A0B-956E-24E767EE7FC7}"/>
+                </a:ext>
+              </a:extLst>
+            </p:cNvPr>
             <p:cNvSpPr/>
             <p:nvPr/>
           </p:nvSpPr>
           <p:spPr bwMode="auto">
             <a:xfrm>
-              <a:off x="7300774" y="4180365"/>
+              <a:off x="7146693" y="4180365"/>
               <a:ext cx="164592" cy="164592"/>
             </a:xfrm>
             <a:prstGeom prst="triangle">
@@ -10174,7 +10442,13 @@
         </p:sp>
         <p:sp>
           <p:nvSpPr>
-            <p:cNvPr id="50" name="Isosceles Triangle 49"/>
+            <p:cNvPr id="91" name="Isosceles Triangle 90">
+              <a:extLst>
+                <a:ext uri="{FF2B5EF4-FFF2-40B4-BE49-F238E27FC236}">
+                  <a16:creationId xmlns:a16="http://schemas.microsoft.com/office/drawing/2014/main" id="{165E4737-FE29-4F31-B899-70A015F44E69}"/>
+                </a:ext>
+              </a:extLst>
+            </p:cNvPr>
             <p:cNvSpPr/>
             <p:nvPr/>
           </p:nvSpPr>
@@ -10237,7 +10511,13 @@
         </p:sp>
         <p:sp>
           <p:nvSpPr>
-            <p:cNvPr id="51" name="Isosceles Triangle 50"/>
+            <p:cNvPr id="92" name="Isosceles Triangle 91">
+              <a:extLst>
+                <a:ext uri="{FF2B5EF4-FFF2-40B4-BE49-F238E27FC236}">
+                  <a16:creationId xmlns:a16="http://schemas.microsoft.com/office/drawing/2014/main" id="{142BBE10-F037-4192-A9B4-843A42F095C5}"/>
+                </a:ext>
+              </a:extLst>
+            </p:cNvPr>
             <p:cNvSpPr/>
             <p:nvPr/>
           </p:nvSpPr>
@@ -10299,35 +10579,6 @@
           </p:txBody>
         </p:sp>
       </p:grpSp>
-      <p:sp>
-        <p:nvSpPr>
-          <p:cNvPr id="23" name="TextBox 22"/>
-          <p:cNvSpPr txBox="1"/>
-          <p:nvPr/>
-        </p:nvSpPr>
-        <p:spPr>
-          <a:xfrm>
-            <a:off x="1752959" y="5638800"/>
-            <a:ext cx="5638083" cy="400110"/>
-          </a:xfrm>
-          <a:prstGeom prst="rect">
-            <a:avLst/>
-          </a:prstGeom>
-          <a:noFill/>
-        </p:spPr>
-        <p:txBody>
-          <a:bodyPr wrap="none" rtlCol="0">
-            <a:spAutoFit/>
-          </a:bodyPr>
-          <a:lstStyle/>
-          <a:p>
-            <a:r>
-              <a:rPr lang="en-US" sz="2000" dirty="0"/>
-              <a:t>(names for abstract classes are shown in italics)</a:t>
-            </a:r>
-          </a:p>
-        </p:txBody>
-      </p:sp>
     </p:spTree>
   </p:cSld>
   <p:clrMapOvr>

</xml_diff>

<commit_message>
minor change to one slide
</commit_message>
<xml_diff>
--- a/PowerPoint Slides/08 - Abstract Syntax Trees.pptx
+++ b/PowerPoint Slides/08 - Abstract Syntax Trees.pptx
@@ -24748,7 +24748,15 @@
           <a:p>
             <a:r>
               <a:rPr lang="en-US" dirty="0"/>
-              <a:t>Once a loop statement has been parsed, we don’t need to retain the nonterminal symbols.  The AST for a loop statement would contain only the statements in the body of the loop and the optional boolean expression (e.g., the reference to the boolean expression could be null).</a:t>
+              <a:t>Once a loop statement has been parsed, we don’t need to retain </a:t>
+            </a:r>
+            <a:r>
+              <a:rPr lang="en-US"/>
+              <a:t>the terminal </a:t>
+            </a:r>
+            <a:r>
+              <a:rPr lang="en-US" dirty="0"/>
+              <a:t>symbols.  The AST for a loop statement would contain only the statements in the body of the loop and the optional boolean expression (e.g., the reference to the boolean expression could be null).</a:t>
             </a:r>
           </a:p>
           <a:p>

</xml_diff>